<commit_message>
updated spelling on conops picture
</commit_message>
<xml_diff>
--- a/Presentations/PDR_Presentation.pptx
+++ b/Presentations/PDR_Presentation.pptx
@@ -133,7 +133,7 @@
   </p:defaultTextStyle>
   <p:extLst>
     <p:ext uri="{EFAFB233-063F-42B5-8137-9DF3F51BA10A}">
-      <p15:sldGuideLst xmlns:p15="http://schemas.microsoft.com/office/powerpoint/2012/main"/>
+      <p15:sldGuideLst xmlns:p15="http://schemas.microsoft.com/office/powerpoint/2012/main" xmlns=""/>
     </p:ext>
   </p:extLst>
 </p:presentation>
@@ -7343,11 +7343,7 @@
           <a:p>
             <a:r>
               <a:rPr lang="en-US" sz="6000" dirty="0" smtClean="0"/>
-              <a:t>Attitude </a:t>
-            </a:r>
-            <a:r>
-              <a:rPr lang="en-US" sz="6000" dirty="0" smtClean="0"/>
-              <a:t>Control</a:t>
+              <a:t>Attitude Control</a:t>
             </a:r>
             <a:endParaRPr lang="en-US" sz="6000" dirty="0"/>
           </a:p>
@@ -7454,11 +7450,7 @@
             <a:pPr lvl="1"/>
             <a:r>
               <a:rPr lang="en-US" dirty="0" smtClean="0"/>
-              <a:t>Using </a:t>
-            </a:r>
-            <a:r>
-              <a:rPr lang="en-US" dirty="0" smtClean="0"/>
-              <a:t>a bar magnet to align with the Earth’s magnetic field</a:t>
+              <a:t>Using a bar magnet to align with the Earth’s magnetic field</a:t>
             </a:r>
           </a:p>
           <a:p>
@@ -8705,39 +8697,9 @@
           <a:chExt cx="0" cy="0"/>
         </a:xfrm>
       </p:grpSpPr>
-      <p:sp>
-        <p:nvSpPr>
-          <p:cNvPr id="2" name="Title 1"/>
-          <p:cNvSpPr>
-            <a:spLocks noGrp="1"/>
-          </p:cNvSpPr>
-          <p:nvPr>
-            <p:ph type="title"/>
-          </p:nvPr>
-        </p:nvSpPr>
-        <p:spPr>
-          <a:xfrm>
-            <a:off x="838200" y="365125"/>
-            <a:ext cx="10515600" cy="587375"/>
-          </a:xfrm>
-        </p:spPr>
-        <p:txBody>
-          <a:bodyPr>
-            <a:normAutofit fontScale="90000"/>
-          </a:bodyPr>
-          <a:lstStyle/>
-          <a:p>
-            <a:r>
-              <a:rPr lang="en-US" dirty="0" smtClean="0"/>
-              <a:t>Conceptual View</a:t>
-            </a:r>
-            <a:endParaRPr lang="en-US" dirty="0"/>
-          </a:p>
-        </p:txBody>
-      </p:sp>
       <p:pic>
         <p:nvPicPr>
-          <p:cNvPr id="6" name="Content Placeholder 5"/>
+          <p:cNvPr id="4" name="Content Placeholder 3"/>
           <p:cNvPicPr>
             <a:picLocks noGrp="1" noChangeAspect="1"/>
           </p:cNvPicPr>
@@ -8759,11 +8721,41 @@
         </p:blipFill>
         <p:spPr>
           <a:xfrm>
-            <a:off x="2485370" y="1138237"/>
-            <a:ext cx="7221260" cy="5379839"/>
+            <a:off x="1931499" y="1084972"/>
+            <a:ext cx="7319033" cy="5452680"/>
           </a:xfrm>
         </p:spPr>
       </p:pic>
+      <p:sp>
+        <p:nvSpPr>
+          <p:cNvPr id="2" name="Title 1"/>
+          <p:cNvSpPr>
+            <a:spLocks noGrp="1"/>
+          </p:cNvSpPr>
+          <p:nvPr>
+            <p:ph type="title"/>
+          </p:nvPr>
+        </p:nvSpPr>
+        <p:spPr>
+          <a:xfrm>
+            <a:off x="838200" y="365125"/>
+            <a:ext cx="10515600" cy="587375"/>
+          </a:xfrm>
+        </p:spPr>
+        <p:txBody>
+          <a:bodyPr>
+            <a:normAutofit fontScale="90000"/>
+          </a:bodyPr>
+          <a:lstStyle/>
+          <a:p>
+            <a:r>
+              <a:rPr lang="en-US" dirty="0" smtClean="0"/>
+              <a:t>Conceptual View</a:t>
+            </a:r>
+            <a:endParaRPr lang="en-US" dirty="0"/>
+          </a:p>
+        </p:txBody>
+      </p:sp>
       <p:sp>
         <p:nvSpPr>
           <p:cNvPr id="8" name="TextBox 7"/>
@@ -8772,7 +8764,7 @@
         </p:nvSpPr>
         <p:spPr>
           <a:xfrm>
-            <a:off x="2628900" y="1542896"/>
+            <a:off x="2140629" y="1545824"/>
             <a:ext cx="5234940" cy="400110"/>
           </a:xfrm>
           <a:prstGeom prst="rect">
@@ -8801,7 +8793,7 @@
         </p:nvSpPr>
         <p:spPr>
           <a:xfrm>
-            <a:off x="2628900" y="2128743"/>
+            <a:off x="2140629" y="2128742"/>
             <a:ext cx="4934494" cy="2585323"/>
           </a:xfrm>
           <a:prstGeom prst="rect">
@@ -9881,11 +9873,7 @@
           <a:p>
             <a:r>
               <a:rPr lang="en-US" dirty="0" smtClean="0"/>
-              <a:t>Power Management</a:t>
-            </a:r>
-            <a:r>
-              <a:rPr lang="en-US" dirty="0" smtClean="0"/>
-              <a:t>	</a:t>
+              <a:t>Power Management	</a:t>
             </a:r>
             <a:endParaRPr lang="en-US" dirty="0"/>
           </a:p>
@@ -9987,7 +9975,6 @@
               <a:rPr lang="en-US" sz="2200" dirty="0" smtClean="0"/>
               <a:t>Requirements</a:t>
             </a:r>
-            <a:endParaRPr lang="en-US" sz="2200" dirty="0" smtClean="0"/>
           </a:p>
           <a:p>
             <a:pPr lvl="1">
@@ -9997,11 +9984,7 @@
             </a:pPr>
             <a:r>
               <a:rPr lang="en-US" dirty="0" smtClean="0"/>
-              <a:t>Supply </a:t>
-            </a:r>
-            <a:r>
-              <a:rPr lang="en-US" dirty="0" smtClean="0"/>
-              <a:t>Subsystems with Power Demands</a:t>
+              <a:t>Supply Subsystems with Power Demands</a:t>
             </a:r>
           </a:p>
           <a:p>
@@ -10012,11 +9995,7 @@
             </a:pPr>
             <a:r>
               <a:rPr lang="en-US" dirty="0" smtClean="0"/>
-              <a:t>Shall supply </a:t>
-            </a:r>
-            <a:r>
-              <a:rPr lang="en-US" dirty="0" smtClean="0"/>
-              <a:t>power demands for payload and subsystems for full orbital period.</a:t>
+              <a:t>Shall supply power demands for payload and subsystems for full orbital period.</a:t>
             </a:r>
           </a:p>
           <a:p>
@@ -10027,11 +10006,7 @@
             </a:pPr>
             <a:r>
               <a:rPr lang="en-US" dirty="0" smtClean="0"/>
-              <a:t>Shall supply </a:t>
-            </a:r>
-            <a:r>
-              <a:rPr lang="en-US" dirty="0" smtClean="0"/>
-              <a:t>adequate battery storage to supply priority systems through non-sun lit portions of orbit.</a:t>
+              <a:t>Shall supply adequate battery storage to supply priority systems through non-sun lit portions of orbit.</a:t>
             </a:r>
             <a:endParaRPr lang="en-US" dirty="0"/>
           </a:p>
@@ -10054,11 +10029,7 @@
             </a:pPr>
             <a:r>
               <a:rPr lang="en-US" dirty="0" smtClean="0"/>
-              <a:t>Shall have </a:t>
-            </a:r>
-            <a:r>
-              <a:rPr lang="en-US" dirty="0" smtClean="0"/>
-              <a:t>Power Safety Mode, provides priority systems shut off sequence to conserve low batteries.</a:t>
+              <a:t>Shall have Power Safety Mode, provides priority systems shut off sequence to conserve low batteries.</a:t>
             </a:r>
           </a:p>
           <a:p>
@@ -10077,35 +10048,7 @@
             </a:r>
             <a:r>
               <a:rPr lang="en-US" dirty="0" smtClean="0"/>
-              <a:t>hall be </a:t>
-            </a:r>
-            <a:r>
-              <a:rPr lang="en-US" dirty="0" smtClean="0"/>
-              <a:t>able to launch with all systems powered off and batteries fully discharged. </a:t>
-            </a:r>
-            <a:r>
-              <a:rPr lang="en-US" dirty="0" smtClean="0"/>
-              <a:t>Shall be </a:t>
-            </a:r>
-            <a:r>
-              <a:rPr lang="en-US" dirty="0" smtClean="0"/>
-              <a:t>able </a:t>
-            </a:r>
-            <a:r>
-              <a:rPr lang="en-US" dirty="0" smtClean="0"/>
-              <a:t>to </a:t>
-            </a:r>
-            <a:r>
-              <a:rPr lang="en-US" dirty="0" smtClean="0"/>
-              <a:t>power-on </a:t>
-            </a:r>
-            <a:r>
-              <a:rPr lang="en-US" dirty="0" smtClean="0"/>
-              <a:t>systems </a:t>
-            </a:r>
-            <a:r>
-              <a:rPr lang="en-US" dirty="0" smtClean="0"/>
-              <a:t>once deployed.</a:t>
+              <a:t>hall be able to launch with all systems powered off and batteries fully discharged. Shall be able to power-on systems once deployed.</a:t>
             </a:r>
           </a:p>
           <a:p>
@@ -10116,11 +10059,7 @@
             </a:pPr>
             <a:r>
               <a:rPr lang="en-US" dirty="0" smtClean="0"/>
-              <a:t>Shall supply </a:t>
-            </a:r>
-            <a:r>
-              <a:rPr lang="en-US" dirty="0" smtClean="0"/>
-              <a:t>ease of access to power system’s inputs and terminals. </a:t>
+              <a:t>Shall supply ease of access to power system’s inputs and terminals. </a:t>
             </a:r>
           </a:p>
         </p:txBody>
@@ -10549,10 +10488,6 @@
               <a:rPr lang="en-US" dirty="0" smtClean="0"/>
               <a:t>Power Management</a:t>
             </a:r>
-            <a:r>
-              <a:rPr lang="en-US" dirty="0" smtClean="0"/>
-              <a:t/>
-            </a:r>
             <a:br>
               <a:rPr lang="en-US" dirty="0" smtClean="0"/>
             </a:br>
@@ -10596,15 +10531,7 @@
             <a:pPr lvl="1"/>
             <a:r>
               <a:rPr lang="en-US" dirty="0" smtClean="0"/>
-              <a:t>Power </a:t>
-            </a:r>
-            <a:r>
-              <a:rPr lang="en-US" dirty="0" smtClean="0"/>
-              <a:t>Management </a:t>
-            </a:r>
-            <a:r>
-              <a:rPr lang="en-US" dirty="0" smtClean="0"/>
-              <a:t>Board</a:t>
+              <a:t>Power Management Board</a:t>
             </a:r>
           </a:p>
           <a:p>
@@ -11074,43 +11001,16 @@
               <a:rPr lang="en-US" dirty="0" smtClean="0">
                 <a:sym typeface="Wingdings" panose="05000000000000000000" pitchFamily="2" charset="2"/>
               </a:rPr>
-              <a:t> </a:t>
-            </a:r>
+              <a:t> of 4 required</a:t>
+            </a:r>
+          </a:p>
+          <a:p>
+            <a:pPr lvl="1"/>
             <a:r>
               <a:rPr lang="en-US" dirty="0" smtClean="0">
                 <a:sym typeface="Wingdings" panose="05000000000000000000" pitchFamily="2" charset="2"/>
               </a:rPr>
-              <a:t>of 4 </a:t>
-            </a:r>
-            <a:r>
-              <a:rPr lang="en-US" dirty="0" smtClean="0">
-                <a:sym typeface="Wingdings" panose="05000000000000000000" pitchFamily="2" charset="2"/>
-              </a:rPr>
-              <a:t>requi</a:t>
-            </a:r>
-            <a:r>
-              <a:rPr lang="en-US" dirty="0" smtClean="0">
-                <a:sym typeface="Wingdings" panose="05000000000000000000" pitchFamily="2" charset="2"/>
-              </a:rPr>
-              <a:t>red</a:t>
-            </a:r>
-            <a:endParaRPr lang="en-US" dirty="0" smtClean="0">
-              <a:sym typeface="Wingdings" panose="05000000000000000000" pitchFamily="2" charset="2"/>
-            </a:endParaRPr>
-          </a:p>
-          <a:p>
-            <a:pPr lvl="1"/>
-            <a:r>
-              <a:rPr lang="en-US" dirty="0" smtClean="0">
-                <a:sym typeface="Wingdings" panose="05000000000000000000" pitchFamily="2" charset="2"/>
-              </a:rPr>
-              <a:t>Suppliers </a:t>
-            </a:r>
-            <a:r>
-              <a:rPr lang="en-US" dirty="0" smtClean="0">
-                <a:sym typeface="Wingdings" panose="05000000000000000000" pitchFamily="2" charset="2"/>
-              </a:rPr>
-              <a:t>include </a:t>
+              <a:t>Suppliers include </a:t>
             </a:r>
             <a:r>
               <a:rPr lang="en-US" dirty="0" err="1" smtClean="0">
@@ -11220,9 +11120,6 @@
               </a:rPr>
               <a:t>Read and controls hardware in and output usage</a:t>
             </a:r>
-            <a:endParaRPr lang="en-US" dirty="0" smtClean="0">
-              <a:sym typeface="Wingdings" panose="05000000000000000000" pitchFamily="2" charset="2"/>
-            </a:endParaRPr>
           </a:p>
           <a:p>
             <a:pPr lvl="1"/>
@@ -11666,7 +11563,15 @@
             <a:pPr lvl="1"/>
             <a:r>
               <a:rPr lang="en-US" dirty="0" smtClean="0"/>
-              <a:t>Provides environmental data to payload with priority</a:t>
+              <a:t>Provides environmental data </a:t>
+            </a:r>
+            <a:r>
+              <a:rPr lang="en-US" dirty="0" smtClean="0"/>
+              <a:t>(time, attitude, position) to </a:t>
+            </a:r>
+            <a:r>
+              <a:rPr lang="en-US" dirty="0" smtClean="0"/>
+              <a:t>payload with priority</a:t>
             </a:r>
           </a:p>
           <a:p>
@@ -11722,8 +11627,17 @@
             <a:pPr lvl="1"/>
             <a:r>
               <a:rPr lang="en-US" dirty="0" smtClean="0"/>
-              <a:t>Attitude Determination and Navigation Systems</a:t>
-            </a:r>
+              <a:t>Attitude Determination and </a:t>
+            </a:r>
+            <a:r>
+              <a:rPr lang="en-US" smtClean="0"/>
+              <a:t>Navigation </a:t>
+            </a:r>
+            <a:r>
+              <a:rPr lang="en-US" smtClean="0"/>
+              <a:t>Control Systems</a:t>
+            </a:r>
+            <a:endParaRPr lang="en-US" dirty="0" smtClean="0"/>
           </a:p>
           <a:p>
             <a:pPr lvl="1"/>
@@ -13260,7 +13174,7 @@
   <a:extraClrSchemeLst/>
   <a:extLst>
     <a:ext uri="{05A4C25C-085E-4340-85A3-A5531E510DB2}">
-      <thm15:themeFamily xmlns:thm15="http://schemas.microsoft.com/office/thememl/2012/main" name="Ion" id="{B8441ADB-2E43-4AF7-B97A-BD870242C6A8}" vid="{292E63A9-BB86-4E3D-B92A-7223C6510D2E}"/>
+      <thm15:themeFamily xmlns:thm15="http://schemas.microsoft.com/office/thememl/2012/main" xmlns="" name="Ion" id="{B8441ADB-2E43-4AF7-B97A-BD870242C6A8}" vid="{292E63A9-BB86-4E3D-B92A-7223C6510D2E}"/>
     </a:ext>
   </a:extLst>
 </a:theme>
@@ -13521,7 +13435,7 @@
   <a:extraClrSchemeLst/>
   <a:extLst>
     <a:ext uri="{05A4C25C-085E-4340-85A3-A5531E510DB2}">
-      <thm15:themeFamily xmlns:thm15="http://schemas.microsoft.com/office/thememl/2012/main" name="Office Theme" id="{62F939B6-93AF-4DB8-9C6B-D6C7DFDC589F}" vid="{4A3C46E8-61CC-4603-A589-7422A47A8E4A}"/>
+      <thm15:themeFamily xmlns:thm15="http://schemas.microsoft.com/office/thememl/2012/main" xmlns="" name="Office Theme" id="{62F939B6-93AF-4DB8-9C6B-D6C7DFDC589F}" vid="{4A3C46E8-61CC-4603-A589-7422A47A8E4A}"/>
     </a:ext>
   </a:extLst>
 </a:theme>

</xml_diff>

<commit_message>
Added The power draw for the OBC, Sun Sensors, and Solar Cells
Battery remains variable, as it depends upon the voltage .
</commit_message>
<xml_diff>
--- a/Presentations/PDR_Presentation.pptx
+++ b/Presentations/PDR_Presentation.pptx
@@ -133,7 +133,7 @@
   </p:defaultTextStyle>
   <p:extLst>
     <p:ext uri="{EFAFB233-063F-42B5-8137-9DF3F51BA10A}">
-      <p15:sldGuideLst xmlns:p15="http://schemas.microsoft.com/office/powerpoint/2012/main" xmlns=""/>
+      <p15:sldGuideLst xmlns="" xmlns:p15="http://schemas.microsoft.com/office/powerpoint/2012/main"/>
     </p:ext>
   </p:extLst>
 </p:presentation>
@@ -221,7 +221,7 @@
           <a:p>
             <a:fld id="{90D58D52-5CD9-4A4B-90F0-A7AB4F899008}" type="datetimeFigureOut">
               <a:rPr lang="en-US" smtClean="0"/>
-              <a:t>10/7/2015</a:t>
+              <a:t>10/7/15</a:t>
             </a:fld>
             <a:endParaRPr lang="en-US"/>
           </a:p>
@@ -1051,7 +1051,7 @@
           <a:p>
             <a:fld id="{E20D963B-2D4F-495B-A2B5-E46053ACE7DA}" type="datetimeFigureOut">
               <a:rPr lang="en-US" smtClean="0"/>
-              <a:t>10/7/2015</a:t>
+              <a:t>10/7/15</a:t>
             </a:fld>
             <a:endParaRPr lang="en-US"/>
           </a:p>
@@ -1326,7 +1326,7 @@
           <a:p>
             <a:fld id="{E20D963B-2D4F-495B-A2B5-E46053ACE7DA}" type="datetimeFigureOut">
               <a:rPr lang="en-US" smtClean="0"/>
-              <a:t>10/7/2015</a:t>
+              <a:t>10/7/15</a:t>
             </a:fld>
             <a:endParaRPr lang="en-US"/>
           </a:p>
@@ -1520,7 +1520,7 @@
           <a:p>
             <a:fld id="{E20D963B-2D4F-495B-A2B5-E46053ACE7DA}" type="datetimeFigureOut">
               <a:rPr lang="en-US" smtClean="0"/>
-              <a:t>10/7/2015</a:t>
+              <a:t>10/7/15</a:t>
             </a:fld>
             <a:endParaRPr lang="en-US"/>
           </a:p>
@@ -1793,7 +1793,7 @@
           <a:p>
             <a:fld id="{E20D963B-2D4F-495B-A2B5-E46053ACE7DA}" type="datetimeFigureOut">
               <a:rPr lang="en-US" smtClean="0"/>
-              <a:t>10/7/2015</a:t>
+              <a:t>10/7/15</a:t>
             </a:fld>
             <a:endParaRPr lang="en-US"/>
           </a:p>
@@ -2134,7 +2134,7 @@
           <a:p>
             <a:fld id="{E20D963B-2D4F-495B-A2B5-E46053ACE7DA}" type="datetimeFigureOut">
               <a:rPr lang="en-US" smtClean="0"/>
-              <a:t>10/7/2015</a:t>
+              <a:t>10/7/15</a:t>
             </a:fld>
             <a:endParaRPr lang="en-US"/>
           </a:p>
@@ -2757,7 +2757,7 @@
           <a:p>
             <a:fld id="{E20D963B-2D4F-495B-A2B5-E46053ACE7DA}" type="datetimeFigureOut">
               <a:rPr lang="en-US" smtClean="0"/>
-              <a:t>10/7/2015</a:t>
+              <a:t>10/7/15</a:t>
             </a:fld>
             <a:endParaRPr lang="en-US"/>
           </a:p>
@@ -3617,7 +3617,7 @@
           <a:p>
             <a:fld id="{E20D963B-2D4F-495B-A2B5-E46053ACE7DA}" type="datetimeFigureOut">
               <a:rPr lang="en-US" smtClean="0"/>
-              <a:t>10/7/2015</a:t>
+              <a:t>10/7/15</a:t>
             </a:fld>
             <a:endParaRPr lang="en-US"/>
           </a:p>
@@ -3787,7 +3787,7 @@
           <a:p>
             <a:fld id="{E20D963B-2D4F-495B-A2B5-E46053ACE7DA}" type="datetimeFigureOut">
               <a:rPr lang="en-US" smtClean="0"/>
-              <a:t>10/7/2015</a:t>
+              <a:t>10/7/15</a:t>
             </a:fld>
             <a:endParaRPr lang="en-US"/>
           </a:p>
@@ -3967,7 +3967,7 @@
           <a:p>
             <a:fld id="{E20D963B-2D4F-495B-A2B5-E46053ACE7DA}" type="datetimeFigureOut">
               <a:rPr lang="en-US" smtClean="0"/>
-              <a:t>10/7/2015</a:t>
+              <a:t>10/7/15</a:t>
             </a:fld>
             <a:endParaRPr lang="en-US"/>
           </a:p>
@@ -4137,7 +4137,7 @@
           <a:p>
             <a:fld id="{E20D963B-2D4F-495B-A2B5-E46053ACE7DA}" type="datetimeFigureOut">
               <a:rPr lang="en-US" smtClean="0"/>
-              <a:t>10/7/2015</a:t>
+              <a:t>10/7/15</a:t>
             </a:fld>
             <a:endParaRPr lang="en-US"/>
           </a:p>
@@ -4384,7 +4384,7 @@
           <a:p>
             <a:fld id="{E20D963B-2D4F-495B-A2B5-E46053ACE7DA}" type="datetimeFigureOut">
               <a:rPr lang="en-US" smtClean="0"/>
-              <a:t>10/7/2015</a:t>
+              <a:t>10/7/15</a:t>
             </a:fld>
             <a:endParaRPr lang="en-US"/>
           </a:p>
@@ -4676,7 +4676,7 @@
           <a:p>
             <a:fld id="{E20D963B-2D4F-495B-A2B5-E46053ACE7DA}" type="datetimeFigureOut">
               <a:rPr lang="en-US" smtClean="0"/>
-              <a:t>10/7/2015</a:t>
+              <a:t>10/7/15</a:t>
             </a:fld>
             <a:endParaRPr lang="en-US"/>
           </a:p>
@@ -5120,7 +5120,7 @@
           <a:p>
             <a:fld id="{E20D963B-2D4F-495B-A2B5-E46053ACE7DA}" type="datetimeFigureOut">
               <a:rPr lang="en-US" smtClean="0"/>
-              <a:t>10/7/2015</a:t>
+              <a:t>10/7/15</a:t>
             </a:fld>
             <a:endParaRPr lang="en-US"/>
           </a:p>
@@ -5238,7 +5238,7 @@
           <a:p>
             <a:fld id="{E20D963B-2D4F-495B-A2B5-E46053ACE7DA}" type="datetimeFigureOut">
               <a:rPr lang="en-US" smtClean="0"/>
-              <a:t>10/7/2015</a:t>
+              <a:t>10/7/15</a:t>
             </a:fld>
             <a:endParaRPr lang="en-US"/>
           </a:p>
@@ -5333,7 +5333,7 @@
           <a:p>
             <a:fld id="{E20D963B-2D4F-495B-A2B5-E46053ACE7DA}" type="datetimeFigureOut">
               <a:rPr lang="en-US" smtClean="0"/>
-              <a:t>10/7/2015</a:t>
+              <a:t>10/7/15</a:t>
             </a:fld>
             <a:endParaRPr lang="en-US"/>
           </a:p>
@@ -5612,7 +5612,7 @@
           <a:p>
             <a:fld id="{E20D963B-2D4F-495B-A2B5-E46053ACE7DA}" type="datetimeFigureOut">
               <a:rPr lang="en-US" smtClean="0"/>
-              <a:t>10/7/2015</a:t>
+              <a:t>10/7/15</a:t>
             </a:fld>
             <a:endParaRPr lang="en-US"/>
           </a:p>
@@ -5887,7 +5887,7 @@
           <a:p>
             <a:fld id="{E20D963B-2D4F-495B-A2B5-E46053ACE7DA}" type="datetimeFigureOut">
               <a:rPr lang="en-US" smtClean="0"/>
-              <a:t>10/7/2015</a:t>
+              <a:t>10/7/15</a:t>
             </a:fld>
             <a:endParaRPr lang="en-US"/>
           </a:p>
@@ -6316,7 +6316,7 @@
           <a:p>
             <a:fld id="{E20D963B-2D4F-495B-A2B5-E46053ACE7DA}" type="datetimeFigureOut">
               <a:rPr lang="en-US" smtClean="0"/>
-              <a:t>10/7/2015</a:t>
+              <a:t>10/7/15</a:t>
             </a:fld>
             <a:endParaRPr lang="en-US"/>
           </a:p>
@@ -6899,7 +6899,7 @@
   <p:timing>
     <p:tnLst>
       <p:par>
-        <p:cTn id="1" dur="indefinite" restart="never" nodeType="tmRoot"/>
+        <p:cTn xmlns:p14="http://schemas.microsoft.com/office/powerpoint/2010/main" id="1" dur="indefinite" restart="never" nodeType="tmRoot"/>
       </p:par>
     </p:tnLst>
   </p:timing>
@@ -6959,7 +6959,7 @@
   <p:timing>
     <p:tnLst>
       <p:par>
-        <p:cTn id="1" dur="indefinite" restart="never" nodeType="tmRoot"/>
+        <p:cTn xmlns:p14="http://schemas.microsoft.com/office/powerpoint/2010/main" id="1" dur="indefinite" restart="never" nodeType="tmRoot"/>
       </p:par>
     </p:tnLst>
   </p:timing>
@@ -7362,7 +7362,7 @@
   <p:timing>
     <p:tnLst>
       <p:par>
-        <p:cTn id="1" dur="indefinite" restart="never" nodeType="tmRoot"/>
+        <p:cTn xmlns:p14="http://schemas.microsoft.com/office/powerpoint/2010/main" id="1" dur="indefinite" restart="never" nodeType="tmRoot"/>
       </p:par>
     </p:tnLst>
   </p:timing>
@@ -7494,7 +7494,7 @@
           </a:prstGeom>
           <a:noFill/>
           <a:extLst>
-            <a:ext uri="{909E8E84-426E-40DD-AFC4-6F175D3DCCD1}">
+            <a:ext uri="{909E8E84-426E-40dd-AFC4-6F175D3DCCD1}">
               <a14:hiddenFill xmlns:a14="http://schemas.microsoft.com/office/drawing/2010/main">
                 <a:solidFill>
                   <a:srgbClr val="FFFFFF"/>
@@ -7535,7 +7535,7 @@
           </a:prstGeom>
           <a:noFill/>
           <a:extLst>
-            <a:ext uri="{909E8E84-426E-40DD-AFC4-6F175D3DCCD1}">
+            <a:ext uri="{909E8E84-426E-40dd-AFC4-6F175D3DCCD1}">
               <a14:hiddenFill xmlns:a14="http://schemas.microsoft.com/office/drawing/2010/main">
                 <a:solidFill>
                   <a:srgbClr val="FFFFFF"/>
@@ -7611,7 +7611,7 @@
   <p:timing>
     <p:tnLst>
       <p:par>
-        <p:cTn id="1" dur="indefinite" restart="never" nodeType="tmRoot"/>
+        <p:cTn xmlns:p14="http://schemas.microsoft.com/office/powerpoint/2010/main" id="1" dur="indefinite" restart="never" nodeType="tmRoot"/>
       </p:par>
     </p:tnLst>
   </p:timing>
@@ -7768,7 +7768,7 @@
   <p:timing>
     <p:tnLst>
       <p:par>
-        <p:cTn id="1" dur="indefinite" restart="never" nodeType="tmRoot"/>
+        <p:cTn xmlns:p14="http://schemas.microsoft.com/office/powerpoint/2010/main" id="1" dur="indefinite" restart="never" nodeType="tmRoot"/>
       </p:par>
     </p:tnLst>
   </p:timing>
@@ -8673,7 +8673,7 @@
   <p:timing>
     <p:tnLst>
       <p:par>
-        <p:cTn id="1" dur="indefinite" restart="never" nodeType="tmRoot"/>
+        <p:cTn xmlns:p14="http://schemas.microsoft.com/office/powerpoint/2010/main" id="1" dur="indefinite" restart="never" nodeType="tmRoot"/>
       </p:par>
     </p:tnLst>
   </p:timing>
@@ -8887,7 +8887,7 @@
   <p:timing>
     <p:tnLst>
       <p:par>
-        <p:cTn id="1" dur="indefinite" restart="never" nodeType="tmRoot">
+        <p:cTn xmlns:p14="http://schemas.microsoft.com/office/powerpoint/2010/main" id="1" dur="indefinite" restart="never" nodeType="tmRoot">
           <p:childTnLst>
             <p:seq concurrent="1" nextAc="seek">
               <p:cTn id="2" dur="indefinite" nodeType="mainSeq">
@@ -9827,7 +9827,7 @@
   <p:timing>
     <p:tnLst>
       <p:par>
-        <p:cTn id="1" dur="indefinite" restart="never" nodeType="tmRoot"/>
+        <p:cTn xmlns:p14="http://schemas.microsoft.com/office/powerpoint/2010/main" id="1" dur="indefinite" restart="never" nodeType="tmRoot"/>
       </p:par>
     </p:tnLst>
   </p:timing>
@@ -9892,7 +9892,7 @@
   <p:timing>
     <p:tnLst>
       <p:par>
-        <p:cTn id="1" dur="indefinite" restart="never" nodeType="tmRoot"/>
+        <p:cTn xmlns:p14="http://schemas.microsoft.com/office/powerpoint/2010/main" id="1" dur="indefinite" restart="never" nodeType="tmRoot"/>
       </p:par>
     </p:tnLst>
   </p:timing>
@@ -10077,7 +10077,7 @@
   <p:timing>
     <p:tnLst>
       <p:par>
-        <p:cTn id="1" dur="indefinite" restart="never" nodeType="tmRoot"/>
+        <p:cTn xmlns:p14="http://schemas.microsoft.com/office/powerpoint/2010/main" id="1" dur="indefinite" restart="never" nodeType="tmRoot"/>
       </p:par>
     </p:tnLst>
   </p:timing>
@@ -10110,14 +10110,14 @@
           <p:nvPr>
             <p:extLst>
               <p:ext uri="{D42A27DB-BD31-4B8C-83A1-F6EECF244321}">
-                <p14:modId xmlns:p14="http://schemas.microsoft.com/office/powerpoint/2010/main" val="3476069201"/>
+                <p14:modId xmlns:p14="http://schemas.microsoft.com/office/powerpoint/2010/main" val="1434557137"/>
               </p:ext>
             </p:extLst>
           </p:nvPr>
         </p:nvGraphicFramePr>
         <p:xfrm>
-          <a:off x="825741" y="2692479"/>
-          <a:ext cx="10362959" cy="2210864"/>
+          <a:off x="825741" y="1566916"/>
+          <a:ext cx="10362958" cy="4647811"/>
         </p:xfrm>
         <a:graphic>
           <a:graphicData uri="http://schemas.openxmlformats.org/drawingml/2006/table">
@@ -10126,11 +10126,12 @@
                 <a:tableStyleId>{5C22544A-7EE6-4342-B048-85BDC9FD1C3A}</a:tableStyleId>
               </a:tblPr>
               <a:tblGrid>
-                <a:gridCol w="2253327"/>
-                <a:gridCol w="2559770"/>
-                <a:gridCol w="2127678"/>
-                <a:gridCol w="1711092"/>
-                <a:gridCol w="1711092"/>
+                <a:gridCol w="1743275"/>
+                <a:gridCol w="995854"/>
+                <a:gridCol w="2352526"/>
+                <a:gridCol w="2460337"/>
+                <a:gridCol w="1405483"/>
+                <a:gridCol w="1405483"/>
               </a:tblGrid>
               <a:tr h="929252">
                 <a:tc>
@@ -10138,6 +10139,25 @@
                     <a:bodyPr/>
                     <a:lstStyle/>
                     <a:p>
+                      <a:endParaRPr lang="en-US" dirty="0"/>
+                    </a:p>
+                  </a:txBody>
+                  <a:tcPr/>
+                </a:tc>
+                <a:tc>
+                  <a:txBody>
+                    <a:bodyPr/>
+                    <a:lstStyle/>
+                    <a:p>
+                      <a:pPr algn="ctr"/>
+                      <a:endParaRPr lang="en-US" dirty="0" smtClean="0"/>
+                    </a:p>
+                    <a:p>
+                      <a:pPr algn="ctr"/>
+                      <a:r>
+                        <a:rPr lang="en-US" dirty="0" smtClean="0"/>
+                        <a:t>OBC</a:t>
+                      </a:r>
                       <a:endParaRPr lang="en-US" dirty="0"/>
                     </a:p>
                   </a:txBody>
@@ -10255,13 +10275,32 @@
                     <a:p>
                       <a:pPr algn="ctr"/>
                       <a:r>
+                        <a:rPr lang="en-US" sz="1800" dirty="0" smtClean="0"/>
+                        <a:t>500mW</a:t>
+                      </a:r>
+                      <a:endParaRPr lang="en-US" sz="1800" dirty="0" smtClean="0"/>
+                    </a:p>
+                  </a:txBody>
+                  <a:tcPr/>
+                </a:tc>
+                <a:tc>
+                  <a:txBody>
+                    <a:bodyPr/>
+                    <a:lstStyle/>
+                    <a:p>
+                      <a:pPr algn="ctr"/>
+                      <a:r>
                         <a:rPr lang="en-US" dirty="0" smtClean="0"/>
-                        <a:t>Radio: 1W</a:t>
+                        <a:t>Radio: </a:t>
+                      </a:r>
+                      <a:r>
+                        <a:rPr lang="en-US" dirty="0" smtClean="0"/>
+                        <a:t>1W</a:t>
                       </a:r>
                     </a:p>
                     <a:p>
                       <a:pPr algn="ctr"/>
-                      <a:endParaRPr lang="en-US" dirty="0"/>
+                      <a:endParaRPr lang="en-US" dirty="0" smtClean="0"/>
                     </a:p>
                   </a:txBody>
                   <a:tcPr/>
@@ -10279,6 +10318,17 @@
                     </a:p>
                     <a:p>
                       <a:pPr algn="ctr"/>
+                      <a:r>
+                        <a:rPr lang="en-US" dirty="0" smtClean="0"/>
+                        <a:t>SOLARMEMS SSoC-A60:</a:t>
+                      </a:r>
+                    </a:p>
+                    <a:p>
+                      <a:pPr algn="ctr"/>
+                      <a:r>
+                        <a:rPr lang="en-US" dirty="0" smtClean="0"/>
+                        <a:t>36mW</a:t>
+                      </a:r>
                       <a:endParaRPr lang="en-US" dirty="0" smtClean="0"/>
                     </a:p>
                   </a:txBody>
@@ -10290,6 +10340,29 @@
                     <a:lstStyle/>
                     <a:p>
                       <a:pPr algn="ctr"/>
+                      <a:r>
+                        <a:rPr lang="en-US" dirty="0" smtClean="0"/>
+                        <a:t>Power </a:t>
+                      </a:r>
+                      <a:r>
+                        <a:rPr lang="en-US" sz="1700" dirty="0" smtClean="0"/>
+                        <a:t>Management</a:t>
+                      </a:r>
+                      <a:r>
+                        <a:rPr lang="en-US" dirty="0" smtClean="0"/>
+                        <a:t> Board: Variable</a:t>
+                      </a:r>
+                    </a:p>
+                    <a:p>
+                      <a:pPr algn="ctr"/>
+                      <a:r>
+                        <a:rPr lang="en-US" dirty="0" smtClean="0"/>
+                        <a:t>Solar</a:t>
+                      </a:r>
+                      <a:r>
+                        <a:rPr lang="en-US" baseline="0" dirty="0" smtClean="0"/>
+                        <a:t> Cells: ~2.4mW</a:t>
+                      </a:r>
                       <a:endParaRPr lang="en-US" dirty="0"/>
                     </a:p>
                   </a:txBody>
@@ -10339,9 +10412,32 @@
                     <a:p>
                       <a:pPr algn="ctr"/>
                       <a:r>
+                        <a:rPr lang="en-US" sz="1800" dirty="0" smtClean="0"/>
+                        <a:t>500mW</a:t>
+                      </a:r>
+                      <a:endParaRPr lang="en-US" sz="1800" dirty="0"/>
+                    </a:p>
+                  </a:txBody>
+                  <a:tcPr/>
+                </a:tc>
+                <a:tc>
+                  <a:txBody>
+                    <a:bodyPr/>
+                    <a:lstStyle/>
+                    <a:p>
+                      <a:pPr algn="ctr"/>
+                      <a:r>
                         <a:rPr lang="en-US" dirty="0" smtClean="0"/>
-                        <a:t>Radio: &lt;1W</a:t>
+                        <a:t>Radio: &lt;</a:t>
                       </a:r>
+                      <a:r>
+                        <a:rPr lang="en-US" dirty="0" smtClean="0"/>
+                        <a:t>1W</a:t>
+                      </a:r>
+                    </a:p>
+                    <a:p>
+                      <a:pPr algn="ctr"/>
+                      <a:endParaRPr lang="en-US" dirty="0" smtClean="0"/>
                     </a:p>
                     <a:p>
                       <a:pPr algn="ctr"/>
@@ -10358,8 +10454,20 @@
                       <a:pPr algn="ctr"/>
                       <a:r>
                         <a:rPr lang="en-US" dirty="0" smtClean="0"/>
-                        <a:t>GPS: 1.2W</a:t>
+                        <a:t>GPS: </a:t>
                       </a:r>
+                      <a:r>
+                        <a:rPr lang="en-US" dirty="0" smtClean="0"/>
+                        <a:t>1.2W</a:t>
+                      </a:r>
+                    </a:p>
+                    <a:p>
+                      <a:pPr algn="ctr"/>
+                      <a:r>
+                        <a:rPr lang="en-US" sz="1800" dirty="0" smtClean="0"/>
+                        <a:t>SSBV sun sensor: 50mW</a:t>
+                      </a:r>
+                      <a:endParaRPr lang="en-US" sz="1800" dirty="0" smtClean="0"/>
                     </a:p>
                     <a:p>
                       <a:pPr algn="ctr"/>
@@ -10372,6 +10480,33 @@
                   <a:txBody>
                     <a:bodyPr/>
                     <a:lstStyle/>
+                    <a:p>
+                      <a:pPr algn="ctr"/>
+                      <a:r>
+                        <a:rPr lang="en-US" dirty="0" smtClean="0"/>
+                        <a:t>Power </a:t>
+                      </a:r>
+                      <a:r>
+                        <a:rPr lang="en-US" sz="1700" dirty="0" smtClean="0"/>
+                        <a:t>Management</a:t>
+                      </a:r>
+                      <a:r>
+                        <a:rPr lang="en-US" dirty="0" smtClean="0"/>
+                        <a:t> Board: Variable</a:t>
+                      </a:r>
+                    </a:p>
+                    <a:p>
+                      <a:pPr algn="ctr"/>
+                      <a:r>
+                        <a:rPr lang="en-US" dirty="0" smtClean="0"/>
+                        <a:t>Solar</a:t>
+                      </a:r>
+                      <a:r>
+                        <a:rPr lang="en-US" baseline="0" dirty="0" smtClean="0"/>
+                        <a:t> Cells: ~2.4mW</a:t>
+                      </a:r>
+                      <a:endParaRPr lang="en-US" dirty="0" smtClean="0"/>
+                    </a:p>
                     <a:p>
                       <a:pPr algn="ctr"/>
                       <a:endParaRPr lang="en-US" dirty="0"/>
@@ -10440,7 +10575,7 @@
   <p:timing>
     <p:tnLst>
       <p:par>
-        <p:cTn id="1" dur="indefinite" restart="never" nodeType="tmRoot"/>
+        <p:cTn xmlns:p14="http://schemas.microsoft.com/office/powerpoint/2010/main" id="1" dur="indefinite" restart="never" nodeType="tmRoot"/>
       </p:par>
     </p:tnLst>
   </p:timing>
@@ -10531,8 +10666,20 @@
             <a:pPr lvl="1"/>
             <a:r>
               <a:rPr lang="en-US" dirty="0" smtClean="0"/>
-              <a:t>Power Management Board</a:t>
-            </a:r>
+              <a:t>Power Management </a:t>
+            </a:r>
+            <a:r>
+              <a:rPr lang="en-US" dirty="0" smtClean="0"/>
+              <a:t>Board</a:t>
+            </a:r>
+          </a:p>
+          <a:p>
+            <a:pPr lvl="1"/>
+            <a:r>
+              <a:rPr lang="en-US" dirty="0" smtClean="0"/>
+              <a:t>Solar Cells (for conversion)</a:t>
+            </a:r>
+            <a:endParaRPr lang="en-US" dirty="0" smtClean="0"/>
           </a:p>
           <a:p>
             <a:r>
@@ -10907,7 +11054,7 @@
   <p:timing>
     <p:tnLst>
       <p:par>
-        <p:cTn id="1" dur="indefinite" restart="never" nodeType="tmRoot"/>
+        <p:cTn xmlns:p14="http://schemas.microsoft.com/office/powerpoint/2010/main" id="1" dur="indefinite" restart="never" nodeType="tmRoot"/>
       </p:par>
     </p:tnLst>
   </p:timing>
@@ -11316,7 +11463,7 @@
   <p:timing>
     <p:tnLst>
       <p:par>
-        <p:cTn id="1" dur="indefinite" restart="never" nodeType="tmRoot"/>
+        <p:cTn xmlns:p14="http://schemas.microsoft.com/office/powerpoint/2010/main" id="1" dur="indefinite" restart="never" nodeType="tmRoot"/>
       </p:par>
     </p:tnLst>
   </p:timing>
@@ -11467,7 +11614,7 @@
   <p:timing>
     <p:tnLst>
       <p:par>
-        <p:cTn id="1" dur="indefinite" restart="never" nodeType="tmRoot"/>
+        <p:cTn xmlns:p14="http://schemas.microsoft.com/office/powerpoint/2010/main" id="1" dur="indefinite" restart="never" nodeType="tmRoot"/>
       </p:par>
     </p:tnLst>
   </p:timing>
@@ -11563,15 +11710,7 @@
             <a:pPr lvl="1"/>
             <a:r>
               <a:rPr lang="en-US" dirty="0" smtClean="0"/>
-              <a:t>Provides environmental data </a:t>
-            </a:r>
-            <a:r>
-              <a:rPr lang="en-US" dirty="0" smtClean="0"/>
-              <a:t>(time, attitude, position) to </a:t>
-            </a:r>
-            <a:r>
-              <a:rPr lang="en-US" dirty="0" smtClean="0"/>
-              <a:t>payload with priority</a:t>
+              <a:t>Provides environmental data (time, attitude, position) to payload with priority</a:t>
             </a:r>
           </a:p>
           <a:p>
@@ -11631,11 +11770,7 @@
             </a:r>
             <a:r>
               <a:rPr lang="en-US" smtClean="0"/>
-              <a:t>Navigation </a:t>
-            </a:r>
-            <a:r>
-              <a:rPr lang="en-US" smtClean="0"/>
-              <a:t>Control Systems</a:t>
+              <a:t>Navigation Control Systems</a:t>
             </a:r>
             <a:endParaRPr lang="en-US" dirty="0" smtClean="0"/>
           </a:p>
@@ -11674,7 +11809,7 @@
   <p:timing>
     <p:tnLst>
       <p:par>
-        <p:cTn id="1" dur="indefinite" restart="never" nodeType="tmRoot"/>
+        <p:cTn xmlns:p14="http://schemas.microsoft.com/office/powerpoint/2010/main" id="1" dur="indefinite" restart="never" nodeType="tmRoot"/>
       </p:par>
     </p:tnLst>
   </p:timing>
@@ -11734,7 +11869,7 @@
   <p:timing>
     <p:tnLst>
       <p:par>
-        <p:cTn id="1" dur="indefinite" restart="never" nodeType="tmRoot"/>
+        <p:cTn xmlns:p14="http://schemas.microsoft.com/office/powerpoint/2010/main" id="1" dur="indefinite" restart="never" nodeType="tmRoot"/>
       </p:par>
     </p:tnLst>
   </p:timing>
@@ -11879,7 +12014,7 @@
   <p:timing>
     <p:tnLst>
       <p:par>
-        <p:cTn id="1" dur="indefinite" restart="never" nodeType="tmRoot"/>
+        <p:cTn xmlns:p14="http://schemas.microsoft.com/office/powerpoint/2010/main" id="1" dur="indefinite" restart="never" nodeType="tmRoot"/>
       </p:par>
     </p:tnLst>
   </p:timing>
@@ -12016,7 +12151,7 @@
   <p:timing>
     <p:tnLst>
       <p:par>
-        <p:cTn id="1" dur="indefinite" restart="never" nodeType="tmRoot"/>
+        <p:cTn xmlns:p14="http://schemas.microsoft.com/office/powerpoint/2010/main" id="1" dur="indefinite" restart="never" nodeType="tmRoot"/>
       </p:par>
     </p:tnLst>
   </p:timing>
@@ -12076,7 +12211,7 @@
         </p:nvGraphicFramePr>
         <p:xfrm>
           <a:off x="1103313" y="2052638"/>
-          <a:ext cx="8947150" cy="3268652"/>
+          <a:ext cx="8947150" cy="3268651"/>
         </p:xfrm>
         <a:graphic>
           <a:graphicData uri="http://schemas.openxmlformats.org/drawingml/2006/table">
@@ -12957,7 +13092,7 @@
     </a:clrScheme>
     <a:fontScheme name="Ion">
       <a:majorFont>
-        <a:latin typeface="Century Gothic" panose="020B0502020202020204"/>
+        <a:latin typeface="Century Gothic"/>
         <a:ea typeface=""/>
         <a:cs typeface=""/>
         <a:font script="Jpan" typeface="メイリオ"/>
@@ -12992,7 +13127,7 @@
         <a:font script="Geor" typeface="Sylfaen"/>
       </a:majorFont>
       <a:minorFont>
-        <a:latin typeface="Century Gothic" panose="020B0502020202020204"/>
+        <a:latin typeface="Century Gothic"/>
         <a:ea typeface=""/>
         <a:cs typeface=""/>
         <a:font script="Jpan" typeface="メイリオ"/>
@@ -13174,7 +13309,7 @@
   <a:extraClrSchemeLst/>
   <a:extLst>
     <a:ext uri="{05A4C25C-085E-4340-85A3-A5531E510DB2}">
-      <thm15:themeFamily xmlns:thm15="http://schemas.microsoft.com/office/thememl/2012/main" xmlns="" name="Ion" id="{B8441ADB-2E43-4AF7-B97A-BD870242C6A8}" vid="{292E63A9-BB86-4E3D-B92A-7223C6510D2E}"/>
+      <thm15:themeFamily xmlns="" xmlns:thm15="http://schemas.microsoft.com/office/thememl/2012/main" name="Ion" id="{B8441ADB-2E43-4AF7-B97A-BD870242C6A8}" vid="{292E63A9-BB86-4E3D-B92A-7223C6510D2E}"/>
     </a:ext>
   </a:extLst>
 </a:theme>
@@ -13223,7 +13358,7 @@
     </a:clrScheme>
     <a:fontScheme name="Office">
       <a:majorFont>
-        <a:latin typeface="Calibri Light" panose="020F0302020204030204"/>
+        <a:latin typeface="Calibri Light"/>
         <a:ea typeface=""/>
         <a:cs typeface=""/>
         <a:font script="Jpan" typeface="ＭＳ Ｐゴシック"/>
@@ -13258,7 +13393,7 @@
         <a:font script="Geor" typeface="Sylfaen"/>
       </a:majorFont>
       <a:minorFont>
-        <a:latin typeface="Calibri" panose="020F0502020204030204"/>
+        <a:latin typeface="Calibri"/>
         <a:ea typeface=""/>
         <a:cs typeface=""/>
         <a:font script="Jpan" typeface="ＭＳ Ｐゴシック"/>
@@ -13435,7 +13570,7 @@
   <a:extraClrSchemeLst/>
   <a:extLst>
     <a:ext uri="{05A4C25C-085E-4340-85A3-A5531E510DB2}">
-      <thm15:themeFamily xmlns:thm15="http://schemas.microsoft.com/office/thememl/2012/main" xmlns="" name="Office Theme" id="{62F939B6-93AF-4DB8-9C6B-D6C7DFDC589F}" vid="{4A3C46E8-61CC-4603-A589-7422A47A8E4A}"/>
+      <thm15:themeFamily xmlns="" xmlns:thm15="http://schemas.microsoft.com/office/thememl/2012/main" name="Office Theme" id="{62F939B6-93AF-4DB8-9C6B-D6C7DFDC589F}" vid="{4A3C46E8-61CC-4603-A589-7422A47A8E4A}"/>
     </a:ext>
   </a:extLst>
 </a:theme>

</xml_diff>

<commit_message>
added umn background to pdr slides
</commit_message>
<xml_diff>
--- a/Presentations/PDR_Presentation.pptx
+++ b/Presentations/PDR_Presentation.pptx
@@ -8,7 +8,7 @@
     <p:notesMasterId r:id="rId28"/>
   </p:notesMasterIdLst>
   <p:sldIdLst>
-    <p:sldId id="256" r:id="rId2"/>
+    <p:sldId id="294" r:id="rId2"/>
     <p:sldId id="257" r:id="rId3"/>
     <p:sldId id="259" r:id="rId4"/>
     <p:sldId id="258" r:id="rId5"/>
@@ -134,7 +134,7 @@
   </p:defaultTextStyle>
   <p:extLst>
     <p:ext uri="{EFAFB233-063F-42B5-8137-9DF3F51BA10A}">
-      <p15:sldGuideLst xmlns="" xmlns:p15="http://schemas.microsoft.com/office/powerpoint/2012/main"/>
+      <p15:sldGuideLst xmlns:p15="http://schemas.microsoft.com/office/powerpoint/2012/main" xmlns=""/>
     </p:ext>
   </p:extLst>
 </p:presentation>
@@ -1073,30 +1073,7 @@
           <a:bodyPr/>
           <a:lstStyle/>
           <a:p>
-            <a:endParaRPr lang="en-US"/>
-          </a:p>
-        </p:txBody>
-      </p:sp>
-      <p:sp>
-        <p:nvSpPr>
-          <p:cNvPr id="6" name="Slide Number Placeholder 5"/>
-          <p:cNvSpPr>
-            <a:spLocks noGrp="1"/>
-          </p:cNvSpPr>
-          <p:nvPr>
-            <p:ph type="sldNum" sz="quarter" idx="12"/>
-          </p:nvPr>
-        </p:nvSpPr>
-        <p:spPr/>
-        <p:txBody>
-          <a:bodyPr/>
-          <a:lstStyle/>
-          <a:p>
-            <a:fld id="{B34AA0BE-94EA-43C7-94B0-3B01F9903F99}" type="slidenum">
-              <a:rPr lang="en-US" smtClean="0"/>
-              <a:t>‹#›</a:t>
-            </a:fld>
-            <a:endParaRPr lang="en-US"/>
+            <a:endParaRPr lang="en-US" dirty="0"/>
           </a:p>
         </p:txBody>
       </p:sp>
@@ -1110,6 +1087,13 @@
   <p:clrMapOvr>
     <a:masterClrMapping/>
   </p:clrMapOvr>
+  <p:timing>
+    <p:tnLst>
+      <p:par>
+        <p:cTn id="1" dur="indefinite" restart="never" nodeType="tmRoot"/>
+      </p:par>
+    </p:tnLst>
+  </p:timing>
 </p:sldLayout>
 </file>
 
@@ -1362,7 +1346,15 @@
             <p:ph type="sldNum" sz="quarter" idx="12"/>
           </p:nvPr>
         </p:nvSpPr>
-        <p:spPr/>
+        <p:spPr>
+          <a:xfrm>
+            <a:off x="10352540" y="295729"/>
+            <a:ext cx="838199" cy="767687"/>
+          </a:xfrm>
+          <a:prstGeom prst="rect">
+            <a:avLst/>
+          </a:prstGeom>
+        </p:spPr>
         <p:txBody>
           <a:bodyPr/>
           <a:lstStyle/>
@@ -1556,7 +1548,15 @@
             <p:ph type="sldNum" sz="quarter" idx="12"/>
           </p:nvPr>
         </p:nvSpPr>
-        <p:spPr/>
+        <p:spPr>
+          <a:xfrm>
+            <a:off x="10352540" y="295729"/>
+            <a:ext cx="838199" cy="767687"/>
+          </a:xfrm>
+          <a:prstGeom prst="rect">
+            <a:avLst/>
+          </a:prstGeom>
+        </p:spPr>
         <p:txBody>
           <a:bodyPr/>
           <a:lstStyle/>
@@ -1829,7 +1829,15 @@
             <p:ph type="sldNum" sz="quarter" idx="12"/>
           </p:nvPr>
         </p:nvSpPr>
-        <p:spPr/>
+        <p:spPr>
+          <a:xfrm>
+            <a:off x="10352540" y="295729"/>
+            <a:ext cx="838199" cy="767687"/>
+          </a:xfrm>
+          <a:prstGeom prst="rect">
+            <a:avLst/>
+          </a:prstGeom>
+        </p:spPr>
         <p:txBody>
           <a:bodyPr/>
           <a:lstStyle/>
@@ -2170,7 +2178,15 @@
             <p:ph type="sldNum" sz="quarter" idx="12"/>
           </p:nvPr>
         </p:nvSpPr>
-        <p:spPr/>
+        <p:spPr>
+          <a:xfrm>
+            <a:off x="10352540" y="295729"/>
+            <a:ext cx="838199" cy="767687"/>
+          </a:xfrm>
+          <a:prstGeom prst="rect">
+            <a:avLst/>
+          </a:prstGeom>
+        </p:spPr>
         <p:txBody>
           <a:bodyPr/>
           <a:lstStyle/>
@@ -2793,7 +2809,15 @@
             <p:ph type="sldNum" sz="quarter" idx="12"/>
           </p:nvPr>
         </p:nvSpPr>
-        <p:spPr/>
+        <p:spPr>
+          <a:xfrm>
+            <a:off x="10352540" y="295729"/>
+            <a:ext cx="838199" cy="767687"/>
+          </a:xfrm>
+          <a:prstGeom prst="rect">
+            <a:avLst/>
+          </a:prstGeom>
+        </p:spPr>
         <p:txBody>
           <a:bodyPr/>
           <a:lstStyle/>
@@ -3653,7 +3677,15 @@
             <p:ph type="sldNum" sz="quarter" idx="12"/>
           </p:nvPr>
         </p:nvSpPr>
-        <p:spPr/>
+        <p:spPr>
+          <a:xfrm>
+            <a:off x="10352540" y="295729"/>
+            <a:ext cx="838199" cy="767687"/>
+          </a:xfrm>
+          <a:prstGeom prst="rect">
+            <a:avLst/>
+          </a:prstGeom>
+        </p:spPr>
         <p:txBody>
           <a:bodyPr/>
           <a:lstStyle/>
@@ -3823,7 +3855,15 @@
             <p:ph type="sldNum" sz="quarter" idx="12"/>
           </p:nvPr>
         </p:nvSpPr>
-        <p:spPr/>
+        <p:spPr>
+          <a:xfrm>
+            <a:off x="10352540" y="295729"/>
+            <a:ext cx="838199" cy="767687"/>
+          </a:xfrm>
+          <a:prstGeom prst="rect">
+            <a:avLst/>
+          </a:prstGeom>
+        </p:spPr>
         <p:txBody>
           <a:bodyPr/>
           <a:lstStyle/>
@@ -4003,7 +4043,15 @@
             <p:ph type="sldNum" sz="quarter" idx="12"/>
           </p:nvPr>
         </p:nvSpPr>
-        <p:spPr/>
+        <p:spPr>
+          <a:xfrm>
+            <a:off x="10352540" y="295729"/>
+            <a:ext cx="838199" cy="767687"/>
+          </a:xfrm>
+          <a:prstGeom prst="rect">
+            <a:avLst/>
+          </a:prstGeom>
+        </p:spPr>
         <p:txBody>
           <a:bodyPr/>
           <a:lstStyle/>
@@ -4026,6 +4074,13 @@
   <p:clrMapOvr>
     <a:masterClrMapping/>
   </p:clrMapOvr>
+  <p:timing>
+    <p:tnLst>
+      <p:par>
+        <p:cTn id="1" dur="indefinite" restart="never" nodeType="tmRoot"/>
+      </p:par>
+    </p:tnLst>
+  </p:timing>
 </p:sldLayout>
 </file>
 
@@ -4173,7 +4228,15 @@
             <p:ph type="sldNum" sz="quarter" idx="12"/>
           </p:nvPr>
         </p:nvSpPr>
-        <p:spPr/>
+        <p:spPr>
+          <a:xfrm>
+            <a:off x="10352540" y="295729"/>
+            <a:ext cx="838199" cy="767687"/>
+          </a:xfrm>
+          <a:prstGeom prst="rect">
+            <a:avLst/>
+          </a:prstGeom>
+        </p:spPr>
         <p:txBody>
           <a:bodyPr/>
           <a:lstStyle/>
@@ -4196,6 +4259,13 @@
   <p:clrMapOvr>
     <a:masterClrMapping/>
   </p:clrMapOvr>
+  <p:timing>
+    <p:tnLst>
+      <p:par>
+        <p:cTn id="1" dur="indefinite" restart="never" nodeType="tmRoot"/>
+      </p:par>
+    </p:tnLst>
+  </p:timing>
 </p:sldLayout>
 </file>
 
@@ -4420,7 +4490,15 @@
             <p:ph type="sldNum" sz="quarter" idx="12"/>
           </p:nvPr>
         </p:nvSpPr>
-        <p:spPr/>
+        <p:spPr>
+          <a:xfrm>
+            <a:off x="10352540" y="295729"/>
+            <a:ext cx="838199" cy="767687"/>
+          </a:xfrm>
+          <a:prstGeom prst="rect">
+            <a:avLst/>
+          </a:prstGeom>
+        </p:spPr>
         <p:txBody>
           <a:bodyPr/>
           <a:lstStyle/>
@@ -4712,7 +4790,15 @@
             <p:ph type="sldNum" sz="quarter" idx="12"/>
           </p:nvPr>
         </p:nvSpPr>
-        <p:spPr/>
+        <p:spPr>
+          <a:xfrm>
+            <a:off x="10352540" y="295729"/>
+            <a:ext cx="838199" cy="767687"/>
+          </a:xfrm>
+          <a:prstGeom prst="rect">
+            <a:avLst/>
+          </a:prstGeom>
+        </p:spPr>
         <p:txBody>
           <a:bodyPr/>
           <a:lstStyle/>
@@ -4735,6 +4821,13 @@
   <p:clrMapOvr>
     <a:masterClrMapping/>
   </p:clrMapOvr>
+  <p:timing>
+    <p:tnLst>
+      <p:par>
+        <p:cTn id="1" dur="indefinite" restart="never" nodeType="tmRoot"/>
+      </p:par>
+    </p:tnLst>
+  </p:timing>
 </p:sldLayout>
 </file>
 
@@ -5156,7 +5249,15 @@
             <p:ph type="sldNum" sz="quarter" idx="12"/>
           </p:nvPr>
         </p:nvSpPr>
-        <p:spPr/>
+        <p:spPr>
+          <a:xfrm>
+            <a:off x="10352540" y="295729"/>
+            <a:ext cx="838199" cy="767687"/>
+          </a:xfrm>
+          <a:prstGeom prst="rect">
+            <a:avLst/>
+          </a:prstGeom>
+        </p:spPr>
         <p:txBody>
           <a:bodyPr/>
           <a:lstStyle/>
@@ -5274,7 +5375,15 @@
             <p:ph type="sldNum" sz="quarter" idx="12"/>
           </p:nvPr>
         </p:nvSpPr>
-        <p:spPr/>
+        <p:spPr>
+          <a:xfrm>
+            <a:off x="10352540" y="295729"/>
+            <a:ext cx="838199" cy="767687"/>
+          </a:xfrm>
+          <a:prstGeom prst="rect">
+            <a:avLst/>
+          </a:prstGeom>
+        </p:spPr>
         <p:txBody>
           <a:bodyPr/>
           <a:lstStyle/>
@@ -5297,6 +5406,13 @@
   <p:clrMapOvr>
     <a:masterClrMapping/>
   </p:clrMapOvr>
+  <p:timing>
+    <p:tnLst>
+      <p:par>
+        <p:cTn id="1" dur="indefinite" restart="never" nodeType="tmRoot"/>
+      </p:par>
+    </p:tnLst>
+  </p:timing>
 </p:sldLayout>
 </file>
 
@@ -5369,7 +5485,15 @@
             <p:ph type="sldNum" sz="quarter" idx="12"/>
           </p:nvPr>
         </p:nvSpPr>
-        <p:spPr/>
+        <p:spPr>
+          <a:xfrm>
+            <a:off x="10352540" y="295729"/>
+            <a:ext cx="838199" cy="767687"/>
+          </a:xfrm>
+          <a:prstGeom prst="rect">
+            <a:avLst/>
+          </a:prstGeom>
+        </p:spPr>
         <p:txBody>
           <a:bodyPr/>
           <a:lstStyle/>
@@ -5392,6 +5516,13 @@
   <p:clrMapOvr>
     <a:masterClrMapping/>
   </p:clrMapOvr>
+  <p:timing>
+    <p:tnLst>
+      <p:par>
+        <p:cTn id="1" dur="indefinite" restart="never" nodeType="tmRoot"/>
+      </p:par>
+    </p:tnLst>
+  </p:timing>
 </p:sldLayout>
 </file>
 
@@ -5648,7 +5779,15 @@
             <p:ph type="sldNum" sz="quarter" idx="12"/>
           </p:nvPr>
         </p:nvSpPr>
-        <p:spPr/>
+        <p:spPr>
+          <a:xfrm>
+            <a:off x="10352540" y="295729"/>
+            <a:ext cx="838199" cy="767687"/>
+          </a:xfrm>
+          <a:prstGeom prst="rect">
+            <a:avLst/>
+          </a:prstGeom>
+        </p:spPr>
         <p:txBody>
           <a:bodyPr/>
           <a:lstStyle/>
@@ -5923,7 +6062,15 @@
             <p:ph type="sldNum" sz="quarter" idx="12"/>
           </p:nvPr>
         </p:nvSpPr>
-        <p:spPr/>
+        <p:spPr>
+          <a:xfrm>
+            <a:off x="10352540" y="295729"/>
+            <a:ext cx="838199" cy="767687"/>
+          </a:xfrm>
+          <a:prstGeom prst="rect">
+            <a:avLst/>
+          </a:prstGeom>
+        </p:spPr>
         <p:txBody>
           <a:bodyPr/>
           <a:lstStyle/>
@@ -6361,47 +6508,36 @@
           </a:p>
         </p:txBody>
       </p:sp>
-      <p:sp>
-        <p:nvSpPr>
-          <p:cNvPr id="6" name="Slide Number Placeholder 5"/>
-          <p:cNvSpPr>
-            <a:spLocks noGrp="1"/>
-          </p:cNvSpPr>
-          <p:nvPr>
-            <p:ph type="sldNum" sz="quarter" idx="4"/>
-          </p:nvPr>
-        </p:nvSpPr>
-        <p:spPr bwMode="gray">
-          <a:xfrm>
-            <a:off x="10352540" y="295729"/>
-            <a:ext cx="838199" cy="767687"/>
+      <p:pic>
+        <p:nvPicPr>
+          <p:cNvPr id="13" name="Picture 12"/>
+          <p:cNvPicPr>
+            <a:picLocks noChangeAspect="1"/>
+          </p:cNvPicPr>
+          <p:nvPr userDrawn="1"/>
+        </p:nvPicPr>
+        <p:blipFill>
+          <a:blip r:embed="rId23" cstate="print">
+            <a:extLst>
+              <a:ext uri="{28A0092B-C50C-407E-A947-70E740481C1C}">
+                <a14:useLocalDpi xmlns:a14="http://schemas.microsoft.com/office/drawing/2010/main" val="0"/>
+              </a:ext>
+            </a:extLst>
+          </a:blip>
+          <a:stretch>
+            <a:fillRect/>
+          </a:stretch>
+        </p:blipFill>
+        <p:spPr>
+          <a:xfrm>
+            <a:off x="10546721" y="242032"/>
+            <a:ext cx="1349356" cy="796120"/>
           </a:xfrm>
           <a:prstGeom prst="rect">
             <a:avLst/>
           </a:prstGeom>
         </p:spPr>
-        <p:txBody>
-          <a:bodyPr vert="horz" lIns="91440" tIns="45720" rIns="91440" bIns="45720" rtlCol="0" anchor="b"/>
-          <a:lstStyle>
-            <a:lvl1pPr algn="ctr">
-              <a:defRPr sz="2800" b="0" i="0">
-                <a:solidFill>
-                  <a:schemeClr val="tx1">
-                    <a:tint val="75000"/>
-                  </a:schemeClr>
-                </a:solidFill>
-              </a:defRPr>
-            </a:lvl1pPr>
-          </a:lstStyle>
-          <a:p>
-            <a:fld id="{B34AA0BE-94EA-43C7-94B0-3B01F9903F99}" type="slidenum">
-              <a:rPr lang="en-US" smtClean="0"/>
-              <a:t>‹#›</a:t>
-            </a:fld>
-            <a:endParaRPr lang="en-US"/>
-          </a:p>
-        </p:txBody>
-      </p:sp>
+      </p:pic>
     </p:spTree>
     <p:extLst>
       <p:ext uri="{BB962C8B-B14F-4D97-AF65-F5344CB8AC3E}">
@@ -6429,6 +6565,13 @@
     <p:sldLayoutId id="2147483676" r:id="rId16"/>
     <p:sldLayoutId id="2147483677" r:id="rId17"/>
   </p:sldLayoutIdLst>
+  <p:timing>
+    <p:tnLst>
+      <p:par>
+        <p:cTn id="1" dur="indefinite" restart="never" nodeType="tmRoot"/>
+      </p:par>
+    </p:tnLst>
+  </p:timing>
   <p:txStyles>
     <p:titleStyle>
       <a:lvl1pPr algn="l" defTabSz="457200" rtl="0" eaLnBrk="1" latinLnBrk="0" hangingPunct="1">
@@ -6868,29 +7011,10 @@
           </a:p>
         </p:txBody>
       </p:sp>
-      <p:sp>
-        <p:nvSpPr>
-          <p:cNvPr id="3" name="Subtitle 2"/>
-          <p:cNvSpPr>
-            <a:spLocks noGrp="1"/>
-          </p:cNvSpPr>
-          <p:nvPr>
-            <p:ph type="subTitle" idx="1"/>
-          </p:nvPr>
-        </p:nvSpPr>
-        <p:spPr/>
-        <p:txBody>
-          <a:bodyPr/>
-          <a:lstStyle/>
-          <a:p>
-            <a:endParaRPr lang="en-US" dirty="0"/>
-          </a:p>
-        </p:txBody>
-      </p:sp>
     </p:spTree>
     <p:extLst>
       <p:ext uri="{BB962C8B-B14F-4D97-AF65-F5344CB8AC3E}">
-        <p14:creationId xmlns:p14="http://schemas.microsoft.com/office/powerpoint/2010/main" val="1026064752"/>
+        <p14:creationId xmlns:p14="http://schemas.microsoft.com/office/powerpoint/2010/main" val="269309062"/>
       </p:ext>
     </p:extLst>
   </p:cSld>
@@ -7556,6 +7680,13 @@
   <p:clrMapOvr>
     <a:masterClrMapping/>
   </p:clrMapOvr>
+  <p:timing>
+    <p:tnLst>
+      <p:par>
+        <p:cTn id="1" dur="indefinite" restart="never" nodeType="tmRoot"/>
+      </p:par>
+    </p:tnLst>
+  </p:timing>
 </p:sld>
 </file>
 
@@ -13334,7 +13465,7 @@
   <a:extraClrSchemeLst/>
   <a:extLst>
     <a:ext uri="{05A4C25C-085E-4340-85A3-A5531E510DB2}">
-      <thm15:themeFamily xmlns="" xmlns:thm15="http://schemas.microsoft.com/office/thememl/2012/main" name="Ion" id="{B8441ADB-2E43-4AF7-B97A-BD870242C6A8}" vid="{292E63A9-BB86-4E3D-B92A-7223C6510D2E}"/>
+      <thm15:themeFamily xmlns:thm15="http://schemas.microsoft.com/office/thememl/2012/main" xmlns="" name="Ion" id="{B8441ADB-2E43-4AF7-B97A-BD870242C6A8}" vid="{292E63A9-BB86-4E3D-B92A-7223C6510D2E}"/>
     </a:ext>
   </a:extLst>
 </a:theme>
@@ -13595,7 +13726,7 @@
   <a:extraClrSchemeLst/>
   <a:extLst>
     <a:ext uri="{05A4C25C-085E-4340-85A3-A5531E510DB2}">
-      <thm15:themeFamily xmlns="" xmlns:thm15="http://schemas.microsoft.com/office/thememl/2012/main" name="Office Theme" id="{62F939B6-93AF-4DB8-9C6B-D6C7DFDC589F}" vid="{4A3C46E8-61CC-4603-A589-7422A47A8E4A}"/>
+      <thm15:themeFamily xmlns:thm15="http://schemas.microsoft.com/office/thememl/2012/main" xmlns="" name="Office Theme" id="{62F939B6-93AF-4DB8-9C6B-D6C7DFDC589F}" vid="{4A3C46E8-61CC-4603-A589-7422A47A8E4A}"/>
     </a:ext>
   </a:extLst>
 </a:theme>

</xml_diff>

<commit_message>
Updated PDR Sun Sensors
</commit_message>
<xml_diff>
--- a/Presentations/PDR_Presentation.pptx
+++ b/Presentations/PDR_Presentation.pptx
@@ -5,7 +5,7 @@
     <p:sldMasterId id="2147483660" r:id="rId1"/>
   </p:sldMasterIdLst>
   <p:notesMasterIdLst>
-    <p:notesMasterId r:id="rId27"/>
+    <p:notesMasterId r:id="rId28"/>
   </p:notesMasterIdLst>
   <p:sldIdLst>
     <p:sldId id="256" r:id="rId2"/>
@@ -20,19 +20,20 @@
     <p:sldId id="265" r:id="rId11"/>
     <p:sldId id="268" r:id="rId12"/>
     <p:sldId id="269" r:id="rId13"/>
-    <p:sldId id="279" r:id="rId14"/>
-    <p:sldId id="278" r:id="rId15"/>
-    <p:sldId id="270" r:id="rId16"/>
-    <p:sldId id="271" r:id="rId17"/>
-    <p:sldId id="272" r:id="rId18"/>
-    <p:sldId id="273" r:id="rId19"/>
-    <p:sldId id="274" r:id="rId20"/>
-    <p:sldId id="275" r:id="rId21"/>
-    <p:sldId id="285" r:id="rId22"/>
-    <p:sldId id="280" r:id="rId23"/>
-    <p:sldId id="281" r:id="rId24"/>
-    <p:sldId id="282" r:id="rId25"/>
-    <p:sldId id="283" r:id="rId26"/>
+    <p:sldId id="286" r:id="rId14"/>
+    <p:sldId id="279" r:id="rId15"/>
+    <p:sldId id="278" r:id="rId16"/>
+    <p:sldId id="270" r:id="rId17"/>
+    <p:sldId id="271" r:id="rId18"/>
+    <p:sldId id="272" r:id="rId19"/>
+    <p:sldId id="273" r:id="rId20"/>
+    <p:sldId id="274" r:id="rId21"/>
+    <p:sldId id="275" r:id="rId22"/>
+    <p:sldId id="285" r:id="rId23"/>
+    <p:sldId id="280" r:id="rId24"/>
+    <p:sldId id="281" r:id="rId25"/>
+    <p:sldId id="282" r:id="rId26"/>
+    <p:sldId id="283" r:id="rId27"/>
   </p:sldIdLst>
   <p:sldSz cx="12192000" cy="6858000"/>
   <p:notesSz cx="6858000" cy="9144000"/>
@@ -133,7 +134,7 @@
   </p:defaultTextStyle>
   <p:extLst>
     <p:ext uri="{EFAFB233-063F-42B5-8137-9DF3F51BA10A}">
-      <p15:sldGuideLst xmlns:p15="http://schemas.microsoft.com/office/powerpoint/2012/main" xmlns=""/>
+      <p15:sldGuideLst xmlns="" xmlns:p15="http://schemas.microsoft.com/office/powerpoint/2012/main"/>
     </p:ext>
   </p:extLst>
 </p:presentation>
@@ -221,7 +222,7 @@
           <a:p>
             <a:fld id="{90D58D52-5CD9-4A4B-90F0-A7AB4F899008}" type="datetimeFigureOut">
               <a:rPr lang="en-US" smtClean="0"/>
-              <a:t>10/7/2015</a:t>
+              <a:t>10/8/2015</a:t>
             </a:fld>
             <a:endParaRPr lang="en-US"/>
           </a:p>
@@ -846,7 +847,7 @@
           <a:p>
             <a:fld id="{4914D37F-4D0B-4DCB-BAF9-AC1A01C3816B}" type="slidenum">
               <a:rPr lang="en-US" smtClean="0"/>
-              <a:t>23</a:t>
+              <a:t>24</a:t>
             </a:fld>
             <a:endParaRPr lang="en-US"/>
           </a:p>
@@ -1051,7 +1052,7 @@
           <a:p>
             <a:fld id="{E20D963B-2D4F-495B-A2B5-E46053ACE7DA}" type="datetimeFigureOut">
               <a:rPr lang="en-US" smtClean="0"/>
-              <a:t>10/7/2015</a:t>
+              <a:t>10/8/2015</a:t>
             </a:fld>
             <a:endParaRPr lang="en-US"/>
           </a:p>
@@ -1326,7 +1327,7 @@
           <a:p>
             <a:fld id="{E20D963B-2D4F-495B-A2B5-E46053ACE7DA}" type="datetimeFigureOut">
               <a:rPr lang="en-US" smtClean="0"/>
-              <a:t>10/7/2015</a:t>
+              <a:t>10/8/2015</a:t>
             </a:fld>
             <a:endParaRPr lang="en-US"/>
           </a:p>
@@ -1520,7 +1521,7 @@
           <a:p>
             <a:fld id="{E20D963B-2D4F-495B-A2B5-E46053ACE7DA}" type="datetimeFigureOut">
               <a:rPr lang="en-US" smtClean="0"/>
-              <a:t>10/7/2015</a:t>
+              <a:t>10/8/2015</a:t>
             </a:fld>
             <a:endParaRPr lang="en-US"/>
           </a:p>
@@ -1793,7 +1794,7 @@
           <a:p>
             <a:fld id="{E20D963B-2D4F-495B-A2B5-E46053ACE7DA}" type="datetimeFigureOut">
               <a:rPr lang="en-US" smtClean="0"/>
-              <a:t>10/7/2015</a:t>
+              <a:t>10/8/2015</a:t>
             </a:fld>
             <a:endParaRPr lang="en-US"/>
           </a:p>
@@ -2134,7 +2135,7 @@
           <a:p>
             <a:fld id="{E20D963B-2D4F-495B-A2B5-E46053ACE7DA}" type="datetimeFigureOut">
               <a:rPr lang="en-US" smtClean="0"/>
-              <a:t>10/7/2015</a:t>
+              <a:t>10/8/2015</a:t>
             </a:fld>
             <a:endParaRPr lang="en-US"/>
           </a:p>
@@ -2757,7 +2758,7 @@
           <a:p>
             <a:fld id="{E20D963B-2D4F-495B-A2B5-E46053ACE7DA}" type="datetimeFigureOut">
               <a:rPr lang="en-US" smtClean="0"/>
-              <a:t>10/7/2015</a:t>
+              <a:t>10/8/2015</a:t>
             </a:fld>
             <a:endParaRPr lang="en-US"/>
           </a:p>
@@ -3617,7 +3618,7 @@
           <a:p>
             <a:fld id="{E20D963B-2D4F-495B-A2B5-E46053ACE7DA}" type="datetimeFigureOut">
               <a:rPr lang="en-US" smtClean="0"/>
-              <a:t>10/7/2015</a:t>
+              <a:t>10/8/2015</a:t>
             </a:fld>
             <a:endParaRPr lang="en-US"/>
           </a:p>
@@ -3787,7 +3788,7 @@
           <a:p>
             <a:fld id="{E20D963B-2D4F-495B-A2B5-E46053ACE7DA}" type="datetimeFigureOut">
               <a:rPr lang="en-US" smtClean="0"/>
-              <a:t>10/7/2015</a:t>
+              <a:t>10/8/2015</a:t>
             </a:fld>
             <a:endParaRPr lang="en-US"/>
           </a:p>
@@ -3967,7 +3968,7 @@
           <a:p>
             <a:fld id="{E20D963B-2D4F-495B-A2B5-E46053ACE7DA}" type="datetimeFigureOut">
               <a:rPr lang="en-US" smtClean="0"/>
-              <a:t>10/7/2015</a:t>
+              <a:t>10/8/2015</a:t>
             </a:fld>
             <a:endParaRPr lang="en-US"/>
           </a:p>
@@ -4137,7 +4138,7 @@
           <a:p>
             <a:fld id="{E20D963B-2D4F-495B-A2B5-E46053ACE7DA}" type="datetimeFigureOut">
               <a:rPr lang="en-US" smtClean="0"/>
-              <a:t>10/7/2015</a:t>
+              <a:t>10/8/2015</a:t>
             </a:fld>
             <a:endParaRPr lang="en-US"/>
           </a:p>
@@ -4384,7 +4385,7 @@
           <a:p>
             <a:fld id="{E20D963B-2D4F-495B-A2B5-E46053ACE7DA}" type="datetimeFigureOut">
               <a:rPr lang="en-US" smtClean="0"/>
-              <a:t>10/7/2015</a:t>
+              <a:t>10/8/2015</a:t>
             </a:fld>
             <a:endParaRPr lang="en-US"/>
           </a:p>
@@ -4676,7 +4677,7 @@
           <a:p>
             <a:fld id="{E20D963B-2D4F-495B-A2B5-E46053ACE7DA}" type="datetimeFigureOut">
               <a:rPr lang="en-US" smtClean="0"/>
-              <a:t>10/7/2015</a:t>
+              <a:t>10/8/2015</a:t>
             </a:fld>
             <a:endParaRPr lang="en-US"/>
           </a:p>
@@ -5120,7 +5121,7 @@
           <a:p>
             <a:fld id="{E20D963B-2D4F-495B-A2B5-E46053ACE7DA}" type="datetimeFigureOut">
               <a:rPr lang="en-US" smtClean="0"/>
-              <a:t>10/7/2015</a:t>
+              <a:t>10/8/2015</a:t>
             </a:fld>
             <a:endParaRPr lang="en-US"/>
           </a:p>
@@ -5238,7 +5239,7 @@
           <a:p>
             <a:fld id="{E20D963B-2D4F-495B-A2B5-E46053ACE7DA}" type="datetimeFigureOut">
               <a:rPr lang="en-US" smtClean="0"/>
-              <a:t>10/7/2015</a:t>
+              <a:t>10/8/2015</a:t>
             </a:fld>
             <a:endParaRPr lang="en-US"/>
           </a:p>
@@ -5333,7 +5334,7 @@
           <a:p>
             <a:fld id="{E20D963B-2D4F-495B-A2B5-E46053ACE7DA}" type="datetimeFigureOut">
               <a:rPr lang="en-US" smtClean="0"/>
-              <a:t>10/7/2015</a:t>
+              <a:t>10/8/2015</a:t>
             </a:fld>
             <a:endParaRPr lang="en-US"/>
           </a:p>
@@ -5612,7 +5613,7 @@
           <a:p>
             <a:fld id="{E20D963B-2D4F-495B-A2B5-E46053ACE7DA}" type="datetimeFigureOut">
               <a:rPr lang="en-US" smtClean="0"/>
-              <a:t>10/7/2015</a:t>
+              <a:t>10/8/2015</a:t>
             </a:fld>
             <a:endParaRPr lang="en-US"/>
           </a:p>
@@ -5887,7 +5888,7 @@
           <a:p>
             <a:fld id="{E20D963B-2D4F-495B-A2B5-E46053ACE7DA}" type="datetimeFigureOut">
               <a:rPr lang="en-US" smtClean="0"/>
-              <a:t>10/7/2015</a:t>
+              <a:t>10/8/2015</a:t>
             </a:fld>
             <a:endParaRPr lang="en-US"/>
           </a:p>
@@ -6316,7 +6317,7 @@
           <a:p>
             <a:fld id="{E20D963B-2D4F-495B-A2B5-E46053ACE7DA}" type="datetimeFigureOut">
               <a:rPr lang="en-US" smtClean="0"/>
-              <a:t>10/7/2015</a:t>
+              <a:t>10/8/2015</a:t>
             </a:fld>
             <a:endParaRPr lang="en-US"/>
           </a:p>
@@ -7241,58 +7242,7 @@
               <a:rPr lang="en-US" dirty="0" smtClean="0"/>
               <a:t>cells</a:t>
             </a:r>
-          </a:p>
-          <a:p>
-            <a:pPr lvl="1"/>
-            <a:endParaRPr lang="en-US" dirty="0"/>
-          </a:p>
-          <a:p>
-            <a:pPr lvl="1"/>
-            <a:r>
-              <a:rPr lang="en-US" dirty="0" smtClean="0"/>
-              <a:t>SHALL MAKE TABLE </a:t>
-            </a:r>
-          </a:p>
-          <a:p>
-            <a:pPr lvl="1"/>
-            <a:r>
-              <a:rPr lang="en-US" dirty="0" err="1"/>
-              <a:t>Gomspace</a:t>
-            </a:r>
-            <a:r>
-              <a:rPr lang="en-US" dirty="0"/>
-              <a:t> P110 Solar Panel Integrated Coarse Sun Sensor</a:t>
-            </a:r>
-          </a:p>
-          <a:p>
-            <a:pPr lvl="1"/>
-            <a:r>
-              <a:rPr lang="en-US" dirty="0" err="1"/>
-              <a:t>SolarMEMS</a:t>
-            </a:r>
-            <a:r>
-              <a:rPr lang="en-US" dirty="0"/>
-              <a:t> SSOC-D60</a:t>
-            </a:r>
-          </a:p>
-          <a:p>
-            <a:pPr lvl="1"/>
-            <a:r>
-              <a:rPr lang="en-US" dirty="0"/>
-              <a:t>SSBV CubeSat Sun Sensor</a:t>
-            </a:r>
-          </a:p>
-          <a:p>
-            <a:pPr lvl="1"/>
-            <a:r>
-              <a:rPr lang="it-IT" dirty="0"/>
-              <a:t>Space Micro MSS-01 Sun sensor</a:t>
-            </a:r>
-            <a:endParaRPr lang="en-US" dirty="0"/>
-          </a:p>
-          <a:p>
-            <a:pPr lvl="1"/>
-            <a:endParaRPr lang="en-US" dirty="0"/>
+            <a:endParaRPr lang="en-US" dirty="0" smtClean="0"/>
           </a:p>
         </p:txBody>
       </p:sp>
@@ -7333,6 +7283,558 @@
             <a:spLocks noGrp="1"/>
           </p:cNvSpPr>
           <p:nvPr>
+            <p:ph type="title"/>
+          </p:nvPr>
+        </p:nvSpPr>
+        <p:spPr/>
+        <p:txBody>
+          <a:bodyPr/>
+          <a:lstStyle/>
+          <a:p>
+            <a:r>
+              <a:rPr lang="en-US" dirty="0" smtClean="0"/>
+              <a:t>Sun Sensors</a:t>
+            </a:r>
+            <a:endParaRPr lang="en-US" dirty="0"/>
+          </a:p>
+        </p:txBody>
+      </p:sp>
+      <p:graphicFrame>
+        <p:nvGraphicFramePr>
+          <p:cNvPr id="4" name="Content Placeholder 5"/>
+          <p:cNvGraphicFramePr>
+            <a:graphicFrameLocks noGrp="1"/>
+          </p:cNvGraphicFramePr>
+          <p:nvPr>
+            <p:ph idx="1"/>
+            <p:extLst>
+              <p:ext uri="{D42A27DB-BD31-4B8C-83A1-F6EECF244321}">
+                <p14:modId xmlns:p14="http://schemas.microsoft.com/office/powerpoint/2010/main" val="3556686935"/>
+              </p:ext>
+            </p:extLst>
+          </p:nvPr>
+        </p:nvGraphicFramePr>
+        <p:xfrm>
+          <a:off x="1103313" y="2504660"/>
+          <a:ext cx="9542266" cy="3725017"/>
+        </p:xfrm>
+        <a:graphic>
+          <a:graphicData uri="http://schemas.openxmlformats.org/drawingml/2006/table">
+            <a:tbl>
+              <a:tblPr firstRow="1" bandRow="1">
+                <a:tableStyleId>{5C22544A-7EE6-4342-B048-85BDC9FD1C3A}</a:tableStyleId>
+              </a:tblPr>
+              <a:tblGrid>
+                <a:gridCol w="1577817"/>
+                <a:gridCol w="1981185"/>
+                <a:gridCol w="2046570"/>
+                <a:gridCol w="1968347"/>
+                <a:gridCol w="1968347"/>
+              </a:tblGrid>
+              <a:tr h="412596">
+                <a:tc>
+                  <a:txBody>
+                    <a:bodyPr/>
+                    <a:lstStyle/>
+                    <a:p>
+                      <a:r>
+                        <a:rPr lang="en-US" dirty="0" smtClean="0"/>
+                        <a:t>Name</a:t>
+                      </a:r>
+                      <a:endParaRPr lang="en-US" dirty="0"/>
+                    </a:p>
+                  </a:txBody>
+                  <a:tcPr/>
+                </a:tc>
+                <a:tc>
+                  <a:txBody>
+                    <a:bodyPr/>
+                    <a:lstStyle/>
+                    <a:p>
+                      <a:pPr lvl="0" algn="l"/>
+                      <a:r>
+                        <a:rPr lang="en-US" dirty="0" smtClean="0"/>
+                        <a:t>P110 </a:t>
+                      </a:r>
+                      <a:r>
+                        <a:rPr lang="en-US" dirty="0" err="1" smtClean="0"/>
+                        <a:t>Gomspace</a:t>
+                      </a:r>
+                      <a:r>
+                        <a:rPr lang="en-US" dirty="0" smtClean="0"/>
+                        <a:t> </a:t>
+                      </a:r>
+                      <a:endParaRPr lang="en-US" dirty="0"/>
+                    </a:p>
+                  </a:txBody>
+                  <a:tcPr/>
+                </a:tc>
+                <a:tc>
+                  <a:txBody>
+                    <a:bodyPr/>
+                    <a:lstStyle/>
+                    <a:p>
+                      <a:r>
+                        <a:rPr lang="en-US" dirty="0" smtClean="0"/>
+                        <a:t>SSoC-A60, SOLARMEMS </a:t>
+                      </a:r>
+                      <a:endParaRPr lang="en-US" dirty="0"/>
+                    </a:p>
+                  </a:txBody>
+                  <a:tcPr/>
+                </a:tc>
+                <a:tc>
+                  <a:txBody>
+                    <a:bodyPr/>
+                    <a:lstStyle/>
+                    <a:p>
+                      <a:r>
+                        <a:rPr lang="en-US" dirty="0" err="1" smtClean="0"/>
+                        <a:t>Cubesat</a:t>
+                      </a:r>
+                      <a:r>
+                        <a:rPr lang="en-US" dirty="0" smtClean="0"/>
+                        <a:t> Sun Sensor, SSBV </a:t>
+                      </a:r>
+                      <a:endParaRPr lang="en-US" dirty="0"/>
+                    </a:p>
+                  </a:txBody>
+                  <a:tcPr/>
+                </a:tc>
+                <a:tc>
+                  <a:txBody>
+                    <a:bodyPr/>
+                    <a:lstStyle/>
+                    <a:p>
+                      <a:r>
+                        <a:rPr lang="it-IT" dirty="0" smtClean="0"/>
+                        <a:t>MSS-01 Sun Sensor,</a:t>
+                      </a:r>
+                    </a:p>
+                    <a:p>
+                      <a:r>
+                        <a:rPr lang="it-IT" dirty="0" smtClean="0"/>
+                        <a:t>Space Micro </a:t>
+                      </a:r>
+                      <a:endParaRPr lang="en-US" dirty="0"/>
+                    </a:p>
+                  </a:txBody>
+                  <a:tcPr/>
+                </a:tc>
+              </a:tr>
+              <a:tr h="441298">
+                <a:tc>
+                  <a:txBody>
+                    <a:bodyPr/>
+                    <a:lstStyle/>
+                    <a:p>
+                      <a:r>
+                        <a:rPr lang="en-US" dirty="0" smtClean="0"/>
+                        <a:t>Size(mm)</a:t>
+                      </a:r>
+                      <a:endParaRPr lang="en-US" dirty="0"/>
+                    </a:p>
+                  </a:txBody>
+                  <a:tcPr/>
+                </a:tc>
+                <a:tc>
+                  <a:txBody>
+                    <a:bodyPr/>
+                    <a:lstStyle/>
+                    <a:p>
+                      <a:r>
+                        <a:rPr lang="en-US" dirty="0" smtClean="0"/>
+                        <a:t>5.5 x 11 x 11</a:t>
+                      </a:r>
+                      <a:endParaRPr lang="en-US" dirty="0"/>
+                    </a:p>
+                  </a:txBody>
+                  <a:tcPr/>
+                </a:tc>
+                <a:tc>
+                  <a:txBody>
+                    <a:bodyPr/>
+                    <a:lstStyle/>
+                    <a:p>
+                      <a:r>
+                        <a:rPr lang="en-US" dirty="0" smtClean="0"/>
+                        <a:t>50 x 12 x 30</a:t>
+                      </a:r>
+                      <a:endParaRPr lang="en-US" dirty="0"/>
+                    </a:p>
+                  </a:txBody>
+                  <a:tcPr/>
+                </a:tc>
+                <a:tc>
+                  <a:txBody>
+                    <a:bodyPr/>
+                    <a:lstStyle/>
+                    <a:p>
+                      <a:r>
+                        <a:rPr lang="en-US" dirty="0" smtClean="0"/>
+                        <a:t>33 x 11 x 6</a:t>
+                      </a:r>
+                      <a:endParaRPr lang="en-US" dirty="0"/>
+                    </a:p>
+                  </a:txBody>
+                  <a:tcPr/>
+                </a:tc>
+                <a:tc>
+                  <a:txBody>
+                    <a:bodyPr/>
+                    <a:lstStyle/>
+                    <a:p>
+                      <a:r>
+                        <a:rPr lang="en-US" dirty="0" smtClean="0"/>
+                        <a:t>35 x 25</a:t>
+                      </a:r>
+                      <a:r>
+                        <a:rPr lang="en-US" baseline="0" dirty="0" smtClean="0"/>
+                        <a:t> x 25</a:t>
+                      </a:r>
+                      <a:endParaRPr lang="en-US" dirty="0"/>
+                    </a:p>
+                  </a:txBody>
+                  <a:tcPr/>
+                </a:tc>
+              </a:tr>
+              <a:tr h="432310">
+                <a:tc>
+                  <a:txBody>
+                    <a:bodyPr/>
+                    <a:lstStyle/>
+                    <a:p>
+                      <a:r>
+                        <a:rPr lang="en-US" dirty="0" smtClean="0"/>
+                        <a:t>Power (W)</a:t>
+                      </a:r>
+                      <a:endParaRPr lang="en-US" dirty="0"/>
+                    </a:p>
+                  </a:txBody>
+                  <a:tcPr/>
+                </a:tc>
+                <a:tc>
+                  <a:txBody>
+                    <a:bodyPr/>
+                    <a:lstStyle/>
+                    <a:p>
+                      <a:r>
+                        <a:rPr lang="en-US" dirty="0" smtClean="0"/>
+                        <a:t>N/A</a:t>
+                      </a:r>
+                      <a:endParaRPr lang="en-US" dirty="0"/>
+                    </a:p>
+                  </a:txBody>
+                  <a:tcPr/>
+                </a:tc>
+                <a:tc>
+                  <a:txBody>
+                    <a:bodyPr/>
+                    <a:lstStyle/>
+                    <a:p>
+                      <a:r>
+                        <a:rPr lang="en-US" dirty="0" smtClean="0"/>
+                        <a:t>0.036</a:t>
+                      </a:r>
+                      <a:endParaRPr lang="en-US" dirty="0"/>
+                    </a:p>
+                  </a:txBody>
+                  <a:tcPr/>
+                </a:tc>
+                <a:tc>
+                  <a:txBody>
+                    <a:bodyPr/>
+                    <a:lstStyle/>
+                    <a:p>
+                      <a:r>
+                        <a:rPr lang="en-US" dirty="0" smtClean="0"/>
+                        <a:t>0.050</a:t>
+                      </a:r>
+                      <a:endParaRPr lang="en-US" dirty="0"/>
+                    </a:p>
+                  </a:txBody>
+                  <a:tcPr/>
+                </a:tc>
+                <a:tc>
+                  <a:txBody>
+                    <a:bodyPr/>
+                    <a:lstStyle/>
+                    <a:p>
+                      <a:r>
+                        <a:rPr lang="en-US" dirty="0" smtClean="0"/>
+                        <a:t>N/A</a:t>
+                      </a:r>
+                      <a:endParaRPr lang="en-US" dirty="0"/>
+                    </a:p>
+                  </a:txBody>
+                  <a:tcPr/>
+                </a:tc>
+              </a:tr>
+              <a:tr h="432310">
+                <a:tc>
+                  <a:txBody>
+                    <a:bodyPr/>
+                    <a:lstStyle/>
+                    <a:p>
+                      <a:r>
+                        <a:rPr lang="en-US" dirty="0" smtClean="0"/>
+                        <a:t>Accuracy (degrees)</a:t>
+                      </a:r>
+                      <a:endParaRPr lang="en-US" dirty="0"/>
+                    </a:p>
+                  </a:txBody>
+                  <a:tcPr/>
+                </a:tc>
+                <a:tc>
+                  <a:txBody>
+                    <a:bodyPr/>
+                    <a:lstStyle/>
+                    <a:p>
+                      <a:r>
+                        <a:rPr lang="en-US" dirty="0" smtClean="0"/>
+                        <a:t>N/A</a:t>
+                      </a:r>
+                      <a:endParaRPr lang="en-US" dirty="0"/>
+                    </a:p>
+                  </a:txBody>
+                  <a:tcPr/>
+                </a:tc>
+                <a:tc>
+                  <a:txBody>
+                    <a:bodyPr/>
+                    <a:lstStyle/>
+                    <a:p>
+                      <a:r>
+                        <a:rPr lang="en-US" dirty="0" smtClean="0"/>
+                        <a:t>0.3</a:t>
+                      </a:r>
+                      <a:endParaRPr lang="en-US" dirty="0"/>
+                    </a:p>
+                  </a:txBody>
+                  <a:tcPr/>
+                </a:tc>
+                <a:tc>
+                  <a:txBody>
+                    <a:bodyPr/>
+                    <a:lstStyle/>
+                    <a:p>
+                      <a:r>
+                        <a:rPr lang="en-US" dirty="0" smtClean="0"/>
+                        <a:t>0.5</a:t>
+                      </a:r>
+                      <a:endParaRPr lang="en-US" dirty="0"/>
+                    </a:p>
+                  </a:txBody>
+                  <a:tcPr/>
+                </a:tc>
+                <a:tc>
+                  <a:txBody>
+                    <a:bodyPr/>
+                    <a:lstStyle/>
+                    <a:p>
+                      <a:r>
+                        <a:rPr lang="en-US" dirty="0" smtClean="0"/>
+                        <a:t>1</a:t>
+                      </a:r>
+                      <a:endParaRPr lang="en-US" dirty="0"/>
+                    </a:p>
+                  </a:txBody>
+                  <a:tcPr/>
+                </a:tc>
+              </a:tr>
+              <a:tr h="432310">
+                <a:tc>
+                  <a:txBody>
+                    <a:bodyPr/>
+                    <a:lstStyle/>
+                    <a:p>
+                      <a:r>
+                        <a:rPr lang="en-US" dirty="0" smtClean="0"/>
+                        <a:t>Weight (g)</a:t>
+                      </a:r>
+                      <a:endParaRPr lang="en-US" dirty="0"/>
+                    </a:p>
+                  </a:txBody>
+                  <a:tcPr/>
+                </a:tc>
+                <a:tc>
+                  <a:txBody>
+                    <a:bodyPr/>
+                    <a:lstStyle/>
+                    <a:p>
+                      <a:r>
+                        <a:rPr lang="en-US" dirty="0" smtClean="0"/>
+                        <a:t>N/A</a:t>
+                      </a:r>
+                      <a:endParaRPr lang="en-US" dirty="0"/>
+                    </a:p>
+                  </a:txBody>
+                  <a:tcPr/>
+                </a:tc>
+                <a:tc>
+                  <a:txBody>
+                    <a:bodyPr/>
+                    <a:lstStyle/>
+                    <a:p>
+                      <a:r>
+                        <a:rPr lang="en-US" dirty="0" smtClean="0"/>
+                        <a:t>25</a:t>
+                      </a:r>
+                      <a:endParaRPr lang="en-US" dirty="0"/>
+                    </a:p>
+                  </a:txBody>
+                  <a:tcPr/>
+                </a:tc>
+                <a:tc>
+                  <a:txBody>
+                    <a:bodyPr/>
+                    <a:lstStyle/>
+                    <a:p>
+                      <a:r>
+                        <a:rPr lang="en-US" dirty="0" smtClean="0"/>
+                        <a:t>5</a:t>
+                      </a:r>
+                      <a:endParaRPr lang="en-US" dirty="0"/>
+                    </a:p>
+                  </a:txBody>
+                  <a:tcPr/>
+                </a:tc>
+                <a:tc>
+                  <a:txBody>
+                    <a:bodyPr/>
+                    <a:lstStyle/>
+                    <a:p>
+                      <a:r>
+                        <a:rPr lang="en-US" dirty="0" smtClean="0"/>
+                        <a:t>36</a:t>
+                      </a:r>
+                      <a:endParaRPr lang="en-US" dirty="0"/>
+                    </a:p>
+                  </a:txBody>
+                  <a:tcPr/>
+                </a:tc>
+              </a:tr>
+              <a:tr h="864619">
+                <a:tc>
+                  <a:txBody>
+                    <a:bodyPr/>
+                    <a:lstStyle/>
+                    <a:p>
+                      <a:r>
+                        <a:rPr lang="en-US" dirty="0" smtClean="0"/>
+                        <a:t>Space Heritage</a:t>
+                      </a:r>
+                      <a:endParaRPr lang="en-US" dirty="0"/>
+                    </a:p>
+                  </a:txBody>
+                  <a:tcPr/>
+                </a:tc>
+                <a:tc>
+                  <a:txBody>
+                    <a:bodyPr/>
+                    <a:lstStyle/>
+                    <a:p>
+                      <a:r>
+                        <a:rPr lang="en-US" dirty="0" smtClean="0"/>
+                        <a:t>AAU-</a:t>
+                      </a:r>
+                      <a:r>
+                        <a:rPr lang="en-US" dirty="0" err="1" smtClean="0"/>
+                        <a:t>Cubesat</a:t>
+                      </a:r>
+                      <a:endParaRPr lang="en-US" dirty="0"/>
+                    </a:p>
+                  </a:txBody>
+                  <a:tcPr/>
+                </a:tc>
+                <a:tc>
+                  <a:txBody>
+                    <a:bodyPr/>
+                    <a:lstStyle/>
+                    <a:p>
+                      <a:r>
+                        <a:rPr lang="en-US" dirty="0" smtClean="0"/>
+                        <a:t>NANOSAT</a:t>
+                      </a:r>
+                      <a:r>
+                        <a:rPr lang="en-US" baseline="0" dirty="0" smtClean="0"/>
+                        <a:t> 1B</a:t>
+                      </a:r>
+                      <a:endParaRPr lang="en-US" dirty="0"/>
+                    </a:p>
+                  </a:txBody>
+                  <a:tcPr/>
+                </a:tc>
+                <a:tc>
+                  <a:txBody>
+                    <a:bodyPr/>
+                    <a:lstStyle/>
+                    <a:p>
+                      <a:r>
+                        <a:rPr lang="en-US" baseline="0" dirty="0" smtClean="0"/>
+                        <a:t>UKube‐1 and  TDS‐1</a:t>
+                      </a:r>
+                      <a:endParaRPr lang="en-US" dirty="0"/>
+                    </a:p>
+                  </a:txBody>
+                  <a:tcPr/>
+                </a:tc>
+                <a:tc>
+                  <a:txBody>
+                    <a:bodyPr/>
+                    <a:lstStyle/>
+                    <a:p>
+                      <a:r>
+                        <a:rPr lang="en-US" dirty="0" smtClean="0"/>
+                        <a:t>N/A</a:t>
+                      </a:r>
+                      <a:endParaRPr lang="en-US" dirty="0"/>
+                    </a:p>
+                  </a:txBody>
+                  <a:tcPr/>
+                </a:tc>
+              </a:tr>
+            </a:tbl>
+          </a:graphicData>
+        </a:graphic>
+      </p:graphicFrame>
+    </p:spTree>
+    <p:extLst>
+      <p:ext uri="{BB962C8B-B14F-4D97-AF65-F5344CB8AC3E}">
+        <p14:creationId xmlns:p14="http://schemas.microsoft.com/office/powerpoint/2010/main" val="2980334392"/>
+      </p:ext>
+    </p:extLst>
+  </p:cSld>
+  <p:clrMapOvr>
+    <a:masterClrMapping/>
+  </p:clrMapOvr>
+</p:sld>
+</file>
+
+<file path=ppt/slides/slide14.xml><?xml version="1.0" encoding="utf-8"?>
+<p:sld xmlns:a="http://schemas.openxmlformats.org/drawingml/2006/main" xmlns:r="http://schemas.openxmlformats.org/officeDocument/2006/relationships" xmlns:p="http://schemas.openxmlformats.org/presentationml/2006/main">
+  <p:cSld>
+    <p:spTree>
+      <p:nvGrpSpPr>
+        <p:cNvPr id="1" name=""/>
+        <p:cNvGrpSpPr/>
+        <p:nvPr/>
+      </p:nvGrpSpPr>
+      <p:grpSpPr>
+        <a:xfrm>
+          <a:off x="0" y="0"/>
+          <a:ext cx="0" cy="0"/>
+          <a:chOff x="0" y="0"/>
+          <a:chExt cx="0" cy="0"/>
+        </a:xfrm>
+      </p:grpSpPr>
+      <p:sp>
+        <p:nvSpPr>
+          <p:cNvPr id="2" name="Title 1"/>
+          <p:cNvSpPr>
+            <a:spLocks noGrp="1"/>
+          </p:cNvSpPr>
+          <p:nvPr>
             <p:ph type="ctrTitle"/>
           </p:nvPr>
         </p:nvSpPr>
@@ -7369,7 +7871,7 @@
 </p:sld>
 </file>
 
-<file path=ppt/slides/slide14.xml><?xml version="1.0" encoding="utf-8"?>
+<file path=ppt/slides/slide15.xml><?xml version="1.0" encoding="utf-8"?>
 <p:sld xmlns:a="http://schemas.openxmlformats.org/drawingml/2006/main" xmlns:r="http://schemas.openxmlformats.org/officeDocument/2006/relationships" xmlns:p="http://schemas.openxmlformats.org/presentationml/2006/main">
   <p:cSld>
     <p:spTree>
@@ -7558,66 +8060,6 @@
 </p:sld>
 </file>
 
-<file path=ppt/slides/slide15.xml><?xml version="1.0" encoding="utf-8"?>
-<p:sld xmlns:a="http://schemas.openxmlformats.org/drawingml/2006/main" xmlns:r="http://schemas.openxmlformats.org/officeDocument/2006/relationships" xmlns:p="http://schemas.openxmlformats.org/presentationml/2006/main">
-  <p:cSld>
-    <p:spTree>
-      <p:nvGrpSpPr>
-        <p:cNvPr id="1" name=""/>
-        <p:cNvGrpSpPr/>
-        <p:nvPr/>
-      </p:nvGrpSpPr>
-      <p:grpSpPr>
-        <a:xfrm>
-          <a:off x="0" y="0"/>
-          <a:ext cx="0" cy="0"/>
-          <a:chOff x="0" y="0"/>
-          <a:chExt cx="0" cy="0"/>
-        </a:xfrm>
-      </p:grpSpPr>
-      <p:sp>
-        <p:nvSpPr>
-          <p:cNvPr id="2" name="Title 1"/>
-          <p:cNvSpPr>
-            <a:spLocks noGrp="1"/>
-          </p:cNvSpPr>
-          <p:nvPr>
-            <p:ph type="ctrTitle"/>
-          </p:nvPr>
-        </p:nvSpPr>
-        <p:spPr/>
-        <p:txBody>
-          <a:bodyPr/>
-          <a:lstStyle/>
-          <a:p>
-            <a:r>
-              <a:rPr lang="en-US" dirty="0" smtClean="0"/>
-              <a:t>Communication	</a:t>
-            </a:r>
-            <a:endParaRPr lang="en-US" dirty="0"/>
-          </a:p>
-        </p:txBody>
-      </p:sp>
-    </p:spTree>
-    <p:extLst>
-      <p:ext uri="{BB962C8B-B14F-4D97-AF65-F5344CB8AC3E}">
-        <p14:creationId xmlns:p14="http://schemas.microsoft.com/office/powerpoint/2010/main" val="2399346682"/>
-      </p:ext>
-    </p:extLst>
-  </p:cSld>
-  <p:clrMapOvr>
-    <a:masterClrMapping/>
-  </p:clrMapOvr>
-  <p:timing>
-    <p:tnLst>
-      <p:par>
-        <p:cTn id="1" dur="indefinite" restart="never" nodeType="tmRoot"/>
-      </p:par>
-    </p:tnLst>
-  </p:timing>
-</p:sld>
-</file>
-
 <file path=ppt/slides/slide16.xml><?xml version="1.0" encoding="utf-8"?>
 <p:sld xmlns:a="http://schemas.openxmlformats.org/drawingml/2006/main" xmlns:r="http://schemas.openxmlformats.org/officeDocument/2006/relationships" xmlns:p="http://schemas.openxmlformats.org/presentationml/2006/main">
   <p:cSld>
@@ -7642,123 +8084,26 @@
             <a:spLocks noGrp="1"/>
           </p:cNvSpPr>
           <p:nvPr>
-            <p:ph type="title"/>
-          </p:nvPr>
-        </p:nvSpPr>
-        <p:spPr>
-          <a:xfrm>
-            <a:off x="646111" y="452718"/>
-            <a:ext cx="9404723" cy="829982"/>
-          </a:xfrm>
-        </p:spPr>
+            <p:ph type="ctrTitle"/>
+          </p:nvPr>
+        </p:nvSpPr>
+        <p:spPr/>
         <p:txBody>
           <a:bodyPr/>
           <a:lstStyle/>
           <a:p>
             <a:r>
               <a:rPr lang="en-US" dirty="0" smtClean="0"/>
-              <a:t>Communication</a:t>
+              <a:t>Communication	</a:t>
             </a:r>
             <a:endParaRPr lang="en-US" dirty="0"/>
-          </a:p>
-        </p:txBody>
-      </p:sp>
-      <p:sp>
-        <p:nvSpPr>
-          <p:cNvPr id="3" name="Content Placeholder 2"/>
-          <p:cNvSpPr>
-            <a:spLocks noGrp="1"/>
-          </p:cNvSpPr>
-          <p:nvPr>
-            <p:ph idx="1"/>
-          </p:nvPr>
-        </p:nvSpPr>
-        <p:spPr>
-          <a:xfrm>
-            <a:off x="1103312" y="1409700"/>
-            <a:ext cx="8946541" cy="4838699"/>
-          </a:xfrm>
-        </p:spPr>
-        <p:txBody>
-          <a:bodyPr>
-            <a:normAutofit/>
-          </a:bodyPr>
-          <a:lstStyle/>
-          <a:p>
-            <a:pPr>
-              <a:lnSpc>
-                <a:spcPct val="150000"/>
-              </a:lnSpc>
-            </a:pPr>
-            <a:r>
-              <a:rPr lang="en-US" dirty="0" smtClean="0"/>
-              <a:t>Requirements</a:t>
-            </a:r>
-          </a:p>
-          <a:p>
-            <a:pPr lvl="1">
-              <a:lnSpc>
-                <a:spcPct val="150000"/>
-              </a:lnSpc>
-            </a:pPr>
-            <a:r>
-              <a:rPr lang="en-US" sz="2000" dirty="0" smtClean="0"/>
-              <a:t>Industrial Grade Radio</a:t>
-            </a:r>
-          </a:p>
-          <a:p>
-            <a:pPr lvl="2">
-              <a:lnSpc>
-                <a:spcPct val="150000"/>
-              </a:lnSpc>
-            </a:pPr>
-            <a:r>
-              <a:rPr lang="en-US" sz="2000" dirty="0" smtClean="0"/>
-              <a:t>Withstand the environment</a:t>
-            </a:r>
-          </a:p>
-          <a:p>
-            <a:pPr lvl="2"/>
-            <a:r>
-              <a:rPr lang="en-US" sz="2000" dirty="0" smtClean="0"/>
-              <a:t>Reliability and high efficiency</a:t>
-            </a:r>
-            <a:endParaRPr lang="en-US" sz="2000" dirty="0"/>
-          </a:p>
-          <a:p>
-            <a:pPr lvl="1"/>
-            <a:r>
-              <a:rPr lang="en-US" sz="2000" dirty="0" smtClean="0"/>
-              <a:t>Data Storage and Transmission</a:t>
-            </a:r>
-          </a:p>
-          <a:p>
-            <a:pPr lvl="2"/>
-            <a:r>
-              <a:rPr lang="en-US" sz="2000" dirty="0" smtClean="0"/>
-              <a:t>Store and transfer data packets when link is available</a:t>
-            </a:r>
-          </a:p>
-          <a:p>
-            <a:pPr lvl="1"/>
-            <a:r>
-              <a:rPr lang="en-US" sz="2000" dirty="0" smtClean="0"/>
-              <a:t>Desired Orbit for Data Transfer</a:t>
-            </a:r>
-          </a:p>
-          <a:p>
-            <a:pPr lvl="2"/>
-            <a:r>
-              <a:rPr lang="en-US" sz="2000" dirty="0" smtClean="0"/>
-              <a:t>Need unit to fly near data stations for downlink</a:t>
-            </a:r>
           </a:p>
         </p:txBody>
       </p:sp>
     </p:spTree>
     <p:extLst>
       <p:ext uri="{BB962C8B-B14F-4D97-AF65-F5344CB8AC3E}">
-        <p14:creationId xmlns:p14="http://schemas.microsoft.com/office/powerpoint/2010/main" val="3732384408"/>
+        <p14:creationId xmlns:p14="http://schemas.microsoft.com/office/powerpoint/2010/main" val="2399346682"/>
       </p:ext>
     </p:extLst>
   </p:cSld>
@@ -7802,14 +8147,19 @@
             <p:ph type="title"/>
           </p:nvPr>
         </p:nvSpPr>
-        <p:spPr/>
+        <p:spPr>
+          <a:xfrm>
+            <a:off x="646111" y="452718"/>
+            <a:ext cx="9404723" cy="829982"/>
+          </a:xfrm>
+        </p:spPr>
         <p:txBody>
           <a:bodyPr/>
           <a:lstStyle/>
           <a:p>
             <a:r>
               <a:rPr lang="en-US" dirty="0" smtClean="0"/>
-              <a:t>Working Assumptions</a:t>
+              <a:t>Communication</a:t>
             </a:r>
             <a:endParaRPr lang="en-US" dirty="0"/>
           </a:p>
@@ -7825,51 +8175,105 @@
             <p:ph idx="1"/>
           </p:nvPr>
         </p:nvSpPr>
-        <p:spPr/>
-        <p:txBody>
-          <a:bodyPr/>
+        <p:spPr>
+          <a:xfrm>
+            <a:off x="1103312" y="1409700"/>
+            <a:ext cx="8946541" cy="4838699"/>
+          </a:xfrm>
+        </p:spPr>
+        <p:txBody>
+          <a:bodyPr>
+            <a:normAutofit/>
+          </a:bodyPr>
           <a:lstStyle/>
           <a:p>
+            <a:pPr>
+              <a:lnSpc>
+                <a:spcPct val="150000"/>
+              </a:lnSpc>
+            </a:pPr>
             <a:r>
               <a:rPr lang="en-US" dirty="0" smtClean="0"/>
-              <a:t>Assume one event per orbit</a:t>
-            </a:r>
-          </a:p>
-          <a:p>
-            <a:r>
-              <a:rPr lang="en-US" dirty="0" smtClean="0"/>
-              <a:t>Assume communication available to 3 base stations across the United States (Honolulu, Boulder, Fairbanks, maybe Crookston)</a:t>
-            </a:r>
-          </a:p>
-          <a:p>
-            <a:r>
-              <a:rPr lang="en-US" dirty="0" smtClean="0"/>
-              <a:t>Assume circular LEO</a:t>
-            </a:r>
-          </a:p>
-          <a:p>
-            <a:r>
-              <a:rPr lang="en-US" dirty="0" smtClean="0"/>
-              <a:t>Assume each data set on the order of 10 </a:t>
-            </a:r>
-            <a:r>
-              <a:rPr lang="en-US" dirty="0" err="1" smtClean="0"/>
-              <a:t>MiB</a:t>
-            </a:r>
-            <a:endParaRPr lang="en-US" dirty="0" smtClean="0"/>
+              <a:t>Requirements</a:t>
+            </a:r>
+          </a:p>
+          <a:p>
+            <a:pPr lvl="1">
+              <a:lnSpc>
+                <a:spcPct val="150000"/>
+              </a:lnSpc>
+            </a:pPr>
+            <a:r>
+              <a:rPr lang="en-US" sz="2000" dirty="0" smtClean="0"/>
+              <a:t>Industrial Grade Radio</a:t>
+            </a:r>
+          </a:p>
+          <a:p>
+            <a:pPr lvl="2">
+              <a:lnSpc>
+                <a:spcPct val="150000"/>
+              </a:lnSpc>
+            </a:pPr>
+            <a:r>
+              <a:rPr lang="en-US" sz="2000" dirty="0" smtClean="0"/>
+              <a:t>Withstand the environment</a:t>
+            </a:r>
+          </a:p>
+          <a:p>
+            <a:pPr lvl="2"/>
+            <a:r>
+              <a:rPr lang="en-US" sz="2000" dirty="0" smtClean="0"/>
+              <a:t>Reliability and high efficiency</a:t>
+            </a:r>
+            <a:endParaRPr lang="en-US" sz="2000" dirty="0"/>
+          </a:p>
+          <a:p>
+            <a:pPr lvl="1"/>
+            <a:r>
+              <a:rPr lang="en-US" sz="2000" dirty="0" smtClean="0"/>
+              <a:t>Data Storage and Transmission</a:t>
+            </a:r>
+          </a:p>
+          <a:p>
+            <a:pPr lvl="2"/>
+            <a:r>
+              <a:rPr lang="en-US" sz="2000" dirty="0" smtClean="0"/>
+              <a:t>Store and transfer data packets when link is available</a:t>
+            </a:r>
+          </a:p>
+          <a:p>
+            <a:pPr lvl="1"/>
+            <a:r>
+              <a:rPr lang="en-US" sz="2000" dirty="0" smtClean="0"/>
+              <a:t>Desired Orbit for Data Transfer</a:t>
+            </a:r>
+          </a:p>
+          <a:p>
+            <a:pPr lvl="2"/>
+            <a:r>
+              <a:rPr lang="en-US" sz="2000" dirty="0" smtClean="0"/>
+              <a:t>Need unit to fly near data stations for downlink</a:t>
+            </a:r>
           </a:p>
         </p:txBody>
       </p:sp>
     </p:spTree>
     <p:extLst>
       <p:ext uri="{BB962C8B-B14F-4D97-AF65-F5344CB8AC3E}">
-        <p14:creationId xmlns:p14="http://schemas.microsoft.com/office/powerpoint/2010/main" val="2767940933"/>
+        <p14:creationId xmlns:p14="http://schemas.microsoft.com/office/powerpoint/2010/main" val="3732384408"/>
       </p:ext>
     </p:extLst>
   </p:cSld>
   <p:clrMapOvr>
     <a:masterClrMapping/>
   </p:clrMapOvr>
+  <p:timing>
+    <p:tnLst>
+      <p:par>
+        <p:cTn id="1" dur="indefinite" restart="never" nodeType="tmRoot"/>
+      </p:par>
+    </p:tnLst>
+  </p:timing>
 </p:sld>
 </file>
 
@@ -7907,7 +8311,7 @@
           <a:p>
             <a:r>
               <a:rPr lang="en-US" dirty="0" smtClean="0"/>
-              <a:t>Questions/Solutions</a:t>
+              <a:t>Working Assumptions</a:t>
             </a:r>
             <a:endParaRPr lang="en-US" dirty="0"/>
           </a:p>
@@ -7930,56 +8334,38 @@
           <a:p>
             <a:r>
               <a:rPr lang="en-US" dirty="0" smtClean="0"/>
-              <a:t>How much power is required for the broadcast signal?</a:t>
-            </a:r>
-          </a:p>
-          <a:p>
-            <a:pPr lvl="1"/>
+              <a:t>Assume one event per orbit</a:t>
+            </a:r>
+          </a:p>
+          <a:p>
             <a:r>
               <a:rPr lang="en-US" dirty="0" smtClean="0"/>
-              <a:t>Link budget</a:t>
+              <a:t>Assume communication available to 3 base stations across the United States (Honolulu, Boulder, Fairbanks, maybe Crookston)</a:t>
             </a:r>
           </a:p>
           <a:p>
             <a:r>
               <a:rPr lang="en-US" dirty="0" smtClean="0"/>
-              <a:t>How much time will be available during each orbit for communication?</a:t>
-            </a:r>
-          </a:p>
-          <a:p>
-            <a:pPr lvl="1"/>
+              <a:t>Assume circular LEO</a:t>
+            </a:r>
+          </a:p>
+          <a:p>
             <a:r>
               <a:rPr lang="en-US" dirty="0" smtClean="0"/>
-              <a:t>Link budget</a:t>
-            </a:r>
-          </a:p>
-          <a:p>
-            <a:pPr lvl="1"/>
-            <a:r>
-              <a:rPr lang="en-US" dirty="0" smtClean="0"/>
-              <a:t>Orbital parameters</a:t>
-            </a:r>
-          </a:p>
-          <a:p>
-            <a:r>
-              <a:rPr lang="en-US" dirty="0" smtClean="0"/>
-              <a:t>Is it possible to transmit all data in the time allotted?</a:t>
-            </a:r>
-          </a:p>
-          <a:p>
-            <a:pPr lvl="1"/>
-            <a:r>
-              <a:rPr lang="en-US" dirty="0" smtClean="0"/>
-              <a:t>Link budget</a:t>
-            </a:r>
-            <a:endParaRPr lang="en-US" dirty="0"/>
+              <a:t>Assume each data set on the order of 10 </a:t>
+            </a:r>
+            <a:r>
+              <a:rPr lang="en-US" dirty="0" err="1" smtClean="0"/>
+              <a:t>MiB</a:t>
+            </a:r>
+            <a:endParaRPr lang="en-US" dirty="0" smtClean="0"/>
           </a:p>
         </p:txBody>
       </p:sp>
     </p:spTree>
     <p:extLst>
       <p:ext uri="{BB962C8B-B14F-4D97-AF65-F5344CB8AC3E}">
-        <p14:creationId xmlns:p14="http://schemas.microsoft.com/office/powerpoint/2010/main" val="1457759480"/>
+        <p14:creationId xmlns:p14="http://schemas.microsoft.com/office/powerpoint/2010/main" val="2767940933"/>
       </p:ext>
     </p:extLst>
   </p:cSld>
@@ -8023,660 +8409,85 @@
           <a:p>
             <a:r>
               <a:rPr lang="en-US" dirty="0" smtClean="0"/>
-              <a:t>Communication – Scenario 1</a:t>
+              <a:t>Questions/Solutions</a:t>
             </a:r>
             <a:endParaRPr lang="en-US" dirty="0"/>
           </a:p>
         </p:txBody>
       </p:sp>
-      <p:pic>
-        <p:nvPicPr>
-          <p:cNvPr id="4" name="Picture 3"/>
-          <p:cNvPicPr>
-            <a:picLocks noChangeAspect="1"/>
-          </p:cNvPicPr>
-          <p:nvPr/>
-        </p:nvPicPr>
-        <p:blipFill>
-          <a:blip r:embed="rId2">
-            <a:extLst>
-              <a:ext uri="{28A0092B-C50C-407E-A947-70E740481C1C}">
-                <a14:useLocalDpi xmlns:a14="http://schemas.microsoft.com/office/drawing/2010/main" val="0"/>
-              </a:ext>
-            </a:extLst>
-          </a:blip>
-          <a:stretch>
-            <a:fillRect/>
-          </a:stretch>
-        </p:blipFill>
-        <p:spPr>
-          <a:xfrm>
-            <a:off x="5177121" y="4425407"/>
-            <a:ext cx="1904440" cy="1815169"/>
-          </a:xfrm>
-          <a:prstGeom prst="rect">
-            <a:avLst/>
-          </a:prstGeom>
-        </p:spPr>
-      </p:pic>
-      <p:pic>
-        <p:nvPicPr>
-          <p:cNvPr id="5" name="Picture 4"/>
-          <p:cNvPicPr>
-            <a:picLocks noChangeAspect="1"/>
-          </p:cNvPicPr>
-          <p:nvPr/>
-        </p:nvPicPr>
-        <p:blipFill>
-          <a:blip r:embed="rId3" cstate="print">
-            <a:extLst>
-              <a:ext uri="{28A0092B-C50C-407E-A947-70E740481C1C}">
-                <a14:useLocalDpi xmlns:a14="http://schemas.microsoft.com/office/drawing/2010/main" val="0"/>
-              </a:ext>
-            </a:extLst>
-          </a:blip>
-          <a:stretch>
-            <a:fillRect/>
-          </a:stretch>
-        </p:blipFill>
-        <p:spPr>
-          <a:xfrm>
-            <a:off x="6703382" y="1987255"/>
-            <a:ext cx="1572457" cy="1513490"/>
-          </a:xfrm>
-          <a:prstGeom prst="rect">
-            <a:avLst/>
-          </a:prstGeom>
-        </p:spPr>
-      </p:pic>
-      <p:pic>
-        <p:nvPicPr>
-          <p:cNvPr id="6" name="Picture 5"/>
-          <p:cNvPicPr>
-            <a:picLocks noChangeAspect="1"/>
-          </p:cNvPicPr>
-          <p:nvPr/>
-        </p:nvPicPr>
-        <p:blipFill>
-          <a:blip r:embed="rId4">
-            <a:extLst>
-              <a:ext uri="{28A0092B-C50C-407E-A947-70E740481C1C}">
-                <a14:useLocalDpi xmlns:a14="http://schemas.microsoft.com/office/drawing/2010/main" val="0"/>
-              </a:ext>
-            </a:extLst>
-          </a:blip>
-          <a:stretch>
-            <a:fillRect/>
-          </a:stretch>
-        </p:blipFill>
-        <p:spPr>
-          <a:xfrm>
-            <a:off x="8439248" y="4658711"/>
-            <a:ext cx="3223172" cy="1813034"/>
-          </a:xfrm>
-          <a:prstGeom prst="rect">
-            <a:avLst/>
-          </a:prstGeom>
-        </p:spPr>
-      </p:pic>
-      <p:sp>
-        <p:nvSpPr>
-          <p:cNvPr id="7" name="TextBox 6"/>
-          <p:cNvSpPr txBox="1"/>
-          <p:nvPr/>
-        </p:nvSpPr>
-        <p:spPr>
-          <a:xfrm>
-            <a:off x="2666561" y="1646849"/>
-            <a:ext cx="1288499" cy="1200329"/>
-          </a:xfrm>
-          <a:prstGeom prst="rect">
-            <a:avLst/>
-          </a:prstGeom>
-          <a:noFill/>
-          <a:ln>
-            <a:solidFill>
-              <a:schemeClr val="tx1"/>
-            </a:solidFill>
-          </a:ln>
-        </p:spPr>
-        <p:txBody>
-          <a:bodyPr wrap="square" rtlCol="0">
-            <a:spAutoFit/>
-          </a:bodyPr>
+      <p:sp>
+        <p:nvSpPr>
+          <p:cNvPr id="3" name="Content Placeholder 2"/>
+          <p:cNvSpPr>
+            <a:spLocks noGrp="1"/>
+          </p:cNvSpPr>
+          <p:nvPr>
+            <p:ph idx="1"/>
+          </p:nvPr>
+        </p:nvSpPr>
+        <p:spPr/>
+        <p:txBody>
+          <a:bodyPr/>
           <a:lstStyle/>
           <a:p>
             <a:r>
               <a:rPr lang="en-US" dirty="0" smtClean="0"/>
-              <a:t>GPS</a:t>
-            </a:r>
-          </a:p>
-          <a:p>
+              <a:t>How much power is required for the broadcast signal?</a:t>
+            </a:r>
+          </a:p>
+          <a:p>
+            <a:pPr lvl="1"/>
             <a:r>
               <a:rPr lang="en-US" dirty="0" smtClean="0"/>
-              <a:t>  -Attitude</a:t>
-            </a:r>
-          </a:p>
-          <a:p>
-            <a:r>
-              <a:rPr lang="en-US" dirty="0"/>
-              <a:t> </a:t>
-            </a:r>
+              <a:t>Link budget</a:t>
+            </a:r>
+          </a:p>
+          <a:p>
             <a:r>
               <a:rPr lang="en-US" dirty="0" smtClean="0"/>
-              <a:t> -Position</a:t>
-            </a:r>
-          </a:p>
-          <a:p>
-            <a:r>
-              <a:rPr lang="en-US" dirty="0"/>
-              <a:t> </a:t>
-            </a:r>
+              <a:t>How much time will be available during each orbit for communication?</a:t>
+            </a:r>
+          </a:p>
+          <a:p>
+            <a:pPr lvl="1"/>
             <a:r>
               <a:rPr lang="en-US" dirty="0" smtClean="0"/>
-              <a:t> -Time</a:t>
+              <a:t>Link budget</a:t>
+            </a:r>
+          </a:p>
+          <a:p>
+            <a:pPr lvl="1"/>
+            <a:r>
+              <a:rPr lang="en-US" dirty="0" smtClean="0"/>
+              <a:t>Orbital parameters</a:t>
+            </a:r>
+          </a:p>
+          <a:p>
+            <a:r>
+              <a:rPr lang="en-US" dirty="0" smtClean="0"/>
+              <a:t>Is it possible to transmit all data in the time allotted?</a:t>
+            </a:r>
+          </a:p>
+          <a:p>
+            <a:pPr lvl="1"/>
+            <a:r>
+              <a:rPr lang="en-US" dirty="0" smtClean="0"/>
+              <a:t>Link budget</a:t>
             </a:r>
             <a:endParaRPr lang="en-US" dirty="0"/>
-          </a:p>
-        </p:txBody>
-      </p:sp>
-      <p:sp>
-        <p:nvSpPr>
-          <p:cNvPr id="8" name="TextBox 7"/>
-          <p:cNvSpPr txBox="1"/>
-          <p:nvPr/>
-        </p:nvSpPr>
-        <p:spPr>
-          <a:xfrm>
-            <a:off x="540635" y="1646849"/>
-            <a:ext cx="1564062" cy="923330"/>
-          </a:xfrm>
-          <a:prstGeom prst="rect">
-            <a:avLst/>
-          </a:prstGeom>
-          <a:noFill/>
-          <a:ln>
-            <a:solidFill>
-              <a:schemeClr val="tx1"/>
-            </a:solidFill>
-          </a:ln>
-        </p:spPr>
-        <p:txBody>
-          <a:bodyPr wrap="square" rtlCol="0">
-            <a:spAutoFit/>
-          </a:bodyPr>
-          <a:lstStyle/>
-          <a:p>
-            <a:r>
-              <a:rPr lang="en-US" dirty="0" smtClean="0"/>
-              <a:t>Power</a:t>
-            </a:r>
-          </a:p>
-          <a:p>
-            <a:r>
-              <a:rPr lang="en-US" dirty="0" smtClean="0"/>
-              <a:t>  -Wattage</a:t>
-            </a:r>
-          </a:p>
-          <a:p>
-            <a:r>
-              <a:rPr lang="en-US" dirty="0"/>
-              <a:t> </a:t>
-            </a:r>
-            <a:r>
-              <a:rPr lang="en-US" dirty="0" smtClean="0"/>
-              <a:t> -Battery</a:t>
-            </a:r>
-            <a:endParaRPr lang="en-US" dirty="0"/>
-          </a:p>
-        </p:txBody>
-      </p:sp>
-      <p:cxnSp>
-        <p:nvCxnSpPr>
-          <p:cNvPr id="10" name="Straight Arrow Connector 9"/>
-          <p:cNvCxnSpPr>
-            <a:stCxn id="7" idx="2"/>
-            <a:endCxn id="35" idx="0"/>
-          </p:cNvCxnSpPr>
-          <p:nvPr/>
-        </p:nvCxnSpPr>
-        <p:spPr>
-          <a:xfrm flipH="1">
-            <a:off x="1985999" y="2847178"/>
-            <a:ext cx="1324812" cy="1706379"/>
-          </a:xfrm>
-          <a:prstGeom prst="straightConnector1">
-            <a:avLst/>
-          </a:prstGeom>
-          <a:ln>
-            <a:solidFill>
-              <a:schemeClr val="tx1"/>
-            </a:solidFill>
-            <a:tailEnd type="none"/>
-          </a:ln>
-        </p:spPr>
-        <p:style>
-          <a:lnRef idx="1">
-            <a:schemeClr val="accent1"/>
-          </a:lnRef>
-          <a:fillRef idx="0">
-            <a:schemeClr val="accent1"/>
-          </a:fillRef>
-          <a:effectRef idx="0">
-            <a:schemeClr val="accent1"/>
-          </a:effectRef>
-          <a:fontRef idx="minor">
-            <a:schemeClr val="tx1"/>
-          </a:fontRef>
-        </p:style>
-      </p:cxnSp>
-      <p:cxnSp>
-        <p:nvCxnSpPr>
-          <p:cNvPr id="11" name="Straight Arrow Connector 10"/>
-          <p:cNvCxnSpPr>
-            <a:stCxn id="8" idx="2"/>
-            <a:endCxn id="35" idx="0"/>
-          </p:cNvCxnSpPr>
-          <p:nvPr/>
-        </p:nvCxnSpPr>
-        <p:spPr>
-          <a:xfrm>
-            <a:off x="1322666" y="2570179"/>
-            <a:ext cx="663333" cy="1983378"/>
-          </a:xfrm>
-          <a:prstGeom prst="straightConnector1">
-            <a:avLst/>
-          </a:prstGeom>
-          <a:ln>
-            <a:solidFill>
-              <a:schemeClr val="tx1"/>
-            </a:solidFill>
-            <a:tailEnd type="none"/>
-          </a:ln>
-        </p:spPr>
-        <p:style>
-          <a:lnRef idx="1">
-            <a:schemeClr val="accent1"/>
-          </a:lnRef>
-          <a:fillRef idx="0">
-            <a:schemeClr val="accent1"/>
-          </a:fillRef>
-          <a:effectRef idx="0">
-            <a:schemeClr val="accent1"/>
-          </a:effectRef>
-          <a:fontRef idx="minor">
-            <a:schemeClr val="tx1"/>
-          </a:fontRef>
-        </p:style>
-      </p:cxnSp>
-      <p:cxnSp>
-        <p:nvCxnSpPr>
-          <p:cNvPr id="16" name="Straight Arrow Connector 15"/>
-          <p:cNvCxnSpPr>
-            <a:stCxn id="4" idx="0"/>
-          </p:cNvCxnSpPr>
-          <p:nvPr/>
-        </p:nvCxnSpPr>
-        <p:spPr>
-          <a:xfrm flipV="1">
-            <a:off x="6129341" y="3287110"/>
-            <a:ext cx="775956" cy="1138297"/>
-          </a:xfrm>
-          <a:prstGeom prst="straightConnector1">
-            <a:avLst/>
-          </a:prstGeom>
-          <a:ln>
-            <a:solidFill>
-              <a:schemeClr val="tx1"/>
-            </a:solidFill>
-            <a:tailEnd type="triangle"/>
-          </a:ln>
-        </p:spPr>
-        <p:style>
-          <a:lnRef idx="1">
-            <a:schemeClr val="accent1"/>
-          </a:lnRef>
-          <a:fillRef idx="0">
-            <a:schemeClr val="accent1"/>
-          </a:fillRef>
-          <a:effectRef idx="0">
-            <a:schemeClr val="accent1"/>
-          </a:effectRef>
-          <a:fontRef idx="minor">
-            <a:schemeClr val="tx1"/>
-          </a:fontRef>
-        </p:style>
-      </p:cxnSp>
-      <p:sp>
-        <p:nvSpPr>
-          <p:cNvPr id="19" name="TextBox 18"/>
-          <p:cNvSpPr txBox="1"/>
-          <p:nvPr/>
-        </p:nvSpPr>
-        <p:spPr>
-          <a:xfrm>
-            <a:off x="5114658" y="4041940"/>
-            <a:ext cx="1726324" cy="369332"/>
-          </a:xfrm>
-          <a:prstGeom prst="rect">
-            <a:avLst/>
-          </a:prstGeom>
-          <a:noFill/>
-        </p:spPr>
-        <p:txBody>
-          <a:bodyPr wrap="square" rtlCol="0">
-            <a:spAutoFit/>
-          </a:bodyPr>
-          <a:lstStyle/>
-          <a:p>
-            <a:r>
-              <a:rPr lang="en-US" dirty="0" smtClean="0"/>
-              <a:t>Radio</a:t>
-            </a:r>
-          </a:p>
-        </p:txBody>
-      </p:sp>
-      <p:sp>
-        <p:nvSpPr>
-          <p:cNvPr id="20" name="TextBox 19"/>
-          <p:cNvSpPr txBox="1"/>
-          <p:nvPr/>
-        </p:nvSpPr>
-        <p:spPr>
-          <a:xfrm>
-            <a:off x="6794938" y="1576552"/>
-            <a:ext cx="1355834" cy="369332"/>
-          </a:xfrm>
-          <a:prstGeom prst="rect">
-            <a:avLst/>
-          </a:prstGeom>
-          <a:noFill/>
-        </p:spPr>
-        <p:txBody>
-          <a:bodyPr wrap="square" rtlCol="0">
-            <a:spAutoFit/>
-          </a:bodyPr>
-          <a:lstStyle/>
-          <a:p>
-            <a:r>
-              <a:rPr lang="en-US" dirty="0" smtClean="0"/>
-              <a:t>Antenna</a:t>
-            </a:r>
-          </a:p>
-        </p:txBody>
-      </p:sp>
-      <p:pic>
-        <p:nvPicPr>
-          <p:cNvPr id="21" name="Picture 20"/>
-          <p:cNvPicPr>
-            <a:picLocks noChangeAspect="1"/>
-          </p:cNvPicPr>
-          <p:nvPr/>
-        </p:nvPicPr>
-        <p:blipFill>
-          <a:blip r:embed="rId5">
-            <a:extLst>
-              <a:ext uri="{28A0092B-C50C-407E-A947-70E740481C1C}">
-                <a14:useLocalDpi xmlns:a14="http://schemas.microsoft.com/office/drawing/2010/main" val="0"/>
-              </a:ext>
-            </a:extLst>
-          </a:blip>
-          <a:stretch>
-            <a:fillRect/>
-          </a:stretch>
-        </p:blipFill>
-        <p:spPr>
-          <a:xfrm rot="2032425">
-            <a:off x="6571690" y="1891017"/>
-            <a:ext cx="3314705" cy="2966852"/>
-          </a:xfrm>
-          <a:prstGeom prst="rect">
-            <a:avLst/>
-          </a:prstGeom>
-        </p:spPr>
-      </p:pic>
-      <p:pic>
-        <p:nvPicPr>
-          <p:cNvPr id="22" name="Picture 21"/>
-          <p:cNvPicPr>
-            <a:picLocks noChangeAspect="1"/>
-          </p:cNvPicPr>
-          <p:nvPr/>
-        </p:nvPicPr>
-        <p:blipFill>
-          <a:blip r:embed="rId6" cstate="print">
-            <a:extLst>
-              <a:ext uri="{28A0092B-C50C-407E-A947-70E740481C1C}">
-                <a14:useLocalDpi xmlns:a14="http://schemas.microsoft.com/office/drawing/2010/main" val="0"/>
-              </a:ext>
-            </a:extLst>
-          </a:blip>
-          <a:stretch>
-            <a:fillRect/>
-          </a:stretch>
-        </p:blipFill>
-        <p:spPr>
-          <a:xfrm rot="18290028">
-            <a:off x="9608668" y="4737886"/>
-            <a:ext cx="649117" cy="714029"/>
-          </a:xfrm>
-          <a:prstGeom prst="rect">
-            <a:avLst/>
-          </a:prstGeom>
-        </p:spPr>
-      </p:pic>
-      <p:sp>
-        <p:nvSpPr>
-          <p:cNvPr id="35" name="TextBox 34"/>
-          <p:cNvSpPr txBox="1"/>
-          <p:nvPr/>
-        </p:nvSpPr>
-        <p:spPr>
-          <a:xfrm>
-            <a:off x="790916" y="4553557"/>
-            <a:ext cx="2390165" cy="646331"/>
-          </a:xfrm>
-          <a:prstGeom prst="rect">
-            <a:avLst/>
-          </a:prstGeom>
-          <a:noFill/>
-          <a:ln>
-            <a:solidFill>
-              <a:schemeClr val="tx1"/>
-            </a:solidFill>
-          </a:ln>
-        </p:spPr>
-        <p:txBody>
-          <a:bodyPr wrap="square" rtlCol="0">
-            <a:spAutoFit/>
-          </a:bodyPr>
-          <a:lstStyle/>
-          <a:p>
-            <a:r>
-              <a:rPr lang="en-US" dirty="0" smtClean="0"/>
-              <a:t>Flight Computer</a:t>
-            </a:r>
-          </a:p>
-          <a:p>
-            <a:r>
-              <a:rPr lang="en-US" dirty="0"/>
-              <a:t> </a:t>
-            </a:r>
-            <a:r>
-              <a:rPr lang="en-US" dirty="0" smtClean="0"/>
-              <a:t> -Assemble packet</a:t>
-            </a:r>
-            <a:endParaRPr lang="en-US" dirty="0"/>
-          </a:p>
-        </p:txBody>
-      </p:sp>
-      <p:cxnSp>
-        <p:nvCxnSpPr>
-          <p:cNvPr id="37" name="Straight Arrow Connector 36"/>
-          <p:cNvCxnSpPr>
-            <a:stCxn id="35" idx="3"/>
-            <a:endCxn id="4" idx="1"/>
-          </p:cNvCxnSpPr>
-          <p:nvPr/>
-        </p:nvCxnSpPr>
-        <p:spPr>
-          <a:xfrm>
-            <a:off x="3181081" y="4876723"/>
-            <a:ext cx="1996040" cy="456269"/>
-          </a:xfrm>
-          <a:prstGeom prst="straightConnector1">
-            <a:avLst/>
-          </a:prstGeom>
-          <a:ln>
-            <a:solidFill>
-              <a:schemeClr val="tx1"/>
-            </a:solidFill>
-            <a:tailEnd type="triangle"/>
-          </a:ln>
-        </p:spPr>
-        <p:style>
-          <a:lnRef idx="1">
-            <a:schemeClr val="accent1"/>
-          </a:lnRef>
-          <a:fillRef idx="0">
-            <a:schemeClr val="accent1"/>
-          </a:fillRef>
-          <a:effectRef idx="0">
-            <a:schemeClr val="accent1"/>
-          </a:effectRef>
-          <a:fontRef idx="minor">
-            <a:schemeClr val="tx1"/>
-          </a:fontRef>
-        </p:style>
-      </p:cxnSp>
-      <p:sp>
-        <p:nvSpPr>
-          <p:cNvPr id="44" name="TextBox 43"/>
-          <p:cNvSpPr txBox="1"/>
-          <p:nvPr/>
-        </p:nvSpPr>
-        <p:spPr>
-          <a:xfrm>
-            <a:off x="4451001" y="1646849"/>
-            <a:ext cx="1789386" cy="646331"/>
-          </a:xfrm>
-          <a:prstGeom prst="rect">
-            <a:avLst/>
-          </a:prstGeom>
-          <a:noFill/>
-          <a:ln>
-            <a:solidFill>
-              <a:schemeClr val="tx1"/>
-            </a:solidFill>
-          </a:ln>
-        </p:spPr>
-        <p:txBody>
-          <a:bodyPr wrap="square" rtlCol="0">
-            <a:spAutoFit/>
-          </a:bodyPr>
-          <a:lstStyle/>
-          <a:p>
-            <a:r>
-              <a:rPr lang="en-US" dirty="0" smtClean="0"/>
-              <a:t>Gamma Ray</a:t>
-            </a:r>
-            <a:r>
-              <a:rPr lang="en-US" dirty="0"/>
-              <a:t> </a:t>
-            </a:r>
-            <a:r>
-              <a:rPr lang="en-US" dirty="0" smtClean="0"/>
-              <a:t>Detector</a:t>
-            </a:r>
-          </a:p>
-        </p:txBody>
-      </p:sp>
-      <p:cxnSp>
-        <p:nvCxnSpPr>
-          <p:cNvPr id="46" name="Straight Arrow Connector 45"/>
-          <p:cNvCxnSpPr>
-            <a:stCxn id="44" idx="2"/>
-            <a:endCxn id="35" idx="0"/>
-          </p:cNvCxnSpPr>
-          <p:nvPr/>
-        </p:nvCxnSpPr>
-        <p:spPr>
-          <a:xfrm flipH="1">
-            <a:off x="1985999" y="2293180"/>
-            <a:ext cx="3359695" cy="2260377"/>
-          </a:xfrm>
-          <a:prstGeom prst="straightConnector1">
-            <a:avLst/>
-          </a:prstGeom>
-          <a:ln>
-            <a:solidFill>
-              <a:schemeClr val="tx1"/>
-            </a:solidFill>
-            <a:tailEnd type="none"/>
-          </a:ln>
-        </p:spPr>
-        <p:style>
-          <a:lnRef idx="1">
-            <a:schemeClr val="accent1"/>
-          </a:lnRef>
-          <a:fillRef idx="0">
-            <a:schemeClr val="accent1"/>
-          </a:fillRef>
-          <a:effectRef idx="0">
-            <a:schemeClr val="accent1"/>
-          </a:effectRef>
-          <a:fontRef idx="minor">
-            <a:schemeClr val="tx1"/>
-          </a:fontRef>
-        </p:style>
-      </p:cxnSp>
-      <p:sp>
-        <p:nvSpPr>
-          <p:cNvPr id="12" name="TextBox 11"/>
-          <p:cNvSpPr txBox="1"/>
-          <p:nvPr/>
-        </p:nvSpPr>
-        <p:spPr>
-          <a:xfrm>
-            <a:off x="526133" y="5717356"/>
-            <a:ext cx="3717833" cy="523220"/>
-          </a:xfrm>
-          <a:prstGeom prst="rect">
-            <a:avLst/>
-          </a:prstGeom>
-          <a:noFill/>
-        </p:spPr>
-        <p:txBody>
-          <a:bodyPr wrap="square" rtlCol="0">
-            <a:spAutoFit/>
-          </a:bodyPr>
-          <a:lstStyle/>
-          <a:p>
-            <a:r>
-              <a:rPr lang="en-US" sz="1400" dirty="0" smtClean="0"/>
-              <a:t>Used if data packets are large and connecting to ground stations is difficult</a:t>
-            </a:r>
-            <a:endParaRPr lang="en-US" sz="1400" dirty="0"/>
           </a:p>
         </p:txBody>
       </p:sp>
     </p:spTree>
     <p:extLst>
       <p:ext uri="{BB962C8B-B14F-4D97-AF65-F5344CB8AC3E}">
-        <p14:creationId xmlns:p14="http://schemas.microsoft.com/office/powerpoint/2010/main" val="3205950527"/>
+        <p14:creationId xmlns:p14="http://schemas.microsoft.com/office/powerpoint/2010/main" val="1457759480"/>
       </p:ext>
     </p:extLst>
   </p:cSld>
   <p:clrMapOvr>
     <a:masterClrMapping/>
   </p:clrMapOvr>
-  <p:timing>
-    <p:tnLst>
-      <p:par>
-        <p:cTn id="1" dur="indefinite" restart="never" nodeType="tmRoot"/>
-      </p:par>
-    </p:tnLst>
-  </p:timing>
 </p:sld>
 </file>
 
@@ -9178,6 +8989,697 @@
           <a:p>
             <a:r>
               <a:rPr lang="en-US" dirty="0" smtClean="0"/>
+              <a:t>Communication – Scenario 1</a:t>
+            </a:r>
+            <a:endParaRPr lang="en-US" dirty="0"/>
+          </a:p>
+        </p:txBody>
+      </p:sp>
+      <p:pic>
+        <p:nvPicPr>
+          <p:cNvPr id="4" name="Picture 3"/>
+          <p:cNvPicPr>
+            <a:picLocks noChangeAspect="1"/>
+          </p:cNvPicPr>
+          <p:nvPr/>
+        </p:nvPicPr>
+        <p:blipFill>
+          <a:blip r:embed="rId2">
+            <a:extLst>
+              <a:ext uri="{28A0092B-C50C-407E-A947-70E740481C1C}">
+                <a14:useLocalDpi xmlns:a14="http://schemas.microsoft.com/office/drawing/2010/main" val="0"/>
+              </a:ext>
+            </a:extLst>
+          </a:blip>
+          <a:stretch>
+            <a:fillRect/>
+          </a:stretch>
+        </p:blipFill>
+        <p:spPr>
+          <a:xfrm>
+            <a:off x="5177121" y="4425407"/>
+            <a:ext cx="1904440" cy="1815169"/>
+          </a:xfrm>
+          <a:prstGeom prst="rect">
+            <a:avLst/>
+          </a:prstGeom>
+        </p:spPr>
+      </p:pic>
+      <p:pic>
+        <p:nvPicPr>
+          <p:cNvPr id="5" name="Picture 4"/>
+          <p:cNvPicPr>
+            <a:picLocks noChangeAspect="1"/>
+          </p:cNvPicPr>
+          <p:nvPr/>
+        </p:nvPicPr>
+        <p:blipFill>
+          <a:blip r:embed="rId3" cstate="print">
+            <a:extLst>
+              <a:ext uri="{28A0092B-C50C-407E-A947-70E740481C1C}">
+                <a14:useLocalDpi xmlns:a14="http://schemas.microsoft.com/office/drawing/2010/main" val="0"/>
+              </a:ext>
+            </a:extLst>
+          </a:blip>
+          <a:stretch>
+            <a:fillRect/>
+          </a:stretch>
+        </p:blipFill>
+        <p:spPr>
+          <a:xfrm>
+            <a:off x="6703382" y="1987255"/>
+            <a:ext cx="1572457" cy="1513490"/>
+          </a:xfrm>
+          <a:prstGeom prst="rect">
+            <a:avLst/>
+          </a:prstGeom>
+        </p:spPr>
+      </p:pic>
+      <p:pic>
+        <p:nvPicPr>
+          <p:cNvPr id="6" name="Picture 5"/>
+          <p:cNvPicPr>
+            <a:picLocks noChangeAspect="1"/>
+          </p:cNvPicPr>
+          <p:nvPr/>
+        </p:nvPicPr>
+        <p:blipFill>
+          <a:blip r:embed="rId4">
+            <a:extLst>
+              <a:ext uri="{28A0092B-C50C-407E-A947-70E740481C1C}">
+                <a14:useLocalDpi xmlns:a14="http://schemas.microsoft.com/office/drawing/2010/main" val="0"/>
+              </a:ext>
+            </a:extLst>
+          </a:blip>
+          <a:stretch>
+            <a:fillRect/>
+          </a:stretch>
+        </p:blipFill>
+        <p:spPr>
+          <a:xfrm>
+            <a:off x="8439248" y="4658711"/>
+            <a:ext cx="3223172" cy="1813034"/>
+          </a:xfrm>
+          <a:prstGeom prst="rect">
+            <a:avLst/>
+          </a:prstGeom>
+        </p:spPr>
+      </p:pic>
+      <p:sp>
+        <p:nvSpPr>
+          <p:cNvPr id="7" name="TextBox 6"/>
+          <p:cNvSpPr txBox="1"/>
+          <p:nvPr/>
+        </p:nvSpPr>
+        <p:spPr>
+          <a:xfrm>
+            <a:off x="2666561" y="1646849"/>
+            <a:ext cx="1288499" cy="1200329"/>
+          </a:xfrm>
+          <a:prstGeom prst="rect">
+            <a:avLst/>
+          </a:prstGeom>
+          <a:noFill/>
+          <a:ln>
+            <a:solidFill>
+              <a:schemeClr val="tx1"/>
+            </a:solidFill>
+          </a:ln>
+        </p:spPr>
+        <p:txBody>
+          <a:bodyPr wrap="square" rtlCol="0">
+            <a:spAutoFit/>
+          </a:bodyPr>
+          <a:lstStyle/>
+          <a:p>
+            <a:r>
+              <a:rPr lang="en-US" dirty="0" smtClean="0"/>
+              <a:t>GPS</a:t>
+            </a:r>
+          </a:p>
+          <a:p>
+            <a:r>
+              <a:rPr lang="en-US" dirty="0" smtClean="0"/>
+              <a:t>  -Attitude</a:t>
+            </a:r>
+          </a:p>
+          <a:p>
+            <a:r>
+              <a:rPr lang="en-US" dirty="0"/>
+              <a:t> </a:t>
+            </a:r>
+            <a:r>
+              <a:rPr lang="en-US" dirty="0" smtClean="0"/>
+              <a:t> -Position</a:t>
+            </a:r>
+          </a:p>
+          <a:p>
+            <a:r>
+              <a:rPr lang="en-US" dirty="0"/>
+              <a:t> </a:t>
+            </a:r>
+            <a:r>
+              <a:rPr lang="en-US" dirty="0" smtClean="0"/>
+              <a:t> -Time</a:t>
+            </a:r>
+            <a:endParaRPr lang="en-US" dirty="0"/>
+          </a:p>
+        </p:txBody>
+      </p:sp>
+      <p:sp>
+        <p:nvSpPr>
+          <p:cNvPr id="8" name="TextBox 7"/>
+          <p:cNvSpPr txBox="1"/>
+          <p:nvPr/>
+        </p:nvSpPr>
+        <p:spPr>
+          <a:xfrm>
+            <a:off x="540635" y="1646849"/>
+            <a:ext cx="1564062" cy="923330"/>
+          </a:xfrm>
+          <a:prstGeom prst="rect">
+            <a:avLst/>
+          </a:prstGeom>
+          <a:noFill/>
+          <a:ln>
+            <a:solidFill>
+              <a:schemeClr val="tx1"/>
+            </a:solidFill>
+          </a:ln>
+        </p:spPr>
+        <p:txBody>
+          <a:bodyPr wrap="square" rtlCol="0">
+            <a:spAutoFit/>
+          </a:bodyPr>
+          <a:lstStyle/>
+          <a:p>
+            <a:r>
+              <a:rPr lang="en-US" dirty="0" smtClean="0"/>
+              <a:t>Power</a:t>
+            </a:r>
+          </a:p>
+          <a:p>
+            <a:r>
+              <a:rPr lang="en-US" dirty="0" smtClean="0"/>
+              <a:t>  -Wattage</a:t>
+            </a:r>
+          </a:p>
+          <a:p>
+            <a:r>
+              <a:rPr lang="en-US" dirty="0"/>
+              <a:t> </a:t>
+            </a:r>
+            <a:r>
+              <a:rPr lang="en-US" dirty="0" smtClean="0"/>
+              <a:t> -Battery</a:t>
+            </a:r>
+            <a:endParaRPr lang="en-US" dirty="0"/>
+          </a:p>
+        </p:txBody>
+      </p:sp>
+      <p:cxnSp>
+        <p:nvCxnSpPr>
+          <p:cNvPr id="10" name="Straight Arrow Connector 9"/>
+          <p:cNvCxnSpPr>
+            <a:stCxn id="7" idx="2"/>
+            <a:endCxn id="35" idx="0"/>
+          </p:cNvCxnSpPr>
+          <p:nvPr/>
+        </p:nvCxnSpPr>
+        <p:spPr>
+          <a:xfrm flipH="1">
+            <a:off x="1985999" y="2847178"/>
+            <a:ext cx="1324812" cy="1706379"/>
+          </a:xfrm>
+          <a:prstGeom prst="straightConnector1">
+            <a:avLst/>
+          </a:prstGeom>
+          <a:ln>
+            <a:solidFill>
+              <a:schemeClr val="tx1"/>
+            </a:solidFill>
+            <a:tailEnd type="none"/>
+          </a:ln>
+        </p:spPr>
+        <p:style>
+          <a:lnRef idx="1">
+            <a:schemeClr val="accent1"/>
+          </a:lnRef>
+          <a:fillRef idx="0">
+            <a:schemeClr val="accent1"/>
+          </a:fillRef>
+          <a:effectRef idx="0">
+            <a:schemeClr val="accent1"/>
+          </a:effectRef>
+          <a:fontRef idx="minor">
+            <a:schemeClr val="tx1"/>
+          </a:fontRef>
+        </p:style>
+      </p:cxnSp>
+      <p:cxnSp>
+        <p:nvCxnSpPr>
+          <p:cNvPr id="11" name="Straight Arrow Connector 10"/>
+          <p:cNvCxnSpPr>
+            <a:stCxn id="8" idx="2"/>
+            <a:endCxn id="35" idx="0"/>
+          </p:cNvCxnSpPr>
+          <p:nvPr/>
+        </p:nvCxnSpPr>
+        <p:spPr>
+          <a:xfrm>
+            <a:off x="1322666" y="2570179"/>
+            <a:ext cx="663333" cy="1983378"/>
+          </a:xfrm>
+          <a:prstGeom prst="straightConnector1">
+            <a:avLst/>
+          </a:prstGeom>
+          <a:ln>
+            <a:solidFill>
+              <a:schemeClr val="tx1"/>
+            </a:solidFill>
+            <a:tailEnd type="none"/>
+          </a:ln>
+        </p:spPr>
+        <p:style>
+          <a:lnRef idx="1">
+            <a:schemeClr val="accent1"/>
+          </a:lnRef>
+          <a:fillRef idx="0">
+            <a:schemeClr val="accent1"/>
+          </a:fillRef>
+          <a:effectRef idx="0">
+            <a:schemeClr val="accent1"/>
+          </a:effectRef>
+          <a:fontRef idx="minor">
+            <a:schemeClr val="tx1"/>
+          </a:fontRef>
+        </p:style>
+      </p:cxnSp>
+      <p:cxnSp>
+        <p:nvCxnSpPr>
+          <p:cNvPr id="16" name="Straight Arrow Connector 15"/>
+          <p:cNvCxnSpPr>
+            <a:stCxn id="4" idx="0"/>
+          </p:cNvCxnSpPr>
+          <p:nvPr/>
+        </p:nvCxnSpPr>
+        <p:spPr>
+          <a:xfrm flipV="1">
+            <a:off x="6129341" y="3287110"/>
+            <a:ext cx="775956" cy="1138297"/>
+          </a:xfrm>
+          <a:prstGeom prst="straightConnector1">
+            <a:avLst/>
+          </a:prstGeom>
+          <a:ln>
+            <a:solidFill>
+              <a:schemeClr val="tx1"/>
+            </a:solidFill>
+            <a:tailEnd type="triangle"/>
+          </a:ln>
+        </p:spPr>
+        <p:style>
+          <a:lnRef idx="1">
+            <a:schemeClr val="accent1"/>
+          </a:lnRef>
+          <a:fillRef idx="0">
+            <a:schemeClr val="accent1"/>
+          </a:fillRef>
+          <a:effectRef idx="0">
+            <a:schemeClr val="accent1"/>
+          </a:effectRef>
+          <a:fontRef idx="minor">
+            <a:schemeClr val="tx1"/>
+          </a:fontRef>
+        </p:style>
+      </p:cxnSp>
+      <p:sp>
+        <p:nvSpPr>
+          <p:cNvPr id="19" name="TextBox 18"/>
+          <p:cNvSpPr txBox="1"/>
+          <p:nvPr/>
+        </p:nvSpPr>
+        <p:spPr>
+          <a:xfrm>
+            <a:off x="5114658" y="4041940"/>
+            <a:ext cx="1726324" cy="369332"/>
+          </a:xfrm>
+          <a:prstGeom prst="rect">
+            <a:avLst/>
+          </a:prstGeom>
+          <a:noFill/>
+        </p:spPr>
+        <p:txBody>
+          <a:bodyPr wrap="square" rtlCol="0">
+            <a:spAutoFit/>
+          </a:bodyPr>
+          <a:lstStyle/>
+          <a:p>
+            <a:r>
+              <a:rPr lang="en-US" dirty="0" smtClean="0"/>
+              <a:t>Radio</a:t>
+            </a:r>
+          </a:p>
+        </p:txBody>
+      </p:sp>
+      <p:sp>
+        <p:nvSpPr>
+          <p:cNvPr id="20" name="TextBox 19"/>
+          <p:cNvSpPr txBox="1"/>
+          <p:nvPr/>
+        </p:nvSpPr>
+        <p:spPr>
+          <a:xfrm>
+            <a:off x="6794938" y="1576552"/>
+            <a:ext cx="1355834" cy="369332"/>
+          </a:xfrm>
+          <a:prstGeom prst="rect">
+            <a:avLst/>
+          </a:prstGeom>
+          <a:noFill/>
+        </p:spPr>
+        <p:txBody>
+          <a:bodyPr wrap="square" rtlCol="0">
+            <a:spAutoFit/>
+          </a:bodyPr>
+          <a:lstStyle/>
+          <a:p>
+            <a:r>
+              <a:rPr lang="en-US" dirty="0" smtClean="0"/>
+              <a:t>Antenna</a:t>
+            </a:r>
+          </a:p>
+        </p:txBody>
+      </p:sp>
+      <p:pic>
+        <p:nvPicPr>
+          <p:cNvPr id="21" name="Picture 20"/>
+          <p:cNvPicPr>
+            <a:picLocks noChangeAspect="1"/>
+          </p:cNvPicPr>
+          <p:nvPr/>
+        </p:nvPicPr>
+        <p:blipFill>
+          <a:blip r:embed="rId5">
+            <a:extLst>
+              <a:ext uri="{28A0092B-C50C-407E-A947-70E740481C1C}">
+                <a14:useLocalDpi xmlns:a14="http://schemas.microsoft.com/office/drawing/2010/main" val="0"/>
+              </a:ext>
+            </a:extLst>
+          </a:blip>
+          <a:stretch>
+            <a:fillRect/>
+          </a:stretch>
+        </p:blipFill>
+        <p:spPr>
+          <a:xfrm rot="2032425">
+            <a:off x="6571690" y="1891017"/>
+            <a:ext cx="3314705" cy="2966852"/>
+          </a:xfrm>
+          <a:prstGeom prst="rect">
+            <a:avLst/>
+          </a:prstGeom>
+        </p:spPr>
+      </p:pic>
+      <p:pic>
+        <p:nvPicPr>
+          <p:cNvPr id="22" name="Picture 21"/>
+          <p:cNvPicPr>
+            <a:picLocks noChangeAspect="1"/>
+          </p:cNvPicPr>
+          <p:nvPr/>
+        </p:nvPicPr>
+        <p:blipFill>
+          <a:blip r:embed="rId6" cstate="print">
+            <a:extLst>
+              <a:ext uri="{28A0092B-C50C-407E-A947-70E740481C1C}">
+                <a14:useLocalDpi xmlns:a14="http://schemas.microsoft.com/office/drawing/2010/main" val="0"/>
+              </a:ext>
+            </a:extLst>
+          </a:blip>
+          <a:stretch>
+            <a:fillRect/>
+          </a:stretch>
+        </p:blipFill>
+        <p:spPr>
+          <a:xfrm rot="18290028">
+            <a:off x="9608668" y="4737886"/>
+            <a:ext cx="649117" cy="714029"/>
+          </a:xfrm>
+          <a:prstGeom prst="rect">
+            <a:avLst/>
+          </a:prstGeom>
+        </p:spPr>
+      </p:pic>
+      <p:sp>
+        <p:nvSpPr>
+          <p:cNvPr id="35" name="TextBox 34"/>
+          <p:cNvSpPr txBox="1"/>
+          <p:nvPr/>
+        </p:nvSpPr>
+        <p:spPr>
+          <a:xfrm>
+            <a:off x="790916" y="4553557"/>
+            <a:ext cx="2390165" cy="646331"/>
+          </a:xfrm>
+          <a:prstGeom prst="rect">
+            <a:avLst/>
+          </a:prstGeom>
+          <a:noFill/>
+          <a:ln>
+            <a:solidFill>
+              <a:schemeClr val="tx1"/>
+            </a:solidFill>
+          </a:ln>
+        </p:spPr>
+        <p:txBody>
+          <a:bodyPr wrap="square" rtlCol="0">
+            <a:spAutoFit/>
+          </a:bodyPr>
+          <a:lstStyle/>
+          <a:p>
+            <a:r>
+              <a:rPr lang="en-US" dirty="0" smtClean="0"/>
+              <a:t>Flight Computer</a:t>
+            </a:r>
+          </a:p>
+          <a:p>
+            <a:r>
+              <a:rPr lang="en-US" dirty="0"/>
+              <a:t> </a:t>
+            </a:r>
+            <a:r>
+              <a:rPr lang="en-US" dirty="0" smtClean="0"/>
+              <a:t> -Assemble packet</a:t>
+            </a:r>
+            <a:endParaRPr lang="en-US" dirty="0"/>
+          </a:p>
+        </p:txBody>
+      </p:sp>
+      <p:cxnSp>
+        <p:nvCxnSpPr>
+          <p:cNvPr id="37" name="Straight Arrow Connector 36"/>
+          <p:cNvCxnSpPr>
+            <a:stCxn id="35" idx="3"/>
+            <a:endCxn id="4" idx="1"/>
+          </p:cNvCxnSpPr>
+          <p:nvPr/>
+        </p:nvCxnSpPr>
+        <p:spPr>
+          <a:xfrm>
+            <a:off x="3181081" y="4876723"/>
+            <a:ext cx="1996040" cy="456269"/>
+          </a:xfrm>
+          <a:prstGeom prst="straightConnector1">
+            <a:avLst/>
+          </a:prstGeom>
+          <a:ln>
+            <a:solidFill>
+              <a:schemeClr val="tx1"/>
+            </a:solidFill>
+            <a:tailEnd type="triangle"/>
+          </a:ln>
+        </p:spPr>
+        <p:style>
+          <a:lnRef idx="1">
+            <a:schemeClr val="accent1"/>
+          </a:lnRef>
+          <a:fillRef idx="0">
+            <a:schemeClr val="accent1"/>
+          </a:fillRef>
+          <a:effectRef idx="0">
+            <a:schemeClr val="accent1"/>
+          </a:effectRef>
+          <a:fontRef idx="minor">
+            <a:schemeClr val="tx1"/>
+          </a:fontRef>
+        </p:style>
+      </p:cxnSp>
+      <p:sp>
+        <p:nvSpPr>
+          <p:cNvPr id="44" name="TextBox 43"/>
+          <p:cNvSpPr txBox="1"/>
+          <p:nvPr/>
+        </p:nvSpPr>
+        <p:spPr>
+          <a:xfrm>
+            <a:off x="4451001" y="1646849"/>
+            <a:ext cx="1789386" cy="646331"/>
+          </a:xfrm>
+          <a:prstGeom prst="rect">
+            <a:avLst/>
+          </a:prstGeom>
+          <a:noFill/>
+          <a:ln>
+            <a:solidFill>
+              <a:schemeClr val="tx1"/>
+            </a:solidFill>
+          </a:ln>
+        </p:spPr>
+        <p:txBody>
+          <a:bodyPr wrap="square" rtlCol="0">
+            <a:spAutoFit/>
+          </a:bodyPr>
+          <a:lstStyle/>
+          <a:p>
+            <a:r>
+              <a:rPr lang="en-US" dirty="0" smtClean="0"/>
+              <a:t>Gamma Ray</a:t>
+            </a:r>
+            <a:r>
+              <a:rPr lang="en-US" dirty="0"/>
+              <a:t> </a:t>
+            </a:r>
+            <a:r>
+              <a:rPr lang="en-US" dirty="0" smtClean="0"/>
+              <a:t>Detector</a:t>
+            </a:r>
+          </a:p>
+        </p:txBody>
+      </p:sp>
+      <p:cxnSp>
+        <p:nvCxnSpPr>
+          <p:cNvPr id="46" name="Straight Arrow Connector 45"/>
+          <p:cNvCxnSpPr>
+            <a:stCxn id="44" idx="2"/>
+            <a:endCxn id="35" idx="0"/>
+          </p:cNvCxnSpPr>
+          <p:nvPr/>
+        </p:nvCxnSpPr>
+        <p:spPr>
+          <a:xfrm flipH="1">
+            <a:off x="1985999" y="2293180"/>
+            <a:ext cx="3359695" cy="2260377"/>
+          </a:xfrm>
+          <a:prstGeom prst="straightConnector1">
+            <a:avLst/>
+          </a:prstGeom>
+          <a:ln>
+            <a:solidFill>
+              <a:schemeClr val="tx1"/>
+            </a:solidFill>
+            <a:tailEnd type="none"/>
+          </a:ln>
+        </p:spPr>
+        <p:style>
+          <a:lnRef idx="1">
+            <a:schemeClr val="accent1"/>
+          </a:lnRef>
+          <a:fillRef idx="0">
+            <a:schemeClr val="accent1"/>
+          </a:fillRef>
+          <a:effectRef idx="0">
+            <a:schemeClr val="accent1"/>
+          </a:effectRef>
+          <a:fontRef idx="minor">
+            <a:schemeClr val="tx1"/>
+          </a:fontRef>
+        </p:style>
+      </p:cxnSp>
+      <p:sp>
+        <p:nvSpPr>
+          <p:cNvPr id="12" name="TextBox 11"/>
+          <p:cNvSpPr txBox="1"/>
+          <p:nvPr/>
+        </p:nvSpPr>
+        <p:spPr>
+          <a:xfrm>
+            <a:off x="526133" y="5717356"/>
+            <a:ext cx="3717833" cy="523220"/>
+          </a:xfrm>
+          <a:prstGeom prst="rect">
+            <a:avLst/>
+          </a:prstGeom>
+          <a:noFill/>
+        </p:spPr>
+        <p:txBody>
+          <a:bodyPr wrap="square" rtlCol="0">
+            <a:spAutoFit/>
+          </a:bodyPr>
+          <a:lstStyle/>
+          <a:p>
+            <a:r>
+              <a:rPr lang="en-US" sz="1400" dirty="0" smtClean="0"/>
+              <a:t>Used if data packets are large and connecting to ground stations is difficult</a:t>
+            </a:r>
+            <a:endParaRPr lang="en-US" sz="1400" dirty="0"/>
+          </a:p>
+        </p:txBody>
+      </p:sp>
+    </p:spTree>
+    <p:extLst>
+      <p:ext uri="{BB962C8B-B14F-4D97-AF65-F5344CB8AC3E}">
+        <p14:creationId xmlns:p14="http://schemas.microsoft.com/office/powerpoint/2010/main" val="3205950527"/>
+      </p:ext>
+    </p:extLst>
+  </p:cSld>
+  <p:clrMapOvr>
+    <a:masterClrMapping/>
+  </p:clrMapOvr>
+  <p:timing>
+    <p:tnLst>
+      <p:par>
+        <p:cTn id="1" dur="indefinite" restart="never" nodeType="tmRoot"/>
+      </p:par>
+    </p:tnLst>
+  </p:timing>
+</p:sld>
+</file>
+
+<file path=ppt/slides/slide21.xml><?xml version="1.0" encoding="utf-8"?>
+<p:sld xmlns:a="http://schemas.openxmlformats.org/drawingml/2006/main" xmlns:r="http://schemas.openxmlformats.org/officeDocument/2006/relationships" xmlns:p="http://schemas.openxmlformats.org/presentationml/2006/main">
+  <p:cSld>
+    <p:spTree>
+      <p:nvGrpSpPr>
+        <p:cNvPr id="1" name=""/>
+        <p:cNvGrpSpPr/>
+        <p:nvPr/>
+      </p:nvGrpSpPr>
+      <p:grpSpPr>
+        <a:xfrm>
+          <a:off x="0" y="0"/>
+          <a:ext cx="0" cy="0"/>
+          <a:chOff x="0" y="0"/>
+          <a:chExt cx="0" cy="0"/>
+        </a:xfrm>
+      </p:grpSpPr>
+      <p:sp>
+        <p:nvSpPr>
+          <p:cNvPr id="2" name="Title 1"/>
+          <p:cNvSpPr>
+            <a:spLocks noGrp="1"/>
+          </p:cNvSpPr>
+          <p:nvPr>
+            <p:ph type="title"/>
+          </p:nvPr>
+        </p:nvSpPr>
+        <p:spPr/>
+        <p:txBody>
+          <a:bodyPr/>
+          <a:lstStyle/>
+          <a:p>
+            <a:r>
+              <a:rPr lang="en-US" dirty="0" smtClean="0"/>
               <a:t>Communication – Scenario 2</a:t>
             </a:r>
             <a:endParaRPr lang="en-US" dirty="0"/>
@@ -9834,7 +10336,7 @@
 </p:sld>
 </file>
 
-<file path=ppt/slides/slide21.xml><?xml version="1.0" encoding="utf-8"?>
+<file path=ppt/slides/slide22.xml><?xml version="1.0" encoding="utf-8"?>
 <p:sld xmlns:a="http://schemas.openxmlformats.org/drawingml/2006/main" xmlns:r="http://schemas.openxmlformats.org/officeDocument/2006/relationships" xmlns:p="http://schemas.openxmlformats.org/presentationml/2006/main">
   <p:cSld>
     <p:spTree>
@@ -9899,7 +10401,7 @@
 </p:sld>
 </file>
 
-<file path=ppt/slides/slide22.xml><?xml version="1.0" encoding="utf-8"?>
+<file path=ppt/slides/slide23.xml><?xml version="1.0" encoding="utf-8"?>
 <p:sld xmlns:a="http://schemas.openxmlformats.org/drawingml/2006/main" xmlns:r="http://schemas.openxmlformats.org/officeDocument/2006/relationships" xmlns:p="http://schemas.openxmlformats.org/presentationml/2006/main">
   <p:cSld>
     <p:spTree>
@@ -10084,7 +10586,7 @@
 </p:sld>
 </file>
 
-<file path=ppt/slides/slide23.xml><?xml version="1.0" encoding="utf-8"?>
+<file path=ppt/slides/slide24.xml><?xml version="1.0" encoding="utf-8"?>
 <p:sld xmlns:a="http://schemas.openxmlformats.org/drawingml/2006/main" xmlns:r="http://schemas.openxmlformats.org/officeDocument/2006/relationships" xmlns:p="http://schemas.openxmlformats.org/presentationml/2006/main">
   <p:cSld>
     <p:spTree>
@@ -10447,7 +10949,7 @@
 </p:sld>
 </file>
 
-<file path=ppt/slides/slide24.xml><?xml version="1.0" encoding="utf-8"?>
+<file path=ppt/slides/slide25.xml><?xml version="1.0" encoding="utf-8"?>
 <p:sld xmlns:a="http://schemas.openxmlformats.org/drawingml/2006/main" xmlns:r="http://schemas.openxmlformats.org/officeDocument/2006/relationships" xmlns:p="http://schemas.openxmlformats.org/presentationml/2006/main">
   <p:cSld>
     <p:spTree>
@@ -10914,7 +11416,7 @@
 </p:sld>
 </file>
 
-<file path=ppt/slides/slide25.xml><?xml version="1.0" encoding="utf-8"?>
+<file path=ppt/slides/slide26.xml><?xml version="1.0" encoding="utf-8"?>
 <p:sld xmlns:a="http://schemas.openxmlformats.org/drawingml/2006/main" xmlns:r="http://schemas.openxmlformats.org/officeDocument/2006/relationships" xmlns:p="http://schemas.openxmlformats.org/presentationml/2006/main">
   <p:cSld>
     <p:spTree>
@@ -11563,15 +12065,7 @@
             <a:pPr lvl="1"/>
             <a:r>
               <a:rPr lang="en-US" dirty="0" smtClean="0"/>
-              <a:t>Provides environmental data </a:t>
-            </a:r>
-            <a:r>
-              <a:rPr lang="en-US" dirty="0" smtClean="0"/>
-              <a:t>(time, attitude, position) to </a:t>
-            </a:r>
-            <a:r>
-              <a:rPr lang="en-US" dirty="0" smtClean="0"/>
-              <a:t>payload with priority</a:t>
+              <a:t>Provides environmental data (time, attitude, position) to payload with priority</a:t>
             </a:r>
           </a:p>
           <a:p>
@@ -11631,11 +12125,7 @@
             </a:r>
             <a:r>
               <a:rPr lang="en-US" smtClean="0"/>
-              <a:t>Navigation </a:t>
-            </a:r>
-            <a:r>
-              <a:rPr lang="en-US" smtClean="0"/>
-              <a:t>Control Systems</a:t>
+              <a:t>Navigation Control Systems</a:t>
             </a:r>
             <a:endParaRPr lang="en-US" dirty="0" smtClean="0"/>
           </a:p>
@@ -13174,7 +13664,7 @@
   <a:extraClrSchemeLst/>
   <a:extLst>
     <a:ext uri="{05A4C25C-085E-4340-85A3-A5531E510DB2}">
-      <thm15:themeFamily xmlns:thm15="http://schemas.microsoft.com/office/thememl/2012/main" xmlns="" name="Ion" id="{B8441ADB-2E43-4AF7-B97A-BD870242C6A8}" vid="{292E63A9-BB86-4E3D-B92A-7223C6510D2E}"/>
+      <thm15:themeFamily xmlns="" xmlns:thm15="http://schemas.microsoft.com/office/thememl/2012/main" name="Ion" id="{B8441ADB-2E43-4AF7-B97A-BD870242C6A8}" vid="{292E63A9-BB86-4E3D-B92A-7223C6510D2E}"/>
     </a:ext>
   </a:extLst>
 </a:theme>
@@ -13435,7 +13925,7 @@
   <a:extraClrSchemeLst/>
   <a:extLst>
     <a:ext uri="{05A4C25C-085E-4340-85A3-A5531E510DB2}">
-      <thm15:themeFamily xmlns:thm15="http://schemas.microsoft.com/office/thememl/2012/main" xmlns="" name="Office Theme" id="{62F939B6-93AF-4DB8-9C6B-D6C7DFDC589F}" vid="{4A3C46E8-61CC-4603-A589-7422A47A8E4A}"/>
+      <thm15:themeFamily xmlns="" xmlns:thm15="http://schemas.microsoft.com/office/thememl/2012/main" name="Office Theme" id="{62F939B6-93AF-4DB8-9C6B-D6C7DFDC589F}" vid="{4A3C46E8-61CC-4603-A589-7422A47A8E4A}"/>
     </a:ext>
   </a:extLst>
 </a:theme>

</xml_diff>

<commit_message>
Finalized PDR - Communications
</commit_message>
<xml_diff>
--- a/Presentations/PDR_Presentation.pptx
+++ b/Presentations/PDR_Presentation.pptx
@@ -5,7 +5,7 @@
     <p:sldMasterId id="2147483660" r:id="rId1"/>
   </p:sldMasterIdLst>
   <p:notesMasterIdLst>
-    <p:notesMasterId r:id="rId33"/>
+    <p:notesMasterId r:id="rId28"/>
   </p:notesMasterIdLst>
   <p:sldIdLst>
     <p:sldId id="256" r:id="rId2"/>
@@ -24,21 +24,16 @@
     <p:sldId id="279" r:id="rId15"/>
     <p:sldId id="278" r:id="rId16"/>
     <p:sldId id="270" r:id="rId17"/>
-    <p:sldId id="271" r:id="rId18"/>
-    <p:sldId id="272" r:id="rId19"/>
-    <p:sldId id="273" r:id="rId20"/>
-    <p:sldId id="274" r:id="rId21"/>
-    <p:sldId id="275" r:id="rId22"/>
-    <p:sldId id="287" r:id="rId23"/>
-    <p:sldId id="288" r:id="rId24"/>
-    <p:sldId id="289" r:id="rId25"/>
-    <p:sldId id="290" r:id="rId26"/>
-    <p:sldId id="291" r:id="rId27"/>
-    <p:sldId id="292" r:id="rId28"/>
-    <p:sldId id="293" r:id="rId29"/>
-    <p:sldId id="281" r:id="rId30"/>
-    <p:sldId id="282" r:id="rId31"/>
-    <p:sldId id="283" r:id="rId32"/>
+    <p:sldId id="287" r:id="rId18"/>
+    <p:sldId id="288" r:id="rId19"/>
+    <p:sldId id="289" r:id="rId20"/>
+    <p:sldId id="290" r:id="rId21"/>
+    <p:sldId id="291" r:id="rId22"/>
+    <p:sldId id="292" r:id="rId23"/>
+    <p:sldId id="293" r:id="rId24"/>
+    <p:sldId id="281" r:id="rId25"/>
+    <p:sldId id="282" r:id="rId26"/>
+    <p:sldId id="283" r:id="rId27"/>
   </p:sldIdLst>
   <p:sldSz cx="12192000" cy="6858000"/>
   <p:notesSz cx="6858000" cy="9144000"/>
@@ -139,7 +134,7 @@
   </p:defaultTextStyle>
   <p:extLst>
     <p:ext uri="{EFAFB233-063F-42B5-8137-9DF3F51BA10A}">
-      <p15:sldGuideLst xmlns:p15="http://schemas.microsoft.com/office/powerpoint/2012/main" xmlns=""/>
+      <p15:sldGuideLst xmlns="" xmlns:p15="http://schemas.microsoft.com/office/powerpoint/2012/main"/>
     </p:ext>
   </p:extLst>
 </p:presentation>
@@ -852,7 +847,7 @@
           <a:p>
             <a:fld id="{4914D37F-4D0B-4DCB-BAF9-AC1A01C3816B}" type="slidenum">
               <a:rPr lang="en-US" smtClean="0"/>
-              <a:t>29</a:t>
+              <a:t>24</a:t>
             </a:fld>
             <a:endParaRPr lang="en-US"/>
           </a:p>
@@ -8151,10 +8146,33 @@
             <p:ph type="title"/>
           </p:nvPr>
         </p:nvSpPr>
+        <p:spPr/>
+        <p:txBody>
+          <a:bodyPr/>
+          <a:lstStyle/>
+          <a:p>
+            <a:r>
+              <a:rPr lang="en-US" dirty="0" smtClean="0"/>
+              <a:t>Orbit</a:t>
+            </a:r>
+            <a:endParaRPr lang="en-US" dirty="0"/>
+          </a:p>
+        </p:txBody>
+      </p:sp>
+      <p:sp>
+        <p:nvSpPr>
+          <p:cNvPr id="3" name="Content Placeholder 2"/>
+          <p:cNvSpPr>
+            <a:spLocks noGrp="1"/>
+          </p:cNvSpPr>
+          <p:nvPr>
+            <p:ph idx="1"/>
+          </p:nvPr>
+        </p:nvSpPr>
         <p:spPr>
           <a:xfrm>
-            <a:off x="646111" y="452718"/>
-            <a:ext cx="9404723" cy="829982"/>
+            <a:off x="1103312" y="2052918"/>
+            <a:ext cx="9659975" cy="4699768"/>
           </a:xfrm>
         </p:spPr>
         <p:txBody>
@@ -8163,42 +8181,41 @@
           <a:p>
             <a:r>
               <a:rPr lang="en-US" dirty="0" smtClean="0"/>
-              <a:t>Communication</a:t>
+              <a:t>3 – 4 ground based communication stations available across United States</a:t>
+            </a:r>
+          </a:p>
+          <a:p>
+            <a:pPr lvl="1">
+              <a:lnSpc>
+                <a:spcPct val="200000"/>
+              </a:lnSpc>
+            </a:pPr>
+            <a:r>
+              <a:rPr lang="en-US" dirty="0" smtClean="0"/>
+              <a:t>Anchorage, Boulder, Honolulu[, Crookston]</a:t>
             </a:r>
             <a:endParaRPr lang="en-US" dirty="0"/>
           </a:p>
-        </p:txBody>
-      </p:sp>
-      <p:sp>
-        <p:nvSpPr>
-          <p:cNvPr id="3" name="Content Placeholder 2"/>
-          <p:cNvSpPr>
-            <a:spLocks noGrp="1"/>
-          </p:cNvSpPr>
-          <p:nvPr>
-            <p:ph idx="1"/>
-          </p:nvPr>
-        </p:nvSpPr>
-        <p:spPr>
-          <a:xfrm>
-            <a:off x="1103312" y="1409700"/>
-            <a:ext cx="8946541" cy="4838699"/>
-          </a:xfrm>
-        </p:spPr>
-        <p:txBody>
-          <a:bodyPr>
-            <a:normAutofit/>
-          </a:bodyPr>
-          <a:lstStyle/>
           <a:p>
             <a:pPr>
               <a:lnSpc>
-                <a:spcPct val="150000"/>
+                <a:spcPct val="200000"/>
               </a:lnSpc>
             </a:pPr>
             <a:r>
               <a:rPr lang="en-US" dirty="0" smtClean="0"/>
-              <a:t>Requirements</a:t>
+              <a:t>Orbit shall coincide with as many ground stations as possible</a:t>
+            </a:r>
+          </a:p>
+          <a:p>
+            <a:pPr lvl="1">
+              <a:lnSpc>
+                <a:spcPct val="200000"/>
+              </a:lnSpc>
+            </a:pPr>
+            <a:r>
+              <a:rPr lang="en-US" dirty="0" smtClean="0"/>
+              <a:t>1.5 hour orbital period in LEO</a:t>
             </a:r>
           </a:p>
           <a:p>
@@ -8208,76 +8225,45 @@
               </a:lnSpc>
             </a:pPr>
             <a:r>
-              <a:rPr lang="en-US" sz="2000" dirty="0" smtClean="0"/>
-              <a:t>Industrial Grade Radio</a:t>
-            </a:r>
-          </a:p>
-          <a:p>
-            <a:pPr lvl="2">
+              <a:rPr lang="en-US" dirty="0" smtClean="0"/>
+              <a:t>5 minute communication window per station</a:t>
+            </a:r>
+          </a:p>
+          <a:p>
+            <a:pPr lvl="1">
               <a:lnSpc>
                 <a:spcPct val="150000"/>
               </a:lnSpc>
             </a:pPr>
             <a:r>
-              <a:rPr lang="en-US" sz="2000" dirty="0" smtClean="0"/>
-              <a:t>Withstand the environment</a:t>
-            </a:r>
-          </a:p>
-          <a:p>
-            <a:pPr lvl="2"/>
-            <a:r>
-              <a:rPr lang="en-US" sz="2000" dirty="0" smtClean="0"/>
-              <a:t>Reliability and high efficiency</a:t>
-            </a:r>
-            <a:endParaRPr lang="en-US" sz="2000" dirty="0"/>
-          </a:p>
-          <a:p>
-            <a:pPr lvl="1"/>
-            <a:r>
-              <a:rPr lang="en-US" sz="2000" dirty="0" smtClean="0"/>
-              <a:t>Data Storage and Transmission</a:t>
-            </a:r>
-          </a:p>
-          <a:p>
-            <a:pPr lvl="2"/>
-            <a:r>
-              <a:rPr lang="en-US" sz="2000" dirty="0" smtClean="0"/>
-              <a:t>Store and transfer data packets when link is available</a:t>
-            </a:r>
-          </a:p>
-          <a:p>
-            <a:pPr lvl="1"/>
-            <a:r>
-              <a:rPr lang="en-US" sz="2000" dirty="0" smtClean="0"/>
-              <a:t>Desired Orbit for Data Transfer</a:t>
-            </a:r>
-          </a:p>
-          <a:p>
-            <a:pPr lvl="2"/>
-            <a:r>
-              <a:rPr lang="en-US" sz="2000" dirty="0" smtClean="0"/>
-              <a:t>Need unit to fly near data stations for downlink</a:t>
-            </a:r>
+              <a:rPr lang="en-US" dirty="0" smtClean="0"/>
+              <a:t>Target: 3 stations</a:t>
+            </a:r>
+          </a:p>
+          <a:p>
+            <a:pPr>
+              <a:lnSpc>
+                <a:spcPct val="200000"/>
+              </a:lnSpc>
+            </a:pPr>
+            <a:r>
+              <a:rPr lang="en-US" dirty="0" smtClean="0"/>
+              <a:t>Orbital parameters shall not interfere with other spacecraft</a:t>
+            </a:r>
+            <a:endParaRPr lang="en-US" dirty="0"/>
           </a:p>
         </p:txBody>
       </p:sp>
     </p:spTree>
     <p:extLst>
       <p:ext uri="{BB962C8B-B14F-4D97-AF65-F5344CB8AC3E}">
-        <p14:creationId xmlns:p14="http://schemas.microsoft.com/office/powerpoint/2010/main" val="3732384408"/>
+        <p14:creationId xmlns:p14="http://schemas.microsoft.com/office/powerpoint/2010/main" val="3836608790"/>
       </p:ext>
     </p:extLst>
   </p:cSld>
   <p:clrMapOvr>
     <a:masterClrMapping/>
   </p:clrMapOvr>
-  <p:timing>
-    <p:tnLst>
-      <p:par>
-        <p:cTn id="1" dur="indefinite" restart="never" nodeType="tmRoot"/>
-      </p:par>
-    </p:tnLst>
-  </p:timing>
 </p:sld>
 </file>
 
@@ -8315,7 +8301,7 @@
           <a:p>
             <a:r>
               <a:rPr lang="en-US" dirty="0" smtClean="0"/>
-              <a:t>Working Assumptions</a:t>
+              <a:t>Data</a:t>
             </a:r>
             <a:endParaRPr lang="en-US" dirty="0"/>
           </a:p>
@@ -8331,45 +8317,110 @@
             <p:ph idx="1"/>
           </p:nvPr>
         </p:nvSpPr>
-        <p:spPr/>
+        <p:spPr>
+          <a:xfrm>
+            <a:off x="1103312" y="1546706"/>
+            <a:ext cx="9735418" cy="5067658"/>
+          </a:xfrm>
+        </p:spPr>
         <p:txBody>
           <a:bodyPr/>
           <a:lstStyle/>
           <a:p>
             <a:r>
+              <a:rPr lang="en-US" dirty="0"/>
+              <a:t>One event per </a:t>
+            </a:r>
+            <a:r>
               <a:rPr lang="en-US" dirty="0" smtClean="0"/>
-              <a:t>Assume one event per orbit</a:t>
-            </a:r>
+              <a:t>orbit assumed </a:t>
+            </a:r>
+            <a:r>
+              <a:rPr lang="en-US" dirty="0"/>
+              <a:t>(~10 </a:t>
+            </a:r>
+            <a:r>
+              <a:rPr lang="en-US" dirty="0" err="1"/>
+              <a:t>MiB</a:t>
+            </a:r>
+            <a:r>
+              <a:rPr lang="en-US" dirty="0"/>
+              <a:t> of data per event)</a:t>
+            </a:r>
+          </a:p>
+          <a:p>
+            <a:endParaRPr lang="en-US" dirty="0" smtClean="0"/>
           </a:p>
           <a:p>
             <a:r>
               <a:rPr lang="en-US" dirty="0" smtClean="0"/>
-              <a:t>Assume communication available to 3 base stations across the United States (Honolulu, Boulder, Fairbanks, maybe Crookston)</a:t>
-            </a:r>
-          </a:p>
-          <a:p>
+              <a:t>Key requirements</a:t>
+            </a:r>
+            <a:endParaRPr lang="en-US" dirty="0"/>
+          </a:p>
+          <a:p>
+            <a:pPr lvl="1">
+              <a:lnSpc>
+                <a:spcPct val="150000"/>
+              </a:lnSpc>
+            </a:pPr>
             <a:r>
               <a:rPr lang="en-US" dirty="0" smtClean="0"/>
-              <a:t>Assume circular LEO</a:t>
-            </a:r>
-          </a:p>
-          <a:p>
+              <a:t>Downlink signal shall have enough power to be received at ground stations</a:t>
+            </a:r>
+            <a:endParaRPr lang="en-US" dirty="0"/>
+          </a:p>
+          <a:p>
+            <a:pPr lvl="1">
+              <a:lnSpc>
+                <a:spcPct val="150000"/>
+              </a:lnSpc>
+            </a:pPr>
             <a:r>
               <a:rPr lang="en-US" dirty="0" smtClean="0"/>
-              <a:t>Assume each data set on the order of 10 </a:t>
-            </a:r>
-            <a:r>
-              <a:rPr lang="en-US" dirty="0" err="1" smtClean="0"/>
-              <a:t>MiB</a:t>
-            </a:r>
-            <a:endParaRPr lang="en-US" dirty="0" smtClean="0"/>
+              <a:t>Data must be stored between communication windows</a:t>
+            </a:r>
+            <a:endParaRPr lang="en-US" dirty="0"/>
+          </a:p>
+          <a:p>
+            <a:pPr lvl="1">
+              <a:lnSpc>
+                <a:spcPct val="150000"/>
+              </a:lnSpc>
+            </a:pPr>
+            <a:r>
+              <a:rPr lang="en-US" dirty="0" smtClean="0"/>
+              <a:t>Downlink speed shall be fast enough to send all stored information per communication window (100 kbps minimum)</a:t>
+            </a:r>
+          </a:p>
+          <a:p>
+            <a:pPr lvl="1">
+              <a:lnSpc>
+                <a:spcPct val="150000"/>
+              </a:lnSpc>
+            </a:pPr>
+            <a:r>
+              <a:rPr lang="en-US" dirty="0" smtClean="0"/>
+              <a:t>Shall provide minimal uplink capability for error checking and basic commands</a:t>
+            </a:r>
+          </a:p>
+          <a:p>
+            <a:pPr lvl="1"/>
+            <a:endParaRPr lang="en-US" dirty="0"/>
+          </a:p>
+          <a:p>
+            <a:r>
+              <a:rPr lang="en-US" dirty="0" smtClean="0"/>
+              <a:t>Link Budget</a:t>
+            </a:r>
+            <a:endParaRPr lang="en-US" dirty="0"/>
           </a:p>
         </p:txBody>
       </p:sp>
     </p:spTree>
     <p:extLst>
       <p:ext uri="{BB962C8B-B14F-4D97-AF65-F5344CB8AC3E}">
-        <p14:creationId xmlns:p14="http://schemas.microsoft.com/office/powerpoint/2010/main" val="2767940933"/>
+        <p14:creationId xmlns:p14="http://schemas.microsoft.com/office/powerpoint/2010/main" val="1391289961"/>
       </p:ext>
     </p:extLst>
   </p:cSld>
@@ -8406,14 +8457,19 @@
             <p:ph type="title"/>
           </p:nvPr>
         </p:nvSpPr>
-        <p:spPr/>
+        <p:spPr>
+          <a:xfrm>
+            <a:off x="646111" y="452718"/>
+            <a:ext cx="9404723" cy="829982"/>
+          </a:xfrm>
+        </p:spPr>
         <p:txBody>
           <a:bodyPr/>
           <a:lstStyle/>
           <a:p>
             <a:r>
               <a:rPr lang="en-US" dirty="0" smtClean="0"/>
-              <a:t>Questions/Solutions</a:t>
+              <a:t>Hardware</a:t>
             </a:r>
             <a:endParaRPr lang="en-US" dirty="0"/>
           </a:p>
@@ -8429,69 +8485,80 @@
             <p:ph idx="1"/>
           </p:nvPr>
         </p:nvSpPr>
-        <p:spPr/>
-        <p:txBody>
-          <a:bodyPr/>
+        <p:spPr>
+          <a:xfrm>
+            <a:off x="1103312" y="1409700"/>
+            <a:ext cx="8946541" cy="4838699"/>
+          </a:xfrm>
+        </p:spPr>
+        <p:txBody>
+          <a:bodyPr>
+            <a:normAutofit/>
+          </a:bodyPr>
           <a:lstStyle/>
           <a:p>
+            <a:pPr>
+              <a:lnSpc>
+                <a:spcPct val="150000"/>
+              </a:lnSpc>
+            </a:pPr>
             <a:r>
               <a:rPr lang="en-US" dirty="0" smtClean="0"/>
-              <a:t>How much power is required for the broadcast signal?</a:t>
-            </a:r>
-          </a:p>
-          <a:p>
-            <a:pPr lvl="1"/>
-            <a:r>
-              <a:rPr lang="en-US" dirty="0" smtClean="0"/>
-              <a:t>Link budget</a:t>
-            </a:r>
-          </a:p>
-          <a:p>
-            <a:r>
-              <a:rPr lang="en-US" dirty="0" smtClean="0"/>
-              <a:t>How much time will be available during each orbit for communication?</a:t>
-            </a:r>
-          </a:p>
-          <a:p>
-            <a:pPr lvl="1"/>
-            <a:r>
-              <a:rPr lang="en-US" dirty="0" smtClean="0"/>
-              <a:t>Link budget</a:t>
-            </a:r>
-          </a:p>
-          <a:p>
-            <a:pPr lvl="1"/>
-            <a:r>
-              <a:rPr lang="en-US" dirty="0" smtClean="0"/>
-              <a:t>Orbital parameters</a:t>
-            </a:r>
-          </a:p>
-          <a:p>
-            <a:r>
-              <a:rPr lang="en-US" dirty="0" smtClean="0"/>
-              <a:t>Is it possible to transmit all data in the time allotted?</a:t>
-            </a:r>
-          </a:p>
-          <a:p>
-            <a:pPr lvl="1"/>
-            <a:r>
-              <a:rPr lang="en-US" dirty="0" smtClean="0"/>
-              <a:t>Link budget</a:t>
-            </a:r>
-            <a:endParaRPr lang="en-US" dirty="0"/>
+              <a:t>Requirements</a:t>
+            </a:r>
+          </a:p>
+          <a:p>
+            <a:pPr lvl="1">
+              <a:lnSpc>
+                <a:spcPct val="150000"/>
+              </a:lnSpc>
+            </a:pPr>
+            <a:r>
+              <a:rPr lang="en-US" sz="2000" dirty="0" smtClean="0"/>
+              <a:t>Industrial Grade Radio</a:t>
+            </a:r>
+          </a:p>
+          <a:p>
+            <a:pPr lvl="2">
+              <a:lnSpc>
+                <a:spcPct val="150000"/>
+              </a:lnSpc>
+            </a:pPr>
+            <a:r>
+              <a:rPr lang="en-US" sz="2000" dirty="0" smtClean="0"/>
+              <a:t>Withstand the environment</a:t>
+            </a:r>
+          </a:p>
+          <a:p>
+            <a:pPr lvl="2">
+              <a:lnSpc>
+                <a:spcPct val="150000"/>
+              </a:lnSpc>
+            </a:pPr>
+            <a:r>
+              <a:rPr lang="en-US" sz="2000" dirty="0" smtClean="0"/>
+              <a:t>Reliability and high efficiency</a:t>
+            </a:r>
           </a:p>
         </p:txBody>
       </p:sp>
     </p:spTree>
     <p:extLst>
       <p:ext uri="{BB962C8B-B14F-4D97-AF65-F5344CB8AC3E}">
-        <p14:creationId xmlns:p14="http://schemas.microsoft.com/office/powerpoint/2010/main" val="1457759480"/>
+        <p14:creationId xmlns:p14="http://schemas.microsoft.com/office/powerpoint/2010/main" val="3187638978"/>
       </p:ext>
     </p:extLst>
   </p:cSld>
   <p:clrMapOvr>
     <a:masterClrMapping/>
   </p:clrMapOvr>
+  <p:timing>
+    <p:tnLst>
+      <p:par>
+        <p:cTn id="1" dur="indefinite" restart="never" nodeType="tmRoot"/>
+      </p:par>
+    </p:tnLst>
+  </p:timing>
 </p:sld>
 </file>
 
@@ -8993,7 +9060,7 @@
           <a:p>
             <a:r>
               <a:rPr lang="en-US" dirty="0" smtClean="0"/>
-              <a:t>Communication – Scenario 1</a:t>
+              <a:t>Hardware – Scenario 1</a:t>
             </a:r>
             <a:endParaRPr lang="en-US" dirty="0"/>
           </a:p>
@@ -9633,7 +9700,7 @@
     </p:spTree>
     <p:extLst>
       <p:ext uri="{BB962C8B-B14F-4D97-AF65-F5344CB8AC3E}">
-        <p14:creationId xmlns:p14="http://schemas.microsoft.com/office/powerpoint/2010/main" val="3205950527"/>
+        <p14:creationId xmlns:p14="http://schemas.microsoft.com/office/powerpoint/2010/main" val="3685603454"/>
       </p:ext>
     </p:extLst>
   </p:cSld>
@@ -9684,7 +9751,7 @@
           <a:p>
             <a:r>
               <a:rPr lang="en-US" dirty="0" smtClean="0"/>
-              <a:t>Communication – Scenario 2</a:t>
+              <a:t>Hardware – Scenario 2</a:t>
             </a:r>
             <a:endParaRPr lang="en-US" dirty="0"/>
           </a:p>
@@ -10323,7 +10390,7 @@
     </p:spTree>
     <p:extLst>
       <p:ext uri="{BB962C8B-B14F-4D97-AF65-F5344CB8AC3E}">
-        <p14:creationId xmlns:p14="http://schemas.microsoft.com/office/powerpoint/2010/main" val="2445904649"/>
+        <p14:creationId xmlns:p14="http://schemas.microsoft.com/office/powerpoint/2010/main" val="122260840"/>
       </p:ext>
     </p:extLst>
   </p:cSld>
@@ -10364,112 +10431,22 @@
             <a:spLocks noGrp="1"/>
           </p:cNvSpPr>
           <p:nvPr>
-            <p:ph type="title"/>
-          </p:nvPr>
-        </p:nvSpPr>
-        <p:spPr/>
+            <p:ph type="ctrTitle"/>
+          </p:nvPr>
+        </p:nvSpPr>
+        <p:spPr>
+          <a:xfrm>
+            <a:off x="787400" y="1460500"/>
+            <a:ext cx="10069513" cy="3329581"/>
+          </a:xfrm>
+        </p:spPr>
         <p:txBody>
           <a:bodyPr/>
           <a:lstStyle/>
           <a:p>
             <a:r>
               <a:rPr lang="en-US" dirty="0" smtClean="0"/>
-              <a:t>Orbit</a:t>
-            </a:r>
-            <a:endParaRPr lang="en-US" dirty="0"/>
-          </a:p>
-        </p:txBody>
-      </p:sp>
-      <p:sp>
-        <p:nvSpPr>
-          <p:cNvPr id="3" name="Content Placeholder 2"/>
-          <p:cNvSpPr>
-            <a:spLocks noGrp="1"/>
-          </p:cNvSpPr>
-          <p:nvPr>
-            <p:ph idx="1"/>
-          </p:nvPr>
-        </p:nvSpPr>
-        <p:spPr>
-          <a:xfrm>
-            <a:off x="1103312" y="2052918"/>
-            <a:ext cx="9659975" cy="4699768"/>
-          </a:xfrm>
-        </p:spPr>
-        <p:txBody>
-          <a:bodyPr/>
-          <a:lstStyle/>
-          <a:p>
-            <a:r>
-              <a:rPr lang="en-US" dirty="0" smtClean="0"/>
-              <a:t>3 – 4 ground based communication stations available across United States</a:t>
-            </a:r>
-          </a:p>
-          <a:p>
-            <a:pPr lvl="1">
-              <a:lnSpc>
-                <a:spcPct val="200000"/>
-              </a:lnSpc>
-            </a:pPr>
-            <a:r>
-              <a:rPr lang="en-US" dirty="0" smtClean="0"/>
-              <a:t>Anchorage, Boulder, Honolulu[, Crookston]</a:t>
-            </a:r>
-            <a:endParaRPr lang="en-US" dirty="0"/>
-          </a:p>
-          <a:p>
-            <a:pPr>
-              <a:lnSpc>
-                <a:spcPct val="200000"/>
-              </a:lnSpc>
-            </a:pPr>
-            <a:r>
-              <a:rPr lang="en-US" dirty="0" smtClean="0"/>
-              <a:t>Orbit shall coincide with as many ground stations as possible</a:t>
-            </a:r>
-          </a:p>
-          <a:p>
-            <a:pPr lvl="1">
-              <a:lnSpc>
-                <a:spcPct val="200000"/>
-              </a:lnSpc>
-            </a:pPr>
-            <a:r>
-              <a:rPr lang="en-US" dirty="0" smtClean="0"/>
-              <a:t>1.5 hour orbital period in LEO</a:t>
-            </a:r>
-          </a:p>
-          <a:p>
-            <a:pPr lvl="1">
-              <a:lnSpc>
-                <a:spcPct val="150000"/>
-              </a:lnSpc>
-            </a:pPr>
-            <a:r>
-              <a:rPr lang="en-US" dirty="0" smtClean="0"/>
-              <a:t>5 minute communication window per station</a:t>
-            </a:r>
-          </a:p>
-          <a:p>
-            <a:pPr lvl="1">
-              <a:lnSpc>
-                <a:spcPct val="150000"/>
-              </a:lnSpc>
-            </a:pPr>
-            <a:r>
-              <a:rPr lang="en-US" dirty="0" smtClean="0"/>
-              <a:t>Target: 3 stations</a:t>
-            </a:r>
-          </a:p>
-          <a:p>
-            <a:pPr>
-              <a:lnSpc>
-                <a:spcPct val="200000"/>
-              </a:lnSpc>
-            </a:pPr>
-            <a:r>
-              <a:rPr lang="en-US" dirty="0" smtClean="0"/>
-              <a:t>Orbital parameters shall not interfere with other spacecraft</a:t>
+              <a:t>Power Management	</a:t>
             </a:r>
             <a:endParaRPr lang="en-US" dirty="0"/>
           </a:p>
@@ -10478,13 +10455,20 @@
     </p:spTree>
     <p:extLst>
       <p:ext uri="{BB962C8B-B14F-4D97-AF65-F5344CB8AC3E}">
-        <p14:creationId xmlns:p14="http://schemas.microsoft.com/office/powerpoint/2010/main" val="3836608790"/>
+        <p14:creationId xmlns:p14="http://schemas.microsoft.com/office/powerpoint/2010/main" val="1090892760"/>
       </p:ext>
     </p:extLst>
   </p:cSld>
   <p:clrMapOvr>
     <a:masterClrMapping/>
   </p:clrMapOvr>
+  <p:timing>
+    <p:tnLst>
+      <p:par>
+        <p:cTn id="1" dur="indefinite" restart="never" nodeType="tmRoot"/>
+      </p:par>
+    </p:tnLst>
+  </p:timing>
 </p:sld>
 </file>
 
@@ -10507,1747 +10491,6 @@
       </p:grpSpPr>
       <p:sp>
         <p:nvSpPr>
-          <p:cNvPr id="2" name="Title 1"/>
-          <p:cNvSpPr>
-            <a:spLocks noGrp="1"/>
-          </p:cNvSpPr>
-          <p:nvPr>
-            <p:ph type="title"/>
-          </p:nvPr>
-        </p:nvSpPr>
-        <p:spPr/>
-        <p:txBody>
-          <a:bodyPr/>
-          <a:lstStyle/>
-          <a:p>
-            <a:r>
-              <a:rPr lang="en-US" dirty="0" smtClean="0"/>
-              <a:t>Data</a:t>
-            </a:r>
-            <a:endParaRPr lang="en-US" dirty="0"/>
-          </a:p>
-        </p:txBody>
-      </p:sp>
-      <p:sp>
-        <p:nvSpPr>
-          <p:cNvPr id="3" name="Content Placeholder 2"/>
-          <p:cNvSpPr>
-            <a:spLocks noGrp="1"/>
-          </p:cNvSpPr>
-          <p:nvPr>
-            <p:ph idx="1"/>
-          </p:nvPr>
-        </p:nvSpPr>
-        <p:spPr>
-          <a:xfrm>
-            <a:off x="1103312" y="1546706"/>
-            <a:ext cx="9735418" cy="5067658"/>
-          </a:xfrm>
-        </p:spPr>
-        <p:txBody>
-          <a:bodyPr/>
-          <a:lstStyle/>
-          <a:p>
-            <a:r>
-              <a:rPr lang="en-US" dirty="0"/>
-              <a:t>One event per </a:t>
-            </a:r>
-            <a:r>
-              <a:rPr lang="en-US" dirty="0" smtClean="0"/>
-              <a:t>orbit assumed </a:t>
-            </a:r>
-            <a:r>
-              <a:rPr lang="en-US" dirty="0"/>
-              <a:t>(~10 </a:t>
-            </a:r>
-            <a:r>
-              <a:rPr lang="en-US" dirty="0" err="1"/>
-              <a:t>MiB</a:t>
-            </a:r>
-            <a:r>
-              <a:rPr lang="en-US" dirty="0"/>
-              <a:t> of data per event)</a:t>
-            </a:r>
-          </a:p>
-          <a:p>
-            <a:endParaRPr lang="en-US" dirty="0" smtClean="0"/>
-          </a:p>
-          <a:p>
-            <a:r>
-              <a:rPr lang="en-US" dirty="0" smtClean="0"/>
-              <a:t>Key requirements</a:t>
-            </a:r>
-            <a:endParaRPr lang="en-US" dirty="0"/>
-          </a:p>
-          <a:p>
-            <a:pPr lvl="1">
-              <a:lnSpc>
-                <a:spcPct val="150000"/>
-              </a:lnSpc>
-            </a:pPr>
-            <a:r>
-              <a:rPr lang="en-US" dirty="0" smtClean="0"/>
-              <a:t>Downlink signal shall have enough power to be received at ground stations</a:t>
-            </a:r>
-            <a:endParaRPr lang="en-US" dirty="0"/>
-          </a:p>
-          <a:p>
-            <a:pPr lvl="1">
-              <a:lnSpc>
-                <a:spcPct val="150000"/>
-              </a:lnSpc>
-            </a:pPr>
-            <a:r>
-              <a:rPr lang="en-US" dirty="0" smtClean="0"/>
-              <a:t>Data must be stored between communication windows</a:t>
-            </a:r>
-            <a:endParaRPr lang="en-US" dirty="0"/>
-          </a:p>
-          <a:p>
-            <a:pPr lvl="1">
-              <a:lnSpc>
-                <a:spcPct val="150000"/>
-              </a:lnSpc>
-            </a:pPr>
-            <a:r>
-              <a:rPr lang="en-US" dirty="0" smtClean="0"/>
-              <a:t>Downlink speed shall be fast enough to send all stored information per communication window (100 kbps minimum)</a:t>
-            </a:r>
-          </a:p>
-          <a:p>
-            <a:pPr lvl="1">
-              <a:lnSpc>
-                <a:spcPct val="150000"/>
-              </a:lnSpc>
-            </a:pPr>
-            <a:r>
-              <a:rPr lang="en-US" dirty="0" smtClean="0"/>
-              <a:t>Shall provide minimal uplink capability for error checking and basic commands</a:t>
-            </a:r>
-          </a:p>
-          <a:p>
-            <a:pPr lvl="1"/>
-            <a:endParaRPr lang="en-US" dirty="0"/>
-          </a:p>
-          <a:p>
-            <a:r>
-              <a:rPr lang="en-US" dirty="0" smtClean="0"/>
-              <a:t>Link Budget</a:t>
-            </a:r>
-            <a:endParaRPr lang="en-US" dirty="0"/>
-          </a:p>
-        </p:txBody>
-      </p:sp>
-    </p:spTree>
-    <p:extLst>
-      <p:ext uri="{BB962C8B-B14F-4D97-AF65-F5344CB8AC3E}">
-        <p14:creationId xmlns:p14="http://schemas.microsoft.com/office/powerpoint/2010/main" val="1391289961"/>
-      </p:ext>
-    </p:extLst>
-  </p:cSld>
-  <p:clrMapOvr>
-    <a:masterClrMapping/>
-  </p:clrMapOvr>
-</p:sld>
-</file>
-
-<file path=ppt/slides/slide24.xml><?xml version="1.0" encoding="utf-8"?>
-<p:sld xmlns:a="http://schemas.openxmlformats.org/drawingml/2006/main" xmlns:r="http://schemas.openxmlformats.org/officeDocument/2006/relationships" xmlns:p="http://schemas.openxmlformats.org/presentationml/2006/main">
-  <p:cSld>
-    <p:spTree>
-      <p:nvGrpSpPr>
-        <p:cNvPr id="1" name=""/>
-        <p:cNvGrpSpPr/>
-        <p:nvPr/>
-      </p:nvGrpSpPr>
-      <p:grpSpPr>
-        <a:xfrm>
-          <a:off x="0" y="0"/>
-          <a:ext cx="0" cy="0"/>
-          <a:chOff x="0" y="0"/>
-          <a:chExt cx="0" cy="0"/>
-        </a:xfrm>
-      </p:grpSpPr>
-      <p:sp>
-        <p:nvSpPr>
-          <p:cNvPr id="2" name="Title 1"/>
-          <p:cNvSpPr>
-            <a:spLocks noGrp="1"/>
-          </p:cNvSpPr>
-          <p:nvPr>
-            <p:ph type="title"/>
-          </p:nvPr>
-        </p:nvSpPr>
-        <p:spPr>
-          <a:xfrm>
-            <a:off x="646111" y="452718"/>
-            <a:ext cx="9404723" cy="829982"/>
-          </a:xfrm>
-        </p:spPr>
-        <p:txBody>
-          <a:bodyPr/>
-          <a:lstStyle/>
-          <a:p>
-            <a:r>
-              <a:rPr lang="en-US" dirty="0" smtClean="0"/>
-              <a:t>Hardware</a:t>
-            </a:r>
-            <a:endParaRPr lang="en-US" dirty="0"/>
-          </a:p>
-        </p:txBody>
-      </p:sp>
-      <p:sp>
-        <p:nvSpPr>
-          <p:cNvPr id="3" name="Content Placeholder 2"/>
-          <p:cNvSpPr>
-            <a:spLocks noGrp="1"/>
-          </p:cNvSpPr>
-          <p:nvPr>
-            <p:ph idx="1"/>
-          </p:nvPr>
-        </p:nvSpPr>
-        <p:spPr>
-          <a:xfrm>
-            <a:off x="1103312" y="1409700"/>
-            <a:ext cx="8946541" cy="4838699"/>
-          </a:xfrm>
-        </p:spPr>
-        <p:txBody>
-          <a:bodyPr>
-            <a:normAutofit/>
-          </a:bodyPr>
-          <a:lstStyle/>
-          <a:p>
-            <a:pPr>
-              <a:lnSpc>
-                <a:spcPct val="150000"/>
-              </a:lnSpc>
-            </a:pPr>
-            <a:r>
-              <a:rPr lang="en-US" dirty="0" smtClean="0"/>
-              <a:t>Requirements</a:t>
-            </a:r>
-          </a:p>
-          <a:p>
-            <a:pPr lvl="1">
-              <a:lnSpc>
-                <a:spcPct val="150000"/>
-              </a:lnSpc>
-            </a:pPr>
-            <a:r>
-              <a:rPr lang="en-US" sz="2000" dirty="0" smtClean="0"/>
-              <a:t>Industrial Grade Radio</a:t>
-            </a:r>
-          </a:p>
-          <a:p>
-            <a:pPr lvl="2">
-              <a:lnSpc>
-                <a:spcPct val="150000"/>
-              </a:lnSpc>
-            </a:pPr>
-            <a:r>
-              <a:rPr lang="en-US" sz="2000" dirty="0" smtClean="0"/>
-              <a:t>Withstand the environment</a:t>
-            </a:r>
-          </a:p>
-          <a:p>
-            <a:pPr lvl="2">
-              <a:lnSpc>
-                <a:spcPct val="150000"/>
-              </a:lnSpc>
-            </a:pPr>
-            <a:r>
-              <a:rPr lang="en-US" sz="2000" dirty="0" smtClean="0"/>
-              <a:t>Reliability and high efficiency</a:t>
-            </a:r>
-          </a:p>
-        </p:txBody>
-      </p:sp>
-    </p:spTree>
-    <p:extLst>
-      <p:ext uri="{BB962C8B-B14F-4D97-AF65-F5344CB8AC3E}">
-        <p14:creationId xmlns:p14="http://schemas.microsoft.com/office/powerpoint/2010/main" val="3187638978"/>
-      </p:ext>
-    </p:extLst>
-  </p:cSld>
-  <p:clrMapOvr>
-    <a:masterClrMapping/>
-  </p:clrMapOvr>
-  <p:timing>
-    <p:tnLst>
-      <p:par>
-        <p:cTn id="1" dur="indefinite" restart="never" nodeType="tmRoot"/>
-      </p:par>
-    </p:tnLst>
-  </p:timing>
-</p:sld>
-</file>
-
-<file path=ppt/slides/slide25.xml><?xml version="1.0" encoding="utf-8"?>
-<p:sld xmlns:a="http://schemas.openxmlformats.org/drawingml/2006/main" xmlns:r="http://schemas.openxmlformats.org/officeDocument/2006/relationships" xmlns:p="http://schemas.openxmlformats.org/presentationml/2006/main">
-  <p:cSld>
-    <p:spTree>
-      <p:nvGrpSpPr>
-        <p:cNvPr id="1" name=""/>
-        <p:cNvGrpSpPr/>
-        <p:nvPr/>
-      </p:nvGrpSpPr>
-      <p:grpSpPr>
-        <a:xfrm>
-          <a:off x="0" y="0"/>
-          <a:ext cx="0" cy="0"/>
-          <a:chOff x="0" y="0"/>
-          <a:chExt cx="0" cy="0"/>
-        </a:xfrm>
-      </p:grpSpPr>
-      <p:sp>
-        <p:nvSpPr>
-          <p:cNvPr id="2" name="Title 1"/>
-          <p:cNvSpPr>
-            <a:spLocks noGrp="1"/>
-          </p:cNvSpPr>
-          <p:nvPr>
-            <p:ph type="title"/>
-          </p:nvPr>
-        </p:nvSpPr>
-        <p:spPr/>
-        <p:txBody>
-          <a:bodyPr/>
-          <a:lstStyle/>
-          <a:p>
-            <a:r>
-              <a:rPr lang="en-US" dirty="0" smtClean="0"/>
-              <a:t>Hardware – Scenario 1</a:t>
-            </a:r>
-            <a:endParaRPr lang="en-US" dirty="0"/>
-          </a:p>
-        </p:txBody>
-      </p:sp>
-      <p:pic>
-        <p:nvPicPr>
-          <p:cNvPr id="4" name="Picture 3"/>
-          <p:cNvPicPr>
-            <a:picLocks noChangeAspect="1"/>
-          </p:cNvPicPr>
-          <p:nvPr/>
-        </p:nvPicPr>
-        <p:blipFill>
-          <a:blip r:embed="rId2">
-            <a:extLst>
-              <a:ext uri="{28A0092B-C50C-407E-A947-70E740481C1C}">
-                <a14:useLocalDpi xmlns:a14="http://schemas.microsoft.com/office/drawing/2010/main" val="0"/>
-              </a:ext>
-            </a:extLst>
-          </a:blip>
-          <a:stretch>
-            <a:fillRect/>
-          </a:stretch>
-        </p:blipFill>
-        <p:spPr>
-          <a:xfrm>
-            <a:off x="5177121" y="4425407"/>
-            <a:ext cx="1904440" cy="1815169"/>
-          </a:xfrm>
-          <a:prstGeom prst="rect">
-            <a:avLst/>
-          </a:prstGeom>
-        </p:spPr>
-      </p:pic>
-      <p:pic>
-        <p:nvPicPr>
-          <p:cNvPr id="5" name="Picture 4"/>
-          <p:cNvPicPr>
-            <a:picLocks noChangeAspect="1"/>
-          </p:cNvPicPr>
-          <p:nvPr/>
-        </p:nvPicPr>
-        <p:blipFill>
-          <a:blip r:embed="rId3" cstate="print">
-            <a:extLst>
-              <a:ext uri="{28A0092B-C50C-407E-A947-70E740481C1C}">
-                <a14:useLocalDpi xmlns:a14="http://schemas.microsoft.com/office/drawing/2010/main" val="0"/>
-              </a:ext>
-            </a:extLst>
-          </a:blip>
-          <a:stretch>
-            <a:fillRect/>
-          </a:stretch>
-        </p:blipFill>
-        <p:spPr>
-          <a:xfrm>
-            <a:off x="6703382" y="1987255"/>
-            <a:ext cx="1572457" cy="1513490"/>
-          </a:xfrm>
-          <a:prstGeom prst="rect">
-            <a:avLst/>
-          </a:prstGeom>
-        </p:spPr>
-      </p:pic>
-      <p:pic>
-        <p:nvPicPr>
-          <p:cNvPr id="6" name="Picture 5"/>
-          <p:cNvPicPr>
-            <a:picLocks noChangeAspect="1"/>
-          </p:cNvPicPr>
-          <p:nvPr/>
-        </p:nvPicPr>
-        <p:blipFill>
-          <a:blip r:embed="rId4">
-            <a:extLst>
-              <a:ext uri="{28A0092B-C50C-407E-A947-70E740481C1C}">
-                <a14:useLocalDpi xmlns:a14="http://schemas.microsoft.com/office/drawing/2010/main" val="0"/>
-              </a:ext>
-            </a:extLst>
-          </a:blip>
-          <a:stretch>
-            <a:fillRect/>
-          </a:stretch>
-        </p:blipFill>
-        <p:spPr>
-          <a:xfrm>
-            <a:off x="8439248" y="4658711"/>
-            <a:ext cx="3223172" cy="1813034"/>
-          </a:xfrm>
-          <a:prstGeom prst="rect">
-            <a:avLst/>
-          </a:prstGeom>
-        </p:spPr>
-      </p:pic>
-      <p:sp>
-        <p:nvSpPr>
-          <p:cNvPr id="7" name="TextBox 6"/>
-          <p:cNvSpPr txBox="1"/>
-          <p:nvPr/>
-        </p:nvSpPr>
-        <p:spPr>
-          <a:xfrm>
-            <a:off x="2666561" y="1646849"/>
-            <a:ext cx="1288499" cy="1200329"/>
-          </a:xfrm>
-          <a:prstGeom prst="rect">
-            <a:avLst/>
-          </a:prstGeom>
-          <a:noFill/>
-          <a:ln>
-            <a:solidFill>
-              <a:schemeClr val="tx1"/>
-            </a:solidFill>
-          </a:ln>
-        </p:spPr>
-        <p:txBody>
-          <a:bodyPr wrap="square" rtlCol="0">
-            <a:spAutoFit/>
-          </a:bodyPr>
-          <a:lstStyle/>
-          <a:p>
-            <a:r>
-              <a:rPr lang="en-US" dirty="0" smtClean="0"/>
-              <a:t>GPS</a:t>
-            </a:r>
-          </a:p>
-          <a:p>
-            <a:r>
-              <a:rPr lang="en-US" dirty="0" smtClean="0"/>
-              <a:t>  -Attitude</a:t>
-            </a:r>
-          </a:p>
-          <a:p>
-            <a:r>
-              <a:rPr lang="en-US" dirty="0"/>
-              <a:t> </a:t>
-            </a:r>
-            <a:r>
-              <a:rPr lang="en-US" dirty="0" smtClean="0"/>
-              <a:t> -Position</a:t>
-            </a:r>
-          </a:p>
-          <a:p>
-            <a:r>
-              <a:rPr lang="en-US" dirty="0"/>
-              <a:t> </a:t>
-            </a:r>
-            <a:r>
-              <a:rPr lang="en-US" dirty="0" smtClean="0"/>
-              <a:t> -Time</a:t>
-            </a:r>
-            <a:endParaRPr lang="en-US" dirty="0"/>
-          </a:p>
-        </p:txBody>
-      </p:sp>
-      <p:sp>
-        <p:nvSpPr>
-          <p:cNvPr id="8" name="TextBox 7"/>
-          <p:cNvSpPr txBox="1"/>
-          <p:nvPr/>
-        </p:nvSpPr>
-        <p:spPr>
-          <a:xfrm>
-            <a:off x="540635" y="1646849"/>
-            <a:ext cx="1564062" cy="923330"/>
-          </a:xfrm>
-          <a:prstGeom prst="rect">
-            <a:avLst/>
-          </a:prstGeom>
-          <a:noFill/>
-          <a:ln>
-            <a:solidFill>
-              <a:schemeClr val="tx1"/>
-            </a:solidFill>
-          </a:ln>
-        </p:spPr>
-        <p:txBody>
-          <a:bodyPr wrap="square" rtlCol="0">
-            <a:spAutoFit/>
-          </a:bodyPr>
-          <a:lstStyle/>
-          <a:p>
-            <a:r>
-              <a:rPr lang="en-US" dirty="0" smtClean="0"/>
-              <a:t>Power</a:t>
-            </a:r>
-          </a:p>
-          <a:p>
-            <a:r>
-              <a:rPr lang="en-US" dirty="0" smtClean="0"/>
-              <a:t>  -Wattage</a:t>
-            </a:r>
-          </a:p>
-          <a:p>
-            <a:r>
-              <a:rPr lang="en-US" dirty="0"/>
-              <a:t> </a:t>
-            </a:r>
-            <a:r>
-              <a:rPr lang="en-US" dirty="0" smtClean="0"/>
-              <a:t> -Battery</a:t>
-            </a:r>
-            <a:endParaRPr lang="en-US" dirty="0"/>
-          </a:p>
-        </p:txBody>
-      </p:sp>
-      <p:cxnSp>
-        <p:nvCxnSpPr>
-          <p:cNvPr id="10" name="Straight Arrow Connector 9"/>
-          <p:cNvCxnSpPr>
-            <a:stCxn id="7" idx="2"/>
-            <a:endCxn id="35" idx="0"/>
-          </p:cNvCxnSpPr>
-          <p:nvPr/>
-        </p:nvCxnSpPr>
-        <p:spPr>
-          <a:xfrm flipH="1">
-            <a:off x="1985999" y="2847178"/>
-            <a:ext cx="1324812" cy="1706379"/>
-          </a:xfrm>
-          <a:prstGeom prst="straightConnector1">
-            <a:avLst/>
-          </a:prstGeom>
-          <a:ln>
-            <a:solidFill>
-              <a:schemeClr val="tx1"/>
-            </a:solidFill>
-            <a:tailEnd type="none"/>
-          </a:ln>
-        </p:spPr>
-        <p:style>
-          <a:lnRef idx="1">
-            <a:schemeClr val="accent1"/>
-          </a:lnRef>
-          <a:fillRef idx="0">
-            <a:schemeClr val="accent1"/>
-          </a:fillRef>
-          <a:effectRef idx="0">
-            <a:schemeClr val="accent1"/>
-          </a:effectRef>
-          <a:fontRef idx="minor">
-            <a:schemeClr val="tx1"/>
-          </a:fontRef>
-        </p:style>
-      </p:cxnSp>
-      <p:cxnSp>
-        <p:nvCxnSpPr>
-          <p:cNvPr id="11" name="Straight Arrow Connector 10"/>
-          <p:cNvCxnSpPr>
-            <a:stCxn id="8" idx="2"/>
-            <a:endCxn id="35" idx="0"/>
-          </p:cNvCxnSpPr>
-          <p:nvPr/>
-        </p:nvCxnSpPr>
-        <p:spPr>
-          <a:xfrm>
-            <a:off x="1322666" y="2570179"/>
-            <a:ext cx="663333" cy="1983378"/>
-          </a:xfrm>
-          <a:prstGeom prst="straightConnector1">
-            <a:avLst/>
-          </a:prstGeom>
-          <a:ln>
-            <a:solidFill>
-              <a:schemeClr val="tx1"/>
-            </a:solidFill>
-            <a:tailEnd type="none"/>
-          </a:ln>
-        </p:spPr>
-        <p:style>
-          <a:lnRef idx="1">
-            <a:schemeClr val="accent1"/>
-          </a:lnRef>
-          <a:fillRef idx="0">
-            <a:schemeClr val="accent1"/>
-          </a:fillRef>
-          <a:effectRef idx="0">
-            <a:schemeClr val="accent1"/>
-          </a:effectRef>
-          <a:fontRef idx="minor">
-            <a:schemeClr val="tx1"/>
-          </a:fontRef>
-        </p:style>
-      </p:cxnSp>
-      <p:cxnSp>
-        <p:nvCxnSpPr>
-          <p:cNvPr id="16" name="Straight Arrow Connector 15"/>
-          <p:cNvCxnSpPr>
-            <a:stCxn id="4" idx="0"/>
-          </p:cNvCxnSpPr>
-          <p:nvPr/>
-        </p:nvCxnSpPr>
-        <p:spPr>
-          <a:xfrm flipV="1">
-            <a:off x="6129341" y="3287110"/>
-            <a:ext cx="775956" cy="1138297"/>
-          </a:xfrm>
-          <a:prstGeom prst="straightConnector1">
-            <a:avLst/>
-          </a:prstGeom>
-          <a:ln>
-            <a:solidFill>
-              <a:schemeClr val="tx1"/>
-            </a:solidFill>
-            <a:tailEnd type="triangle"/>
-          </a:ln>
-        </p:spPr>
-        <p:style>
-          <a:lnRef idx="1">
-            <a:schemeClr val="accent1"/>
-          </a:lnRef>
-          <a:fillRef idx="0">
-            <a:schemeClr val="accent1"/>
-          </a:fillRef>
-          <a:effectRef idx="0">
-            <a:schemeClr val="accent1"/>
-          </a:effectRef>
-          <a:fontRef idx="minor">
-            <a:schemeClr val="tx1"/>
-          </a:fontRef>
-        </p:style>
-      </p:cxnSp>
-      <p:sp>
-        <p:nvSpPr>
-          <p:cNvPr id="19" name="TextBox 18"/>
-          <p:cNvSpPr txBox="1"/>
-          <p:nvPr/>
-        </p:nvSpPr>
-        <p:spPr>
-          <a:xfrm>
-            <a:off x="5114658" y="4041940"/>
-            <a:ext cx="1726324" cy="369332"/>
-          </a:xfrm>
-          <a:prstGeom prst="rect">
-            <a:avLst/>
-          </a:prstGeom>
-          <a:noFill/>
-        </p:spPr>
-        <p:txBody>
-          <a:bodyPr wrap="square" rtlCol="0">
-            <a:spAutoFit/>
-          </a:bodyPr>
-          <a:lstStyle/>
-          <a:p>
-            <a:r>
-              <a:rPr lang="en-US" dirty="0" smtClean="0"/>
-              <a:t>Radio</a:t>
-            </a:r>
-          </a:p>
-        </p:txBody>
-      </p:sp>
-      <p:sp>
-        <p:nvSpPr>
-          <p:cNvPr id="20" name="TextBox 19"/>
-          <p:cNvSpPr txBox="1"/>
-          <p:nvPr/>
-        </p:nvSpPr>
-        <p:spPr>
-          <a:xfrm>
-            <a:off x="6794938" y="1576552"/>
-            <a:ext cx="1355834" cy="369332"/>
-          </a:xfrm>
-          <a:prstGeom prst="rect">
-            <a:avLst/>
-          </a:prstGeom>
-          <a:noFill/>
-        </p:spPr>
-        <p:txBody>
-          <a:bodyPr wrap="square" rtlCol="0">
-            <a:spAutoFit/>
-          </a:bodyPr>
-          <a:lstStyle/>
-          <a:p>
-            <a:r>
-              <a:rPr lang="en-US" dirty="0" smtClean="0"/>
-              <a:t>Antenna</a:t>
-            </a:r>
-          </a:p>
-        </p:txBody>
-      </p:sp>
-      <p:pic>
-        <p:nvPicPr>
-          <p:cNvPr id="21" name="Picture 20"/>
-          <p:cNvPicPr>
-            <a:picLocks noChangeAspect="1"/>
-          </p:cNvPicPr>
-          <p:nvPr/>
-        </p:nvPicPr>
-        <p:blipFill>
-          <a:blip r:embed="rId5">
-            <a:extLst>
-              <a:ext uri="{28A0092B-C50C-407E-A947-70E740481C1C}">
-                <a14:useLocalDpi xmlns:a14="http://schemas.microsoft.com/office/drawing/2010/main" val="0"/>
-              </a:ext>
-            </a:extLst>
-          </a:blip>
-          <a:stretch>
-            <a:fillRect/>
-          </a:stretch>
-        </p:blipFill>
-        <p:spPr>
-          <a:xfrm rot="2032425">
-            <a:off x="6571690" y="1891017"/>
-            <a:ext cx="3314705" cy="2966852"/>
-          </a:xfrm>
-          <a:prstGeom prst="rect">
-            <a:avLst/>
-          </a:prstGeom>
-        </p:spPr>
-      </p:pic>
-      <p:pic>
-        <p:nvPicPr>
-          <p:cNvPr id="22" name="Picture 21"/>
-          <p:cNvPicPr>
-            <a:picLocks noChangeAspect="1"/>
-          </p:cNvPicPr>
-          <p:nvPr/>
-        </p:nvPicPr>
-        <p:blipFill>
-          <a:blip r:embed="rId6" cstate="print">
-            <a:extLst>
-              <a:ext uri="{28A0092B-C50C-407E-A947-70E740481C1C}">
-                <a14:useLocalDpi xmlns:a14="http://schemas.microsoft.com/office/drawing/2010/main" val="0"/>
-              </a:ext>
-            </a:extLst>
-          </a:blip>
-          <a:stretch>
-            <a:fillRect/>
-          </a:stretch>
-        </p:blipFill>
-        <p:spPr>
-          <a:xfrm rot="18290028">
-            <a:off x="9608668" y="4737886"/>
-            <a:ext cx="649117" cy="714029"/>
-          </a:xfrm>
-          <a:prstGeom prst="rect">
-            <a:avLst/>
-          </a:prstGeom>
-        </p:spPr>
-      </p:pic>
-      <p:sp>
-        <p:nvSpPr>
-          <p:cNvPr id="35" name="TextBox 34"/>
-          <p:cNvSpPr txBox="1"/>
-          <p:nvPr/>
-        </p:nvSpPr>
-        <p:spPr>
-          <a:xfrm>
-            <a:off x="790916" y="4553557"/>
-            <a:ext cx="2390165" cy="646331"/>
-          </a:xfrm>
-          <a:prstGeom prst="rect">
-            <a:avLst/>
-          </a:prstGeom>
-          <a:noFill/>
-          <a:ln>
-            <a:solidFill>
-              <a:schemeClr val="tx1"/>
-            </a:solidFill>
-          </a:ln>
-        </p:spPr>
-        <p:txBody>
-          <a:bodyPr wrap="square" rtlCol="0">
-            <a:spAutoFit/>
-          </a:bodyPr>
-          <a:lstStyle/>
-          <a:p>
-            <a:r>
-              <a:rPr lang="en-US" dirty="0" smtClean="0"/>
-              <a:t>Flight Computer</a:t>
-            </a:r>
-          </a:p>
-          <a:p>
-            <a:r>
-              <a:rPr lang="en-US" dirty="0"/>
-              <a:t> </a:t>
-            </a:r>
-            <a:r>
-              <a:rPr lang="en-US" dirty="0" smtClean="0"/>
-              <a:t> -Assemble packet</a:t>
-            </a:r>
-            <a:endParaRPr lang="en-US" dirty="0"/>
-          </a:p>
-        </p:txBody>
-      </p:sp>
-      <p:cxnSp>
-        <p:nvCxnSpPr>
-          <p:cNvPr id="37" name="Straight Arrow Connector 36"/>
-          <p:cNvCxnSpPr>
-            <a:stCxn id="35" idx="3"/>
-            <a:endCxn id="4" idx="1"/>
-          </p:cNvCxnSpPr>
-          <p:nvPr/>
-        </p:nvCxnSpPr>
-        <p:spPr>
-          <a:xfrm>
-            <a:off x="3181081" y="4876723"/>
-            <a:ext cx="1996040" cy="456269"/>
-          </a:xfrm>
-          <a:prstGeom prst="straightConnector1">
-            <a:avLst/>
-          </a:prstGeom>
-          <a:ln>
-            <a:solidFill>
-              <a:schemeClr val="tx1"/>
-            </a:solidFill>
-            <a:tailEnd type="triangle"/>
-          </a:ln>
-        </p:spPr>
-        <p:style>
-          <a:lnRef idx="1">
-            <a:schemeClr val="accent1"/>
-          </a:lnRef>
-          <a:fillRef idx="0">
-            <a:schemeClr val="accent1"/>
-          </a:fillRef>
-          <a:effectRef idx="0">
-            <a:schemeClr val="accent1"/>
-          </a:effectRef>
-          <a:fontRef idx="minor">
-            <a:schemeClr val="tx1"/>
-          </a:fontRef>
-        </p:style>
-      </p:cxnSp>
-      <p:sp>
-        <p:nvSpPr>
-          <p:cNvPr id="44" name="TextBox 43"/>
-          <p:cNvSpPr txBox="1"/>
-          <p:nvPr/>
-        </p:nvSpPr>
-        <p:spPr>
-          <a:xfrm>
-            <a:off x="4451001" y="1646849"/>
-            <a:ext cx="1789386" cy="646331"/>
-          </a:xfrm>
-          <a:prstGeom prst="rect">
-            <a:avLst/>
-          </a:prstGeom>
-          <a:noFill/>
-          <a:ln>
-            <a:solidFill>
-              <a:schemeClr val="tx1"/>
-            </a:solidFill>
-          </a:ln>
-        </p:spPr>
-        <p:txBody>
-          <a:bodyPr wrap="square" rtlCol="0">
-            <a:spAutoFit/>
-          </a:bodyPr>
-          <a:lstStyle/>
-          <a:p>
-            <a:r>
-              <a:rPr lang="en-US" dirty="0" smtClean="0"/>
-              <a:t>Gamma Ray</a:t>
-            </a:r>
-            <a:r>
-              <a:rPr lang="en-US" dirty="0"/>
-              <a:t> </a:t>
-            </a:r>
-            <a:r>
-              <a:rPr lang="en-US" dirty="0" smtClean="0"/>
-              <a:t>Detector</a:t>
-            </a:r>
-          </a:p>
-        </p:txBody>
-      </p:sp>
-      <p:cxnSp>
-        <p:nvCxnSpPr>
-          <p:cNvPr id="46" name="Straight Arrow Connector 45"/>
-          <p:cNvCxnSpPr>
-            <a:stCxn id="44" idx="2"/>
-            <a:endCxn id="35" idx="0"/>
-          </p:cNvCxnSpPr>
-          <p:nvPr/>
-        </p:nvCxnSpPr>
-        <p:spPr>
-          <a:xfrm flipH="1">
-            <a:off x="1985999" y="2293180"/>
-            <a:ext cx="3359695" cy="2260377"/>
-          </a:xfrm>
-          <a:prstGeom prst="straightConnector1">
-            <a:avLst/>
-          </a:prstGeom>
-          <a:ln>
-            <a:solidFill>
-              <a:schemeClr val="tx1"/>
-            </a:solidFill>
-            <a:tailEnd type="none"/>
-          </a:ln>
-        </p:spPr>
-        <p:style>
-          <a:lnRef idx="1">
-            <a:schemeClr val="accent1"/>
-          </a:lnRef>
-          <a:fillRef idx="0">
-            <a:schemeClr val="accent1"/>
-          </a:fillRef>
-          <a:effectRef idx="0">
-            <a:schemeClr val="accent1"/>
-          </a:effectRef>
-          <a:fontRef idx="minor">
-            <a:schemeClr val="tx1"/>
-          </a:fontRef>
-        </p:style>
-      </p:cxnSp>
-      <p:sp>
-        <p:nvSpPr>
-          <p:cNvPr id="12" name="TextBox 11"/>
-          <p:cNvSpPr txBox="1"/>
-          <p:nvPr/>
-        </p:nvSpPr>
-        <p:spPr>
-          <a:xfrm>
-            <a:off x="526133" y="5717356"/>
-            <a:ext cx="3717833" cy="523220"/>
-          </a:xfrm>
-          <a:prstGeom prst="rect">
-            <a:avLst/>
-          </a:prstGeom>
-          <a:noFill/>
-        </p:spPr>
-        <p:txBody>
-          <a:bodyPr wrap="square" rtlCol="0">
-            <a:spAutoFit/>
-          </a:bodyPr>
-          <a:lstStyle/>
-          <a:p>
-            <a:r>
-              <a:rPr lang="en-US" sz="1400" dirty="0" smtClean="0"/>
-              <a:t>Used if data packets are large and connecting to ground stations is difficult</a:t>
-            </a:r>
-            <a:endParaRPr lang="en-US" sz="1400" dirty="0"/>
-          </a:p>
-        </p:txBody>
-      </p:sp>
-    </p:spTree>
-    <p:extLst>
-      <p:ext uri="{BB962C8B-B14F-4D97-AF65-F5344CB8AC3E}">
-        <p14:creationId xmlns:p14="http://schemas.microsoft.com/office/powerpoint/2010/main" val="3685603454"/>
-      </p:ext>
-    </p:extLst>
-  </p:cSld>
-  <p:clrMapOvr>
-    <a:masterClrMapping/>
-  </p:clrMapOvr>
-  <p:timing>
-    <p:tnLst>
-      <p:par>
-        <p:cTn id="1" dur="indefinite" restart="never" nodeType="tmRoot"/>
-      </p:par>
-    </p:tnLst>
-  </p:timing>
-</p:sld>
-</file>
-
-<file path=ppt/slides/slide26.xml><?xml version="1.0" encoding="utf-8"?>
-<p:sld xmlns:a="http://schemas.openxmlformats.org/drawingml/2006/main" xmlns:r="http://schemas.openxmlformats.org/officeDocument/2006/relationships" xmlns:p="http://schemas.openxmlformats.org/presentationml/2006/main">
-  <p:cSld>
-    <p:spTree>
-      <p:nvGrpSpPr>
-        <p:cNvPr id="1" name=""/>
-        <p:cNvGrpSpPr/>
-        <p:nvPr/>
-      </p:nvGrpSpPr>
-      <p:grpSpPr>
-        <a:xfrm>
-          <a:off x="0" y="0"/>
-          <a:ext cx="0" cy="0"/>
-          <a:chOff x="0" y="0"/>
-          <a:chExt cx="0" cy="0"/>
-        </a:xfrm>
-      </p:grpSpPr>
-      <p:sp>
-        <p:nvSpPr>
-          <p:cNvPr id="2" name="Title 1"/>
-          <p:cNvSpPr>
-            <a:spLocks noGrp="1"/>
-          </p:cNvSpPr>
-          <p:nvPr>
-            <p:ph type="title"/>
-          </p:nvPr>
-        </p:nvSpPr>
-        <p:spPr/>
-        <p:txBody>
-          <a:bodyPr/>
-          <a:lstStyle/>
-          <a:p>
-            <a:r>
-              <a:rPr lang="en-US" dirty="0" smtClean="0"/>
-              <a:t>Hardware – Scenario 2</a:t>
-            </a:r>
-            <a:endParaRPr lang="en-US" dirty="0"/>
-          </a:p>
-        </p:txBody>
-      </p:sp>
-      <p:pic>
-        <p:nvPicPr>
-          <p:cNvPr id="5" name="Picture 4"/>
-          <p:cNvPicPr>
-            <a:picLocks noChangeAspect="1"/>
-          </p:cNvPicPr>
-          <p:nvPr/>
-        </p:nvPicPr>
-        <p:blipFill>
-          <a:blip r:embed="rId2" cstate="print">
-            <a:extLst>
-              <a:ext uri="{28A0092B-C50C-407E-A947-70E740481C1C}">
-                <a14:useLocalDpi xmlns:a14="http://schemas.microsoft.com/office/drawing/2010/main" val="0"/>
-              </a:ext>
-            </a:extLst>
-          </a:blip>
-          <a:stretch>
-            <a:fillRect/>
-          </a:stretch>
-        </p:blipFill>
-        <p:spPr>
-          <a:xfrm>
-            <a:off x="6703382" y="1987255"/>
-            <a:ext cx="1572457" cy="1513490"/>
-          </a:xfrm>
-          <a:prstGeom prst="rect">
-            <a:avLst/>
-          </a:prstGeom>
-        </p:spPr>
-      </p:pic>
-      <p:pic>
-        <p:nvPicPr>
-          <p:cNvPr id="6" name="Picture 5"/>
-          <p:cNvPicPr>
-            <a:picLocks noChangeAspect="1"/>
-          </p:cNvPicPr>
-          <p:nvPr/>
-        </p:nvPicPr>
-        <p:blipFill>
-          <a:blip r:embed="rId3">
-            <a:extLst>
-              <a:ext uri="{28A0092B-C50C-407E-A947-70E740481C1C}">
-                <a14:useLocalDpi xmlns:a14="http://schemas.microsoft.com/office/drawing/2010/main" val="0"/>
-              </a:ext>
-            </a:extLst>
-          </a:blip>
-          <a:stretch>
-            <a:fillRect/>
-          </a:stretch>
-        </p:blipFill>
-        <p:spPr>
-          <a:xfrm>
-            <a:off x="8439248" y="4658711"/>
-            <a:ext cx="3223172" cy="1813034"/>
-          </a:xfrm>
-          <a:prstGeom prst="rect">
-            <a:avLst/>
-          </a:prstGeom>
-        </p:spPr>
-      </p:pic>
-      <p:sp>
-        <p:nvSpPr>
-          <p:cNvPr id="7" name="TextBox 6"/>
-          <p:cNvSpPr txBox="1"/>
-          <p:nvPr/>
-        </p:nvSpPr>
-        <p:spPr>
-          <a:xfrm>
-            <a:off x="2666561" y="1646849"/>
-            <a:ext cx="1288499" cy="1200329"/>
-          </a:xfrm>
-          <a:prstGeom prst="rect">
-            <a:avLst/>
-          </a:prstGeom>
-          <a:noFill/>
-          <a:ln>
-            <a:solidFill>
-              <a:schemeClr val="tx1"/>
-            </a:solidFill>
-          </a:ln>
-        </p:spPr>
-        <p:txBody>
-          <a:bodyPr wrap="square" rtlCol="0">
-            <a:spAutoFit/>
-          </a:bodyPr>
-          <a:lstStyle/>
-          <a:p>
-            <a:r>
-              <a:rPr lang="en-US" dirty="0" smtClean="0"/>
-              <a:t>GPS</a:t>
-            </a:r>
-          </a:p>
-          <a:p>
-            <a:r>
-              <a:rPr lang="en-US" dirty="0" smtClean="0"/>
-              <a:t>  -Attitude</a:t>
-            </a:r>
-          </a:p>
-          <a:p>
-            <a:r>
-              <a:rPr lang="en-US" dirty="0"/>
-              <a:t> </a:t>
-            </a:r>
-            <a:r>
-              <a:rPr lang="en-US" dirty="0" smtClean="0"/>
-              <a:t> -Position</a:t>
-            </a:r>
-          </a:p>
-          <a:p>
-            <a:r>
-              <a:rPr lang="en-US" dirty="0"/>
-              <a:t> </a:t>
-            </a:r>
-            <a:r>
-              <a:rPr lang="en-US" dirty="0" smtClean="0"/>
-              <a:t> -Time</a:t>
-            </a:r>
-            <a:endParaRPr lang="en-US" dirty="0"/>
-          </a:p>
-        </p:txBody>
-      </p:sp>
-      <p:sp>
-        <p:nvSpPr>
-          <p:cNvPr id="8" name="TextBox 7"/>
-          <p:cNvSpPr txBox="1"/>
-          <p:nvPr/>
-        </p:nvSpPr>
-        <p:spPr>
-          <a:xfrm>
-            <a:off x="540635" y="1646849"/>
-            <a:ext cx="1564062" cy="923330"/>
-          </a:xfrm>
-          <a:prstGeom prst="rect">
-            <a:avLst/>
-          </a:prstGeom>
-          <a:noFill/>
-          <a:ln>
-            <a:solidFill>
-              <a:schemeClr val="tx1"/>
-            </a:solidFill>
-          </a:ln>
-        </p:spPr>
-        <p:txBody>
-          <a:bodyPr wrap="square" rtlCol="0">
-            <a:spAutoFit/>
-          </a:bodyPr>
-          <a:lstStyle/>
-          <a:p>
-            <a:r>
-              <a:rPr lang="en-US" dirty="0" smtClean="0"/>
-              <a:t>Power</a:t>
-            </a:r>
-          </a:p>
-          <a:p>
-            <a:r>
-              <a:rPr lang="en-US" dirty="0" smtClean="0"/>
-              <a:t>  -Wattage</a:t>
-            </a:r>
-          </a:p>
-          <a:p>
-            <a:r>
-              <a:rPr lang="en-US" dirty="0"/>
-              <a:t> </a:t>
-            </a:r>
-            <a:r>
-              <a:rPr lang="en-US" dirty="0" smtClean="0"/>
-              <a:t> -Battery</a:t>
-            </a:r>
-            <a:endParaRPr lang="en-US" dirty="0"/>
-          </a:p>
-        </p:txBody>
-      </p:sp>
-      <p:cxnSp>
-        <p:nvCxnSpPr>
-          <p:cNvPr id="10" name="Straight Arrow Connector 9"/>
-          <p:cNvCxnSpPr>
-            <a:stCxn id="7" idx="2"/>
-            <a:endCxn id="35" idx="0"/>
-          </p:cNvCxnSpPr>
-          <p:nvPr/>
-        </p:nvCxnSpPr>
-        <p:spPr>
-          <a:xfrm flipH="1">
-            <a:off x="2004478" y="2847178"/>
-            <a:ext cx="1306333" cy="1710588"/>
-          </a:xfrm>
-          <a:prstGeom prst="straightConnector1">
-            <a:avLst/>
-          </a:prstGeom>
-          <a:ln>
-            <a:solidFill>
-              <a:schemeClr val="tx1"/>
-            </a:solidFill>
-            <a:tailEnd type="none"/>
-          </a:ln>
-        </p:spPr>
-        <p:style>
-          <a:lnRef idx="1">
-            <a:schemeClr val="accent1"/>
-          </a:lnRef>
-          <a:fillRef idx="0">
-            <a:schemeClr val="accent1"/>
-          </a:fillRef>
-          <a:effectRef idx="0">
-            <a:schemeClr val="accent1"/>
-          </a:effectRef>
-          <a:fontRef idx="minor">
-            <a:schemeClr val="tx1"/>
-          </a:fontRef>
-        </p:style>
-      </p:cxnSp>
-      <p:cxnSp>
-        <p:nvCxnSpPr>
-          <p:cNvPr id="11" name="Straight Arrow Connector 10"/>
-          <p:cNvCxnSpPr>
-            <a:stCxn id="8" idx="2"/>
-            <a:endCxn id="35" idx="0"/>
-          </p:cNvCxnSpPr>
-          <p:nvPr/>
-        </p:nvCxnSpPr>
-        <p:spPr>
-          <a:xfrm>
-            <a:off x="1322666" y="2570179"/>
-            <a:ext cx="681812" cy="1987587"/>
-          </a:xfrm>
-          <a:prstGeom prst="straightConnector1">
-            <a:avLst/>
-          </a:prstGeom>
-          <a:ln>
-            <a:solidFill>
-              <a:schemeClr val="tx1"/>
-            </a:solidFill>
-            <a:tailEnd type="none"/>
-          </a:ln>
-        </p:spPr>
-        <p:style>
-          <a:lnRef idx="1">
-            <a:schemeClr val="accent1"/>
-          </a:lnRef>
-          <a:fillRef idx="0">
-            <a:schemeClr val="accent1"/>
-          </a:fillRef>
-          <a:effectRef idx="0">
-            <a:schemeClr val="accent1"/>
-          </a:effectRef>
-          <a:fontRef idx="minor">
-            <a:schemeClr val="tx1"/>
-          </a:fontRef>
-        </p:style>
-      </p:cxnSp>
-      <p:cxnSp>
-        <p:nvCxnSpPr>
-          <p:cNvPr id="16" name="Straight Arrow Connector 15"/>
-          <p:cNvCxnSpPr/>
-          <p:nvPr/>
-        </p:nvCxnSpPr>
-        <p:spPr>
-          <a:xfrm flipV="1">
-            <a:off x="6373932" y="3458876"/>
-            <a:ext cx="565817" cy="1013368"/>
-          </a:xfrm>
-          <a:prstGeom prst="straightConnector1">
-            <a:avLst/>
-          </a:prstGeom>
-          <a:ln>
-            <a:solidFill>
-              <a:schemeClr val="tx1"/>
-            </a:solidFill>
-            <a:tailEnd type="triangle"/>
-          </a:ln>
-        </p:spPr>
-        <p:style>
-          <a:lnRef idx="1">
-            <a:schemeClr val="accent1"/>
-          </a:lnRef>
-          <a:fillRef idx="0">
-            <a:schemeClr val="accent1"/>
-          </a:fillRef>
-          <a:effectRef idx="0">
-            <a:schemeClr val="accent1"/>
-          </a:effectRef>
-          <a:fontRef idx="minor">
-            <a:schemeClr val="tx1"/>
-          </a:fontRef>
-        </p:style>
-      </p:cxnSp>
-      <p:sp>
-        <p:nvSpPr>
-          <p:cNvPr id="19" name="TextBox 18"/>
-          <p:cNvSpPr txBox="1"/>
-          <p:nvPr/>
-        </p:nvSpPr>
-        <p:spPr>
-          <a:xfrm>
-            <a:off x="4177862" y="4053246"/>
-            <a:ext cx="1726324" cy="369332"/>
-          </a:xfrm>
-          <a:prstGeom prst="rect">
-            <a:avLst/>
-          </a:prstGeom>
-          <a:noFill/>
-        </p:spPr>
-        <p:txBody>
-          <a:bodyPr wrap="square" rtlCol="0">
-            <a:spAutoFit/>
-          </a:bodyPr>
-          <a:lstStyle/>
-          <a:p>
-            <a:r>
-              <a:rPr lang="en-US" dirty="0" err="1" smtClean="0"/>
-              <a:t>FunCube</a:t>
-            </a:r>
-            <a:endParaRPr lang="en-US" dirty="0" smtClean="0"/>
-          </a:p>
-        </p:txBody>
-      </p:sp>
-      <p:sp>
-        <p:nvSpPr>
-          <p:cNvPr id="20" name="TextBox 19"/>
-          <p:cNvSpPr txBox="1"/>
-          <p:nvPr/>
-        </p:nvSpPr>
-        <p:spPr>
-          <a:xfrm>
-            <a:off x="6794938" y="1576552"/>
-            <a:ext cx="1355834" cy="369332"/>
-          </a:xfrm>
-          <a:prstGeom prst="rect">
-            <a:avLst/>
-          </a:prstGeom>
-          <a:noFill/>
-        </p:spPr>
-        <p:txBody>
-          <a:bodyPr wrap="square" rtlCol="0">
-            <a:spAutoFit/>
-          </a:bodyPr>
-          <a:lstStyle/>
-          <a:p>
-            <a:r>
-              <a:rPr lang="en-US" dirty="0" smtClean="0"/>
-              <a:t>Antenna</a:t>
-            </a:r>
-          </a:p>
-        </p:txBody>
-      </p:sp>
-      <p:pic>
-        <p:nvPicPr>
-          <p:cNvPr id="21" name="Picture 20"/>
-          <p:cNvPicPr>
-            <a:picLocks noChangeAspect="1"/>
-          </p:cNvPicPr>
-          <p:nvPr/>
-        </p:nvPicPr>
-        <p:blipFill>
-          <a:blip r:embed="rId4">
-            <a:extLst>
-              <a:ext uri="{28A0092B-C50C-407E-A947-70E740481C1C}">
-                <a14:useLocalDpi xmlns:a14="http://schemas.microsoft.com/office/drawing/2010/main" val="0"/>
-              </a:ext>
-            </a:extLst>
-          </a:blip>
-          <a:stretch>
-            <a:fillRect/>
-          </a:stretch>
-        </p:blipFill>
-        <p:spPr>
-          <a:xfrm rot="2032425">
-            <a:off x="6571690" y="1891017"/>
-            <a:ext cx="3314705" cy="2966852"/>
-          </a:xfrm>
-          <a:prstGeom prst="rect">
-            <a:avLst/>
-          </a:prstGeom>
-        </p:spPr>
-      </p:pic>
-      <p:pic>
-        <p:nvPicPr>
-          <p:cNvPr id="22" name="Picture 21"/>
-          <p:cNvPicPr>
-            <a:picLocks noChangeAspect="1"/>
-          </p:cNvPicPr>
-          <p:nvPr/>
-        </p:nvPicPr>
-        <p:blipFill>
-          <a:blip r:embed="rId5" cstate="print">
-            <a:extLst>
-              <a:ext uri="{28A0092B-C50C-407E-A947-70E740481C1C}">
-                <a14:useLocalDpi xmlns:a14="http://schemas.microsoft.com/office/drawing/2010/main" val="0"/>
-              </a:ext>
-            </a:extLst>
-          </a:blip>
-          <a:stretch>
-            <a:fillRect/>
-          </a:stretch>
-        </p:blipFill>
-        <p:spPr>
-          <a:xfrm rot="18290028">
-            <a:off x="9608668" y="4737886"/>
-            <a:ext cx="649117" cy="714029"/>
-          </a:xfrm>
-          <a:prstGeom prst="rect">
-            <a:avLst/>
-          </a:prstGeom>
-        </p:spPr>
-      </p:pic>
-      <p:sp>
-        <p:nvSpPr>
-          <p:cNvPr id="35" name="TextBox 34"/>
-          <p:cNvSpPr txBox="1"/>
-          <p:nvPr/>
-        </p:nvSpPr>
-        <p:spPr>
-          <a:xfrm>
-            <a:off x="789237" y="4557766"/>
-            <a:ext cx="2430482" cy="646331"/>
-          </a:xfrm>
-          <a:prstGeom prst="rect">
-            <a:avLst/>
-          </a:prstGeom>
-          <a:noFill/>
-          <a:ln>
-            <a:solidFill>
-              <a:schemeClr val="tx1"/>
-            </a:solidFill>
-          </a:ln>
-        </p:spPr>
-        <p:txBody>
-          <a:bodyPr wrap="square" rtlCol="0">
-            <a:spAutoFit/>
-          </a:bodyPr>
-          <a:lstStyle/>
-          <a:p>
-            <a:r>
-              <a:rPr lang="en-US" dirty="0" smtClean="0"/>
-              <a:t>Flight Computer</a:t>
-            </a:r>
-          </a:p>
-          <a:p>
-            <a:r>
-              <a:rPr lang="en-US" dirty="0"/>
-              <a:t> </a:t>
-            </a:r>
-            <a:r>
-              <a:rPr lang="en-US" dirty="0" smtClean="0"/>
-              <a:t> -Assemble packet</a:t>
-            </a:r>
-            <a:endParaRPr lang="en-US" dirty="0"/>
-          </a:p>
-        </p:txBody>
-      </p:sp>
-      <p:cxnSp>
-        <p:nvCxnSpPr>
-          <p:cNvPr id="37" name="Straight Arrow Connector 36"/>
-          <p:cNvCxnSpPr>
-            <a:stCxn id="35" idx="3"/>
-            <a:endCxn id="23" idx="1"/>
-          </p:cNvCxnSpPr>
-          <p:nvPr/>
-        </p:nvCxnSpPr>
-        <p:spPr>
-          <a:xfrm>
-            <a:off x="3219719" y="4880932"/>
-            <a:ext cx="958143" cy="136336"/>
-          </a:xfrm>
-          <a:prstGeom prst="straightConnector1">
-            <a:avLst/>
-          </a:prstGeom>
-          <a:ln>
-            <a:solidFill>
-              <a:schemeClr val="tx1"/>
-            </a:solidFill>
-            <a:tailEnd type="triangle"/>
-          </a:ln>
-        </p:spPr>
-        <p:style>
-          <a:lnRef idx="1">
-            <a:schemeClr val="accent1"/>
-          </a:lnRef>
-          <a:fillRef idx="0">
-            <a:schemeClr val="accent1"/>
-          </a:fillRef>
-          <a:effectRef idx="0">
-            <a:schemeClr val="accent1"/>
-          </a:effectRef>
-          <a:fontRef idx="minor">
-            <a:schemeClr val="tx1"/>
-          </a:fontRef>
-        </p:style>
-      </p:cxnSp>
-      <p:sp>
-        <p:nvSpPr>
-          <p:cNvPr id="44" name="TextBox 43"/>
-          <p:cNvSpPr txBox="1"/>
-          <p:nvPr/>
-        </p:nvSpPr>
-        <p:spPr>
-          <a:xfrm>
-            <a:off x="4451001" y="1646849"/>
-            <a:ext cx="1789386" cy="646331"/>
-          </a:xfrm>
-          <a:prstGeom prst="rect">
-            <a:avLst/>
-          </a:prstGeom>
-          <a:noFill/>
-          <a:ln>
-            <a:solidFill>
-              <a:schemeClr val="tx1"/>
-            </a:solidFill>
-          </a:ln>
-        </p:spPr>
-        <p:txBody>
-          <a:bodyPr wrap="square" rtlCol="0">
-            <a:spAutoFit/>
-          </a:bodyPr>
-          <a:lstStyle/>
-          <a:p>
-            <a:r>
-              <a:rPr lang="en-US" dirty="0" smtClean="0"/>
-              <a:t>Gamma Ray</a:t>
-            </a:r>
-            <a:r>
-              <a:rPr lang="en-US" dirty="0"/>
-              <a:t> </a:t>
-            </a:r>
-            <a:r>
-              <a:rPr lang="en-US" dirty="0" smtClean="0"/>
-              <a:t>Detector</a:t>
-            </a:r>
-          </a:p>
-        </p:txBody>
-      </p:sp>
-      <p:cxnSp>
-        <p:nvCxnSpPr>
-          <p:cNvPr id="46" name="Straight Arrow Connector 45"/>
-          <p:cNvCxnSpPr>
-            <a:stCxn id="44" idx="2"/>
-            <a:endCxn id="35" idx="0"/>
-          </p:cNvCxnSpPr>
-          <p:nvPr/>
-        </p:nvCxnSpPr>
-        <p:spPr>
-          <a:xfrm flipH="1">
-            <a:off x="2004478" y="2293180"/>
-            <a:ext cx="3341216" cy="2264586"/>
-          </a:xfrm>
-          <a:prstGeom prst="straightConnector1">
-            <a:avLst/>
-          </a:prstGeom>
-          <a:ln>
-            <a:solidFill>
-              <a:schemeClr val="tx1"/>
-            </a:solidFill>
-            <a:tailEnd type="none"/>
-          </a:ln>
-        </p:spPr>
-        <p:style>
-          <a:lnRef idx="1">
-            <a:schemeClr val="accent1"/>
-          </a:lnRef>
-          <a:fillRef idx="0">
-            <a:schemeClr val="accent1"/>
-          </a:fillRef>
-          <a:effectRef idx="0">
-            <a:schemeClr val="accent1"/>
-          </a:effectRef>
-          <a:fontRef idx="minor">
-            <a:schemeClr val="tx1"/>
-          </a:fontRef>
-        </p:style>
-      </p:cxnSp>
-      <p:pic>
-        <p:nvPicPr>
-          <p:cNvPr id="23" name="Picture 22"/>
-          <p:cNvPicPr>
-            <a:picLocks noChangeAspect="1"/>
-          </p:cNvPicPr>
-          <p:nvPr/>
-        </p:nvPicPr>
-        <p:blipFill>
-          <a:blip r:embed="rId6" cstate="print">
-            <a:extLst>
-              <a:ext uri="{28A0092B-C50C-407E-A947-70E740481C1C}">
-                <a14:useLocalDpi xmlns:a14="http://schemas.microsoft.com/office/drawing/2010/main" val="0"/>
-              </a:ext>
-            </a:extLst>
-          </a:blip>
-          <a:stretch>
-            <a:fillRect/>
-          </a:stretch>
-        </p:blipFill>
-        <p:spPr>
-          <a:xfrm>
-            <a:off x="4177862" y="4472243"/>
-            <a:ext cx="2196070" cy="1090049"/>
-          </a:xfrm>
-          <a:prstGeom prst="rect">
-            <a:avLst/>
-          </a:prstGeom>
-        </p:spPr>
-      </p:pic>
-      <p:sp>
-        <p:nvSpPr>
-          <p:cNvPr id="36" name="TextBox 35"/>
-          <p:cNvSpPr txBox="1"/>
-          <p:nvPr/>
-        </p:nvSpPr>
-        <p:spPr>
-          <a:xfrm>
-            <a:off x="540635" y="5735286"/>
-            <a:ext cx="3414425" cy="523220"/>
-          </a:xfrm>
-          <a:prstGeom prst="rect">
-            <a:avLst/>
-          </a:prstGeom>
-          <a:noFill/>
-        </p:spPr>
-        <p:txBody>
-          <a:bodyPr wrap="square" rtlCol="0">
-            <a:spAutoFit/>
-          </a:bodyPr>
-          <a:lstStyle/>
-          <a:p>
-            <a:r>
-              <a:rPr lang="en-US" sz="1400" dirty="0" smtClean="0"/>
-              <a:t>Cheaper approach if data packets are small enough</a:t>
-            </a:r>
-            <a:endParaRPr lang="en-US" sz="1400" dirty="0"/>
-          </a:p>
-        </p:txBody>
-      </p:sp>
-    </p:spTree>
-    <p:extLst>
-      <p:ext uri="{BB962C8B-B14F-4D97-AF65-F5344CB8AC3E}">
-        <p14:creationId xmlns:p14="http://schemas.microsoft.com/office/powerpoint/2010/main" val="122260840"/>
-      </p:ext>
-    </p:extLst>
-  </p:cSld>
-  <p:clrMapOvr>
-    <a:masterClrMapping/>
-  </p:clrMapOvr>
-  <p:timing>
-    <p:tnLst>
-      <p:par>
-        <p:cTn id="1" dur="indefinite" restart="never" nodeType="tmRoot"/>
-      </p:par>
-    </p:tnLst>
-  </p:timing>
-</p:sld>
-</file>
-
-<file path=ppt/slides/slide27.xml><?xml version="1.0" encoding="utf-8"?>
-<p:sld xmlns:a="http://schemas.openxmlformats.org/drawingml/2006/main" xmlns:r="http://schemas.openxmlformats.org/officeDocument/2006/relationships" xmlns:p="http://schemas.openxmlformats.org/presentationml/2006/main">
-  <p:cSld>
-    <p:spTree>
-      <p:nvGrpSpPr>
-        <p:cNvPr id="1" name=""/>
-        <p:cNvGrpSpPr/>
-        <p:nvPr/>
-      </p:nvGrpSpPr>
-      <p:grpSpPr>
-        <a:xfrm>
-          <a:off x="0" y="0"/>
-          <a:ext cx="0" cy="0"/>
-          <a:chOff x="0" y="0"/>
-          <a:chExt cx="0" cy="0"/>
-        </a:xfrm>
-      </p:grpSpPr>
-      <p:sp>
-        <p:nvSpPr>
-          <p:cNvPr id="2" name="Title 1"/>
-          <p:cNvSpPr>
-            <a:spLocks noGrp="1"/>
-          </p:cNvSpPr>
-          <p:nvPr>
-            <p:ph type="ctrTitle"/>
-          </p:nvPr>
-        </p:nvSpPr>
-        <p:spPr>
-          <a:xfrm>
-            <a:off x="787400" y="1460500"/>
-            <a:ext cx="10069513" cy="3329581"/>
-          </a:xfrm>
-        </p:spPr>
-        <p:txBody>
-          <a:bodyPr/>
-          <a:lstStyle/>
-          <a:p>
-            <a:r>
-              <a:rPr lang="en-US" dirty="0" smtClean="0"/>
-              <a:t>Power Management	</a:t>
-            </a:r>
-            <a:endParaRPr lang="en-US" dirty="0"/>
-          </a:p>
-        </p:txBody>
-      </p:sp>
-    </p:spTree>
-    <p:extLst>
-      <p:ext uri="{BB962C8B-B14F-4D97-AF65-F5344CB8AC3E}">
-        <p14:creationId xmlns:p14="http://schemas.microsoft.com/office/powerpoint/2010/main" val="1090892760"/>
-      </p:ext>
-    </p:extLst>
-  </p:cSld>
-  <p:clrMapOvr>
-    <a:masterClrMapping/>
-  </p:clrMapOvr>
-  <p:timing>
-    <p:tnLst>
-      <p:par>
-        <p:cTn id="1" dur="indefinite" restart="never" nodeType="tmRoot"/>
-      </p:par>
-    </p:tnLst>
-  </p:timing>
-</p:sld>
-</file>
-
-<file path=ppt/slides/slide28.xml><?xml version="1.0" encoding="utf-8"?>
-<p:sld xmlns:a="http://schemas.openxmlformats.org/drawingml/2006/main" xmlns:r="http://schemas.openxmlformats.org/officeDocument/2006/relationships" xmlns:p="http://schemas.openxmlformats.org/presentationml/2006/main">
-  <p:cSld>
-    <p:spTree>
-      <p:nvGrpSpPr>
-        <p:cNvPr id="1" name=""/>
-        <p:cNvGrpSpPr/>
-        <p:nvPr/>
-      </p:nvGrpSpPr>
-      <p:grpSpPr>
-        <a:xfrm>
-          <a:off x="0" y="0"/>
-          <a:ext cx="0" cy="0"/>
-          <a:chOff x="0" y="0"/>
-          <a:chExt cx="0" cy="0"/>
-        </a:xfrm>
-      </p:grpSpPr>
-      <p:sp>
-        <p:nvSpPr>
           <p:cNvPr id="4" name="Title 3"/>
           <p:cNvSpPr>
             <a:spLocks noGrp="1"/>
@@ -12414,7 +10657,7 @@
 </p:sld>
 </file>
 
-<file path=ppt/slides/slide29.xml><?xml version="1.0" encoding="utf-8"?>
+<file path=ppt/slides/slide24.xml><?xml version="1.0" encoding="utf-8"?>
 <p:sld xmlns:a="http://schemas.openxmlformats.org/drawingml/2006/main" xmlns:r="http://schemas.openxmlformats.org/officeDocument/2006/relationships" xmlns:p="http://schemas.openxmlformats.org/presentationml/2006/main">
   <p:cSld>
     <p:spTree>
@@ -12777,158 +11020,7 @@
 </p:sld>
 </file>
 
-<file path=ppt/slides/slide3.xml><?xml version="1.0" encoding="utf-8"?>
-<p:sld xmlns:a="http://schemas.openxmlformats.org/drawingml/2006/main" xmlns:r="http://schemas.openxmlformats.org/officeDocument/2006/relationships" xmlns:p="http://schemas.openxmlformats.org/presentationml/2006/main">
-  <p:cSld>
-    <p:spTree>
-      <p:nvGrpSpPr>
-        <p:cNvPr id="1" name=""/>
-        <p:cNvGrpSpPr/>
-        <p:nvPr/>
-      </p:nvGrpSpPr>
-      <p:grpSpPr>
-        <a:xfrm>
-          <a:off x="0" y="0"/>
-          <a:ext cx="0" cy="0"/>
-          <a:chOff x="0" y="0"/>
-          <a:chExt cx="0" cy="0"/>
-        </a:xfrm>
-      </p:grpSpPr>
-      <p:sp>
-        <p:nvSpPr>
-          <p:cNvPr id="4" name="Title 1"/>
-          <p:cNvSpPr>
-            <a:spLocks noGrp="1"/>
-          </p:cNvSpPr>
-          <p:nvPr>
-            <p:ph type="title"/>
-          </p:nvPr>
-        </p:nvSpPr>
-        <p:spPr>
-          <a:xfrm>
-            <a:off x="838200" y="365125"/>
-            <a:ext cx="10515600" cy="688975"/>
-          </a:xfrm>
-        </p:spPr>
-        <p:txBody>
-          <a:bodyPr>
-            <a:normAutofit fontScale="90000"/>
-          </a:bodyPr>
-          <a:lstStyle/>
-          <a:p>
-            <a:r>
-              <a:rPr lang="en-US" dirty="0" smtClean="0"/>
-              <a:t>Requirements</a:t>
-            </a:r>
-            <a:endParaRPr lang="en-US" dirty="0"/>
-          </a:p>
-        </p:txBody>
-      </p:sp>
-      <p:sp>
-        <p:nvSpPr>
-          <p:cNvPr id="3" name="Content Placeholder 2"/>
-          <p:cNvSpPr>
-            <a:spLocks noGrp="1"/>
-          </p:cNvSpPr>
-          <p:nvPr>
-            <p:ph idx="1"/>
-          </p:nvPr>
-        </p:nvSpPr>
-        <p:spPr>
-          <a:xfrm>
-            <a:off x="838200" y="939800"/>
-            <a:ext cx="10515600" cy="5237163"/>
-          </a:xfrm>
-        </p:spPr>
-        <p:txBody>
-          <a:bodyPr/>
-          <a:lstStyle/>
-          <a:p>
-            <a:pPr marL="0" indent="0">
-              <a:buNone/>
-            </a:pPr>
-            <a:endParaRPr lang="en-US" dirty="0"/>
-          </a:p>
-          <a:p>
-            <a:pPr lvl="1"/>
-            <a:endParaRPr lang="en-US" dirty="0" smtClean="0"/>
-          </a:p>
-          <a:p>
-            <a:pPr lvl="1"/>
-            <a:r>
-              <a:rPr lang="en-US" dirty="0" smtClean="0"/>
-              <a:t>The CubeSat shall determine and relay a relative position solution (i.e., relative to the formation) with an accuracy of 10 meters (1 standard deviation)</a:t>
-            </a:r>
-          </a:p>
-          <a:p>
-            <a:pPr lvl="1"/>
-            <a:endParaRPr lang="en-US" dirty="0" smtClean="0"/>
-          </a:p>
-          <a:p>
-            <a:pPr lvl="1"/>
-            <a:r>
-              <a:rPr lang="en-US" dirty="0" smtClean="0"/>
-              <a:t>The CubeSat shall determine and relay a </a:t>
-            </a:r>
-            <a:r>
-              <a:rPr lang="en-US" dirty="0"/>
-              <a:t>relative attitude solution with an accuracy of 10 </a:t>
-            </a:r>
-            <a:r>
-              <a:rPr lang="en-US" dirty="0" err="1" smtClean="0"/>
-              <a:t>mRad</a:t>
-            </a:r>
-            <a:r>
-              <a:rPr lang="en-US" dirty="0"/>
-              <a:t>.</a:t>
-            </a:r>
-          </a:p>
-          <a:p>
-            <a:pPr lvl="1"/>
-            <a:endParaRPr lang="en-US" dirty="0" smtClean="0"/>
-          </a:p>
-          <a:p>
-            <a:pPr lvl="1"/>
-            <a:r>
-              <a:rPr lang="en-US" dirty="0" smtClean="0"/>
-              <a:t>The CubeSat shall maintain a clock </a:t>
-            </a:r>
-            <a:r>
-              <a:rPr lang="en-US" dirty="0"/>
-              <a:t>offset or timing accuracy (relative to the formation) better than 10 µs.</a:t>
-            </a:r>
-          </a:p>
-          <a:p>
-            <a:pPr lvl="1"/>
-            <a:endParaRPr lang="en-US" dirty="0"/>
-          </a:p>
-          <a:p>
-            <a:pPr lvl="1"/>
-            <a:endParaRPr lang="en-US" dirty="0"/>
-          </a:p>
-        </p:txBody>
-      </p:sp>
-    </p:spTree>
-    <p:extLst>
-      <p:ext uri="{BB962C8B-B14F-4D97-AF65-F5344CB8AC3E}">
-        <p14:creationId xmlns:p14="http://schemas.microsoft.com/office/powerpoint/2010/main" val="1456631454"/>
-      </p:ext>
-    </p:extLst>
-  </p:cSld>
-  <p:clrMapOvr>
-    <a:masterClrMapping/>
-  </p:clrMapOvr>
-  <p:timing>
-    <p:tnLst>
-      <p:par>
-        <p:cTn id="1" dur="indefinite" restart="never" nodeType="tmRoot"/>
-      </p:par>
-    </p:tnLst>
-  </p:timing>
-</p:sld>
-</file>
-
-<file path=ppt/slides/slide30.xml><?xml version="1.0" encoding="utf-8"?>
+<file path=ppt/slides/slide25.xml><?xml version="1.0" encoding="utf-8"?>
 <p:sld xmlns:a="http://schemas.openxmlformats.org/drawingml/2006/main" xmlns:r="http://schemas.openxmlformats.org/officeDocument/2006/relationships" xmlns:p="http://schemas.openxmlformats.org/presentationml/2006/main">
   <p:cSld>
     <p:spTree>
@@ -13395,7 +11487,7 @@
 </p:sld>
 </file>
 
-<file path=ppt/slides/slide31.xml><?xml version="1.0" encoding="utf-8"?>
+<file path=ppt/slides/slide26.xml><?xml version="1.0" encoding="utf-8"?>
 <p:sld xmlns:a="http://schemas.openxmlformats.org/drawingml/2006/main" xmlns:r="http://schemas.openxmlformats.org/officeDocument/2006/relationships" xmlns:p="http://schemas.openxmlformats.org/presentationml/2006/main">
   <p:cSld>
     <p:spTree>
@@ -13788,6 +11880,157 @@
     <p:extLst>
       <p:ext uri="{BB962C8B-B14F-4D97-AF65-F5344CB8AC3E}">
         <p14:creationId xmlns:p14="http://schemas.microsoft.com/office/powerpoint/2010/main" val="767162753"/>
+      </p:ext>
+    </p:extLst>
+  </p:cSld>
+  <p:clrMapOvr>
+    <a:masterClrMapping/>
+  </p:clrMapOvr>
+  <p:timing>
+    <p:tnLst>
+      <p:par>
+        <p:cTn id="1" dur="indefinite" restart="never" nodeType="tmRoot"/>
+      </p:par>
+    </p:tnLst>
+  </p:timing>
+</p:sld>
+</file>
+
+<file path=ppt/slides/slide3.xml><?xml version="1.0" encoding="utf-8"?>
+<p:sld xmlns:a="http://schemas.openxmlformats.org/drawingml/2006/main" xmlns:r="http://schemas.openxmlformats.org/officeDocument/2006/relationships" xmlns:p="http://schemas.openxmlformats.org/presentationml/2006/main">
+  <p:cSld>
+    <p:spTree>
+      <p:nvGrpSpPr>
+        <p:cNvPr id="1" name=""/>
+        <p:cNvGrpSpPr/>
+        <p:nvPr/>
+      </p:nvGrpSpPr>
+      <p:grpSpPr>
+        <a:xfrm>
+          <a:off x="0" y="0"/>
+          <a:ext cx="0" cy="0"/>
+          <a:chOff x="0" y="0"/>
+          <a:chExt cx="0" cy="0"/>
+        </a:xfrm>
+      </p:grpSpPr>
+      <p:sp>
+        <p:nvSpPr>
+          <p:cNvPr id="4" name="Title 1"/>
+          <p:cNvSpPr>
+            <a:spLocks noGrp="1"/>
+          </p:cNvSpPr>
+          <p:nvPr>
+            <p:ph type="title"/>
+          </p:nvPr>
+        </p:nvSpPr>
+        <p:spPr>
+          <a:xfrm>
+            <a:off x="838200" y="365125"/>
+            <a:ext cx="10515600" cy="688975"/>
+          </a:xfrm>
+        </p:spPr>
+        <p:txBody>
+          <a:bodyPr>
+            <a:normAutofit fontScale="90000"/>
+          </a:bodyPr>
+          <a:lstStyle/>
+          <a:p>
+            <a:r>
+              <a:rPr lang="en-US" dirty="0" smtClean="0"/>
+              <a:t>Requirements</a:t>
+            </a:r>
+            <a:endParaRPr lang="en-US" dirty="0"/>
+          </a:p>
+        </p:txBody>
+      </p:sp>
+      <p:sp>
+        <p:nvSpPr>
+          <p:cNvPr id="3" name="Content Placeholder 2"/>
+          <p:cNvSpPr>
+            <a:spLocks noGrp="1"/>
+          </p:cNvSpPr>
+          <p:nvPr>
+            <p:ph idx="1"/>
+          </p:nvPr>
+        </p:nvSpPr>
+        <p:spPr>
+          <a:xfrm>
+            <a:off x="838200" y="939800"/>
+            <a:ext cx="10515600" cy="5237163"/>
+          </a:xfrm>
+        </p:spPr>
+        <p:txBody>
+          <a:bodyPr/>
+          <a:lstStyle/>
+          <a:p>
+            <a:pPr marL="0" indent="0">
+              <a:buNone/>
+            </a:pPr>
+            <a:endParaRPr lang="en-US" dirty="0"/>
+          </a:p>
+          <a:p>
+            <a:pPr lvl="1"/>
+            <a:endParaRPr lang="en-US" dirty="0" smtClean="0"/>
+          </a:p>
+          <a:p>
+            <a:pPr lvl="1"/>
+            <a:r>
+              <a:rPr lang="en-US" dirty="0" smtClean="0"/>
+              <a:t>The CubeSat shall determine and relay a relative position solution (i.e., relative to the formation) with an accuracy of 10 meters (1 standard deviation)</a:t>
+            </a:r>
+          </a:p>
+          <a:p>
+            <a:pPr lvl="1"/>
+            <a:endParaRPr lang="en-US" dirty="0" smtClean="0"/>
+          </a:p>
+          <a:p>
+            <a:pPr lvl="1"/>
+            <a:r>
+              <a:rPr lang="en-US" dirty="0" smtClean="0"/>
+              <a:t>The CubeSat shall determine and relay a </a:t>
+            </a:r>
+            <a:r>
+              <a:rPr lang="en-US" dirty="0"/>
+              <a:t>relative attitude solution with an accuracy of 10 </a:t>
+            </a:r>
+            <a:r>
+              <a:rPr lang="en-US" dirty="0" err="1" smtClean="0"/>
+              <a:t>mRad</a:t>
+            </a:r>
+            <a:r>
+              <a:rPr lang="en-US" dirty="0"/>
+              <a:t>.</a:t>
+            </a:r>
+          </a:p>
+          <a:p>
+            <a:pPr lvl="1"/>
+            <a:endParaRPr lang="en-US" dirty="0" smtClean="0"/>
+          </a:p>
+          <a:p>
+            <a:pPr lvl="1"/>
+            <a:r>
+              <a:rPr lang="en-US" dirty="0" smtClean="0"/>
+              <a:t>The CubeSat shall maintain a clock </a:t>
+            </a:r>
+            <a:r>
+              <a:rPr lang="en-US" dirty="0"/>
+              <a:t>offset or timing accuracy (relative to the formation) better than 10 µs.</a:t>
+            </a:r>
+          </a:p>
+          <a:p>
+            <a:pPr lvl="1"/>
+            <a:endParaRPr lang="en-US" dirty="0"/>
+          </a:p>
+          <a:p>
+            <a:pPr lvl="1"/>
+            <a:endParaRPr lang="en-US" dirty="0"/>
+          </a:p>
+        </p:txBody>
+      </p:sp>
+    </p:spTree>
+    <p:extLst>
+      <p:ext uri="{BB962C8B-B14F-4D97-AF65-F5344CB8AC3E}">
+        <p14:creationId xmlns:p14="http://schemas.microsoft.com/office/powerpoint/2010/main" val="1456631454"/>
       </p:ext>
     </p:extLst>
   </p:cSld>
@@ -15492,7 +13735,7 @@
   <a:extraClrSchemeLst/>
   <a:extLst>
     <a:ext uri="{05A4C25C-085E-4340-85A3-A5531E510DB2}">
-      <thm15:themeFamily xmlns:thm15="http://schemas.microsoft.com/office/thememl/2012/main" xmlns="" name="Ion" id="{B8441ADB-2E43-4AF7-B97A-BD870242C6A8}" vid="{292E63A9-BB86-4E3D-B92A-7223C6510D2E}"/>
+      <thm15:themeFamily xmlns="" xmlns:thm15="http://schemas.microsoft.com/office/thememl/2012/main" name="Ion" id="{B8441ADB-2E43-4AF7-B97A-BD870242C6A8}" vid="{292E63A9-BB86-4E3D-B92A-7223C6510D2E}"/>
     </a:ext>
   </a:extLst>
 </a:theme>
@@ -15753,7 +13996,7 @@
   <a:extraClrSchemeLst/>
   <a:extLst>
     <a:ext uri="{05A4C25C-085E-4340-85A3-A5531E510DB2}">
-      <thm15:themeFamily xmlns:thm15="http://schemas.microsoft.com/office/thememl/2012/main" xmlns="" name="Office Theme" id="{62F939B6-93AF-4DB8-9C6B-D6C7DFDC589F}" vid="{4A3C46E8-61CC-4603-A589-7422A47A8E4A}"/>
+      <thm15:themeFamily xmlns="" xmlns:thm15="http://schemas.microsoft.com/office/thememl/2012/main" name="Office Theme" id="{62F939B6-93AF-4DB8-9C6B-D6C7DFDC589F}" vid="{4A3C46E8-61CC-4603-A589-7422A47A8E4A}"/>
     </a:ext>
   </a:extLst>
 </a:theme>

</xml_diff>

<commit_message>
No changes made to the file posted yesterday
</commit_message>
<xml_diff>
--- a/Presentations/PDR_Presentation.pptx
+++ b/Presentations/PDR_Presentation.pptx
@@ -133,7 +133,7 @@
   </p:defaultTextStyle>
   <p:extLst>
     <p:ext uri="{EFAFB233-063F-42B5-8137-9DF3F51BA10A}">
-      <p15:sldGuideLst xmlns="" xmlns:p15="http://schemas.microsoft.com/office/powerpoint/2012/main"/>
+      <p15:sldGuideLst xmlns:p15="http://schemas.microsoft.com/office/powerpoint/2012/main" xmlns=""/>
     </p:ext>
   </p:extLst>
 </p:presentation>
@@ -221,7 +221,7 @@
           <a:p>
             <a:fld id="{90D58D52-5CD9-4A4B-90F0-A7AB4F899008}" type="datetimeFigureOut">
               <a:rPr lang="en-US" smtClean="0"/>
-              <a:t>10/7/15</a:t>
+              <a:t>10/8/15</a:t>
             </a:fld>
             <a:endParaRPr lang="en-US"/>
           </a:p>
@@ -1051,7 +1051,7 @@
           <a:p>
             <a:fld id="{E20D963B-2D4F-495B-A2B5-E46053ACE7DA}" type="datetimeFigureOut">
               <a:rPr lang="en-US" smtClean="0"/>
-              <a:t>10/7/15</a:t>
+              <a:t>10/8/15</a:t>
             </a:fld>
             <a:endParaRPr lang="en-US"/>
           </a:p>
@@ -1326,7 +1326,7 @@
           <a:p>
             <a:fld id="{E20D963B-2D4F-495B-A2B5-E46053ACE7DA}" type="datetimeFigureOut">
               <a:rPr lang="en-US" smtClean="0"/>
-              <a:t>10/7/15</a:t>
+              <a:t>10/8/15</a:t>
             </a:fld>
             <a:endParaRPr lang="en-US"/>
           </a:p>
@@ -1520,7 +1520,7 @@
           <a:p>
             <a:fld id="{E20D963B-2D4F-495B-A2B5-E46053ACE7DA}" type="datetimeFigureOut">
               <a:rPr lang="en-US" smtClean="0"/>
-              <a:t>10/7/15</a:t>
+              <a:t>10/8/15</a:t>
             </a:fld>
             <a:endParaRPr lang="en-US"/>
           </a:p>
@@ -1793,7 +1793,7 @@
           <a:p>
             <a:fld id="{E20D963B-2D4F-495B-A2B5-E46053ACE7DA}" type="datetimeFigureOut">
               <a:rPr lang="en-US" smtClean="0"/>
-              <a:t>10/7/15</a:t>
+              <a:t>10/8/15</a:t>
             </a:fld>
             <a:endParaRPr lang="en-US"/>
           </a:p>
@@ -2134,7 +2134,7 @@
           <a:p>
             <a:fld id="{E20D963B-2D4F-495B-A2B5-E46053ACE7DA}" type="datetimeFigureOut">
               <a:rPr lang="en-US" smtClean="0"/>
-              <a:t>10/7/15</a:t>
+              <a:t>10/8/15</a:t>
             </a:fld>
             <a:endParaRPr lang="en-US"/>
           </a:p>
@@ -2757,7 +2757,7 @@
           <a:p>
             <a:fld id="{E20D963B-2D4F-495B-A2B5-E46053ACE7DA}" type="datetimeFigureOut">
               <a:rPr lang="en-US" smtClean="0"/>
-              <a:t>10/7/15</a:t>
+              <a:t>10/8/15</a:t>
             </a:fld>
             <a:endParaRPr lang="en-US"/>
           </a:p>
@@ -3617,7 +3617,7 @@
           <a:p>
             <a:fld id="{E20D963B-2D4F-495B-A2B5-E46053ACE7DA}" type="datetimeFigureOut">
               <a:rPr lang="en-US" smtClean="0"/>
-              <a:t>10/7/15</a:t>
+              <a:t>10/8/15</a:t>
             </a:fld>
             <a:endParaRPr lang="en-US"/>
           </a:p>
@@ -3787,7 +3787,7 @@
           <a:p>
             <a:fld id="{E20D963B-2D4F-495B-A2B5-E46053ACE7DA}" type="datetimeFigureOut">
               <a:rPr lang="en-US" smtClean="0"/>
-              <a:t>10/7/15</a:t>
+              <a:t>10/8/15</a:t>
             </a:fld>
             <a:endParaRPr lang="en-US"/>
           </a:p>
@@ -3967,7 +3967,7 @@
           <a:p>
             <a:fld id="{E20D963B-2D4F-495B-A2B5-E46053ACE7DA}" type="datetimeFigureOut">
               <a:rPr lang="en-US" smtClean="0"/>
-              <a:t>10/7/15</a:t>
+              <a:t>10/8/15</a:t>
             </a:fld>
             <a:endParaRPr lang="en-US"/>
           </a:p>
@@ -4137,7 +4137,7 @@
           <a:p>
             <a:fld id="{E20D963B-2D4F-495B-A2B5-E46053ACE7DA}" type="datetimeFigureOut">
               <a:rPr lang="en-US" smtClean="0"/>
-              <a:t>10/7/15</a:t>
+              <a:t>10/8/15</a:t>
             </a:fld>
             <a:endParaRPr lang="en-US"/>
           </a:p>
@@ -4384,7 +4384,7 @@
           <a:p>
             <a:fld id="{E20D963B-2D4F-495B-A2B5-E46053ACE7DA}" type="datetimeFigureOut">
               <a:rPr lang="en-US" smtClean="0"/>
-              <a:t>10/7/15</a:t>
+              <a:t>10/8/15</a:t>
             </a:fld>
             <a:endParaRPr lang="en-US"/>
           </a:p>
@@ -4676,7 +4676,7 @@
           <a:p>
             <a:fld id="{E20D963B-2D4F-495B-A2B5-E46053ACE7DA}" type="datetimeFigureOut">
               <a:rPr lang="en-US" smtClean="0"/>
-              <a:t>10/7/15</a:t>
+              <a:t>10/8/15</a:t>
             </a:fld>
             <a:endParaRPr lang="en-US"/>
           </a:p>
@@ -5120,7 +5120,7 @@
           <a:p>
             <a:fld id="{E20D963B-2D4F-495B-A2B5-E46053ACE7DA}" type="datetimeFigureOut">
               <a:rPr lang="en-US" smtClean="0"/>
-              <a:t>10/7/15</a:t>
+              <a:t>10/8/15</a:t>
             </a:fld>
             <a:endParaRPr lang="en-US"/>
           </a:p>
@@ -5238,7 +5238,7 @@
           <a:p>
             <a:fld id="{E20D963B-2D4F-495B-A2B5-E46053ACE7DA}" type="datetimeFigureOut">
               <a:rPr lang="en-US" smtClean="0"/>
-              <a:t>10/7/15</a:t>
+              <a:t>10/8/15</a:t>
             </a:fld>
             <a:endParaRPr lang="en-US"/>
           </a:p>
@@ -5333,7 +5333,7 @@
           <a:p>
             <a:fld id="{E20D963B-2D4F-495B-A2B5-E46053ACE7DA}" type="datetimeFigureOut">
               <a:rPr lang="en-US" smtClean="0"/>
-              <a:t>10/7/15</a:t>
+              <a:t>10/8/15</a:t>
             </a:fld>
             <a:endParaRPr lang="en-US"/>
           </a:p>
@@ -5612,7 +5612,7 @@
           <a:p>
             <a:fld id="{E20D963B-2D4F-495B-A2B5-E46053ACE7DA}" type="datetimeFigureOut">
               <a:rPr lang="en-US" smtClean="0"/>
-              <a:t>10/7/15</a:t>
+              <a:t>10/8/15</a:t>
             </a:fld>
             <a:endParaRPr lang="en-US"/>
           </a:p>
@@ -5887,7 +5887,7 @@
           <a:p>
             <a:fld id="{E20D963B-2D4F-495B-A2B5-E46053ACE7DA}" type="datetimeFigureOut">
               <a:rPr lang="en-US" smtClean="0"/>
-              <a:t>10/7/15</a:t>
+              <a:t>10/8/15</a:t>
             </a:fld>
             <a:endParaRPr lang="en-US"/>
           </a:p>
@@ -6316,7 +6316,7 @@
           <a:p>
             <a:fld id="{E20D963B-2D4F-495B-A2B5-E46053ACE7DA}" type="datetimeFigureOut">
               <a:rPr lang="en-US" smtClean="0"/>
-              <a:t>10/7/15</a:t>
+              <a:t>10/8/15</a:t>
             </a:fld>
             <a:endParaRPr lang="en-US"/>
           </a:p>
@@ -10278,7 +10278,6 @@
                         <a:rPr lang="en-US" sz="1800" dirty="0" smtClean="0"/>
                         <a:t>500mW</a:t>
                       </a:r>
-                      <a:endParaRPr lang="en-US" sz="1800" dirty="0" smtClean="0"/>
                     </a:p>
                   </a:txBody>
                   <a:tcPr/>
@@ -10291,11 +10290,7 @@
                       <a:pPr algn="ctr"/>
                       <a:r>
                         <a:rPr lang="en-US" dirty="0" smtClean="0"/>
-                        <a:t>Radio: </a:t>
-                      </a:r>
-                      <a:r>
-                        <a:rPr lang="en-US" dirty="0" smtClean="0"/>
-                        <a:t>1W</a:t>
+                        <a:t>Radio: 1W</a:t>
                       </a:r>
                     </a:p>
                     <a:p>
@@ -10329,7 +10324,6 @@
                         <a:rPr lang="en-US" dirty="0" smtClean="0"/>
                         <a:t>36mW</a:t>
                       </a:r>
-                      <a:endParaRPr lang="en-US" dirty="0" smtClean="0"/>
                     </a:p>
                   </a:txBody>
                   <a:tcPr/>
@@ -10428,11 +10422,7 @@
                       <a:pPr algn="ctr"/>
                       <a:r>
                         <a:rPr lang="en-US" dirty="0" smtClean="0"/>
-                        <a:t>Radio: &lt;</a:t>
-                      </a:r>
-                      <a:r>
-                        <a:rPr lang="en-US" dirty="0" smtClean="0"/>
-                        <a:t>1W</a:t>
+                        <a:t>Radio: &lt;1W</a:t>
                       </a:r>
                     </a:p>
                     <a:p>
@@ -10454,11 +10444,7 @@
                       <a:pPr algn="ctr"/>
                       <a:r>
                         <a:rPr lang="en-US" dirty="0" smtClean="0"/>
-                        <a:t>GPS: </a:t>
-                      </a:r>
-                      <a:r>
-                        <a:rPr lang="en-US" dirty="0" smtClean="0"/>
-                        <a:t>1.2W</a:t>
+                        <a:t>GPS: 1.2W</a:t>
                       </a:r>
                     </a:p>
                     <a:p>
@@ -10467,7 +10453,6 @@
                         <a:rPr lang="en-US" sz="1800" dirty="0" smtClean="0"/>
                         <a:t>SSBV sun sensor: 50mW</a:t>
                       </a:r>
-                      <a:endParaRPr lang="en-US" sz="1800" dirty="0" smtClean="0"/>
                     </a:p>
                     <a:p>
                       <a:pPr algn="ctr"/>
@@ -10666,11 +10651,7 @@
             <a:pPr lvl="1"/>
             <a:r>
               <a:rPr lang="en-US" dirty="0" smtClean="0"/>
-              <a:t>Power Management </a:t>
-            </a:r>
-            <a:r>
-              <a:rPr lang="en-US" dirty="0" smtClean="0"/>
-              <a:t>Board</a:t>
+              <a:t>Power Management Board</a:t>
             </a:r>
           </a:p>
           <a:p>
@@ -10679,7 +10660,6 @@
               <a:rPr lang="en-US" dirty="0" smtClean="0"/>
               <a:t>Solar Cells (for conversion)</a:t>
             </a:r>
-            <a:endParaRPr lang="en-US" dirty="0" smtClean="0"/>
           </a:p>
           <a:p>
             <a:r>
@@ -13309,7 +13289,7 @@
   <a:extraClrSchemeLst/>
   <a:extLst>
     <a:ext uri="{05A4C25C-085E-4340-85A3-A5531E510DB2}">
-      <thm15:themeFamily xmlns="" xmlns:thm15="http://schemas.microsoft.com/office/thememl/2012/main" name="Ion" id="{B8441ADB-2E43-4AF7-B97A-BD870242C6A8}" vid="{292E63A9-BB86-4E3D-B92A-7223C6510D2E}"/>
+      <thm15:themeFamily xmlns:thm15="http://schemas.microsoft.com/office/thememl/2012/main" xmlns="" name="Ion" id="{B8441ADB-2E43-4AF7-B97A-BD870242C6A8}" vid="{292E63A9-BB86-4E3D-B92A-7223C6510D2E}"/>
     </a:ext>
   </a:extLst>
 </a:theme>
@@ -13570,7 +13550,7 @@
   <a:extraClrSchemeLst/>
   <a:extLst>
     <a:ext uri="{05A4C25C-085E-4340-85A3-A5531E510DB2}">
-      <thm15:themeFamily xmlns="" xmlns:thm15="http://schemas.microsoft.com/office/thememl/2012/main" name="Office Theme" id="{62F939B6-93AF-4DB8-9C6B-D6C7DFDC589F}" vid="{4A3C46E8-61CC-4603-A589-7422A47A8E4A}"/>
+      <thm15:themeFamily xmlns:thm15="http://schemas.microsoft.com/office/thememl/2012/main" xmlns="" name="Office Theme" id="{62F939B6-93AF-4DB8-9C6B-D6C7DFDC589F}" vid="{4A3C46E8-61CC-4603-A589-7422A47A8E4A}"/>
     </a:ext>
   </a:extLst>
 </a:theme>

</xml_diff>

<commit_message>
Revised with Nick J and Ethan A
</commit_message>
<xml_diff>
--- a/Presentations/PDR_Presentation.pptx
+++ b/Presentations/PDR_Presentation.pptx
@@ -134,7 +134,18 @@
   </p:defaultTextStyle>
   <p:extLst>
     <p:ext uri="{EFAFB233-063F-42B5-8137-9DF3F51BA10A}">
-      <p15:sldGuideLst xmlns="" xmlns:p15="http://schemas.microsoft.com/office/powerpoint/2012/main"/>
+      <p15:sldGuideLst xmlns:p15="http://schemas.microsoft.com/office/powerpoint/2012/main">
+        <p15:guide id="1" orient="horz" pos="2160">
+          <p15:clr>
+            <a:srgbClr val="A4A3A4"/>
+          </p15:clr>
+        </p15:guide>
+        <p15:guide id="2" pos="3840">
+          <p15:clr>
+            <a:srgbClr val="A4A3A4"/>
+          </p15:clr>
+        </p15:guide>
+      </p15:sldGuideLst>
     </p:ext>
   </p:extLst>
 </p:presentation>
@@ -222,7 +233,7 @@
           <a:p>
             <a:fld id="{90D58D52-5CD9-4A4B-90F0-A7AB4F899008}" type="datetimeFigureOut">
               <a:rPr lang="en-US" smtClean="0"/>
-              <a:t>10/9/15</a:t>
+              <a:t>10/9/2015</a:t>
             </a:fld>
             <a:endParaRPr lang="en-US"/>
           </a:p>
@@ -1052,7 +1063,7 @@
           <a:p>
             <a:fld id="{E20D963B-2D4F-495B-A2B5-E46053ACE7DA}" type="datetimeFigureOut">
               <a:rPr lang="en-US" smtClean="0"/>
-              <a:t>10/9/15</a:t>
+              <a:t>10/9/2015</a:t>
             </a:fld>
             <a:endParaRPr lang="en-US"/>
           </a:p>
@@ -1327,7 +1338,7 @@
           <a:p>
             <a:fld id="{E20D963B-2D4F-495B-A2B5-E46053ACE7DA}" type="datetimeFigureOut">
               <a:rPr lang="en-US" smtClean="0"/>
-              <a:t>10/9/15</a:t>
+              <a:t>10/9/2015</a:t>
             </a:fld>
             <a:endParaRPr lang="en-US"/>
           </a:p>
@@ -1521,7 +1532,7 @@
           <a:p>
             <a:fld id="{E20D963B-2D4F-495B-A2B5-E46053ACE7DA}" type="datetimeFigureOut">
               <a:rPr lang="en-US" smtClean="0"/>
-              <a:t>10/9/15</a:t>
+              <a:t>10/9/2015</a:t>
             </a:fld>
             <a:endParaRPr lang="en-US"/>
           </a:p>
@@ -1794,7 +1805,7 @@
           <a:p>
             <a:fld id="{E20D963B-2D4F-495B-A2B5-E46053ACE7DA}" type="datetimeFigureOut">
               <a:rPr lang="en-US" smtClean="0"/>
-              <a:t>10/9/15</a:t>
+              <a:t>10/9/2015</a:t>
             </a:fld>
             <a:endParaRPr lang="en-US"/>
           </a:p>
@@ -2135,7 +2146,7 @@
           <a:p>
             <a:fld id="{E20D963B-2D4F-495B-A2B5-E46053ACE7DA}" type="datetimeFigureOut">
               <a:rPr lang="en-US" smtClean="0"/>
-              <a:t>10/9/15</a:t>
+              <a:t>10/9/2015</a:t>
             </a:fld>
             <a:endParaRPr lang="en-US"/>
           </a:p>
@@ -2758,7 +2769,7 @@
           <a:p>
             <a:fld id="{E20D963B-2D4F-495B-A2B5-E46053ACE7DA}" type="datetimeFigureOut">
               <a:rPr lang="en-US" smtClean="0"/>
-              <a:t>10/9/15</a:t>
+              <a:t>10/9/2015</a:t>
             </a:fld>
             <a:endParaRPr lang="en-US"/>
           </a:p>
@@ -3618,7 +3629,7 @@
           <a:p>
             <a:fld id="{E20D963B-2D4F-495B-A2B5-E46053ACE7DA}" type="datetimeFigureOut">
               <a:rPr lang="en-US" smtClean="0"/>
-              <a:t>10/9/15</a:t>
+              <a:t>10/9/2015</a:t>
             </a:fld>
             <a:endParaRPr lang="en-US"/>
           </a:p>
@@ -3788,7 +3799,7 @@
           <a:p>
             <a:fld id="{E20D963B-2D4F-495B-A2B5-E46053ACE7DA}" type="datetimeFigureOut">
               <a:rPr lang="en-US" smtClean="0"/>
-              <a:t>10/9/15</a:t>
+              <a:t>10/9/2015</a:t>
             </a:fld>
             <a:endParaRPr lang="en-US"/>
           </a:p>
@@ -3968,7 +3979,7 @@
           <a:p>
             <a:fld id="{E20D963B-2D4F-495B-A2B5-E46053ACE7DA}" type="datetimeFigureOut">
               <a:rPr lang="en-US" smtClean="0"/>
-              <a:t>10/9/15</a:t>
+              <a:t>10/9/2015</a:t>
             </a:fld>
             <a:endParaRPr lang="en-US"/>
           </a:p>
@@ -4138,7 +4149,7 @@
           <a:p>
             <a:fld id="{E20D963B-2D4F-495B-A2B5-E46053ACE7DA}" type="datetimeFigureOut">
               <a:rPr lang="en-US" smtClean="0"/>
-              <a:t>10/9/15</a:t>
+              <a:t>10/9/2015</a:t>
             </a:fld>
             <a:endParaRPr lang="en-US"/>
           </a:p>
@@ -4385,7 +4396,7 @@
           <a:p>
             <a:fld id="{E20D963B-2D4F-495B-A2B5-E46053ACE7DA}" type="datetimeFigureOut">
               <a:rPr lang="en-US" smtClean="0"/>
-              <a:t>10/9/15</a:t>
+              <a:t>10/9/2015</a:t>
             </a:fld>
             <a:endParaRPr lang="en-US"/>
           </a:p>
@@ -4677,7 +4688,7 @@
           <a:p>
             <a:fld id="{E20D963B-2D4F-495B-A2B5-E46053ACE7DA}" type="datetimeFigureOut">
               <a:rPr lang="en-US" smtClean="0"/>
-              <a:t>10/9/15</a:t>
+              <a:t>10/9/2015</a:t>
             </a:fld>
             <a:endParaRPr lang="en-US"/>
           </a:p>
@@ -5121,7 +5132,7 @@
           <a:p>
             <a:fld id="{E20D963B-2D4F-495B-A2B5-E46053ACE7DA}" type="datetimeFigureOut">
               <a:rPr lang="en-US" smtClean="0"/>
-              <a:t>10/9/15</a:t>
+              <a:t>10/9/2015</a:t>
             </a:fld>
             <a:endParaRPr lang="en-US"/>
           </a:p>
@@ -5239,7 +5250,7 @@
           <a:p>
             <a:fld id="{E20D963B-2D4F-495B-A2B5-E46053ACE7DA}" type="datetimeFigureOut">
               <a:rPr lang="en-US" smtClean="0"/>
-              <a:t>10/9/15</a:t>
+              <a:t>10/9/2015</a:t>
             </a:fld>
             <a:endParaRPr lang="en-US"/>
           </a:p>
@@ -5334,7 +5345,7 @@
           <a:p>
             <a:fld id="{E20D963B-2D4F-495B-A2B5-E46053ACE7DA}" type="datetimeFigureOut">
               <a:rPr lang="en-US" smtClean="0"/>
-              <a:t>10/9/15</a:t>
+              <a:t>10/9/2015</a:t>
             </a:fld>
             <a:endParaRPr lang="en-US"/>
           </a:p>
@@ -5613,7 +5624,7 @@
           <a:p>
             <a:fld id="{E20D963B-2D4F-495B-A2B5-E46053ACE7DA}" type="datetimeFigureOut">
               <a:rPr lang="en-US" smtClean="0"/>
-              <a:t>10/9/15</a:t>
+              <a:t>10/9/2015</a:t>
             </a:fld>
             <a:endParaRPr lang="en-US"/>
           </a:p>
@@ -5888,7 +5899,7 @@
           <a:p>
             <a:fld id="{E20D963B-2D4F-495B-A2B5-E46053ACE7DA}" type="datetimeFigureOut">
               <a:rPr lang="en-US" smtClean="0"/>
-              <a:t>10/9/15</a:t>
+              <a:t>10/9/2015</a:t>
             </a:fld>
             <a:endParaRPr lang="en-US"/>
           </a:p>
@@ -6317,7 +6328,7 @@
           <a:p>
             <a:fld id="{E20D963B-2D4F-495B-A2B5-E46053ACE7DA}" type="datetimeFigureOut">
               <a:rPr lang="en-US" smtClean="0"/>
-              <a:t>10/9/15</a:t>
+              <a:t>10/9/2015</a:t>
             </a:fld>
             <a:endParaRPr lang="en-US"/>
           </a:p>
@@ -6930,7 +6941,7 @@
   <p:timing>
     <p:tnLst>
       <p:par>
-        <p:cTn xmlns:p14="http://schemas.microsoft.com/office/powerpoint/2010/main" id="1" dur="indefinite" restart="never" nodeType="tmRoot"/>
+        <p:cTn id="1" dur="indefinite" restart="never" nodeType="tmRoot"/>
       </p:par>
     </p:tnLst>
   </p:timing>
@@ -6990,7 +7001,7 @@
   <p:timing>
     <p:tnLst>
       <p:par>
-        <p:cTn xmlns:p14="http://schemas.microsoft.com/office/powerpoint/2010/main" id="1" dur="indefinite" restart="never" nodeType="tmRoot"/>
+        <p:cTn id="1" dur="indefinite" restart="never" nodeType="tmRoot"/>
       </p:par>
     </p:tnLst>
   </p:timing>
@@ -7189,6 +7200,13 @@
   <p:clrMapOvr>
     <a:masterClrMapping/>
   </p:clrMapOvr>
+  <p:timing>
+    <p:tnLst>
+      <p:par>
+        <p:cTn id="1" dur="indefinite" restart="never" nodeType="tmRoot"/>
+      </p:par>
+    </p:tnLst>
+  </p:timing>
 </p:sld>
 </file>
 
@@ -7285,6 +7303,13 @@
   <p:clrMapOvr>
     <a:masterClrMapping/>
   </p:clrMapOvr>
+  <p:timing>
+    <p:tnLst>
+      <p:par>
+        <p:cTn id="1" dur="indefinite" restart="never" nodeType="tmRoot"/>
+      </p:par>
+    </p:tnLst>
+  </p:timing>
 </p:sld>
 </file>
 
@@ -7345,7 +7370,7 @@
         </p:nvGraphicFramePr>
         <p:xfrm>
           <a:off x="1103313" y="2504660"/>
-          <a:ext cx="9542266" cy="3725016"/>
+          <a:ext cx="9542266" cy="3725017"/>
         </p:xfrm>
         <a:graphic>
           <a:graphicData uri="http://schemas.openxmlformats.org/drawingml/2006/table">
@@ -7837,6 +7862,13 @@
   <p:clrMapOvr>
     <a:masterClrMapping/>
   </p:clrMapOvr>
+  <p:timing>
+    <p:tnLst>
+      <p:par>
+        <p:cTn id="1" dur="indefinite" restart="never" nodeType="tmRoot"/>
+      </p:par>
+    </p:tnLst>
+  </p:timing>
 </p:sld>
 </file>
 
@@ -7893,7 +7925,7 @@
   <p:timing>
     <p:tnLst>
       <p:par>
-        <p:cTn xmlns:p14="http://schemas.microsoft.com/office/powerpoint/2010/main" id="1" dur="indefinite" restart="never" nodeType="tmRoot"/>
+        <p:cTn id="1" dur="indefinite" restart="never" nodeType="tmRoot"/>
       </p:par>
     </p:tnLst>
   </p:timing>
@@ -8026,7 +8058,7 @@
           <a:noFill/>
           <a:extLst>
             <a:ext uri="{909E8E84-426E-40dd-AFC4-6F175D3DCCD1}">
-              <a14:hiddenFill xmlns:a14="http://schemas.microsoft.com/office/drawing/2010/main">
+              <a14:hiddenFill xmlns:a14="http://schemas.microsoft.com/office/drawing/2010/main" xmlns="">
                 <a:solidFill>
                   <a:srgbClr val="FFFFFF"/>
                 </a:solidFill>
@@ -8067,7 +8099,7 @@
           <a:noFill/>
           <a:extLst>
             <a:ext uri="{909E8E84-426E-40dd-AFC4-6F175D3DCCD1}">
-              <a14:hiddenFill xmlns:a14="http://schemas.microsoft.com/office/drawing/2010/main">
+              <a14:hiddenFill xmlns:a14="http://schemas.microsoft.com/office/drawing/2010/main" xmlns="">
                 <a:solidFill>
                   <a:srgbClr val="FFFFFF"/>
                 </a:solidFill>
@@ -8086,6 +8118,13 @@
   <p:clrMapOvr>
     <a:masterClrMapping/>
   </p:clrMapOvr>
+  <p:timing>
+    <p:tnLst>
+      <p:par>
+        <p:cTn id="1" dur="indefinite" restart="never" nodeType="tmRoot"/>
+      </p:par>
+    </p:tnLst>
+  </p:timing>
 </p:sld>
 </file>
 
@@ -8142,7 +8181,7 @@
   <p:timing>
     <p:tnLst>
       <p:par>
-        <p:cTn xmlns:p14="http://schemas.microsoft.com/office/powerpoint/2010/main" id="1" dur="indefinite" restart="never" nodeType="tmRoot"/>
+        <p:cTn id="1" dur="indefinite" restart="never" nodeType="tmRoot"/>
       </p:par>
     </p:tnLst>
   </p:timing>
@@ -8222,7 +8261,11 @@
             </a:pPr>
             <a:r>
               <a:rPr lang="en-US" dirty="0" smtClean="0"/>
-              <a:t>Anchorage, Boulder, Honolulu[, Crookston]</a:t>
+              <a:t>Anchorage, Boulder, </a:t>
+            </a:r>
+            <a:r>
+              <a:rPr lang="en-US" dirty="0" smtClean="0"/>
+              <a:t>Honolulu, Crookston</a:t>
             </a:r>
             <a:endParaRPr lang="en-US" dirty="0"/>
           </a:p>
@@ -8294,6 +8337,13 @@
   <p:clrMapOvr>
     <a:masterClrMapping/>
   </p:clrMapOvr>
+  <p:timing>
+    <p:tnLst>
+      <p:par>
+        <p:cTn id="1" dur="indefinite" restart="never" nodeType="tmRoot"/>
+      </p:par>
+    </p:tnLst>
+  </p:timing>
 </p:sld>
 </file>
 
@@ -8370,12 +8420,12 @@
               <a:t>(~10 </a:t>
             </a:r>
             <a:r>
-              <a:rPr lang="en-US" dirty="0" err="1"/>
-              <a:t>MiB</a:t>
+              <a:rPr lang="en-US" dirty="0" smtClean="0"/>
+              <a:t>MB </a:t>
             </a:r>
             <a:r>
               <a:rPr lang="en-US" dirty="0"/>
-              <a:t> of data per event)</a:t>
+              <a:t>of data per event)</a:t>
             </a:r>
           </a:p>
           <a:p>
@@ -8457,6 +8507,13 @@
   <p:clrMapOvr>
     <a:masterClrMapping/>
   </p:clrMapOvr>
+  <p:timing>
+    <p:tnLst>
+      <p:par>
+        <p:cTn id="1" dur="indefinite" restart="never" nodeType="tmRoot"/>
+      </p:par>
+    </p:tnLst>
+  </p:timing>
 </p:sld>
 </file>
 
@@ -8585,7 +8642,7 @@
   <p:timing>
     <p:tnLst>
       <p:par>
-        <p:cTn xmlns:p14="http://schemas.microsoft.com/office/powerpoint/2010/main" id="1" dur="indefinite" restart="never" nodeType="tmRoot"/>
+        <p:cTn id="1" dur="indefinite" restart="never" nodeType="tmRoot"/>
       </p:par>
     </p:tnLst>
   </p:timing>
@@ -8799,7 +8856,7 @@
   <p:timing>
     <p:tnLst>
       <p:par>
-        <p:cTn xmlns:p14="http://schemas.microsoft.com/office/powerpoint/2010/main" id="1" dur="indefinite" restart="never" nodeType="tmRoot">
+        <p:cTn id="1" dur="indefinite" restart="never" nodeType="tmRoot">
           <p:childTnLst>
             <p:seq concurrent="1" nextAc="seek">
               <p:cTn id="2" dur="indefinite" nodeType="mainSeq">
@@ -9740,7 +9797,7 @@
   <p:timing>
     <p:tnLst>
       <p:par>
-        <p:cTn xmlns:p14="http://schemas.microsoft.com/office/powerpoint/2010/main" id="1" dur="indefinite" restart="never" nodeType="tmRoot"/>
+        <p:cTn id="1" dur="indefinite" restart="never" nodeType="tmRoot"/>
       </p:par>
     </p:tnLst>
   </p:timing>
@@ -10430,7 +10487,7 @@
   <p:timing>
     <p:tnLst>
       <p:par>
-        <p:cTn xmlns:p14="http://schemas.microsoft.com/office/powerpoint/2010/main" id="1" dur="indefinite" restart="never" nodeType="tmRoot"/>
+        <p:cTn id="1" dur="indefinite" restart="never" nodeType="tmRoot"/>
       </p:par>
     </p:tnLst>
   </p:timing>
@@ -10495,7 +10552,7 @@
   <p:timing>
     <p:tnLst>
       <p:par>
-        <p:cTn xmlns:p14="http://schemas.microsoft.com/office/powerpoint/2010/main" id="1" dur="indefinite" restart="never" nodeType="tmRoot"/>
+        <p:cTn id="1" dur="indefinite" restart="never" nodeType="tmRoot"/>
       </p:par>
     </p:tnLst>
   </p:timing>
@@ -10680,7 +10737,7 @@
   <p:timing>
     <p:tnLst>
       <p:par>
-        <p:cTn xmlns:p14="http://schemas.microsoft.com/office/powerpoint/2010/main" id="1" dur="indefinite" restart="never" nodeType="tmRoot"/>
+        <p:cTn id="1" dur="indefinite" restart="never" nodeType="tmRoot"/>
       </p:par>
     </p:tnLst>
   </p:timing>
@@ -10713,14 +10770,14 @@
           <p:nvPr>
             <p:extLst>
               <p:ext uri="{D42A27DB-BD31-4B8C-83A1-F6EECF244321}">
-                <p14:modId xmlns:p14="http://schemas.microsoft.com/office/powerpoint/2010/main" val="1434557137"/>
+                <p14:modId xmlns:p14="http://schemas.microsoft.com/office/powerpoint/2010/main" val="3610048238"/>
               </p:ext>
             </p:extLst>
           </p:nvPr>
         </p:nvGraphicFramePr>
         <p:xfrm>
           <a:off x="825741" y="1566916"/>
-          <a:ext cx="10362958" cy="4647811"/>
+          <a:ext cx="10362958" cy="4129652"/>
         </p:xfrm>
         <a:graphic>
           <a:graphicData uri="http://schemas.openxmlformats.org/drawingml/2006/table">
@@ -10731,9 +10788,9 @@
               <a:tblGrid>
                 <a:gridCol w="1743275"/>
                 <a:gridCol w="995854"/>
-                <a:gridCol w="2352526"/>
-                <a:gridCol w="2460337"/>
-                <a:gridCol w="1405483"/>
+                <a:gridCol w="1426230"/>
+                <a:gridCol w="2501900"/>
+                <a:gridCol w="2290216"/>
                 <a:gridCol w="1405483"/>
               </a:tblGrid>
               <a:tr h="929252">
@@ -10778,8 +10835,9 @@
                       <a:pPr algn="ctr"/>
                       <a:r>
                         <a:rPr lang="en-US" dirty="0" smtClean="0"/>
-                        <a:t>Communications</a:t>
+                        <a:t>Com</a:t>
                       </a:r>
+                      <a:endParaRPr lang="en-US" dirty="0" smtClean="0"/>
                     </a:p>
                     <a:p>
                       <a:pPr algn="ctr"/>
@@ -11163,7 +11221,7 @@
   <p:timing>
     <p:tnLst>
       <p:par>
-        <p:cTn xmlns:p14="http://schemas.microsoft.com/office/powerpoint/2010/main" id="1" dur="indefinite" restart="never" nodeType="tmRoot"/>
+        <p:cTn id="1" dur="indefinite" restart="never" nodeType="tmRoot"/>
       </p:par>
     </p:tnLst>
   </p:timing>
@@ -11637,7 +11695,7 @@
   <p:timing>
     <p:tnLst>
       <p:par>
-        <p:cTn xmlns:p14="http://schemas.microsoft.com/office/powerpoint/2010/main" id="1" dur="indefinite" restart="never" nodeType="tmRoot"/>
+        <p:cTn id="1" dur="indefinite" restart="never" nodeType="tmRoot"/>
       </p:par>
     </p:tnLst>
   </p:timing>
@@ -12046,7 +12104,7 @@
   <p:timing>
     <p:tnLst>
       <p:par>
-        <p:cTn xmlns:p14="http://schemas.microsoft.com/office/powerpoint/2010/main" id="1" dur="indefinite" restart="never" nodeType="tmRoot"/>
+        <p:cTn id="1" dur="indefinite" restart="never" nodeType="tmRoot"/>
       </p:par>
     </p:tnLst>
   </p:timing>
@@ -12197,7 +12255,7 @@
   <p:timing>
     <p:tnLst>
       <p:par>
-        <p:cTn xmlns:p14="http://schemas.microsoft.com/office/powerpoint/2010/main" id="1" dur="indefinite" restart="never" nodeType="tmRoot"/>
+        <p:cTn id="1" dur="indefinite" restart="never" nodeType="tmRoot"/>
       </p:par>
     </p:tnLst>
   </p:timing>
@@ -12392,7 +12450,7 @@
   <p:timing>
     <p:tnLst>
       <p:par>
-        <p:cTn xmlns:p14="http://schemas.microsoft.com/office/powerpoint/2010/main" id="1" dur="indefinite" restart="never" nodeType="tmRoot"/>
+        <p:cTn id="1" dur="indefinite" restart="never" nodeType="tmRoot"/>
       </p:par>
     </p:tnLst>
   </p:timing>
@@ -12452,7 +12510,7 @@
   <p:timing>
     <p:tnLst>
       <p:par>
-        <p:cTn xmlns:p14="http://schemas.microsoft.com/office/powerpoint/2010/main" id="1" dur="indefinite" restart="never" nodeType="tmRoot"/>
+        <p:cTn id="1" dur="indefinite" restart="never" nodeType="tmRoot"/>
       </p:par>
     </p:tnLst>
   </p:timing>
@@ -12597,7 +12655,7 @@
   <p:timing>
     <p:tnLst>
       <p:par>
-        <p:cTn xmlns:p14="http://schemas.microsoft.com/office/powerpoint/2010/main" id="1" dur="indefinite" restart="never" nodeType="tmRoot"/>
+        <p:cTn id="1" dur="indefinite" restart="never" nodeType="tmRoot"/>
       </p:par>
     </p:tnLst>
   </p:timing>
@@ -12734,7 +12792,7 @@
   <p:timing>
     <p:tnLst>
       <p:par>
-        <p:cTn xmlns:p14="http://schemas.microsoft.com/office/powerpoint/2010/main" id="1" dur="indefinite" restart="never" nodeType="tmRoot"/>
+        <p:cTn id="1" dur="indefinite" restart="never" nodeType="tmRoot"/>
       </p:par>
     </p:tnLst>
   </p:timing>
@@ -12794,7 +12852,7 @@
         </p:nvGraphicFramePr>
         <p:xfrm>
           <a:off x="1103313" y="2052638"/>
-          <a:ext cx="8947150" cy="3268651"/>
+          <a:ext cx="8947150" cy="3268652"/>
         </p:xfrm>
         <a:graphic>
           <a:graphicData uri="http://schemas.openxmlformats.org/drawingml/2006/table">
@@ -13144,6 +13202,13 @@
   <p:clrMapOvr>
     <a:masterClrMapping/>
   </p:clrMapOvr>
+  <p:timing>
+    <p:tnLst>
+      <p:par>
+        <p:cTn id="1" dur="indefinite" restart="never" nodeType="tmRoot"/>
+      </p:par>
+    </p:tnLst>
+  </p:timing>
 </p:sld>
 </file>
 
@@ -13629,6 +13694,13 @@
   <p:clrMapOvr>
     <a:masterClrMapping/>
   </p:clrMapOvr>
+  <p:timing>
+    <p:tnLst>
+      <p:par>
+        <p:cTn id="1" dur="indefinite" restart="never" nodeType="tmRoot"/>
+      </p:par>
+    </p:tnLst>
+  </p:timing>
 </p:sld>
 </file>
 
@@ -13892,7 +13964,7 @@
   <a:extraClrSchemeLst/>
   <a:extLst>
     <a:ext uri="{05A4C25C-085E-4340-85A3-A5531E510DB2}">
-      <thm15:themeFamily xmlns="" xmlns:thm15="http://schemas.microsoft.com/office/thememl/2012/main" name="Ion" id="{B8441ADB-2E43-4AF7-B97A-BD870242C6A8}" vid="{292E63A9-BB86-4E3D-B92A-7223C6510D2E}"/>
+      <thm15:themeFamily xmlns:thm15="http://schemas.microsoft.com/office/thememl/2012/main" name="Ion" id="{B8441ADB-2E43-4AF7-B97A-BD870242C6A8}" vid="{292E63A9-BB86-4E3D-B92A-7223C6510D2E}"/>
     </a:ext>
   </a:extLst>
 </a:theme>
@@ -14153,7 +14225,7 @@
   <a:extraClrSchemeLst/>
   <a:extLst>
     <a:ext uri="{05A4C25C-085E-4340-85A3-A5531E510DB2}">
-      <thm15:themeFamily xmlns="" xmlns:thm15="http://schemas.microsoft.com/office/thememl/2012/main" name="Office Theme" id="{62F939B6-93AF-4DB8-9C6B-D6C7DFDC589F}" vid="{4A3C46E8-61CC-4603-A589-7422A47A8E4A}"/>
+      <thm15:themeFamily xmlns:thm15="http://schemas.microsoft.com/office/thememl/2012/main" name="Office Theme" id="{62F939B6-93AF-4DB8-9C6B-D6C7DFDC589F}" vid="{4A3C46E8-61CC-4603-A589-7422A47A8E4A}"/>
     </a:ext>
   </a:extLst>
 </a:theme>

</xml_diff>

<commit_message>
changed degrees to mRad on sun sensors sheet
</commit_message>
<xml_diff>
--- a/Presentations/PDR_Presentation.pptx
+++ b/Presentations/PDR_Presentation.pptx
@@ -6896,7 +6896,12 @@
             <p:ph type="ctrTitle"/>
           </p:nvPr>
         </p:nvSpPr>
-        <p:spPr/>
+        <p:spPr>
+          <a:xfrm>
+            <a:off x="1154955" y="1414640"/>
+            <a:ext cx="8825658" cy="3329581"/>
+          </a:xfrm>
+        </p:spPr>
         <p:txBody>
           <a:bodyPr/>
           <a:lstStyle/>
@@ -6919,10 +6924,363 @@
             <p:ph type="subTitle" idx="1"/>
           </p:nvPr>
         </p:nvSpPr>
-        <p:spPr/>
-        <p:txBody>
-          <a:bodyPr/>
+        <p:spPr>
+          <a:xfrm>
+            <a:off x="1154955" y="4744221"/>
+            <a:ext cx="9279020" cy="1524057"/>
+          </a:xfrm>
+        </p:spPr>
+        <p:txBody>
+          <a:bodyPr>
+            <a:normAutofit/>
+          </a:bodyPr>
           <a:lstStyle/>
+          <a:p>
+            <a:r>
+              <a:rPr lang="en-US" dirty="0"/>
+              <a:t>Charles </a:t>
+            </a:r>
+            <a:r>
+              <a:rPr lang="en-US" dirty="0" smtClean="0"/>
+              <a:t>Denis 			Ben </a:t>
+            </a:r>
+            <a:r>
+              <a:rPr lang="en-US" dirty="0" err="1"/>
+              <a:t>Setterholm</a:t>
+            </a:r>
+            <a:r>
+              <a:rPr lang="en-US" dirty="0"/>
+              <a:t> </a:t>
+            </a:r>
+            <a:r>
+              <a:rPr lang="en-US" dirty="0" smtClean="0"/>
+              <a:t>			Ethan Arendt</a:t>
+            </a:r>
+            <a:endParaRPr lang="en-US" dirty="0"/>
+          </a:p>
+          <a:p>
+            <a:r>
+              <a:rPr lang="en-US" dirty="0"/>
+              <a:t>Jacob </a:t>
+            </a:r>
+            <a:r>
+              <a:rPr lang="en-US" dirty="0" smtClean="0"/>
+              <a:t>Gustafson 		Nicholas </a:t>
+            </a:r>
+            <a:r>
+              <a:rPr lang="en-US" dirty="0" err="1"/>
+              <a:t>Janak</a:t>
+            </a:r>
+            <a:r>
+              <a:rPr lang="en-US" dirty="0"/>
+              <a:t> </a:t>
+            </a:r>
+            <a:r>
+              <a:rPr lang="en-US" dirty="0" smtClean="0"/>
+              <a:t>			Brian Hanson</a:t>
+            </a:r>
+            <a:endParaRPr lang="en-US" dirty="0"/>
+          </a:p>
+          <a:p>
+            <a:r>
+              <a:rPr lang="en-US" dirty="0"/>
+              <a:t>Justin </a:t>
+            </a:r>
+            <a:r>
+              <a:rPr lang="en-US" dirty="0" smtClean="0"/>
+              <a:t>Seifert</a:t>
+            </a:r>
+            <a:r>
+              <a:rPr lang="en-US" dirty="0"/>
+              <a:t> </a:t>
+            </a:r>
+            <a:r>
+              <a:rPr lang="en-US" dirty="0" smtClean="0"/>
+              <a:t>				Tim </a:t>
+            </a:r>
+            <a:r>
+              <a:rPr lang="en-US" dirty="0" err="1" smtClean="0"/>
+              <a:t>Kukowski</a:t>
+            </a:r>
+            <a:r>
+              <a:rPr lang="en-US" dirty="0" smtClean="0"/>
+              <a:t> 				Nicholas </a:t>
+            </a:r>
+            <a:r>
+              <a:rPr lang="en-US" dirty="0" err="1" smtClean="0"/>
+              <a:t>SloaN</a:t>
+            </a:r>
+            <a:endParaRPr lang="en-US" dirty="0"/>
+          </a:p>
+        </p:txBody>
+      </p:sp>
+      <p:sp>
+        <p:nvSpPr>
+          <p:cNvPr id="8" name="Subtitle 2"/>
+          <p:cNvSpPr txBox="1">
+            <a:spLocks/>
+          </p:cNvSpPr>
+          <p:nvPr/>
+        </p:nvSpPr>
+        <p:spPr>
+          <a:xfrm>
+            <a:off x="5277485" y="4728222"/>
+            <a:ext cx="4369545" cy="1902820"/>
+          </a:xfrm>
+          <a:prstGeom prst="rect">
+            <a:avLst/>
+          </a:prstGeom>
+        </p:spPr>
+        <p:txBody>
+          <a:bodyPr vert="horz" lIns="91440" tIns="45720" rIns="91440" bIns="45720" rtlCol="0" anchor="t">
+            <a:normAutofit/>
+          </a:bodyPr>
+          <a:lstStyle>
+            <a:lvl1pPr marL="0" indent="0" algn="l" defTabSz="457200" rtl="0" eaLnBrk="1" latinLnBrk="0" hangingPunct="1">
+              <a:spcBef>
+                <a:spcPts val="1000"/>
+              </a:spcBef>
+              <a:spcAft>
+                <a:spcPts val="0"/>
+              </a:spcAft>
+              <a:buClr>
+                <a:schemeClr val="bg2">
+                  <a:lumMod val="40000"/>
+                  <a:lumOff val="60000"/>
+                </a:schemeClr>
+              </a:buClr>
+              <a:buSzPct val="80000"/>
+              <a:buFont typeface="Wingdings 3" charset="2"/>
+              <a:buNone/>
+              <a:defRPr sz="2000" b="0" i="0" kern="1200" cap="all">
+                <a:solidFill>
+                  <a:schemeClr val="bg2">
+                    <a:lumMod val="40000"/>
+                    <a:lumOff val="60000"/>
+                  </a:schemeClr>
+                </a:solidFill>
+                <a:latin typeface="+mj-lt"/>
+                <a:ea typeface="+mj-ea"/>
+                <a:cs typeface="+mj-cs"/>
+              </a:defRPr>
+            </a:lvl1pPr>
+            <a:lvl2pPr marL="457200" indent="0" algn="ctr" defTabSz="457200" rtl="0" eaLnBrk="1" latinLnBrk="0" hangingPunct="1">
+              <a:spcBef>
+                <a:spcPts val="1000"/>
+              </a:spcBef>
+              <a:spcAft>
+                <a:spcPts val="0"/>
+              </a:spcAft>
+              <a:buClr>
+                <a:schemeClr val="bg2">
+                  <a:lumMod val="40000"/>
+                  <a:lumOff val="60000"/>
+                </a:schemeClr>
+              </a:buClr>
+              <a:buSzPct val="80000"/>
+              <a:buFont typeface="Wingdings 3" charset="2"/>
+              <a:buNone/>
+              <a:defRPr sz="1800" b="0" i="0" kern="1200">
+                <a:solidFill>
+                  <a:schemeClr val="tx1">
+                    <a:tint val="75000"/>
+                  </a:schemeClr>
+                </a:solidFill>
+                <a:latin typeface="+mj-lt"/>
+                <a:ea typeface="+mj-ea"/>
+                <a:cs typeface="+mj-cs"/>
+              </a:defRPr>
+            </a:lvl2pPr>
+            <a:lvl3pPr marL="914400" indent="0" algn="ctr" defTabSz="457200" rtl="0" eaLnBrk="1" latinLnBrk="0" hangingPunct="1">
+              <a:spcBef>
+                <a:spcPts val="1000"/>
+              </a:spcBef>
+              <a:spcAft>
+                <a:spcPts val="0"/>
+              </a:spcAft>
+              <a:buClr>
+                <a:schemeClr val="bg2">
+                  <a:lumMod val="40000"/>
+                  <a:lumOff val="60000"/>
+                </a:schemeClr>
+              </a:buClr>
+              <a:buSzPct val="80000"/>
+              <a:buFont typeface="Wingdings 3" charset="2"/>
+              <a:buNone/>
+              <a:defRPr sz="1600" b="0" i="0" kern="1200">
+                <a:solidFill>
+                  <a:schemeClr val="tx1">
+                    <a:tint val="75000"/>
+                  </a:schemeClr>
+                </a:solidFill>
+                <a:latin typeface="+mj-lt"/>
+                <a:ea typeface="+mj-ea"/>
+                <a:cs typeface="+mj-cs"/>
+              </a:defRPr>
+            </a:lvl3pPr>
+            <a:lvl4pPr marL="1371600" indent="0" algn="ctr" defTabSz="457200" rtl="0" eaLnBrk="1" latinLnBrk="0" hangingPunct="1">
+              <a:spcBef>
+                <a:spcPts val="1000"/>
+              </a:spcBef>
+              <a:spcAft>
+                <a:spcPts val="0"/>
+              </a:spcAft>
+              <a:buClr>
+                <a:schemeClr val="bg2">
+                  <a:lumMod val="40000"/>
+                  <a:lumOff val="60000"/>
+                </a:schemeClr>
+              </a:buClr>
+              <a:buSzPct val="80000"/>
+              <a:buFont typeface="Wingdings 3" charset="2"/>
+              <a:buNone/>
+              <a:defRPr sz="1400" b="0" i="0" kern="1200">
+                <a:solidFill>
+                  <a:schemeClr val="tx1">
+                    <a:tint val="75000"/>
+                  </a:schemeClr>
+                </a:solidFill>
+                <a:latin typeface="+mj-lt"/>
+                <a:ea typeface="+mj-ea"/>
+                <a:cs typeface="+mj-cs"/>
+              </a:defRPr>
+            </a:lvl4pPr>
+            <a:lvl5pPr marL="1828800" indent="0" algn="ctr" defTabSz="457200" rtl="0" eaLnBrk="1" latinLnBrk="0" hangingPunct="1">
+              <a:spcBef>
+                <a:spcPts val="1000"/>
+              </a:spcBef>
+              <a:spcAft>
+                <a:spcPts val="0"/>
+              </a:spcAft>
+              <a:buClr>
+                <a:schemeClr val="bg2">
+                  <a:lumMod val="40000"/>
+                  <a:lumOff val="60000"/>
+                </a:schemeClr>
+              </a:buClr>
+              <a:buSzPct val="80000"/>
+              <a:buFont typeface="Wingdings 3" charset="2"/>
+              <a:buNone/>
+              <a:defRPr sz="1400" b="0" i="0" kern="1200">
+                <a:solidFill>
+                  <a:schemeClr val="tx1">
+                    <a:tint val="75000"/>
+                  </a:schemeClr>
+                </a:solidFill>
+                <a:latin typeface="+mj-lt"/>
+                <a:ea typeface="+mj-ea"/>
+                <a:cs typeface="+mj-cs"/>
+              </a:defRPr>
+            </a:lvl5pPr>
+            <a:lvl6pPr marL="2286000" indent="0" algn="ctr" defTabSz="457200" rtl="0" eaLnBrk="1" latinLnBrk="0" hangingPunct="1">
+              <a:spcBef>
+                <a:spcPts val="1000"/>
+              </a:spcBef>
+              <a:spcAft>
+                <a:spcPts val="0"/>
+              </a:spcAft>
+              <a:buClr>
+                <a:schemeClr val="bg2">
+                  <a:lumMod val="40000"/>
+                  <a:lumOff val="60000"/>
+                </a:schemeClr>
+              </a:buClr>
+              <a:buSzPct val="80000"/>
+              <a:buFont typeface="Wingdings 3" charset="2"/>
+              <a:buNone/>
+              <a:defRPr sz="1400" b="0" i="0" kern="1200">
+                <a:solidFill>
+                  <a:schemeClr val="tx1">
+                    <a:tint val="75000"/>
+                  </a:schemeClr>
+                </a:solidFill>
+                <a:latin typeface="+mj-lt"/>
+                <a:ea typeface="+mj-ea"/>
+                <a:cs typeface="+mj-cs"/>
+              </a:defRPr>
+            </a:lvl6pPr>
+            <a:lvl7pPr marL="2743200" indent="0" algn="ctr" defTabSz="457200" rtl="0" eaLnBrk="1" latinLnBrk="0" hangingPunct="1">
+              <a:spcBef>
+                <a:spcPts val="1000"/>
+              </a:spcBef>
+              <a:spcAft>
+                <a:spcPts val="0"/>
+              </a:spcAft>
+              <a:buClr>
+                <a:schemeClr val="bg2">
+                  <a:lumMod val="40000"/>
+                  <a:lumOff val="60000"/>
+                </a:schemeClr>
+              </a:buClr>
+              <a:buSzPct val="80000"/>
+              <a:buFont typeface="Wingdings 3" charset="2"/>
+              <a:buNone/>
+              <a:defRPr sz="1400" b="0" i="0" kern="1200">
+                <a:solidFill>
+                  <a:schemeClr val="tx1">
+                    <a:tint val="75000"/>
+                  </a:schemeClr>
+                </a:solidFill>
+                <a:latin typeface="+mj-lt"/>
+                <a:ea typeface="+mj-ea"/>
+                <a:cs typeface="+mj-cs"/>
+              </a:defRPr>
+            </a:lvl7pPr>
+            <a:lvl8pPr marL="3200400" indent="0" algn="ctr" defTabSz="457200" rtl="0" eaLnBrk="1" latinLnBrk="0" hangingPunct="1">
+              <a:spcBef>
+                <a:spcPts val="1000"/>
+              </a:spcBef>
+              <a:spcAft>
+                <a:spcPts val="0"/>
+              </a:spcAft>
+              <a:buClr>
+                <a:schemeClr val="bg2">
+                  <a:lumMod val="40000"/>
+                  <a:lumOff val="60000"/>
+                </a:schemeClr>
+              </a:buClr>
+              <a:buSzPct val="80000"/>
+              <a:buFont typeface="Wingdings 3" charset="2"/>
+              <a:buNone/>
+              <a:defRPr sz="1400" b="0" i="0" kern="1200">
+                <a:solidFill>
+                  <a:schemeClr val="tx1">
+                    <a:tint val="75000"/>
+                  </a:schemeClr>
+                </a:solidFill>
+                <a:latin typeface="+mj-lt"/>
+                <a:ea typeface="+mj-ea"/>
+                <a:cs typeface="+mj-cs"/>
+              </a:defRPr>
+            </a:lvl8pPr>
+            <a:lvl9pPr marL="3657600" indent="0" algn="ctr" defTabSz="457200" rtl="0" eaLnBrk="1" latinLnBrk="0" hangingPunct="1">
+              <a:spcBef>
+                <a:spcPts val="1000"/>
+              </a:spcBef>
+              <a:spcAft>
+                <a:spcPts val="0"/>
+              </a:spcAft>
+              <a:buClr>
+                <a:schemeClr val="bg2">
+                  <a:lumMod val="40000"/>
+                  <a:lumOff val="60000"/>
+                </a:schemeClr>
+              </a:buClr>
+              <a:buSzPct val="80000"/>
+              <a:buFont typeface="Wingdings 3" charset="2"/>
+              <a:buNone/>
+              <a:defRPr sz="1400" b="0" i="0" kern="1200">
+                <a:solidFill>
+                  <a:schemeClr val="tx1">
+                    <a:tint val="75000"/>
+                  </a:schemeClr>
+                </a:solidFill>
+                <a:latin typeface="+mj-lt"/>
+                <a:ea typeface="+mj-ea"/>
+                <a:cs typeface="+mj-cs"/>
+              </a:defRPr>
+            </a:lvl9pPr>
+          </a:lstStyle>
           <a:p>
             <a:endParaRPr lang="en-US" dirty="0"/>
           </a:p>
@@ -7363,14 +7721,14 @@
             <p:ph idx="1"/>
             <p:extLst>
               <p:ext uri="{D42A27DB-BD31-4B8C-83A1-F6EECF244321}">
-                <p14:modId xmlns:p14="http://schemas.microsoft.com/office/powerpoint/2010/main" val="1015997690"/>
+                <p14:modId xmlns:p14="http://schemas.microsoft.com/office/powerpoint/2010/main" val="17157926"/>
               </p:ext>
             </p:extLst>
           </p:nvPr>
         </p:nvGraphicFramePr>
         <p:xfrm>
-          <a:off x="1103313" y="2504660"/>
-          <a:ext cx="9542266" cy="3725017"/>
+          <a:off x="503582" y="2279373"/>
+          <a:ext cx="11078817" cy="3242927"/>
         </p:xfrm>
         <a:graphic>
           <a:graphicData uri="http://schemas.openxmlformats.org/drawingml/2006/table">
@@ -7379,11 +7737,11 @@
                 <a:tableStyleId>{5C22544A-7EE6-4342-B048-85BDC9FD1C3A}</a:tableStyleId>
               </a:tblPr>
               <a:tblGrid>
-                <a:gridCol w="1577817"/>
-                <a:gridCol w="1981185"/>
-                <a:gridCol w="2046570"/>
-                <a:gridCol w="1968347"/>
-                <a:gridCol w="1968347"/>
+                <a:gridCol w="2250806"/>
+                <a:gridCol w="1881288"/>
+                <a:gridCol w="2376121"/>
+                <a:gridCol w="2285301"/>
+                <a:gridCol w="2285301"/>
               </a:tblGrid>
               <a:tr h="412596">
                 <a:tc>
@@ -7393,7 +7751,7 @@
                     <a:p>
                       <a:r>
                         <a:rPr lang="en-US" dirty="0" smtClean="0"/>
-                        <a:t>Name</a:t>
+                        <a:t>Specifications</a:t>
                       </a:r>
                       <a:endParaRPr lang="en-US" dirty="0"/>
                     </a:p>
@@ -7632,7 +7990,19 @@
                     <a:p>
                       <a:r>
                         <a:rPr lang="en-US" dirty="0" smtClean="0"/>
-                        <a:t>Accuracy (degrees)</a:t>
+                        <a:t>Accuracy </a:t>
+                      </a:r>
+                      <a:r>
+                        <a:rPr lang="en-US" dirty="0" smtClean="0"/>
+                        <a:t>(</a:t>
+                      </a:r>
+                      <a:r>
+                        <a:rPr lang="en-US" dirty="0" err="1" smtClean="0"/>
+                        <a:t>mRad</a:t>
+                      </a:r>
+                      <a:r>
+                        <a:rPr lang="en-US" dirty="0" smtClean="0"/>
+                        <a:t>)</a:t>
                       </a:r>
                       <a:endParaRPr lang="en-US" dirty="0"/>
                     </a:p>
@@ -7660,7 +8030,7 @@
                     <a:p>
                       <a:r>
                         <a:rPr lang="en-US" dirty="0" smtClean="0"/>
-                        <a:t>0.3</a:t>
+                        <a:t>10.5</a:t>
                       </a:r>
                       <a:endParaRPr lang="en-US" dirty="0"/>
                     </a:p>
@@ -7674,7 +8044,7 @@
                     <a:p>
                       <a:r>
                         <a:rPr lang="en-US" dirty="0" smtClean="0"/>
-                        <a:t>0.5</a:t>
+                        <a:t>17.5</a:t>
                       </a:r>
                       <a:endParaRPr lang="en-US" dirty="0"/>
                     </a:p>
@@ -7688,7 +8058,7 @@
                     <a:p>
                       <a:r>
                         <a:rPr lang="en-US" dirty="0" smtClean="0"/>
-                        <a:t>1</a:t>
+                        <a:t>35.0</a:t>
                       </a:r>
                       <a:endParaRPr lang="en-US" dirty="0"/>
                     </a:p>
@@ -8058,7 +8428,7 @@
           <a:noFill/>
           <a:extLst>
             <a:ext uri="{909E8E84-426E-40dd-AFC4-6F175D3DCCD1}">
-              <a14:hiddenFill xmlns:a14="http://schemas.microsoft.com/office/drawing/2010/main" xmlns="">
+              <a14:hiddenFill xmlns="" xmlns:a14="http://schemas.microsoft.com/office/drawing/2010/main">
                 <a:solidFill>
                   <a:srgbClr val="FFFFFF"/>
                 </a:solidFill>
@@ -8099,7 +8469,7 @@
           <a:noFill/>
           <a:extLst>
             <a:ext uri="{909E8E84-426E-40dd-AFC4-6F175D3DCCD1}">
-              <a14:hiddenFill xmlns:a14="http://schemas.microsoft.com/office/drawing/2010/main" xmlns="">
+              <a14:hiddenFill xmlns="" xmlns:a14="http://schemas.microsoft.com/office/drawing/2010/main">
                 <a:solidFill>
                   <a:srgbClr val="FFFFFF"/>
                 </a:solidFill>
@@ -8261,11 +8631,7 @@
             </a:pPr>
             <a:r>
               <a:rPr lang="en-US" dirty="0" smtClean="0"/>
-              <a:t>Anchorage, Boulder, </a:t>
-            </a:r>
-            <a:r>
-              <a:rPr lang="en-US" dirty="0" smtClean="0"/>
-              <a:t>Honolulu, Crookston</a:t>
+              <a:t>Anchorage, Boulder, Honolulu, Crookston</a:t>
             </a:r>
             <a:endParaRPr lang="en-US" dirty="0"/>
           </a:p>
@@ -10770,7 +11136,7 @@
           <p:nvPr>
             <p:extLst>
               <p:ext uri="{D42A27DB-BD31-4B8C-83A1-F6EECF244321}">
-                <p14:modId xmlns:p14="http://schemas.microsoft.com/office/powerpoint/2010/main" val="3610048238"/>
+                <p14:modId xmlns:p14="http://schemas.microsoft.com/office/powerpoint/2010/main" val="2186428752"/>
               </p:ext>
             </p:extLst>
           </p:nvPr>
@@ -10799,6 +11165,13 @@
                     <a:bodyPr/>
                     <a:lstStyle/>
                     <a:p>
+                      <a:endParaRPr lang="en-US" dirty="0" smtClean="0"/>
+                    </a:p>
+                    <a:p>
+                      <a:r>
+                        <a:rPr lang="en-US" dirty="0" smtClean="0"/>
+                        <a:t>Specifications</a:t>
+                      </a:r>
                       <a:endParaRPr lang="en-US" dirty="0"/>
                     </a:p>
                   </a:txBody>
@@ -10837,7 +11210,6 @@
                         <a:rPr lang="en-US" dirty="0" smtClean="0"/>
                         <a:t>Com</a:t>
                       </a:r>
-                      <a:endParaRPr lang="en-US" dirty="0" smtClean="0"/>
                     </a:p>
                     <a:p>
                       <a:pPr algn="ctr"/>
@@ -12847,12 +13219,16 @@
           </p:cNvGraphicFramePr>
           <p:nvPr>
             <p:ph idx="1"/>
-            <p:extLst/>
+            <p:extLst>
+              <p:ext uri="{D42A27DB-BD31-4B8C-83A1-F6EECF244321}">
+                <p14:modId xmlns:p14="http://schemas.microsoft.com/office/powerpoint/2010/main" val="789455037"/>
+              </p:ext>
+            </p:extLst>
           </p:nvPr>
         </p:nvGraphicFramePr>
         <p:xfrm>
-          <a:off x="1103313" y="2052638"/>
-          <a:ext cx="8947150" cy="3268652"/>
+          <a:off x="646110" y="2052638"/>
+          <a:ext cx="10512219" cy="3218871"/>
         </p:xfrm>
         <a:graphic>
           <a:graphicData uri="http://schemas.openxmlformats.org/drawingml/2006/table">
@@ -12861,10 +13237,10 @@
                 <a:tableStyleId>{5C22544A-7EE6-4342-B048-85BDC9FD1C3A}</a:tableStyleId>
               </a:tblPr>
               <a:tblGrid>
-                <a:gridCol w="1392752"/>
-                <a:gridCol w="2496065"/>
-                <a:gridCol w="2578443"/>
-                <a:gridCol w="2479890"/>
+                <a:gridCol w="1871803"/>
+                <a:gridCol w="2697260"/>
+                <a:gridCol w="3029474"/>
+                <a:gridCol w="2913682"/>
               </a:tblGrid>
               <a:tr h="864619">
                 <a:tc>
@@ -12874,7 +13250,7 @@
                     <a:p>
                       <a:r>
                         <a:rPr lang="en-US" dirty="0" smtClean="0"/>
-                        <a:t>Name</a:t>
+                        <a:t>Specifications</a:t>
                       </a:r>
                       <a:endParaRPr lang="en-US" dirty="0"/>
                     </a:p>
@@ -13260,12 +13636,16 @@
           </p:cNvGraphicFramePr>
           <p:nvPr>
             <p:ph idx="1"/>
-            <p:extLst/>
+            <p:extLst>
+              <p:ext uri="{D42A27DB-BD31-4B8C-83A1-F6EECF244321}">
+                <p14:modId xmlns:p14="http://schemas.microsoft.com/office/powerpoint/2010/main" val="2187046363"/>
+              </p:ext>
+            </p:extLst>
           </p:nvPr>
         </p:nvGraphicFramePr>
         <p:xfrm>
-          <a:off x="1087409" y="2017803"/>
-          <a:ext cx="8947150" cy="3203553"/>
+          <a:off x="646111" y="2017803"/>
+          <a:ext cx="10260427" cy="3203553"/>
         </p:xfrm>
         <a:graphic>
           <a:graphicData uri="http://schemas.openxmlformats.org/drawingml/2006/table">
@@ -13274,10 +13654,10 @@
                 <a:tableStyleId>{5C22544A-7EE6-4342-B048-85BDC9FD1C3A}</a:tableStyleId>
               </a:tblPr>
               <a:tblGrid>
-                <a:gridCol w="1350991"/>
-                <a:gridCol w="2560320"/>
-                <a:gridCol w="2264229"/>
-                <a:gridCol w="2771610"/>
+                <a:gridCol w="1792289"/>
+                <a:gridCol w="2693131"/>
+                <a:gridCol w="2596576"/>
+                <a:gridCol w="3178431"/>
               </a:tblGrid>
               <a:tr h="854047">
                 <a:tc>
@@ -13287,7 +13667,7 @@
                     <a:p>
                       <a:r>
                         <a:rPr lang="en-US" dirty="0" smtClean="0"/>
-                        <a:t>Name</a:t>
+                        <a:t>Specifications</a:t>
                       </a:r>
                       <a:endParaRPr lang="en-US" dirty="0"/>
                     </a:p>

</xml_diff>

<commit_message>
Updated costs for GPS
We already own NovaTel and and antenna
</commit_message>
<xml_diff>
--- a/Presentations/PDR_Presentation.pptx
+++ b/Presentations/PDR_Presentation.pptx
@@ -136,7 +136,7 @@
   </p:defaultTextStyle>
   <p:extLst>
     <p:ext uri="{EFAFB233-063F-42B5-8137-9DF3F51BA10A}">
-      <p15:sldGuideLst xmlns:p15="http://schemas.microsoft.com/office/powerpoint/2012/main" xmlns="">
+      <p15:sldGuideLst xmlns:p15="http://schemas.microsoft.com/office/powerpoint/2012/main">
         <p15:guide id="1" orient="horz" pos="2160">
           <p15:clr>
             <a:srgbClr val="A4A3A4"/>
@@ -7520,14 +7520,14 @@
             <p:ph idx="1"/>
             <p:extLst>
               <p:ext uri="{D42A27DB-BD31-4B8C-83A1-F6EECF244321}">
-                <p14:modId xmlns:p14="http://schemas.microsoft.com/office/powerpoint/2010/main" val="3773073953"/>
+                <p14:modId xmlns:p14="http://schemas.microsoft.com/office/powerpoint/2010/main" val="2245810852"/>
               </p:ext>
             </p:extLst>
           </p:nvPr>
         </p:nvGraphicFramePr>
         <p:xfrm>
-          <a:off x="646110" y="2052638"/>
-          <a:ext cx="10512219" cy="4083490"/>
+          <a:off x="646111" y="1487977"/>
+          <a:ext cx="10512219" cy="4106490"/>
         </p:xfrm>
         <a:graphic>
           <a:graphicData uri="http://schemas.openxmlformats.org/drawingml/2006/table">
@@ -7541,7 +7541,7 @@
                 <a:gridCol w="3029474"/>
                 <a:gridCol w="2913682"/>
               </a:tblGrid>
-              <a:tr h="864619">
+              <a:tr h="869489">
                 <a:tc>
                   <a:txBody>
                     <a:bodyPr/>
@@ -7619,7 +7619,7 @@
                   <a:tcPr/>
                 </a:tc>
               </a:tr>
-              <a:tr h="625013">
+              <a:tr h="628533">
                 <a:tc>
                   <a:txBody>
                     <a:bodyPr/>
@@ -7681,7 +7681,7 @@
                   <a:tcPr/>
                 </a:tc>
               </a:tr>
-              <a:tr h="432310">
+              <a:tr h="434745">
                 <a:tc>
                   <a:txBody>
                     <a:bodyPr/>
@@ -7743,7 +7743,7 @@
                   <a:tcPr/>
                 </a:tc>
               </a:tr>
-              <a:tr h="432310">
+              <a:tr h="434745">
                 <a:tc>
                   <a:txBody>
                     <a:bodyPr/>
@@ -7801,7 +7801,7 @@
                   <a:tcPr/>
                 </a:tc>
               </a:tr>
-              <a:tr h="864619">
+              <a:tr h="869489">
                 <a:tc>
                   <a:txBody>
                     <a:bodyPr/>
@@ -7863,7 +7863,7 @@
                   <a:tcPr/>
                 </a:tc>
               </a:tr>
-              <a:tr h="864619">
+              <a:tr h="869489">
                 <a:tc>
                   <a:txBody>
                     <a:bodyPr/>
@@ -7899,7 +7899,7 @@
                     <a:p>
                       <a:r>
                         <a:rPr lang="en-US" dirty="0" smtClean="0"/>
-                        <a:t>12,000</a:t>
+                        <a:t>12,000*</a:t>
                       </a:r>
                       <a:endParaRPr lang="en-US" dirty="0"/>
                     </a:p>
@@ -7925,6 +7925,36 @@
           </a:graphicData>
         </a:graphic>
       </p:graphicFrame>
+      <p:sp>
+        <p:nvSpPr>
+          <p:cNvPr id="3" name="TextBox 2"/>
+          <p:cNvSpPr txBox="1"/>
+          <p:nvPr/>
+        </p:nvSpPr>
+        <p:spPr>
+          <a:xfrm>
+            <a:off x="646111" y="5935288"/>
+            <a:ext cx="7390015" cy="369332"/>
+          </a:xfrm>
+          <a:prstGeom prst="rect">
+            <a:avLst/>
+          </a:prstGeom>
+          <a:noFill/>
+        </p:spPr>
+        <p:txBody>
+          <a:bodyPr wrap="square" rtlCol="0">
+            <a:spAutoFit/>
+          </a:bodyPr>
+          <a:lstStyle/>
+          <a:p>
+            <a:r>
+              <a:rPr lang="en-US" dirty="0" smtClean="0"/>
+              <a:t>*Currently owned and wouldn’t contribute to total budget</a:t>
+            </a:r>
+            <a:endParaRPr lang="en-US" dirty="0"/>
+          </a:p>
+        </p:txBody>
+      </p:sp>
     </p:spTree>
     <p:extLst>
       <p:ext uri="{BB962C8B-B14F-4D97-AF65-F5344CB8AC3E}">
@@ -7999,7 +8029,7 @@
             <p:ph idx="1"/>
             <p:extLst>
               <p:ext uri="{D42A27DB-BD31-4B8C-83A1-F6EECF244321}">
-                <p14:modId xmlns:p14="http://schemas.microsoft.com/office/powerpoint/2010/main" val="3977726031"/>
+                <p14:modId xmlns:p14="http://schemas.microsoft.com/office/powerpoint/2010/main" val="3748473094"/>
               </p:ext>
             </p:extLst>
           </p:nvPr>
@@ -8479,7 +8509,6 @@
                         <a:rPr lang="en-US" dirty="0" smtClean="0"/>
                         <a:t>5,000</a:t>
                       </a:r>
-                      <a:endParaRPr lang="en-US" dirty="0" smtClean="0"/>
                     </a:p>
                   </a:txBody>
                   <a:tcPr/>
@@ -8510,7 +8539,6 @@
                         <a:rPr lang="en-US" dirty="0" smtClean="0"/>
                         <a:t>3,000</a:t>
                       </a:r>
-                      <a:endParaRPr lang="en-US" dirty="0" smtClean="0"/>
                     </a:p>
                   </a:txBody>
                   <a:tcPr/>
@@ -8521,8 +8549,12 @@
                     <a:lstStyle/>
                     <a:p>
                       <a:r>
-                        <a:rPr lang="en-US" smtClean="0"/>
-                        <a:t>N/A</a:t>
+                        <a:rPr lang="en-US" dirty="0" smtClean="0"/>
+                        <a:t>Already</a:t>
+                      </a:r>
+                      <a:r>
+                        <a:rPr lang="en-US" baseline="0" dirty="0" smtClean="0"/>
+                        <a:t> owned</a:t>
                       </a:r>
                       <a:endParaRPr lang="en-US" dirty="0"/>
                     </a:p>
@@ -15150,7 +15182,7 @@
   <a:themeElements>
     <a:clrScheme name="Ion">
       <a:dk1>
-        <a:sysClr val="windowText" lastClr="000000"/>
+        <a:sysClr val="windowText" lastClr="1E1E1E"/>
       </a:dk1>
       <a:lt1>
         <a:sysClr val="window" lastClr="FFFFFF"/>
@@ -15405,7 +15437,7 @@
   <a:extraClrSchemeLst/>
   <a:extLst>
     <a:ext uri="{05A4C25C-085E-4340-85A3-A5531E510DB2}">
-      <thm15:themeFamily xmlns:thm15="http://schemas.microsoft.com/office/thememl/2012/main" xmlns="" name="Ion" id="{B8441ADB-2E43-4AF7-B97A-BD870242C6A8}" vid="{292E63A9-BB86-4E3D-B92A-7223C6510D2E}"/>
+      <thm15:themeFamily xmlns:thm15="http://schemas.microsoft.com/office/thememl/2012/main" name="Ion" id="{B8441ADB-2E43-4AF7-B97A-BD870242C6A8}" vid="{292E63A9-BB86-4E3D-B92A-7223C6510D2E}"/>
     </a:ext>
   </a:extLst>
 </a:theme>
@@ -15416,7 +15448,7 @@
   <a:themeElements>
     <a:clrScheme name="Office">
       <a:dk1>
-        <a:sysClr val="windowText" lastClr="000000"/>
+        <a:sysClr val="windowText" lastClr="1E1E1E"/>
       </a:dk1>
       <a:lt1>
         <a:sysClr val="window" lastClr="FFFFFF"/>
@@ -15666,7 +15698,7 @@
   <a:extraClrSchemeLst/>
   <a:extLst>
     <a:ext uri="{05A4C25C-085E-4340-85A3-A5531E510DB2}">
-      <thm15:themeFamily xmlns:thm15="http://schemas.microsoft.com/office/thememl/2012/main" xmlns="" name="Office Theme" id="{62F939B6-93AF-4DB8-9C6B-D6C7DFDC589F}" vid="{4A3C46E8-61CC-4603-A589-7422A47A8E4A}"/>
+      <thm15:themeFamily xmlns:thm15="http://schemas.microsoft.com/office/thememl/2012/main" name="Office Theme" id="{62F939B6-93AF-4DB8-9C6B-D6C7DFDC589F}" vid="{4A3C46E8-61CC-4603-A589-7422A47A8E4A}"/>
     </a:ext>
   </a:extLst>
 </a:theme>

</xml_diff>

<commit_message>
Updated background as we talked about in meeting
</commit_message>
<xml_diff>
--- a/Presentations/PDR_Presentation.pptx
+++ b/Presentations/PDR_Presentation.pptx
@@ -6134,9 +6134,18 @@
 <p:sldMaster xmlns:a="http://schemas.openxmlformats.org/drawingml/2006/main" xmlns:r="http://schemas.openxmlformats.org/officeDocument/2006/relationships" xmlns:p="http://schemas.openxmlformats.org/presentationml/2006/main">
   <p:cSld>
     <p:bg>
-      <p:bgRef idx="1003">
-        <a:schemeClr val="bg2"/>
-      </p:bgRef>
+      <p:bgPr>
+        <a:blipFill dpi="0" rotWithShape="1">
+          <a:blip r:embed="rId19">
+            <a:lum/>
+          </a:blip>
+          <a:srcRect/>
+          <a:stretch>
+            <a:fillRect t="-16000" b="-16000"/>
+          </a:stretch>
+        </a:blipFill>
+        <a:effectLst/>
+      </p:bgPr>
     </p:bg>
     <p:spTree>
       <p:nvGrpSpPr>
@@ -6161,7 +6170,7 @@
           <p:nvPr/>
         </p:nvPicPr>
         <p:blipFill rotWithShape="1">
-          <a:blip r:embed="rId19">
+          <a:blip r:embed="rId20">
             <a:extLst>
               <a:ext uri="{28A0092B-C50C-407E-A947-70E740481C1C}">
                 <a14:useLocalDpi xmlns:a14="http://schemas.microsoft.com/office/drawing/2010/main" val="0"/>
@@ -6190,7 +6199,7 @@
           <p:nvPr/>
         </p:nvPicPr>
         <p:blipFill rotWithShape="1">
-          <a:blip r:embed="rId20">
+          <a:blip r:embed="rId21">
             <a:extLst>
               <a:ext uri="{28A0092B-C50C-407E-A947-70E740481C1C}">
                 <a14:useLocalDpi xmlns:a14="http://schemas.microsoft.com/office/drawing/2010/main" val="0"/>
@@ -6282,7 +6291,7 @@
           <p:nvPr/>
         </p:nvPicPr>
         <p:blipFill rotWithShape="1">
-          <a:blip r:embed="rId21">
+          <a:blip r:embed="rId22">
             <a:extLst>
               <a:ext uri="{28A0092B-C50C-407E-A947-70E740481C1C}">
                 <a14:useLocalDpi xmlns:a14="http://schemas.microsoft.com/office/drawing/2010/main" val="0"/>
@@ -6311,7 +6320,7 @@
           <p:nvPr/>
         </p:nvPicPr>
         <p:blipFill rotWithShape="1">
-          <a:blip r:embed="rId22">
+          <a:blip r:embed="rId23">
             <a:extLst>
               <a:ext uri="{28A0092B-C50C-407E-A947-70E740481C1C}">
                 <a14:useLocalDpi xmlns:a14="http://schemas.microsoft.com/office/drawing/2010/main" val="0"/>
@@ -6333,42 +6342,6 @@
       </p:pic>
       <p:sp>
         <p:nvSpPr>
-          <p:cNvPr id="14" name="Rectangle 13"/>
-          <p:cNvSpPr/>
-          <p:nvPr/>
-        </p:nvSpPr>
-        <p:spPr>
-          <a:xfrm>
-            <a:off x="10437812" y="0"/>
-            <a:ext cx="685800" cy="1143000"/>
-          </a:xfrm>
-          <a:prstGeom prst="rect">
-            <a:avLst/>
-          </a:prstGeom>
-          <a:solidFill>
-            <a:schemeClr val="accent1"/>
-          </a:solidFill>
-          <a:ln>
-            <a:noFill/>
-          </a:ln>
-        </p:spPr>
-        <p:style>
-          <a:lnRef idx="1">
-            <a:schemeClr val="accent1"/>
-          </a:lnRef>
-          <a:fillRef idx="3">
-            <a:schemeClr val="accent1"/>
-          </a:fillRef>
-          <a:effectRef idx="2">
-            <a:schemeClr val="accent1"/>
-          </a:effectRef>
-          <a:fontRef idx="minor">
-            <a:schemeClr val="lt1"/>
-          </a:fontRef>
-        </p:style>
-      </p:sp>
-      <p:sp>
-        <p:nvSpPr>
           <p:cNvPr id="2" name="Title Placeholder 1"/>
           <p:cNvSpPr>
             <a:spLocks noGrp="1"/>
@@ -6592,7 +6565,7 @@
           <p:nvPr userDrawn="1"/>
         </p:nvPicPr>
         <p:blipFill>
-          <a:blip r:embed="rId23" cstate="print">
+          <a:blip r:embed="rId24" cstate="print">
             <a:extLst>
               <a:ext uri="{28A0092B-C50C-407E-A947-70E740481C1C}">
                 <a14:useLocalDpi xmlns:a14="http://schemas.microsoft.com/office/drawing/2010/main" val="0"/>
@@ -14034,8 +14007,8 @@
         </p:blipFill>
         <p:spPr>
           <a:xfrm>
-            <a:off x="1931499" y="1084972"/>
-            <a:ext cx="7319033" cy="5452680"/>
+            <a:off x="1751195" y="1183446"/>
+            <a:ext cx="8689609" cy="5452680"/>
           </a:xfrm>
         </p:spPr>
       </p:pic>
@@ -14248,7 +14221,7 @@
                                         <p:tgtEl>
                                           <p:spTgt spid="9">
                                             <p:txEl>
-                                              <p:pRg st="2" end="2"/>
+                                              <p:pRg st="0" end="0"/>
                                             </p:txEl>
                                           </p:spTgt>
                                         </p:tgtEl>
@@ -14297,7 +14270,7 @@
                                         <p:tgtEl>
                                           <p:spTgt spid="9">
                                             <p:txEl>
-                                              <p:pRg st="0" end="0"/>
+                                              <p:pRg st="2" end="2"/>
                                             </p:txEl>
                                           </p:spTgt>
                                         </p:tgtEl>

</xml_diff>

<commit_message>
Added block diagrams to intermediate slides
</commit_message>
<xml_diff>
--- a/Presentations/PDR_Presentation.pptx
+++ b/Presentations/PDR_Presentation.pptx
@@ -15,28 +15,28 @@
     <p:sldId id="259" r:id="rId6"/>
     <p:sldId id="258" r:id="rId7"/>
     <p:sldId id="297" r:id="rId8"/>
-    <p:sldId id="298" r:id="rId9"/>
+    <p:sldId id="299" r:id="rId9"/>
     <p:sldId id="261" r:id="rId10"/>
     <p:sldId id="262" r:id="rId11"/>
     <p:sldId id="263" r:id="rId12"/>
     <p:sldId id="264" r:id="rId13"/>
-    <p:sldId id="265" r:id="rId14"/>
+    <p:sldId id="300" r:id="rId14"/>
     <p:sldId id="268" r:id="rId15"/>
     <p:sldId id="293" r:id="rId16"/>
-    <p:sldId id="279" r:id="rId17"/>
+    <p:sldId id="301" r:id="rId17"/>
     <p:sldId id="278" r:id="rId18"/>
-    <p:sldId id="286" r:id="rId19"/>
+    <p:sldId id="302" r:id="rId19"/>
     <p:sldId id="287" r:id="rId20"/>
     <p:sldId id="288" r:id="rId21"/>
     <p:sldId id="289" r:id="rId22"/>
     <p:sldId id="290" r:id="rId23"/>
     <p:sldId id="291" r:id="rId24"/>
-    <p:sldId id="285" r:id="rId25"/>
+    <p:sldId id="303" r:id="rId25"/>
     <p:sldId id="280" r:id="rId26"/>
     <p:sldId id="281" r:id="rId27"/>
     <p:sldId id="282" r:id="rId28"/>
     <p:sldId id="283" r:id="rId29"/>
-    <p:sldId id="294" r:id="rId30"/>
+    <p:sldId id="304" r:id="rId30"/>
   </p:sldIdLst>
   <p:sldSz cx="12192000" cy="6858000"/>
   <p:notesSz cx="6858000" cy="9144000"/>
@@ -137,7 +137,7 @@
   </p:defaultTextStyle>
   <p:extLst>
     <p:ext uri="{EFAFB233-063F-42B5-8137-9DF3F51BA10A}">
-      <p15:sldGuideLst xmlns:p15="http://schemas.microsoft.com/office/powerpoint/2012/main">
+      <p15:sldGuideLst xmlns:p15="http://schemas.microsoft.com/office/powerpoint/2012/main" xmlns="">
         <p15:guide id="1" orient="horz" pos="2160">
           <p15:clr>
             <a:srgbClr val="A4A3A4"/>
@@ -8725,39 +8725,66 @@
             <a:spLocks noGrp="1"/>
           </p:cNvSpPr>
           <p:nvPr>
-            <p:ph type="ctrTitle"/>
-          </p:nvPr>
-        </p:nvSpPr>
-        <p:spPr/>
+            <p:ph type="title"/>
+          </p:nvPr>
+        </p:nvSpPr>
+        <p:spPr>
+          <a:xfrm>
+            <a:off x="646111" y="452718"/>
+            <a:ext cx="9404723" cy="672697"/>
+          </a:xfrm>
+        </p:spPr>
         <p:txBody>
           <a:bodyPr/>
           <a:lstStyle/>
           <a:p>
             <a:r>
-              <a:rPr lang="en-US" sz="6000" dirty="0" smtClean="0"/>
+              <a:rPr lang="en-US" dirty="0" smtClean="0"/>
               <a:t>Attitude Determination</a:t>
             </a:r>
-            <a:endParaRPr lang="en-US" sz="6000" dirty="0"/>
-          </a:p>
-        </p:txBody>
-      </p:sp>
+            <a:endParaRPr lang="en-US" dirty="0"/>
+          </a:p>
+        </p:txBody>
+      </p:sp>
+      <p:pic>
+        <p:nvPicPr>
+          <p:cNvPr id="4" name="Content Placeholder 3"/>
+          <p:cNvPicPr>
+            <a:picLocks noGrp="1" noChangeAspect="1"/>
+          </p:cNvPicPr>
+          <p:nvPr>
+            <p:ph idx="1"/>
+          </p:nvPr>
+        </p:nvPicPr>
+        <p:blipFill>
+          <a:blip r:embed="rId2">
+            <a:extLst>
+              <a:ext uri="{28A0092B-C50C-407E-A947-70E740481C1C}">
+                <a14:useLocalDpi xmlns:a14="http://schemas.microsoft.com/office/drawing/2010/main" val="0"/>
+              </a:ext>
+            </a:extLst>
+          </a:blip>
+          <a:stretch>
+            <a:fillRect/>
+          </a:stretch>
+        </p:blipFill>
+        <p:spPr>
+          <a:xfrm>
+            <a:off x="1963370" y="2052638"/>
+            <a:ext cx="7227035" cy="4195762"/>
+          </a:xfrm>
+        </p:spPr>
+      </p:pic>
     </p:spTree>
     <p:extLst>
       <p:ext uri="{BB962C8B-B14F-4D97-AF65-F5344CB8AC3E}">
-        <p14:creationId xmlns:p14="http://schemas.microsoft.com/office/powerpoint/2010/main" val="1886115859"/>
+        <p14:creationId xmlns:p14="http://schemas.microsoft.com/office/powerpoint/2010/main" val="2675576949"/>
       </p:ext>
     </p:extLst>
   </p:cSld>
   <p:clrMapOvr>
     <a:masterClrMapping/>
   </p:clrMapOvr>
-  <p:timing>
-    <p:tnLst>
-      <p:par>
-        <p:cTn id="1" dur="indefinite" restart="never" nodeType="tmRoot"/>
-      </p:par>
-    </p:tnLst>
-  </p:timing>
 </p:sld>
 </file>
 
@@ -8896,26 +8923,9 @@
             </a:r>
           </a:p>
           <a:p>
-            <a:pPr lvl="1"/>
-            <a:endParaRPr lang="en-US" dirty="0" smtClean="0"/>
-          </a:p>
-          <a:p>
-            <a:pPr lvl="1"/>
-            <a:r>
-              <a:rPr lang="en-US" dirty="0" smtClean="0"/>
-              <a:t>Shall not </a:t>
-            </a:r>
-            <a:r>
-              <a:rPr lang="en-US" dirty="0"/>
-              <a:t>be </a:t>
-            </a:r>
-            <a:r>
-              <a:rPr lang="en-US" dirty="0" smtClean="0"/>
-              <a:t>magnetically-based</a:t>
-            </a:r>
-          </a:p>
-          <a:p>
-            <a:pPr lvl="1"/>
+            <a:pPr marL="457200" lvl="1" indent="0">
+              <a:buNone/>
+            </a:pPr>
             <a:endParaRPr lang="en-US" dirty="0" smtClean="0"/>
           </a:p>
           <a:p>
@@ -9828,39 +9838,66 @@
             <a:spLocks noGrp="1"/>
           </p:cNvSpPr>
           <p:nvPr>
-            <p:ph type="ctrTitle"/>
-          </p:nvPr>
-        </p:nvSpPr>
-        <p:spPr/>
+            <p:ph type="title"/>
+          </p:nvPr>
+        </p:nvSpPr>
+        <p:spPr>
+          <a:xfrm>
+            <a:off x="646111" y="452718"/>
+            <a:ext cx="9404723" cy="672697"/>
+          </a:xfrm>
+        </p:spPr>
         <p:txBody>
           <a:bodyPr/>
           <a:lstStyle/>
           <a:p>
             <a:r>
-              <a:rPr lang="en-US" sz="6000" dirty="0" smtClean="0"/>
+              <a:rPr lang="en-US" dirty="0" smtClean="0"/>
               <a:t>Attitude Control</a:t>
             </a:r>
-            <a:endParaRPr lang="en-US" sz="6000" dirty="0"/>
-          </a:p>
-        </p:txBody>
-      </p:sp>
+            <a:endParaRPr lang="en-US" dirty="0"/>
+          </a:p>
+        </p:txBody>
+      </p:sp>
+      <p:pic>
+        <p:nvPicPr>
+          <p:cNvPr id="5" name="Content Placeholder 4"/>
+          <p:cNvPicPr>
+            <a:picLocks noGrp="1" noChangeAspect="1"/>
+          </p:cNvPicPr>
+          <p:nvPr>
+            <p:ph idx="1"/>
+          </p:nvPr>
+        </p:nvPicPr>
+        <p:blipFill>
+          <a:blip r:embed="rId2">
+            <a:extLst>
+              <a:ext uri="{28A0092B-C50C-407E-A947-70E740481C1C}">
+                <a14:useLocalDpi xmlns:a14="http://schemas.microsoft.com/office/drawing/2010/main" val="0"/>
+              </a:ext>
+            </a:extLst>
+          </a:blip>
+          <a:stretch>
+            <a:fillRect/>
+          </a:stretch>
+        </p:blipFill>
+        <p:spPr>
+          <a:xfrm>
+            <a:off x="1963370" y="2052638"/>
+            <a:ext cx="7227035" cy="4195762"/>
+          </a:xfrm>
+        </p:spPr>
+      </p:pic>
     </p:spTree>
     <p:extLst>
       <p:ext uri="{BB962C8B-B14F-4D97-AF65-F5344CB8AC3E}">
-        <p14:creationId xmlns:p14="http://schemas.microsoft.com/office/powerpoint/2010/main" val="3626793256"/>
+        <p14:creationId xmlns:p14="http://schemas.microsoft.com/office/powerpoint/2010/main" val="2395279142"/>
       </p:ext>
     </p:extLst>
   </p:cSld>
   <p:clrMapOvr>
     <a:masterClrMapping/>
   </p:clrMapOvr>
-  <p:timing>
-    <p:tnLst>
-      <p:par>
-        <p:cTn id="1" dur="indefinite" restart="never" nodeType="tmRoot"/>
-      </p:par>
-    </p:tnLst>
-  </p:timing>
 </p:sld>
 </file>
 
@@ -10084,39 +10121,66 @@
             <a:spLocks noGrp="1"/>
           </p:cNvSpPr>
           <p:nvPr>
-            <p:ph type="ctrTitle"/>
-          </p:nvPr>
-        </p:nvSpPr>
-        <p:spPr/>
+            <p:ph type="title"/>
+          </p:nvPr>
+        </p:nvSpPr>
+        <p:spPr>
+          <a:xfrm>
+            <a:off x="646111" y="452718"/>
+            <a:ext cx="9404723" cy="672697"/>
+          </a:xfrm>
+        </p:spPr>
         <p:txBody>
           <a:bodyPr/>
           <a:lstStyle/>
           <a:p>
             <a:r>
               <a:rPr lang="en-US" dirty="0" smtClean="0"/>
-              <a:t>Communication	</a:t>
+              <a:t>Communication</a:t>
             </a:r>
             <a:endParaRPr lang="en-US" dirty="0"/>
           </a:p>
         </p:txBody>
       </p:sp>
+      <p:pic>
+        <p:nvPicPr>
+          <p:cNvPr id="5" name="Content Placeholder 4"/>
+          <p:cNvPicPr>
+            <a:picLocks noGrp="1" noChangeAspect="1"/>
+          </p:cNvPicPr>
+          <p:nvPr>
+            <p:ph idx="1"/>
+          </p:nvPr>
+        </p:nvPicPr>
+        <p:blipFill>
+          <a:blip r:embed="rId2">
+            <a:extLst>
+              <a:ext uri="{28A0092B-C50C-407E-A947-70E740481C1C}">
+                <a14:useLocalDpi xmlns:a14="http://schemas.microsoft.com/office/drawing/2010/main" val="0"/>
+              </a:ext>
+            </a:extLst>
+          </a:blip>
+          <a:stretch>
+            <a:fillRect/>
+          </a:stretch>
+        </p:blipFill>
+        <p:spPr>
+          <a:xfrm>
+            <a:off x="1963370" y="2052638"/>
+            <a:ext cx="7227035" cy="4195762"/>
+          </a:xfrm>
+        </p:spPr>
+      </p:pic>
     </p:spTree>
     <p:extLst>
       <p:ext uri="{BB962C8B-B14F-4D97-AF65-F5344CB8AC3E}">
-        <p14:creationId xmlns:p14="http://schemas.microsoft.com/office/powerpoint/2010/main" val="225367916"/>
+        <p14:creationId xmlns:p14="http://schemas.microsoft.com/office/powerpoint/2010/main" val="2395279142"/>
       </p:ext>
     </p:extLst>
   </p:cSld>
   <p:clrMapOvr>
     <a:masterClrMapping/>
   </p:clrMapOvr>
-  <p:timing>
-    <p:tnLst>
-      <p:par>
-        <p:cTn id="1" dur="indefinite" restart="never" nodeType="tmRoot"/>
-      </p:par>
-    </p:tnLst>
-  </p:timing>
 </p:sld>
 </file>
 
@@ -12281,13 +12345,13 @@
             <a:spLocks noGrp="1"/>
           </p:cNvSpPr>
           <p:nvPr>
-            <p:ph type="ctrTitle"/>
+            <p:ph type="title"/>
           </p:nvPr>
         </p:nvSpPr>
         <p:spPr>
           <a:xfrm>
-            <a:off x="787400" y="1460500"/>
-            <a:ext cx="10069513" cy="3329581"/>
+            <a:off x="646111" y="452718"/>
+            <a:ext cx="9404723" cy="672697"/>
           </a:xfrm>
         </p:spPr>
         <p:txBody>
@@ -12296,29 +12360,51 @@
           <a:p>
             <a:r>
               <a:rPr lang="en-US" dirty="0" smtClean="0"/>
-              <a:t>Power Management	</a:t>
+              <a:t>Power Management</a:t>
             </a:r>
             <a:endParaRPr lang="en-US" dirty="0"/>
           </a:p>
         </p:txBody>
       </p:sp>
+      <p:pic>
+        <p:nvPicPr>
+          <p:cNvPr id="5" name="Content Placeholder 4"/>
+          <p:cNvPicPr>
+            <a:picLocks noGrp="1" noChangeAspect="1"/>
+          </p:cNvPicPr>
+          <p:nvPr>
+            <p:ph idx="1"/>
+          </p:nvPr>
+        </p:nvPicPr>
+        <p:blipFill>
+          <a:blip r:embed="rId2">
+            <a:extLst>
+              <a:ext uri="{28A0092B-C50C-407E-A947-70E740481C1C}">
+                <a14:useLocalDpi xmlns:a14="http://schemas.microsoft.com/office/drawing/2010/main" val="0"/>
+              </a:ext>
+            </a:extLst>
+          </a:blip>
+          <a:stretch>
+            <a:fillRect/>
+          </a:stretch>
+        </p:blipFill>
+        <p:spPr>
+          <a:xfrm>
+            <a:off x="1963370" y="2052638"/>
+            <a:ext cx="7227035" cy="4195762"/>
+          </a:xfrm>
+        </p:spPr>
+      </p:pic>
     </p:spTree>
     <p:extLst>
       <p:ext uri="{BB962C8B-B14F-4D97-AF65-F5344CB8AC3E}">
-        <p14:creationId xmlns:p14="http://schemas.microsoft.com/office/powerpoint/2010/main" val="2950636843"/>
+        <p14:creationId xmlns:p14="http://schemas.microsoft.com/office/powerpoint/2010/main" val="2395279142"/>
       </p:ext>
     </p:extLst>
   </p:cSld>
   <p:clrMapOvr>
     <a:masterClrMapping/>
   </p:clrMapOvr>
-  <p:timing>
-    <p:tnLst>
-      <p:par>
-        <p:cTn id="1" dur="indefinite" restart="never" nodeType="tmRoot"/>
-      </p:par>
-    </p:tnLst>
-  </p:timing>
 </p:sld>
 </file>
 
@@ -13909,8 +13995,8 @@
         </p:nvSpPr>
         <p:spPr>
           <a:xfrm>
-            <a:off x="4038240" y="3776154"/>
-            <a:ext cx="9404723" cy="1400530"/>
+            <a:off x="646111" y="452718"/>
+            <a:ext cx="9404723" cy="672697"/>
           </a:xfrm>
         </p:spPr>
         <p:txBody>
@@ -13918,62 +14004,42 @@
           <a:lstStyle/>
           <a:p>
             <a:r>
-              <a:rPr lang="en-US" sz="4400" dirty="0" smtClean="0">
-                <a:effectLst>
-                  <a:outerShdw blurRad="38100" dist="38100" dir="2700000" algn="tl">
-                    <a:srgbClr val="000000">
-                      <a:alpha val="43137"/>
-                    </a:srgbClr>
-                  </a:outerShdw>
-                </a:effectLst>
-              </a:rPr>
-              <a:t>Questions</a:t>
-            </a:r>
-            <a:r>
-              <a:rPr lang="en-US" sz="4400" dirty="0" smtClean="0">
-                <a:effectLst>
-                  <a:outerShdw blurRad="38100" dist="38100" dir="2700000" algn="tl">
-                    <a:srgbClr val="000000">
-                      <a:alpha val="43137"/>
-                    </a:srgbClr>
-                  </a:outerShdw>
-                </a:effectLst>
-                <a:latin typeface="Arial" panose="020B0604020202020204" pitchFamily="34" charset="0"/>
-                <a:cs typeface="Arial" panose="020B0604020202020204" pitchFamily="34" charset="0"/>
-              </a:rPr>
-              <a:t>?</a:t>
-            </a:r>
-            <a:endParaRPr lang="en-US" sz="4400" dirty="0">
-              <a:effectLst>
-                <a:outerShdw blurRad="38100" dist="38100" dir="2700000" algn="tl">
-                  <a:srgbClr val="000000">
-                    <a:alpha val="43137"/>
-                  </a:srgbClr>
-                </a:outerShdw>
-              </a:effectLst>
-              <a:latin typeface="Arial" panose="020B0604020202020204" pitchFamily="34" charset="0"/>
-              <a:cs typeface="Arial" panose="020B0604020202020204" pitchFamily="34" charset="0"/>
-            </a:endParaRPr>
+              <a:rPr lang="en-US" smtClean="0"/>
+              <a:t>Deliverables at CDR</a:t>
+            </a:r>
+            <a:endParaRPr lang="en-US" dirty="0"/>
+          </a:p>
+        </p:txBody>
+      </p:sp>
+      <p:sp>
+        <p:nvSpPr>
+          <p:cNvPr id="3" name="Content Placeholder 2"/>
+          <p:cNvSpPr>
+            <a:spLocks noGrp="1"/>
+          </p:cNvSpPr>
+          <p:nvPr>
+            <p:ph idx="1"/>
+          </p:nvPr>
+        </p:nvSpPr>
+        <p:spPr/>
+        <p:txBody>
+          <a:bodyPr/>
+          <a:lstStyle/>
+          <a:p>
+            <a:endParaRPr lang="en-US"/>
           </a:p>
         </p:txBody>
       </p:sp>
     </p:spTree>
     <p:extLst>
       <p:ext uri="{BB962C8B-B14F-4D97-AF65-F5344CB8AC3E}">
-        <p14:creationId xmlns:p14="http://schemas.microsoft.com/office/powerpoint/2010/main" val="4176363047"/>
+        <p14:creationId xmlns:p14="http://schemas.microsoft.com/office/powerpoint/2010/main" val="2395279142"/>
       </p:ext>
     </p:extLst>
   </p:cSld>
   <p:clrMapOvr>
     <a:masterClrMapping/>
   </p:clrMapOvr>
-  <p:timing>
-    <p:tnLst>
-      <p:par>
-        <p:cTn id="1" dur="indefinite" restart="never" nodeType="tmRoot"/>
-      </p:par>
-    </p:tnLst>
-  </p:timing>
 </p:sld>
 </file>
 
@@ -15007,7 +15073,7 @@
       </p:sp>
       <p:pic>
         <p:nvPicPr>
-          <p:cNvPr id="4" name="Content Placeholder 3"/>
+          <p:cNvPr id="5" name="Content Placeholder 4"/>
           <p:cNvPicPr>
             <a:picLocks noGrp="1" noChangeAspect="1"/>
           </p:cNvPicPr>
@@ -15029,8 +15095,8 @@
         </p:blipFill>
         <p:spPr>
           <a:xfrm>
-            <a:off x="1414150" y="1420837"/>
-            <a:ext cx="9037211" cy="4993591"/>
+            <a:off x="1963370" y="2052638"/>
+            <a:ext cx="7227035" cy="4195762"/>
           </a:xfrm>
         </p:spPr>
       </p:pic>
@@ -15092,10 +15158,39 @@
           </a:p>
         </p:txBody>
       </p:sp>
+      <p:pic>
+        <p:nvPicPr>
+          <p:cNvPr id="5" name="Content Placeholder 4"/>
+          <p:cNvPicPr>
+            <a:picLocks noGrp="1" noChangeAspect="1"/>
+          </p:cNvPicPr>
+          <p:nvPr>
+            <p:ph idx="1"/>
+          </p:nvPr>
+        </p:nvPicPr>
+        <p:blipFill>
+          <a:blip r:embed="rId2">
+            <a:extLst>
+              <a:ext uri="{28A0092B-C50C-407E-A947-70E740481C1C}">
+                <a14:useLocalDpi xmlns:a14="http://schemas.microsoft.com/office/drawing/2010/main" val="0"/>
+              </a:ext>
+            </a:extLst>
+          </a:blip>
+          <a:stretch>
+            <a:fillRect/>
+          </a:stretch>
+        </p:blipFill>
+        <p:spPr>
+          <a:xfrm>
+            <a:off x="1963370" y="2052638"/>
+            <a:ext cx="7227035" cy="4195762"/>
+          </a:xfrm>
+        </p:spPr>
+      </p:pic>
     </p:spTree>
     <p:extLst>
       <p:ext uri="{BB962C8B-B14F-4D97-AF65-F5344CB8AC3E}">
-        <p14:creationId xmlns:p14="http://schemas.microsoft.com/office/powerpoint/2010/main" val="1075357016"/>
+        <p14:creationId xmlns:p14="http://schemas.microsoft.com/office/powerpoint/2010/main" val="1362424093"/>
       </p:ext>
     </p:extLst>
   </p:cSld>
@@ -15496,7 +15591,7 @@
   <a:extraClrSchemeLst/>
   <a:extLst>
     <a:ext uri="{05A4C25C-085E-4340-85A3-A5531E510DB2}">
-      <thm15:themeFamily xmlns:thm15="http://schemas.microsoft.com/office/thememl/2012/main" name="Ion" id="{B8441ADB-2E43-4AF7-B97A-BD870242C6A8}" vid="{292E63A9-BB86-4E3D-B92A-7223C6510D2E}"/>
+      <thm15:themeFamily xmlns:thm15="http://schemas.microsoft.com/office/thememl/2012/main" xmlns="" name="Ion" id="{B8441ADB-2E43-4AF7-B97A-BD870242C6A8}" vid="{292E63A9-BB86-4E3D-B92A-7223C6510D2E}"/>
     </a:ext>
   </a:extLst>
 </a:theme>
@@ -15757,7 +15852,7 @@
   <a:extraClrSchemeLst/>
   <a:extLst>
     <a:ext uri="{05A4C25C-085E-4340-85A3-A5531E510DB2}">
-      <thm15:themeFamily xmlns:thm15="http://schemas.microsoft.com/office/thememl/2012/main" name="Office Theme" id="{62F939B6-93AF-4DB8-9C6B-D6C7DFDC589F}" vid="{4A3C46E8-61CC-4603-A589-7422A47A8E4A}"/>
+      <thm15:themeFamily xmlns:thm15="http://schemas.microsoft.com/office/thememl/2012/main" xmlns="" name="Office Theme" id="{62F939B6-93AF-4DB8-9C6B-D6C7DFDC589F}" vid="{4A3C46E8-61CC-4603-A589-7422A47A8E4A}"/>
     </a:ext>
   </a:extLst>
 </a:theme>

</xml_diff>

<commit_message>
Added cost to PDR Sun Sensors
</commit_message>
<xml_diff>
--- a/Presentations/PDR_Presentation.pptx
+++ b/Presentations/PDR_Presentation.pptx
@@ -137,7 +137,7 @@
   </p:defaultTextStyle>
   <p:extLst>
     <p:ext uri="{EFAFB233-063F-42B5-8137-9DF3F51BA10A}">
-      <p15:sldGuideLst xmlns:p15="http://schemas.microsoft.com/office/powerpoint/2012/main">
+      <p15:sldGuideLst xmlns:p15="http://schemas.microsoft.com/office/powerpoint/2012/main" xmlns="">
         <p15:guide id="1" orient="horz" pos="2160">
           <p15:clr>
             <a:srgbClr val="A4A3A4"/>
@@ -236,7 +236,7 @@
           <a:p>
             <a:fld id="{90D58D52-5CD9-4A4B-90F0-A7AB4F899008}" type="datetimeFigureOut">
               <a:rPr lang="en-US" smtClean="0"/>
-              <a:t>10/12/2015</a:t>
+              <a:t>10/13/2015</a:t>
             </a:fld>
             <a:endParaRPr lang="en-US"/>
           </a:p>
@@ -1234,7 +1234,7 @@
           <a:p>
             <a:fld id="{E20D963B-2D4F-495B-A2B5-E46053ACE7DA}" type="datetimeFigureOut">
               <a:rPr lang="en-US" smtClean="0"/>
-              <a:t>10/12/2015</a:t>
+              <a:t>10/13/2015</a:t>
             </a:fld>
             <a:endParaRPr lang="en-US"/>
           </a:p>
@@ -1509,7 +1509,7 @@
           <a:p>
             <a:fld id="{E20D963B-2D4F-495B-A2B5-E46053ACE7DA}" type="datetimeFigureOut">
               <a:rPr lang="en-US" smtClean="0"/>
-              <a:t>10/12/2015</a:t>
+              <a:t>10/13/2015</a:t>
             </a:fld>
             <a:endParaRPr lang="en-US"/>
           </a:p>
@@ -1703,7 +1703,7 @@
           <a:p>
             <a:fld id="{E20D963B-2D4F-495B-A2B5-E46053ACE7DA}" type="datetimeFigureOut">
               <a:rPr lang="en-US" smtClean="0"/>
-              <a:t>10/12/2015</a:t>
+              <a:t>10/13/2015</a:t>
             </a:fld>
             <a:endParaRPr lang="en-US"/>
           </a:p>
@@ -1976,7 +1976,7 @@
           <a:p>
             <a:fld id="{E20D963B-2D4F-495B-A2B5-E46053ACE7DA}" type="datetimeFigureOut">
               <a:rPr lang="en-US" smtClean="0"/>
-              <a:t>10/12/2015</a:t>
+              <a:t>10/13/2015</a:t>
             </a:fld>
             <a:endParaRPr lang="en-US"/>
           </a:p>
@@ -2317,7 +2317,7 @@
           <a:p>
             <a:fld id="{E20D963B-2D4F-495B-A2B5-E46053ACE7DA}" type="datetimeFigureOut">
               <a:rPr lang="en-US" smtClean="0"/>
-              <a:t>10/12/2015</a:t>
+              <a:t>10/13/2015</a:t>
             </a:fld>
             <a:endParaRPr lang="en-US"/>
           </a:p>
@@ -2940,7 +2940,7 @@
           <a:p>
             <a:fld id="{E20D963B-2D4F-495B-A2B5-E46053ACE7DA}" type="datetimeFigureOut">
               <a:rPr lang="en-US" smtClean="0"/>
-              <a:t>10/12/2015</a:t>
+              <a:t>10/13/2015</a:t>
             </a:fld>
             <a:endParaRPr lang="en-US"/>
           </a:p>
@@ -3800,7 +3800,7 @@
           <a:p>
             <a:fld id="{E20D963B-2D4F-495B-A2B5-E46053ACE7DA}" type="datetimeFigureOut">
               <a:rPr lang="en-US" smtClean="0"/>
-              <a:t>10/12/2015</a:t>
+              <a:t>10/13/2015</a:t>
             </a:fld>
             <a:endParaRPr lang="en-US"/>
           </a:p>
@@ -3970,7 +3970,7 @@
           <a:p>
             <a:fld id="{E20D963B-2D4F-495B-A2B5-E46053ACE7DA}" type="datetimeFigureOut">
               <a:rPr lang="en-US" smtClean="0"/>
-              <a:t>10/12/2015</a:t>
+              <a:t>10/13/2015</a:t>
             </a:fld>
             <a:endParaRPr lang="en-US"/>
           </a:p>
@@ -4150,7 +4150,7 @@
           <a:p>
             <a:fld id="{E20D963B-2D4F-495B-A2B5-E46053ACE7DA}" type="datetimeFigureOut">
               <a:rPr lang="en-US" smtClean="0"/>
-              <a:t>10/12/2015</a:t>
+              <a:t>10/13/2015</a:t>
             </a:fld>
             <a:endParaRPr lang="en-US"/>
           </a:p>
@@ -4530,7 +4530,7 @@
           <a:p>
             <a:fld id="{E20D963B-2D4F-495B-A2B5-E46053ACE7DA}" type="datetimeFigureOut">
               <a:rPr lang="en-US" smtClean="0"/>
-              <a:t>10/12/2015</a:t>
+              <a:t>10/13/2015</a:t>
             </a:fld>
             <a:endParaRPr lang="en-US"/>
           </a:p>
@@ -4822,7 +4822,7 @@
           <a:p>
             <a:fld id="{E20D963B-2D4F-495B-A2B5-E46053ACE7DA}" type="datetimeFigureOut">
               <a:rPr lang="en-US" smtClean="0"/>
-              <a:t>10/12/2015</a:t>
+              <a:t>10/13/2015</a:t>
             </a:fld>
             <a:endParaRPr lang="en-US"/>
           </a:p>
@@ -5266,7 +5266,7 @@
           <a:p>
             <a:fld id="{E20D963B-2D4F-495B-A2B5-E46053ACE7DA}" type="datetimeFigureOut">
               <a:rPr lang="en-US" smtClean="0"/>
-              <a:t>10/12/2015</a:t>
+              <a:t>10/13/2015</a:t>
             </a:fld>
             <a:endParaRPr lang="en-US"/>
           </a:p>
@@ -5384,7 +5384,7 @@
           <a:p>
             <a:fld id="{E20D963B-2D4F-495B-A2B5-E46053ACE7DA}" type="datetimeFigureOut">
               <a:rPr lang="en-US" smtClean="0"/>
-              <a:t>10/12/2015</a:t>
+              <a:t>10/13/2015</a:t>
             </a:fld>
             <a:endParaRPr lang="en-US"/>
           </a:p>
@@ -5479,7 +5479,7 @@
           <a:p>
             <a:fld id="{E20D963B-2D4F-495B-A2B5-E46053ACE7DA}" type="datetimeFigureOut">
               <a:rPr lang="en-US" smtClean="0"/>
-              <a:t>10/12/2015</a:t>
+              <a:t>10/13/2015</a:t>
             </a:fld>
             <a:endParaRPr lang="en-US"/>
           </a:p>
@@ -5758,7 +5758,7 @@
           <a:p>
             <a:fld id="{E20D963B-2D4F-495B-A2B5-E46053ACE7DA}" type="datetimeFigureOut">
               <a:rPr lang="en-US" smtClean="0"/>
-              <a:t>10/12/2015</a:t>
+              <a:t>10/13/2015</a:t>
             </a:fld>
             <a:endParaRPr lang="en-US"/>
           </a:p>
@@ -6033,7 +6033,7 @@
           <a:p>
             <a:fld id="{E20D963B-2D4F-495B-A2B5-E46053ACE7DA}" type="datetimeFigureOut">
               <a:rPr lang="en-US" smtClean="0"/>
-              <a:t>10/12/2015</a:t>
+              <a:t>10/13/2015</a:t>
             </a:fld>
             <a:endParaRPr lang="en-US"/>
           </a:p>
@@ -6435,7 +6435,7 @@
           <a:p>
             <a:fld id="{E20D963B-2D4F-495B-A2B5-E46053ACE7DA}" type="datetimeFigureOut">
               <a:rPr lang="en-US" smtClean="0"/>
-              <a:t>10/12/2015</a:t>
+              <a:t>10/13/2015</a:t>
             </a:fld>
             <a:endParaRPr lang="en-US"/>
           </a:p>
@@ -8991,14 +8991,14 @@
             <p:ph idx="1"/>
             <p:extLst>
               <p:ext uri="{D42A27DB-BD31-4B8C-83A1-F6EECF244321}">
-                <p14:modId xmlns:p14="http://schemas.microsoft.com/office/powerpoint/2010/main" val="3553086323"/>
+                <p14:modId xmlns:p14="http://schemas.microsoft.com/office/powerpoint/2010/main" val="3095906834"/>
               </p:ext>
             </p:extLst>
           </p:nvPr>
         </p:nvGraphicFramePr>
         <p:xfrm>
-          <a:off x="474085" y="2948069"/>
-          <a:ext cx="11078817" cy="3242927"/>
+          <a:off x="515649" y="2885723"/>
+          <a:ext cx="11078817" cy="3761027"/>
         </p:xfrm>
         <a:graphic>
           <a:graphicData uri="http://schemas.openxmlformats.org/drawingml/2006/table">
@@ -9010,8 +9010,8 @@
                 <a:gridCol w="2250806"/>
                 <a:gridCol w="1881288"/>
                 <a:gridCol w="2376121"/>
-                <a:gridCol w="2285301"/>
-                <a:gridCol w="2285301"/>
+                <a:gridCol w="2369518"/>
+                <a:gridCol w="2201084"/>
               </a:tblGrid>
               <a:tr h="412596">
                 <a:tc>
@@ -9404,7 +9404,7 @@
                   <a:tcPr/>
                 </a:tc>
               </a:tr>
-              <a:tr h="864619">
+              <a:tr h="415639">
                 <a:tc>
                   <a:txBody>
                     <a:bodyPr/>
@@ -9463,6 +9463,78 @@
                       <a:r>
                         <a:rPr lang="en-US" baseline="0" dirty="0" smtClean="0"/>
                         <a:t>UKube‐1 and  TDS‐1</a:t>
+                      </a:r>
+                      <a:endParaRPr lang="en-US" dirty="0"/>
+                    </a:p>
+                  </a:txBody>
+                  <a:tcPr/>
+                </a:tc>
+                <a:tc>
+                  <a:txBody>
+                    <a:bodyPr/>
+                    <a:lstStyle/>
+                    <a:p>
+                      <a:r>
+                        <a:rPr lang="en-US" dirty="0" smtClean="0"/>
+                        <a:t>N/A</a:t>
+                      </a:r>
+                      <a:endParaRPr lang="en-US" dirty="0"/>
+                    </a:p>
+                  </a:txBody>
+                  <a:tcPr/>
+                </a:tc>
+              </a:tr>
+              <a:tr h="692760">
+                <a:tc>
+                  <a:txBody>
+                    <a:bodyPr/>
+                    <a:lstStyle/>
+                    <a:p>
+                      <a:r>
+                        <a:rPr lang="en-US" dirty="0" smtClean="0"/>
+                        <a:t>Cost ($)</a:t>
+                      </a:r>
+                      <a:endParaRPr lang="en-US" dirty="0"/>
+                    </a:p>
+                  </a:txBody>
+                  <a:tcPr/>
+                </a:tc>
+                <a:tc>
+                  <a:txBody>
+                    <a:bodyPr/>
+                    <a:lstStyle/>
+                    <a:p>
+                      <a:r>
+                        <a:rPr lang="en-US" dirty="0" smtClean="0"/>
+                        <a:t>Included in solar panels</a:t>
+                      </a:r>
+                      <a:endParaRPr lang="en-US" dirty="0"/>
+                    </a:p>
+                  </a:txBody>
+                  <a:tcPr/>
+                </a:tc>
+                <a:tc>
+                  <a:txBody>
+                    <a:bodyPr/>
+                    <a:lstStyle/>
+                    <a:p>
+                      <a:r>
+                        <a:rPr lang="en-US" dirty="0" smtClean="0"/>
+                        <a:t>3362.35</a:t>
+                      </a:r>
+                      <a:endParaRPr lang="en-US" dirty="0"/>
+                    </a:p>
+                  </a:txBody>
+                  <a:tcPr/>
+                </a:tc>
+                <a:tc>
+                  <a:txBody>
+                    <a:bodyPr/>
+                    <a:lstStyle/>
+                    <a:p>
+                      <a:r>
+                        <a:rPr lang="en-US" dirty="0" smtClean="0"/>
+                        <a:t>3300</a:t>
                       </a:r>
                       <a:endParaRPr lang="en-US" dirty="0"/>
                     </a:p>
@@ -10385,21 +10457,8 @@
                   <a:srgbClr val="FFC000"/>
                 </a:solidFill>
               </a:rPr>
-              <a:t>Team </a:t>
-            </a:r>
-            <a:r>
-              <a:rPr lang="en-US" sz="2400" u="sng" dirty="0" smtClean="0">
-                <a:solidFill>
-                  <a:srgbClr val="FFC000"/>
-                </a:solidFill>
-              </a:rPr>
-              <a:t>Lead/Structure</a:t>
-            </a:r>
-            <a:endParaRPr lang="en-US" sz="2400" u="sng" dirty="0" smtClean="0">
-              <a:solidFill>
-                <a:srgbClr val="FFC000"/>
-              </a:solidFill>
-            </a:endParaRPr>
+              <a:t>Team Lead/Structure</a:t>
+            </a:r>
           </a:p>
           <a:p>
             <a:pPr marL="457200" lvl="1" indent="0" algn="ctr">
@@ -15581,7 +15640,7 @@
   <a:extraClrSchemeLst/>
   <a:extLst>
     <a:ext uri="{05A4C25C-085E-4340-85A3-A5531E510DB2}">
-      <thm15:themeFamily xmlns:thm15="http://schemas.microsoft.com/office/thememl/2012/main" name="Ion" id="{B8441ADB-2E43-4AF7-B97A-BD870242C6A8}" vid="{292E63A9-BB86-4E3D-B92A-7223C6510D2E}"/>
+      <thm15:themeFamily xmlns:thm15="http://schemas.microsoft.com/office/thememl/2012/main" xmlns="" name="Ion" id="{B8441ADB-2E43-4AF7-B97A-BD870242C6A8}" vid="{292E63A9-BB86-4E3D-B92A-7223C6510D2E}"/>
     </a:ext>
   </a:extLst>
 </a:theme>
@@ -15842,7 +15901,7 @@
   <a:extraClrSchemeLst/>
   <a:extLst>
     <a:ext uri="{05A4C25C-085E-4340-85A3-A5531E510DB2}">
-      <thm15:themeFamily xmlns:thm15="http://schemas.microsoft.com/office/thememl/2012/main" name="Office Theme" id="{62F939B6-93AF-4DB8-9C6B-D6C7DFDC589F}" vid="{4A3C46E8-61CC-4603-A589-7422A47A8E4A}"/>
+      <thm15:themeFamily xmlns:thm15="http://schemas.microsoft.com/office/thememl/2012/main" xmlns="" name="Office Theme" id="{62F939B6-93AF-4DB8-9C6B-D6C7DFDC589F}" vid="{4A3C46E8-61CC-4603-A589-7422A47A8E4A}"/>
     </a:ext>
   </a:extLst>
 </a:theme>

</xml_diff>

<commit_message>
Added Funcube manual and modified Communication slides
Still need a bit more info on some slides
</commit_message>
<xml_diff>
--- a/Presentations/PDR_Presentation.pptx
+++ b/Presentations/PDR_Presentation.pptx
@@ -5,7 +5,7 @@
     <p:sldMasterId id="2147483660" r:id="rId1"/>
   </p:sldMasterIdLst>
   <p:notesMasterIdLst>
-    <p:notesMasterId r:id="rId31"/>
+    <p:notesMasterId r:id="rId30"/>
   </p:notesMasterIdLst>
   <p:sldIdLst>
     <p:sldId id="256" r:id="rId2"/>
@@ -29,14 +29,13 @@
     <p:sldId id="287" r:id="rId20"/>
     <p:sldId id="288" r:id="rId21"/>
     <p:sldId id="289" r:id="rId22"/>
-    <p:sldId id="290" r:id="rId23"/>
-    <p:sldId id="291" r:id="rId24"/>
-    <p:sldId id="303" r:id="rId25"/>
-    <p:sldId id="280" r:id="rId26"/>
-    <p:sldId id="281" r:id="rId27"/>
-    <p:sldId id="282" r:id="rId28"/>
-    <p:sldId id="283" r:id="rId29"/>
-    <p:sldId id="304" r:id="rId30"/>
+    <p:sldId id="305" r:id="rId23"/>
+    <p:sldId id="303" r:id="rId24"/>
+    <p:sldId id="280" r:id="rId25"/>
+    <p:sldId id="281" r:id="rId26"/>
+    <p:sldId id="282" r:id="rId27"/>
+    <p:sldId id="283" r:id="rId28"/>
+    <p:sldId id="304" r:id="rId29"/>
   </p:sldIdLst>
   <p:sldSz cx="12192000" cy="6858000"/>
   <p:notesSz cx="6858000" cy="9144000"/>
@@ -992,6 +991,90 @@
           <a:bodyPr/>
           <a:lstStyle/>
           <a:p>
+            <a:endParaRPr lang="en-US" dirty="0"/>
+          </a:p>
+        </p:txBody>
+      </p:sp>
+      <p:sp>
+        <p:nvSpPr>
+          <p:cNvPr id="4" name="Slide Number Placeholder 3"/>
+          <p:cNvSpPr>
+            <a:spLocks noGrp="1"/>
+          </p:cNvSpPr>
+          <p:nvPr>
+            <p:ph type="sldNum" sz="quarter" idx="10"/>
+          </p:nvPr>
+        </p:nvSpPr>
+        <p:spPr/>
+        <p:txBody>
+          <a:bodyPr/>
+          <a:lstStyle/>
+          <a:p>
+            <a:fld id="{A42E6D89-32EA-4356-9CEB-BD1BF313CB8D}" type="slidenum">
+              <a:rPr lang="en-US" smtClean="0"/>
+              <a:t>22</a:t>
+            </a:fld>
+            <a:endParaRPr lang="en-US"/>
+          </a:p>
+        </p:txBody>
+      </p:sp>
+    </p:spTree>
+    <p:extLst>
+      <p:ext uri="{BB962C8B-B14F-4D97-AF65-F5344CB8AC3E}">
+        <p14:creationId xmlns:p14="http://schemas.microsoft.com/office/powerpoint/2010/main" val="16553970"/>
+      </p:ext>
+    </p:extLst>
+  </p:cSld>
+  <p:clrMapOvr>
+    <a:masterClrMapping/>
+  </p:clrMapOvr>
+</p:notes>
+</file>
+
+<file path=ppt/notesSlides/notesSlide7.xml><?xml version="1.0" encoding="utf-8"?>
+<p:notes xmlns:a="http://schemas.openxmlformats.org/drawingml/2006/main" xmlns:r="http://schemas.openxmlformats.org/officeDocument/2006/relationships" xmlns:p="http://schemas.openxmlformats.org/presentationml/2006/main">
+  <p:cSld>
+    <p:spTree>
+      <p:nvGrpSpPr>
+        <p:cNvPr id="1" name=""/>
+        <p:cNvGrpSpPr/>
+        <p:nvPr/>
+      </p:nvGrpSpPr>
+      <p:grpSpPr>
+        <a:xfrm>
+          <a:off x="0" y="0"/>
+          <a:ext cx="0" cy="0"/>
+          <a:chOff x="0" y="0"/>
+          <a:chExt cx="0" cy="0"/>
+        </a:xfrm>
+      </p:grpSpPr>
+      <p:sp>
+        <p:nvSpPr>
+          <p:cNvPr id="2" name="Slide Image Placeholder 1"/>
+          <p:cNvSpPr>
+            <a:spLocks noGrp="1" noRot="1" noChangeAspect="1"/>
+          </p:cNvSpPr>
+          <p:nvPr>
+            <p:ph type="sldImg"/>
+          </p:nvPr>
+        </p:nvSpPr>
+        <p:spPr/>
+      </p:sp>
+      <p:sp>
+        <p:nvSpPr>
+          <p:cNvPr id="3" name="Notes Placeholder 2"/>
+          <p:cNvSpPr>
+            <a:spLocks noGrp="1"/>
+          </p:cNvSpPr>
+          <p:nvPr>
+            <p:ph type="body" idx="1"/>
+          </p:nvPr>
+        </p:nvSpPr>
+        <p:spPr/>
+        <p:txBody>
+          <a:bodyPr/>
+          <a:lstStyle/>
+          <a:p>
             <a:r>
               <a:rPr lang="en-US" dirty="0" smtClean="0"/>
               <a:t>The “Best” scenario for the Radio is if we can somehow</a:t>
@@ -1029,7 +1112,7 @@
           <a:p>
             <a:fld id="{4914D37F-4D0B-4DCB-BAF9-AC1A01C3816B}" type="slidenum">
               <a:rPr lang="en-US" smtClean="0"/>
-              <a:t>26</a:t>
+              <a:t>25</a:t>
             </a:fld>
             <a:endParaRPr lang="en-US"/>
           </a:p>
@@ -7598,7 +7681,7 @@
             <p:ph idx="1"/>
             <p:extLst>
               <p:ext uri="{D42A27DB-BD31-4B8C-83A1-F6EECF244321}">
-                <p14:modId xmlns:p14="http://schemas.microsoft.com/office/powerpoint/2010/main" val="2159364954"/>
+                <p14:modId xmlns:p14="http://schemas.microsoft.com/office/powerpoint/2010/main" val="3369906007"/>
               </p:ext>
             </p:extLst>
           </p:nvPr>
@@ -7719,11 +7802,27 @@
                     <a:p>
                       <a:r>
                         <a:rPr lang="en-US" dirty="0" smtClean="0"/>
-                        <a:t>71 by</a:t>
+                        <a:t>71 </a:t>
+                      </a:r>
+                      <a:r>
+                        <a:rPr lang="en-US" dirty="0" smtClean="0"/>
+                        <a:t>x</a:t>
                       </a:r>
                       <a:r>
                         <a:rPr lang="en-US" baseline="0" dirty="0" smtClean="0"/>
-                        <a:t> 35 by 12.5</a:t>
+                        <a:t> </a:t>
+                      </a:r>
+                      <a:r>
+                        <a:rPr lang="en-US" baseline="0" dirty="0" smtClean="0"/>
+                        <a:t>35 </a:t>
+                      </a:r>
+                      <a:r>
+                        <a:rPr lang="en-US" baseline="0" dirty="0" smtClean="0"/>
+                        <a:t>x </a:t>
+                      </a:r>
+                      <a:r>
+                        <a:rPr lang="en-US" baseline="0" dirty="0" smtClean="0"/>
+                        <a:t>12.5</a:t>
                       </a:r>
                       <a:endParaRPr lang="en-US" dirty="0"/>
                     </a:p>
@@ -7737,7 +7836,23 @@
                     <a:p>
                       <a:r>
                         <a:rPr lang="en-US" dirty="0" smtClean="0"/>
-                        <a:t>71 by 46 by 11</a:t>
+                        <a:t>71 </a:t>
+                      </a:r>
+                      <a:r>
+                        <a:rPr lang="en-US" dirty="0" smtClean="0"/>
+                        <a:t>x </a:t>
+                      </a:r>
+                      <a:r>
+                        <a:rPr lang="en-US" dirty="0" smtClean="0"/>
+                        <a:t>46 </a:t>
+                      </a:r>
+                      <a:r>
+                        <a:rPr lang="en-US" dirty="0" smtClean="0"/>
+                        <a:t>x </a:t>
+                      </a:r>
+                      <a:r>
+                        <a:rPr lang="en-US" dirty="0" smtClean="0"/>
+                        <a:t>11</a:t>
                       </a:r>
                       <a:endParaRPr lang="en-US" dirty="0"/>
                     </a:p>
@@ -7751,7 +7866,23 @@
                     <a:p>
                       <a:r>
                         <a:rPr lang="en-US" dirty="0" smtClean="0"/>
-                        <a:t>100 by 70 by 25</a:t>
+                        <a:t>100 </a:t>
+                      </a:r>
+                      <a:r>
+                        <a:rPr lang="en-US" dirty="0" smtClean="0"/>
+                        <a:t>x </a:t>
+                      </a:r>
+                      <a:r>
+                        <a:rPr lang="en-US" dirty="0" smtClean="0"/>
+                        <a:t>70 </a:t>
+                      </a:r>
+                      <a:r>
+                        <a:rPr lang="en-US" dirty="0" smtClean="0"/>
+                        <a:t>x </a:t>
+                      </a:r>
+                      <a:r>
+                        <a:rPr lang="en-US" dirty="0" smtClean="0"/>
+                        <a:t>25</a:t>
                       </a:r>
                       <a:endParaRPr lang="en-US" dirty="0"/>
                     </a:p>
@@ -7977,11 +8108,7 @@
                     <a:p>
                       <a:r>
                         <a:rPr lang="en-US" dirty="0" smtClean="0"/>
-                        <a:t>6,000</a:t>
-                      </a:r>
-                      <a:r>
-                        <a:rPr lang="en-US" dirty="0" smtClean="0"/>
-                        <a:t>*</a:t>
+                        <a:t>6,000*</a:t>
                       </a:r>
                       <a:endParaRPr lang="en-US" dirty="0"/>
                     </a:p>
@@ -8111,7 +8238,7 @@
             <p:ph idx="1"/>
             <p:extLst>
               <p:ext uri="{D42A27DB-BD31-4B8C-83A1-F6EECF244321}">
-                <p14:modId xmlns:p14="http://schemas.microsoft.com/office/powerpoint/2010/main" val="2332800956"/>
+                <p14:modId xmlns:p14="http://schemas.microsoft.com/office/powerpoint/2010/main" val="2251670377"/>
               </p:ext>
             </p:extLst>
           </p:nvPr>
@@ -8632,7 +8759,7 @@
                     <a:p>
                       <a:r>
                         <a:rPr lang="en-US" dirty="0" smtClean="0"/>
-                        <a:t>1,000</a:t>
+                        <a:t>1,000*</a:t>
                       </a:r>
                       <a:endParaRPr lang="en-US" dirty="0"/>
                     </a:p>
@@ -8669,7 +8796,6 @@
               <a:rPr lang="en-US" dirty="0"/>
               <a:t>*Currently owned and wouldn’t contribute to total budget</a:t>
             </a:r>
-            <a:endParaRPr lang="en-US" dirty="0"/>
           </a:p>
         </p:txBody>
       </p:sp>
@@ -11052,654 +11178,455 @@
             <p:ph type="title"/>
           </p:nvPr>
         </p:nvSpPr>
-        <p:spPr/>
+        <p:spPr>
+          <a:xfrm>
+            <a:off x="646111" y="452718"/>
+            <a:ext cx="9404723" cy="829982"/>
+          </a:xfrm>
+        </p:spPr>
         <p:txBody>
           <a:bodyPr/>
           <a:lstStyle/>
           <a:p>
             <a:r>
               <a:rPr lang="en-US" dirty="0" smtClean="0"/>
-              <a:t>Communication – Scenario 1</a:t>
+              <a:t>Communication - Hardware</a:t>
             </a:r>
             <a:endParaRPr lang="en-US" dirty="0"/>
           </a:p>
         </p:txBody>
       </p:sp>
-      <p:pic>
-        <p:nvPicPr>
-          <p:cNvPr id="4" name="Picture 3"/>
-          <p:cNvPicPr>
-            <a:picLocks noChangeAspect="1"/>
-          </p:cNvPicPr>
-          <p:nvPr/>
-        </p:nvPicPr>
-        <p:blipFill>
-          <a:blip r:embed="rId2">
-            <a:extLst>
-              <a:ext uri="{28A0092B-C50C-407E-A947-70E740481C1C}">
-                <a14:useLocalDpi xmlns:a14="http://schemas.microsoft.com/office/drawing/2010/main" val="0"/>
-              </a:ext>
-            </a:extLst>
-          </a:blip>
-          <a:stretch>
-            <a:fillRect/>
-          </a:stretch>
-        </p:blipFill>
-        <p:spPr>
-          <a:xfrm>
-            <a:off x="5177121" y="4425407"/>
-            <a:ext cx="1904440" cy="1815169"/>
-          </a:xfrm>
-          <a:prstGeom prst="rect">
-            <a:avLst/>
-          </a:prstGeom>
-        </p:spPr>
-      </p:pic>
-      <p:pic>
-        <p:nvPicPr>
-          <p:cNvPr id="5" name="Picture 4"/>
-          <p:cNvPicPr>
-            <a:picLocks noChangeAspect="1"/>
-          </p:cNvPicPr>
-          <p:nvPr/>
-        </p:nvPicPr>
-        <p:blipFill>
-          <a:blip r:embed="rId3" cstate="print">
-            <a:extLst>
-              <a:ext uri="{28A0092B-C50C-407E-A947-70E740481C1C}">
-                <a14:useLocalDpi xmlns:a14="http://schemas.microsoft.com/office/drawing/2010/main" val="0"/>
-              </a:ext>
-            </a:extLst>
-          </a:blip>
-          <a:stretch>
-            <a:fillRect/>
-          </a:stretch>
-        </p:blipFill>
-        <p:spPr>
-          <a:xfrm>
-            <a:off x="6703382" y="1987255"/>
-            <a:ext cx="1572457" cy="1513490"/>
-          </a:xfrm>
-          <a:prstGeom prst="rect">
-            <a:avLst/>
-          </a:prstGeom>
-        </p:spPr>
-      </p:pic>
-      <p:pic>
-        <p:nvPicPr>
-          <p:cNvPr id="6" name="Picture 5"/>
-          <p:cNvPicPr>
-            <a:picLocks noChangeAspect="1"/>
-          </p:cNvPicPr>
-          <p:nvPr/>
-        </p:nvPicPr>
-        <p:blipFill>
-          <a:blip r:embed="rId4">
-            <a:extLst>
-              <a:ext uri="{28A0092B-C50C-407E-A947-70E740481C1C}">
-                <a14:useLocalDpi xmlns:a14="http://schemas.microsoft.com/office/drawing/2010/main" val="0"/>
-              </a:ext>
-            </a:extLst>
-          </a:blip>
-          <a:stretch>
-            <a:fillRect/>
-          </a:stretch>
-        </p:blipFill>
-        <p:spPr>
-          <a:xfrm>
-            <a:off x="8439248" y="4658711"/>
-            <a:ext cx="3223172" cy="1813034"/>
-          </a:xfrm>
-          <a:prstGeom prst="rect">
-            <a:avLst/>
-          </a:prstGeom>
-        </p:spPr>
-      </p:pic>
-      <p:sp>
-        <p:nvSpPr>
-          <p:cNvPr id="7" name="TextBox 6"/>
-          <p:cNvSpPr txBox="1"/>
-          <p:nvPr/>
-        </p:nvSpPr>
-        <p:spPr>
-          <a:xfrm>
-            <a:off x="2666561" y="1646849"/>
-            <a:ext cx="1288499" cy="1200329"/>
-          </a:xfrm>
-          <a:prstGeom prst="rect">
-            <a:avLst/>
-          </a:prstGeom>
-          <a:noFill/>
-          <a:ln>
-            <a:solidFill>
-              <a:schemeClr val="tx1"/>
-            </a:solidFill>
-          </a:ln>
-        </p:spPr>
-        <p:txBody>
-          <a:bodyPr wrap="square" rtlCol="0">
-            <a:spAutoFit/>
-          </a:bodyPr>
-          <a:lstStyle/>
-          <a:p>
-            <a:r>
-              <a:rPr lang="en-US" dirty="0" smtClean="0"/>
-              <a:t>GPS</a:t>
-            </a:r>
-          </a:p>
-          <a:p>
-            <a:r>
-              <a:rPr lang="en-US" dirty="0" smtClean="0"/>
-              <a:t>  -Attitude</a:t>
-            </a:r>
-          </a:p>
-          <a:p>
-            <a:r>
-              <a:rPr lang="en-US" dirty="0"/>
-              <a:t> </a:t>
-            </a:r>
-            <a:r>
-              <a:rPr lang="en-US" dirty="0" smtClean="0"/>
-              <a:t> -Position</a:t>
-            </a:r>
-          </a:p>
-          <a:p>
-            <a:r>
-              <a:rPr lang="en-US" dirty="0"/>
-              <a:t> </a:t>
-            </a:r>
-            <a:r>
-              <a:rPr lang="en-US" dirty="0" smtClean="0"/>
-              <a:t> -Time</a:t>
-            </a:r>
-            <a:endParaRPr lang="en-US" dirty="0"/>
-          </a:p>
-        </p:txBody>
-      </p:sp>
-      <p:sp>
-        <p:nvSpPr>
-          <p:cNvPr id="8" name="TextBox 7"/>
-          <p:cNvSpPr txBox="1"/>
-          <p:nvPr/>
-        </p:nvSpPr>
-        <p:spPr>
-          <a:xfrm>
-            <a:off x="540635" y="1646849"/>
-            <a:ext cx="1564062" cy="923330"/>
-          </a:xfrm>
-          <a:prstGeom prst="rect">
-            <a:avLst/>
-          </a:prstGeom>
-          <a:noFill/>
-          <a:ln>
-            <a:solidFill>
-              <a:schemeClr val="tx1"/>
-            </a:solidFill>
-          </a:ln>
-        </p:spPr>
-        <p:txBody>
-          <a:bodyPr wrap="square" rtlCol="0">
-            <a:spAutoFit/>
-          </a:bodyPr>
-          <a:lstStyle/>
-          <a:p>
-            <a:r>
-              <a:rPr lang="en-US" dirty="0" smtClean="0"/>
-              <a:t>Power</a:t>
-            </a:r>
-          </a:p>
-          <a:p>
-            <a:r>
-              <a:rPr lang="en-US" dirty="0" smtClean="0"/>
-              <a:t>  -Wattage</a:t>
-            </a:r>
-          </a:p>
-          <a:p>
-            <a:r>
-              <a:rPr lang="en-US" dirty="0"/>
-              <a:t> </a:t>
-            </a:r>
-            <a:r>
-              <a:rPr lang="en-US" dirty="0" smtClean="0"/>
-              <a:t> -Battery</a:t>
-            </a:r>
-            <a:endParaRPr lang="en-US" dirty="0"/>
-          </a:p>
-        </p:txBody>
-      </p:sp>
-      <p:cxnSp>
-        <p:nvCxnSpPr>
-          <p:cNvPr id="10" name="Straight Arrow Connector 9"/>
-          <p:cNvCxnSpPr>
-            <a:stCxn id="7" idx="2"/>
-            <a:endCxn id="35" idx="0"/>
-          </p:cNvCxnSpPr>
-          <p:nvPr/>
-        </p:nvCxnSpPr>
-        <p:spPr>
-          <a:xfrm flipH="1">
-            <a:off x="1985999" y="2847178"/>
-            <a:ext cx="1324812" cy="1706379"/>
-          </a:xfrm>
-          <a:prstGeom prst="straightConnector1">
-            <a:avLst/>
-          </a:prstGeom>
-          <a:ln>
-            <a:solidFill>
-              <a:schemeClr val="tx1"/>
-            </a:solidFill>
-            <a:tailEnd type="none"/>
-          </a:ln>
-        </p:spPr>
-        <p:style>
-          <a:lnRef idx="1">
-            <a:schemeClr val="accent1"/>
-          </a:lnRef>
-          <a:fillRef idx="0">
-            <a:schemeClr val="accent1"/>
-          </a:fillRef>
-          <a:effectRef idx="0">
-            <a:schemeClr val="accent1"/>
-          </a:effectRef>
-          <a:fontRef idx="minor">
-            <a:schemeClr val="tx1"/>
-          </a:fontRef>
-        </p:style>
-      </p:cxnSp>
-      <p:cxnSp>
-        <p:nvCxnSpPr>
-          <p:cNvPr id="11" name="Straight Arrow Connector 10"/>
-          <p:cNvCxnSpPr>
-            <a:stCxn id="8" idx="2"/>
-            <a:endCxn id="35" idx="0"/>
-          </p:cNvCxnSpPr>
-          <p:nvPr/>
-        </p:nvCxnSpPr>
-        <p:spPr>
-          <a:xfrm>
-            <a:off x="1322666" y="2570179"/>
-            <a:ext cx="663333" cy="1983378"/>
-          </a:xfrm>
-          <a:prstGeom prst="straightConnector1">
-            <a:avLst/>
-          </a:prstGeom>
-          <a:ln>
-            <a:solidFill>
-              <a:schemeClr val="tx1"/>
-            </a:solidFill>
-            <a:tailEnd type="none"/>
-          </a:ln>
-        </p:spPr>
-        <p:style>
-          <a:lnRef idx="1">
-            <a:schemeClr val="accent1"/>
-          </a:lnRef>
-          <a:fillRef idx="0">
-            <a:schemeClr val="accent1"/>
-          </a:fillRef>
-          <a:effectRef idx="0">
-            <a:schemeClr val="accent1"/>
-          </a:effectRef>
-          <a:fontRef idx="minor">
-            <a:schemeClr val="tx1"/>
-          </a:fontRef>
-        </p:style>
-      </p:cxnSp>
-      <p:cxnSp>
-        <p:nvCxnSpPr>
-          <p:cNvPr id="16" name="Straight Arrow Connector 15"/>
-          <p:cNvCxnSpPr>
-            <a:stCxn id="4" idx="0"/>
-          </p:cNvCxnSpPr>
-          <p:nvPr/>
-        </p:nvCxnSpPr>
-        <p:spPr>
-          <a:xfrm flipV="1">
-            <a:off x="6129341" y="3287110"/>
-            <a:ext cx="775956" cy="1138297"/>
-          </a:xfrm>
-          <a:prstGeom prst="straightConnector1">
-            <a:avLst/>
-          </a:prstGeom>
-          <a:ln>
-            <a:solidFill>
-              <a:schemeClr val="tx1"/>
-            </a:solidFill>
-            <a:tailEnd type="triangle"/>
-          </a:ln>
-        </p:spPr>
-        <p:style>
-          <a:lnRef idx="1">
-            <a:schemeClr val="accent1"/>
-          </a:lnRef>
-          <a:fillRef idx="0">
-            <a:schemeClr val="accent1"/>
-          </a:fillRef>
-          <a:effectRef idx="0">
-            <a:schemeClr val="accent1"/>
-          </a:effectRef>
-          <a:fontRef idx="minor">
-            <a:schemeClr val="tx1"/>
-          </a:fontRef>
-        </p:style>
-      </p:cxnSp>
-      <p:sp>
-        <p:nvSpPr>
-          <p:cNvPr id="19" name="TextBox 18"/>
-          <p:cNvSpPr txBox="1"/>
-          <p:nvPr/>
-        </p:nvSpPr>
-        <p:spPr>
-          <a:xfrm>
-            <a:off x="5114658" y="4041940"/>
-            <a:ext cx="1726324" cy="369332"/>
-          </a:xfrm>
-          <a:prstGeom prst="rect">
-            <a:avLst/>
-          </a:prstGeom>
-          <a:noFill/>
-        </p:spPr>
-        <p:txBody>
-          <a:bodyPr wrap="square" rtlCol="0">
-            <a:spAutoFit/>
-          </a:bodyPr>
-          <a:lstStyle/>
-          <a:p>
-            <a:r>
-              <a:rPr lang="en-US" dirty="0" smtClean="0"/>
-              <a:t>Radio</a:t>
-            </a:r>
-          </a:p>
-        </p:txBody>
-      </p:sp>
-      <p:sp>
-        <p:nvSpPr>
-          <p:cNvPr id="20" name="TextBox 19"/>
-          <p:cNvSpPr txBox="1"/>
-          <p:nvPr/>
-        </p:nvSpPr>
-        <p:spPr>
-          <a:xfrm>
-            <a:off x="6794938" y="1576552"/>
-            <a:ext cx="1355834" cy="369332"/>
-          </a:xfrm>
-          <a:prstGeom prst="rect">
-            <a:avLst/>
-          </a:prstGeom>
-          <a:noFill/>
-        </p:spPr>
-        <p:txBody>
-          <a:bodyPr wrap="square" rtlCol="0">
-            <a:spAutoFit/>
-          </a:bodyPr>
-          <a:lstStyle/>
-          <a:p>
-            <a:r>
-              <a:rPr lang="en-US" dirty="0" smtClean="0"/>
-              <a:t>Antenna</a:t>
-            </a:r>
-          </a:p>
-        </p:txBody>
-      </p:sp>
-      <p:pic>
-        <p:nvPicPr>
-          <p:cNvPr id="21" name="Picture 20"/>
-          <p:cNvPicPr>
-            <a:picLocks noChangeAspect="1"/>
-          </p:cNvPicPr>
-          <p:nvPr/>
-        </p:nvPicPr>
-        <p:blipFill>
-          <a:blip r:embed="rId5">
-            <a:extLst>
-              <a:ext uri="{28A0092B-C50C-407E-A947-70E740481C1C}">
-                <a14:useLocalDpi xmlns:a14="http://schemas.microsoft.com/office/drawing/2010/main" val="0"/>
-              </a:ext>
-            </a:extLst>
-          </a:blip>
-          <a:stretch>
-            <a:fillRect/>
-          </a:stretch>
-        </p:blipFill>
-        <p:spPr>
-          <a:xfrm rot="2032425">
-            <a:off x="6571690" y="1891017"/>
-            <a:ext cx="3314705" cy="2966852"/>
-          </a:xfrm>
-          <a:prstGeom prst="rect">
-            <a:avLst/>
-          </a:prstGeom>
-        </p:spPr>
-      </p:pic>
-      <p:pic>
-        <p:nvPicPr>
-          <p:cNvPr id="22" name="Picture 21"/>
-          <p:cNvPicPr>
-            <a:picLocks noChangeAspect="1"/>
-          </p:cNvPicPr>
-          <p:nvPr/>
-        </p:nvPicPr>
-        <p:blipFill>
-          <a:blip r:embed="rId6" cstate="print">
-            <a:extLst>
-              <a:ext uri="{28A0092B-C50C-407E-A947-70E740481C1C}">
-                <a14:useLocalDpi xmlns:a14="http://schemas.microsoft.com/office/drawing/2010/main" val="0"/>
-              </a:ext>
-            </a:extLst>
-          </a:blip>
-          <a:stretch>
-            <a:fillRect/>
-          </a:stretch>
-        </p:blipFill>
-        <p:spPr>
-          <a:xfrm rot="18290028">
-            <a:off x="9608668" y="4737886"/>
-            <a:ext cx="649117" cy="714029"/>
-          </a:xfrm>
-          <a:prstGeom prst="rect">
-            <a:avLst/>
-          </a:prstGeom>
-        </p:spPr>
-      </p:pic>
-      <p:sp>
-        <p:nvSpPr>
-          <p:cNvPr id="35" name="TextBox 34"/>
-          <p:cNvSpPr txBox="1"/>
-          <p:nvPr/>
-        </p:nvSpPr>
-        <p:spPr>
-          <a:xfrm>
-            <a:off x="790916" y="4553557"/>
-            <a:ext cx="2390165" cy="646331"/>
-          </a:xfrm>
-          <a:prstGeom prst="rect">
-            <a:avLst/>
-          </a:prstGeom>
-          <a:noFill/>
-          <a:ln>
-            <a:solidFill>
-              <a:schemeClr val="tx1"/>
-            </a:solidFill>
-          </a:ln>
-        </p:spPr>
-        <p:txBody>
-          <a:bodyPr wrap="square" rtlCol="0">
-            <a:spAutoFit/>
-          </a:bodyPr>
-          <a:lstStyle/>
-          <a:p>
-            <a:r>
-              <a:rPr lang="en-US" dirty="0" smtClean="0"/>
-              <a:t>Flight Computer</a:t>
-            </a:r>
-          </a:p>
-          <a:p>
-            <a:r>
-              <a:rPr lang="en-US" dirty="0"/>
-              <a:t> </a:t>
-            </a:r>
-            <a:r>
-              <a:rPr lang="en-US" dirty="0" smtClean="0"/>
-              <a:t> -Assemble packet</a:t>
-            </a:r>
-            <a:endParaRPr lang="en-US" dirty="0"/>
-          </a:p>
-        </p:txBody>
-      </p:sp>
-      <p:cxnSp>
-        <p:nvCxnSpPr>
-          <p:cNvPr id="37" name="Straight Arrow Connector 36"/>
-          <p:cNvCxnSpPr>
-            <a:stCxn id="35" idx="3"/>
-            <a:endCxn id="4" idx="1"/>
-          </p:cNvCxnSpPr>
-          <p:nvPr/>
-        </p:nvCxnSpPr>
-        <p:spPr>
-          <a:xfrm>
-            <a:off x="3181081" y="4876723"/>
-            <a:ext cx="1996040" cy="456269"/>
-          </a:xfrm>
-          <a:prstGeom prst="straightConnector1">
-            <a:avLst/>
-          </a:prstGeom>
-          <a:ln>
-            <a:solidFill>
-              <a:schemeClr val="tx1"/>
-            </a:solidFill>
-            <a:tailEnd type="triangle"/>
-          </a:ln>
-        </p:spPr>
-        <p:style>
-          <a:lnRef idx="1">
-            <a:schemeClr val="accent1"/>
-          </a:lnRef>
-          <a:fillRef idx="0">
-            <a:schemeClr val="accent1"/>
-          </a:fillRef>
-          <a:effectRef idx="0">
-            <a:schemeClr val="accent1"/>
-          </a:effectRef>
-          <a:fontRef idx="minor">
-            <a:schemeClr val="tx1"/>
-          </a:fontRef>
-        </p:style>
-      </p:cxnSp>
-      <p:sp>
-        <p:nvSpPr>
-          <p:cNvPr id="44" name="TextBox 43"/>
-          <p:cNvSpPr txBox="1"/>
-          <p:nvPr/>
-        </p:nvSpPr>
-        <p:spPr>
-          <a:xfrm>
-            <a:off x="4451001" y="1646849"/>
-            <a:ext cx="1789386" cy="646331"/>
-          </a:xfrm>
-          <a:prstGeom prst="rect">
-            <a:avLst/>
-          </a:prstGeom>
-          <a:noFill/>
-          <a:ln>
-            <a:solidFill>
-              <a:schemeClr val="tx1"/>
-            </a:solidFill>
-          </a:ln>
-        </p:spPr>
-        <p:txBody>
-          <a:bodyPr wrap="square" rtlCol="0">
-            <a:spAutoFit/>
-          </a:bodyPr>
-          <a:lstStyle/>
-          <a:p>
-            <a:r>
-              <a:rPr lang="en-US" dirty="0" smtClean="0"/>
-              <a:t>Gamma Ray</a:t>
-            </a:r>
-            <a:r>
-              <a:rPr lang="en-US" dirty="0"/>
-              <a:t> </a:t>
-            </a:r>
-            <a:r>
-              <a:rPr lang="en-US" dirty="0" smtClean="0"/>
-              <a:t>Detector</a:t>
-            </a:r>
-          </a:p>
-        </p:txBody>
-      </p:sp>
-      <p:cxnSp>
-        <p:nvCxnSpPr>
-          <p:cNvPr id="46" name="Straight Arrow Connector 45"/>
-          <p:cNvCxnSpPr>
-            <a:stCxn id="44" idx="2"/>
-            <a:endCxn id="35" idx="0"/>
-          </p:cNvCxnSpPr>
-          <p:nvPr/>
-        </p:nvCxnSpPr>
-        <p:spPr>
-          <a:xfrm flipH="1">
-            <a:off x="1985999" y="2293180"/>
-            <a:ext cx="3359695" cy="2260377"/>
-          </a:xfrm>
-          <a:prstGeom prst="straightConnector1">
-            <a:avLst/>
-          </a:prstGeom>
-          <a:ln>
-            <a:solidFill>
-              <a:schemeClr val="tx1"/>
-            </a:solidFill>
-            <a:tailEnd type="none"/>
-          </a:ln>
-        </p:spPr>
-        <p:style>
-          <a:lnRef idx="1">
-            <a:schemeClr val="accent1"/>
-          </a:lnRef>
-          <a:fillRef idx="0">
-            <a:schemeClr val="accent1"/>
-          </a:fillRef>
-          <a:effectRef idx="0">
-            <a:schemeClr val="accent1"/>
-          </a:effectRef>
-          <a:fontRef idx="minor">
-            <a:schemeClr val="tx1"/>
-          </a:fontRef>
-        </p:style>
-      </p:cxnSp>
-      <p:sp>
-        <p:nvSpPr>
-          <p:cNvPr id="12" name="TextBox 11"/>
-          <p:cNvSpPr txBox="1"/>
-          <p:nvPr/>
-        </p:nvSpPr>
-        <p:spPr>
-          <a:xfrm>
-            <a:off x="526133" y="5717356"/>
-            <a:ext cx="3717833" cy="523220"/>
-          </a:xfrm>
-          <a:prstGeom prst="rect">
-            <a:avLst/>
-          </a:prstGeom>
-          <a:noFill/>
-        </p:spPr>
-        <p:txBody>
-          <a:bodyPr wrap="square" rtlCol="0">
-            <a:spAutoFit/>
-          </a:bodyPr>
-          <a:lstStyle/>
-          <a:p>
-            <a:r>
-              <a:rPr lang="en-US" sz="1400" dirty="0" smtClean="0"/>
-              <a:t>Used if data packets are large and connecting to ground stations is difficult</a:t>
-            </a:r>
-            <a:endParaRPr lang="en-US" sz="1400" dirty="0"/>
-          </a:p>
-        </p:txBody>
-      </p:sp>
+      <p:graphicFrame>
+        <p:nvGraphicFramePr>
+          <p:cNvPr id="4" name="Content Placeholder 3"/>
+          <p:cNvGraphicFramePr>
+            <a:graphicFrameLocks noGrp="1"/>
+          </p:cNvGraphicFramePr>
+          <p:nvPr>
+            <p:ph idx="1"/>
+            <p:extLst>
+              <p:ext uri="{D42A27DB-BD31-4B8C-83A1-F6EECF244321}">
+                <p14:modId xmlns:p14="http://schemas.microsoft.com/office/powerpoint/2010/main" val="2066533038"/>
+              </p:ext>
+            </p:extLst>
+          </p:nvPr>
+        </p:nvGraphicFramePr>
+        <p:xfrm>
+          <a:off x="1103313" y="1409700"/>
+          <a:ext cx="8947152" cy="4126577"/>
+        </p:xfrm>
+        <a:graphic>
+          <a:graphicData uri="http://schemas.openxmlformats.org/drawingml/2006/table">
+            <a:tbl>
+              <a:tblPr firstRow="1" bandRow="1">
+                <a:tableStyleId>{5C22544A-7EE6-4342-B048-85BDC9FD1C3A}</a:tableStyleId>
+              </a:tblPr>
+              <a:tblGrid>
+                <a:gridCol w="3019800"/>
+                <a:gridCol w="1720734"/>
+                <a:gridCol w="1969830"/>
+                <a:gridCol w="2236788"/>
+              </a:tblGrid>
+              <a:tr h="797523">
+                <a:tc>
+                  <a:txBody>
+                    <a:bodyPr/>
+                    <a:lstStyle/>
+                    <a:p>
+                      <a:r>
+                        <a:rPr lang="en-US" dirty="0" smtClean="0"/>
+                        <a:t>Specifications</a:t>
+                      </a:r>
+                      <a:endParaRPr lang="en-US" dirty="0"/>
+                    </a:p>
+                  </a:txBody>
+                  <a:tcPr/>
+                </a:tc>
+                <a:tc>
+                  <a:txBody>
+                    <a:bodyPr/>
+                    <a:lstStyle/>
+                    <a:p>
+                      <a:r>
+                        <a:rPr lang="en-US" dirty="0" err="1" smtClean="0"/>
+                        <a:t>FunCube</a:t>
+                      </a:r>
+                      <a:r>
+                        <a:rPr lang="en-US" dirty="0" smtClean="0"/>
+                        <a:t> Dongle Pro+</a:t>
+                      </a:r>
+                      <a:endParaRPr lang="en-US" dirty="0"/>
+                    </a:p>
+                  </a:txBody>
+                  <a:tcPr/>
+                </a:tc>
+                <a:tc>
+                  <a:txBody>
+                    <a:bodyPr/>
+                    <a:lstStyle/>
+                    <a:p>
+                      <a:r>
+                        <a:rPr lang="en-US" dirty="0" err="1" smtClean="0"/>
+                        <a:t>Freewave</a:t>
+                      </a:r>
+                      <a:r>
+                        <a:rPr lang="en-US" dirty="0" smtClean="0"/>
+                        <a:t> </a:t>
+                      </a:r>
+                    </a:p>
+                    <a:p>
+                      <a:r>
+                        <a:rPr lang="en-US" dirty="0" smtClean="0"/>
+                        <a:t>MM2-TTL</a:t>
+                      </a:r>
+                      <a:endParaRPr lang="en-US" dirty="0"/>
+                    </a:p>
+                  </a:txBody>
+                  <a:tcPr/>
+                </a:tc>
+                <a:tc>
+                  <a:txBody>
+                    <a:bodyPr/>
+                    <a:lstStyle/>
+                    <a:p>
+                      <a:endParaRPr lang="en-US" dirty="0"/>
+                    </a:p>
+                  </a:txBody>
+                  <a:tcPr/>
+                </a:tc>
+              </a:tr>
+              <a:tr h="462057">
+                <a:tc>
+                  <a:txBody>
+                    <a:bodyPr/>
+                    <a:lstStyle/>
+                    <a:p>
+                      <a:r>
+                        <a:rPr lang="en-US" dirty="0" smtClean="0"/>
+                        <a:t>Size (in)</a:t>
+                      </a:r>
+                      <a:endParaRPr lang="en-US" dirty="0"/>
+                    </a:p>
+                  </a:txBody>
+                  <a:tcPr/>
+                </a:tc>
+                <a:tc>
+                  <a:txBody>
+                    <a:bodyPr/>
+                    <a:lstStyle/>
+                    <a:p>
+                      <a:r>
+                        <a:rPr lang="en-US" dirty="0" smtClean="0"/>
+                        <a:t>3 x 0.75 x 0.15</a:t>
+                      </a:r>
+                      <a:endParaRPr lang="en-US" dirty="0"/>
+                    </a:p>
+                  </a:txBody>
+                  <a:tcPr/>
+                </a:tc>
+                <a:tc>
+                  <a:txBody>
+                    <a:bodyPr/>
+                    <a:lstStyle/>
+                    <a:p>
+                      <a:r>
+                        <a:rPr lang="en-US" dirty="0" smtClean="0"/>
+                        <a:t>2 x 1.4 x 0.38</a:t>
+                      </a:r>
+                      <a:endParaRPr lang="en-US" dirty="0"/>
+                    </a:p>
+                  </a:txBody>
+                  <a:tcPr/>
+                </a:tc>
+                <a:tc>
+                  <a:txBody>
+                    <a:bodyPr/>
+                    <a:lstStyle/>
+                    <a:p>
+                      <a:endParaRPr lang="en-US"/>
+                    </a:p>
+                  </a:txBody>
+                  <a:tcPr/>
+                </a:tc>
+              </a:tr>
+              <a:tr h="462057">
+                <a:tc>
+                  <a:txBody>
+                    <a:bodyPr/>
+                    <a:lstStyle/>
+                    <a:p>
+                      <a:r>
+                        <a:rPr lang="en-US" dirty="0" smtClean="0"/>
+                        <a:t>Power (W)</a:t>
+                      </a:r>
+                      <a:endParaRPr lang="en-US" dirty="0"/>
+                    </a:p>
+                  </a:txBody>
+                  <a:tcPr/>
+                </a:tc>
+                <a:tc>
+                  <a:txBody>
+                    <a:bodyPr/>
+                    <a:lstStyle/>
+                    <a:p>
+                      <a:r>
+                        <a:rPr lang="en-US" dirty="0" smtClean="0"/>
+                        <a:t>N/A</a:t>
+                      </a:r>
+                      <a:endParaRPr lang="en-US" dirty="0"/>
+                    </a:p>
+                  </a:txBody>
+                  <a:tcPr/>
+                </a:tc>
+                <a:tc>
+                  <a:txBody>
+                    <a:bodyPr/>
+                    <a:lstStyle/>
+                    <a:p>
+                      <a:r>
+                        <a:rPr lang="en-US" dirty="0" smtClean="0"/>
+                        <a:t>0.10 to 1.0</a:t>
+                      </a:r>
+                      <a:endParaRPr lang="en-US" dirty="0"/>
+                    </a:p>
+                  </a:txBody>
+                  <a:tcPr/>
+                </a:tc>
+                <a:tc>
+                  <a:txBody>
+                    <a:bodyPr/>
+                    <a:lstStyle/>
+                    <a:p>
+                      <a:endParaRPr lang="en-US"/>
+                    </a:p>
+                  </a:txBody>
+                  <a:tcPr/>
+                </a:tc>
+              </a:tr>
+              <a:tr h="462057">
+                <a:tc>
+                  <a:txBody>
+                    <a:bodyPr/>
+                    <a:lstStyle/>
+                    <a:p>
+                      <a:r>
+                        <a:rPr lang="en-US" baseline="0" dirty="0" smtClean="0"/>
+                        <a:t>Weight (g)</a:t>
+                      </a:r>
+                      <a:endParaRPr lang="en-US" dirty="0"/>
+                    </a:p>
+                  </a:txBody>
+                  <a:tcPr/>
+                </a:tc>
+                <a:tc>
+                  <a:txBody>
+                    <a:bodyPr/>
+                    <a:lstStyle/>
+                    <a:p>
+                      <a:endParaRPr lang="en-US" dirty="0"/>
+                    </a:p>
+                  </a:txBody>
+                  <a:tcPr/>
+                </a:tc>
+                <a:tc>
+                  <a:txBody>
+                    <a:bodyPr/>
+                    <a:lstStyle/>
+                    <a:p>
+                      <a:r>
+                        <a:rPr lang="en-US" dirty="0" smtClean="0"/>
+                        <a:t>14</a:t>
+                      </a:r>
+                      <a:endParaRPr lang="en-US" dirty="0"/>
+                    </a:p>
+                  </a:txBody>
+                  <a:tcPr/>
+                </a:tc>
+                <a:tc>
+                  <a:txBody>
+                    <a:bodyPr/>
+                    <a:lstStyle/>
+                    <a:p>
+                      <a:endParaRPr lang="en-US" dirty="0"/>
+                    </a:p>
+                  </a:txBody>
+                  <a:tcPr/>
+                </a:tc>
+              </a:tr>
+              <a:tr h="462057">
+                <a:tc>
+                  <a:txBody>
+                    <a:bodyPr/>
+                    <a:lstStyle/>
+                    <a:p>
+                      <a:r>
+                        <a:rPr lang="en-US" dirty="0" smtClean="0"/>
+                        <a:t>Data Transfer</a:t>
+                      </a:r>
+                      <a:r>
+                        <a:rPr lang="en-US" baseline="0" dirty="0" smtClean="0"/>
+                        <a:t> Rate (kbps)</a:t>
+                      </a:r>
+                      <a:endParaRPr lang="en-US" dirty="0"/>
+                    </a:p>
+                  </a:txBody>
+                  <a:tcPr/>
+                </a:tc>
+                <a:tc>
+                  <a:txBody>
+                    <a:bodyPr/>
+                    <a:lstStyle/>
+                    <a:p>
+                      <a:r>
+                        <a:rPr lang="en-US" dirty="0" smtClean="0"/>
+                        <a:t>N/A</a:t>
+                      </a:r>
+                      <a:endParaRPr lang="en-US" dirty="0"/>
+                    </a:p>
+                  </a:txBody>
+                  <a:tcPr/>
+                </a:tc>
+                <a:tc>
+                  <a:txBody>
+                    <a:bodyPr/>
+                    <a:lstStyle/>
+                    <a:p>
+                      <a:r>
+                        <a:rPr lang="en-US" dirty="0" smtClean="0"/>
+                        <a:t>115.2</a:t>
+                      </a:r>
+                      <a:endParaRPr lang="en-US" dirty="0"/>
+                    </a:p>
+                  </a:txBody>
+                  <a:tcPr/>
+                </a:tc>
+                <a:tc>
+                  <a:txBody>
+                    <a:bodyPr/>
+                    <a:lstStyle/>
+                    <a:p>
+                      <a:endParaRPr lang="en-US" dirty="0"/>
+                    </a:p>
+                  </a:txBody>
+                  <a:tcPr/>
+                </a:tc>
+              </a:tr>
+              <a:tr h="797523">
+                <a:tc>
+                  <a:txBody>
+                    <a:bodyPr/>
+                    <a:lstStyle/>
+                    <a:p>
+                      <a:r>
+                        <a:rPr lang="en-US" dirty="0" smtClean="0"/>
+                        <a:t>Space Heritage</a:t>
+                      </a:r>
+                      <a:endParaRPr lang="en-US" dirty="0"/>
+                    </a:p>
+                  </a:txBody>
+                  <a:tcPr/>
+                </a:tc>
+                <a:tc>
+                  <a:txBody>
+                    <a:bodyPr/>
+                    <a:lstStyle/>
+                    <a:p>
+                      <a:r>
+                        <a:rPr lang="en-US" dirty="0" err="1" smtClean="0"/>
+                        <a:t>FunCube</a:t>
+                      </a:r>
+                      <a:r>
+                        <a:rPr lang="en-US" baseline="0" dirty="0" smtClean="0"/>
+                        <a:t> Satellites </a:t>
+                      </a:r>
+                      <a:endParaRPr lang="en-US" dirty="0"/>
+                    </a:p>
+                  </a:txBody>
+                  <a:tcPr/>
+                </a:tc>
+                <a:tc>
+                  <a:txBody>
+                    <a:bodyPr/>
+                    <a:lstStyle/>
+                    <a:p>
+                      <a:endParaRPr lang="en-US" dirty="0"/>
+                    </a:p>
+                  </a:txBody>
+                  <a:tcPr/>
+                </a:tc>
+                <a:tc>
+                  <a:txBody>
+                    <a:bodyPr/>
+                    <a:lstStyle/>
+                    <a:p>
+                      <a:endParaRPr lang="en-US" dirty="0"/>
+                    </a:p>
+                  </a:txBody>
+                  <a:tcPr/>
+                </a:tc>
+              </a:tr>
+              <a:tr h="683303">
+                <a:tc>
+                  <a:txBody>
+                    <a:bodyPr/>
+                    <a:lstStyle/>
+                    <a:p>
+                      <a:r>
+                        <a:rPr lang="en-US" dirty="0" smtClean="0"/>
+                        <a:t>Cost ($)</a:t>
+                      </a:r>
+                      <a:endParaRPr lang="en-US" dirty="0"/>
+                    </a:p>
+                  </a:txBody>
+                  <a:tcPr/>
+                </a:tc>
+                <a:tc>
+                  <a:txBody>
+                    <a:bodyPr/>
+                    <a:lstStyle/>
+                    <a:p>
+                      <a:r>
+                        <a:rPr lang="en-US" dirty="0" smtClean="0"/>
+                        <a:t>325</a:t>
+                      </a:r>
+                      <a:endParaRPr lang="en-US" dirty="0"/>
+                    </a:p>
+                  </a:txBody>
+                  <a:tcPr/>
+                </a:tc>
+                <a:tc>
+                  <a:txBody>
+                    <a:bodyPr/>
+                    <a:lstStyle/>
+                    <a:p>
+                      <a:r>
+                        <a:rPr lang="en-US" dirty="0" smtClean="0"/>
+                        <a:t>650</a:t>
+                      </a:r>
+                      <a:endParaRPr lang="en-US" dirty="0"/>
+                    </a:p>
+                  </a:txBody>
+                  <a:tcPr/>
+                </a:tc>
+                <a:tc>
+                  <a:txBody>
+                    <a:bodyPr/>
+                    <a:lstStyle/>
+                    <a:p>
+                      <a:endParaRPr lang="en-US" dirty="0"/>
+                    </a:p>
+                  </a:txBody>
+                  <a:tcPr/>
+                </a:tc>
+              </a:tr>
+            </a:tbl>
+          </a:graphicData>
+        </a:graphic>
+      </p:graphicFrame>
     </p:spTree>
     <p:extLst>
       <p:ext uri="{BB962C8B-B14F-4D97-AF65-F5344CB8AC3E}">
-        <p14:creationId xmlns:p14="http://schemas.microsoft.com/office/powerpoint/2010/main" val="1154325271"/>
+        <p14:creationId xmlns:p14="http://schemas.microsoft.com/office/powerpoint/2010/main" val="1258591814"/>
       </p:ext>
     </p:extLst>
   </p:cSld>
@@ -11717,696 +11644,6 @@
 </file>
 
 <file path=ppt/slides/slide23.xml><?xml version="1.0" encoding="utf-8"?>
-<p:sld xmlns:a="http://schemas.openxmlformats.org/drawingml/2006/main" xmlns:r="http://schemas.openxmlformats.org/officeDocument/2006/relationships" xmlns:p="http://schemas.openxmlformats.org/presentationml/2006/main">
-  <p:cSld>
-    <p:spTree>
-      <p:nvGrpSpPr>
-        <p:cNvPr id="1" name=""/>
-        <p:cNvGrpSpPr/>
-        <p:nvPr/>
-      </p:nvGrpSpPr>
-      <p:grpSpPr>
-        <a:xfrm>
-          <a:off x="0" y="0"/>
-          <a:ext cx="0" cy="0"/>
-          <a:chOff x="0" y="0"/>
-          <a:chExt cx="0" cy="0"/>
-        </a:xfrm>
-      </p:grpSpPr>
-      <p:sp>
-        <p:nvSpPr>
-          <p:cNvPr id="2" name="Title 1"/>
-          <p:cNvSpPr>
-            <a:spLocks noGrp="1"/>
-          </p:cNvSpPr>
-          <p:nvPr>
-            <p:ph type="title"/>
-          </p:nvPr>
-        </p:nvSpPr>
-        <p:spPr/>
-        <p:txBody>
-          <a:bodyPr/>
-          <a:lstStyle/>
-          <a:p>
-            <a:r>
-              <a:rPr lang="en-US" dirty="0" smtClean="0"/>
-              <a:t>Communication – Scenario 2</a:t>
-            </a:r>
-            <a:endParaRPr lang="en-US" dirty="0"/>
-          </a:p>
-        </p:txBody>
-      </p:sp>
-      <p:pic>
-        <p:nvPicPr>
-          <p:cNvPr id="5" name="Picture 4"/>
-          <p:cNvPicPr>
-            <a:picLocks noChangeAspect="1"/>
-          </p:cNvPicPr>
-          <p:nvPr/>
-        </p:nvPicPr>
-        <p:blipFill>
-          <a:blip r:embed="rId2" cstate="print">
-            <a:extLst>
-              <a:ext uri="{28A0092B-C50C-407E-A947-70E740481C1C}">
-                <a14:useLocalDpi xmlns:a14="http://schemas.microsoft.com/office/drawing/2010/main" val="0"/>
-              </a:ext>
-            </a:extLst>
-          </a:blip>
-          <a:stretch>
-            <a:fillRect/>
-          </a:stretch>
-        </p:blipFill>
-        <p:spPr>
-          <a:xfrm>
-            <a:off x="6703382" y="1987255"/>
-            <a:ext cx="1572457" cy="1513490"/>
-          </a:xfrm>
-          <a:prstGeom prst="rect">
-            <a:avLst/>
-          </a:prstGeom>
-        </p:spPr>
-      </p:pic>
-      <p:pic>
-        <p:nvPicPr>
-          <p:cNvPr id="6" name="Picture 5"/>
-          <p:cNvPicPr>
-            <a:picLocks noChangeAspect="1"/>
-          </p:cNvPicPr>
-          <p:nvPr/>
-        </p:nvPicPr>
-        <p:blipFill>
-          <a:blip r:embed="rId3">
-            <a:extLst>
-              <a:ext uri="{28A0092B-C50C-407E-A947-70E740481C1C}">
-                <a14:useLocalDpi xmlns:a14="http://schemas.microsoft.com/office/drawing/2010/main" val="0"/>
-              </a:ext>
-            </a:extLst>
-          </a:blip>
-          <a:stretch>
-            <a:fillRect/>
-          </a:stretch>
-        </p:blipFill>
-        <p:spPr>
-          <a:xfrm>
-            <a:off x="8439248" y="4658711"/>
-            <a:ext cx="3223172" cy="1813034"/>
-          </a:xfrm>
-          <a:prstGeom prst="rect">
-            <a:avLst/>
-          </a:prstGeom>
-        </p:spPr>
-      </p:pic>
-      <p:sp>
-        <p:nvSpPr>
-          <p:cNvPr id="7" name="TextBox 6"/>
-          <p:cNvSpPr txBox="1"/>
-          <p:nvPr/>
-        </p:nvSpPr>
-        <p:spPr>
-          <a:xfrm>
-            <a:off x="2666561" y="1646849"/>
-            <a:ext cx="1288499" cy="1200329"/>
-          </a:xfrm>
-          <a:prstGeom prst="rect">
-            <a:avLst/>
-          </a:prstGeom>
-          <a:noFill/>
-          <a:ln>
-            <a:solidFill>
-              <a:schemeClr val="tx1"/>
-            </a:solidFill>
-          </a:ln>
-        </p:spPr>
-        <p:txBody>
-          <a:bodyPr wrap="square" rtlCol="0">
-            <a:spAutoFit/>
-          </a:bodyPr>
-          <a:lstStyle/>
-          <a:p>
-            <a:r>
-              <a:rPr lang="en-US" dirty="0" smtClean="0"/>
-              <a:t>GPS</a:t>
-            </a:r>
-          </a:p>
-          <a:p>
-            <a:r>
-              <a:rPr lang="en-US" dirty="0" smtClean="0"/>
-              <a:t>  -Attitude</a:t>
-            </a:r>
-          </a:p>
-          <a:p>
-            <a:r>
-              <a:rPr lang="en-US" dirty="0"/>
-              <a:t> </a:t>
-            </a:r>
-            <a:r>
-              <a:rPr lang="en-US" dirty="0" smtClean="0"/>
-              <a:t> -Position</a:t>
-            </a:r>
-          </a:p>
-          <a:p>
-            <a:r>
-              <a:rPr lang="en-US" dirty="0"/>
-              <a:t> </a:t>
-            </a:r>
-            <a:r>
-              <a:rPr lang="en-US" dirty="0" smtClean="0"/>
-              <a:t> -Time</a:t>
-            </a:r>
-            <a:endParaRPr lang="en-US" dirty="0"/>
-          </a:p>
-        </p:txBody>
-      </p:sp>
-      <p:sp>
-        <p:nvSpPr>
-          <p:cNvPr id="8" name="TextBox 7"/>
-          <p:cNvSpPr txBox="1"/>
-          <p:nvPr/>
-        </p:nvSpPr>
-        <p:spPr>
-          <a:xfrm>
-            <a:off x="540635" y="1646849"/>
-            <a:ext cx="1564062" cy="923330"/>
-          </a:xfrm>
-          <a:prstGeom prst="rect">
-            <a:avLst/>
-          </a:prstGeom>
-          <a:noFill/>
-          <a:ln>
-            <a:solidFill>
-              <a:schemeClr val="tx1"/>
-            </a:solidFill>
-          </a:ln>
-        </p:spPr>
-        <p:txBody>
-          <a:bodyPr wrap="square" rtlCol="0">
-            <a:spAutoFit/>
-          </a:bodyPr>
-          <a:lstStyle/>
-          <a:p>
-            <a:r>
-              <a:rPr lang="en-US" dirty="0" smtClean="0"/>
-              <a:t>Power</a:t>
-            </a:r>
-          </a:p>
-          <a:p>
-            <a:r>
-              <a:rPr lang="en-US" dirty="0" smtClean="0"/>
-              <a:t>  -Wattage</a:t>
-            </a:r>
-          </a:p>
-          <a:p>
-            <a:r>
-              <a:rPr lang="en-US" dirty="0"/>
-              <a:t> </a:t>
-            </a:r>
-            <a:r>
-              <a:rPr lang="en-US" dirty="0" smtClean="0"/>
-              <a:t> -Battery</a:t>
-            </a:r>
-            <a:endParaRPr lang="en-US" dirty="0"/>
-          </a:p>
-        </p:txBody>
-      </p:sp>
-      <p:cxnSp>
-        <p:nvCxnSpPr>
-          <p:cNvPr id="10" name="Straight Arrow Connector 9"/>
-          <p:cNvCxnSpPr>
-            <a:stCxn id="7" idx="2"/>
-            <a:endCxn id="35" idx="0"/>
-          </p:cNvCxnSpPr>
-          <p:nvPr/>
-        </p:nvCxnSpPr>
-        <p:spPr>
-          <a:xfrm flipH="1">
-            <a:off x="2004478" y="2847178"/>
-            <a:ext cx="1306333" cy="1710588"/>
-          </a:xfrm>
-          <a:prstGeom prst="straightConnector1">
-            <a:avLst/>
-          </a:prstGeom>
-          <a:ln>
-            <a:solidFill>
-              <a:schemeClr val="tx1"/>
-            </a:solidFill>
-            <a:tailEnd type="none"/>
-          </a:ln>
-        </p:spPr>
-        <p:style>
-          <a:lnRef idx="1">
-            <a:schemeClr val="accent1"/>
-          </a:lnRef>
-          <a:fillRef idx="0">
-            <a:schemeClr val="accent1"/>
-          </a:fillRef>
-          <a:effectRef idx="0">
-            <a:schemeClr val="accent1"/>
-          </a:effectRef>
-          <a:fontRef idx="minor">
-            <a:schemeClr val="tx1"/>
-          </a:fontRef>
-        </p:style>
-      </p:cxnSp>
-      <p:cxnSp>
-        <p:nvCxnSpPr>
-          <p:cNvPr id="11" name="Straight Arrow Connector 10"/>
-          <p:cNvCxnSpPr>
-            <a:stCxn id="8" idx="2"/>
-            <a:endCxn id="35" idx="0"/>
-          </p:cNvCxnSpPr>
-          <p:nvPr/>
-        </p:nvCxnSpPr>
-        <p:spPr>
-          <a:xfrm>
-            <a:off x="1322666" y="2570179"/>
-            <a:ext cx="681812" cy="1987587"/>
-          </a:xfrm>
-          <a:prstGeom prst="straightConnector1">
-            <a:avLst/>
-          </a:prstGeom>
-          <a:ln>
-            <a:solidFill>
-              <a:schemeClr val="tx1"/>
-            </a:solidFill>
-            <a:tailEnd type="none"/>
-          </a:ln>
-        </p:spPr>
-        <p:style>
-          <a:lnRef idx="1">
-            <a:schemeClr val="accent1"/>
-          </a:lnRef>
-          <a:fillRef idx="0">
-            <a:schemeClr val="accent1"/>
-          </a:fillRef>
-          <a:effectRef idx="0">
-            <a:schemeClr val="accent1"/>
-          </a:effectRef>
-          <a:fontRef idx="minor">
-            <a:schemeClr val="tx1"/>
-          </a:fontRef>
-        </p:style>
-      </p:cxnSp>
-      <p:cxnSp>
-        <p:nvCxnSpPr>
-          <p:cNvPr id="16" name="Straight Arrow Connector 15"/>
-          <p:cNvCxnSpPr/>
-          <p:nvPr/>
-        </p:nvCxnSpPr>
-        <p:spPr>
-          <a:xfrm flipV="1">
-            <a:off x="6373932" y="3458876"/>
-            <a:ext cx="565817" cy="1013368"/>
-          </a:xfrm>
-          <a:prstGeom prst="straightConnector1">
-            <a:avLst/>
-          </a:prstGeom>
-          <a:ln>
-            <a:solidFill>
-              <a:schemeClr val="tx1"/>
-            </a:solidFill>
-            <a:tailEnd type="triangle"/>
-          </a:ln>
-        </p:spPr>
-        <p:style>
-          <a:lnRef idx="1">
-            <a:schemeClr val="accent1"/>
-          </a:lnRef>
-          <a:fillRef idx="0">
-            <a:schemeClr val="accent1"/>
-          </a:fillRef>
-          <a:effectRef idx="0">
-            <a:schemeClr val="accent1"/>
-          </a:effectRef>
-          <a:fontRef idx="minor">
-            <a:schemeClr val="tx1"/>
-          </a:fontRef>
-        </p:style>
-      </p:cxnSp>
-      <p:sp>
-        <p:nvSpPr>
-          <p:cNvPr id="19" name="TextBox 18"/>
-          <p:cNvSpPr txBox="1"/>
-          <p:nvPr/>
-        </p:nvSpPr>
-        <p:spPr>
-          <a:xfrm>
-            <a:off x="4177862" y="4053246"/>
-            <a:ext cx="1726324" cy="369332"/>
-          </a:xfrm>
-          <a:prstGeom prst="rect">
-            <a:avLst/>
-          </a:prstGeom>
-          <a:noFill/>
-        </p:spPr>
-        <p:txBody>
-          <a:bodyPr wrap="square" rtlCol="0">
-            <a:spAutoFit/>
-          </a:bodyPr>
-          <a:lstStyle/>
-          <a:p>
-            <a:r>
-              <a:rPr lang="en-US" dirty="0" err="1" smtClean="0"/>
-              <a:t>FunCube</a:t>
-            </a:r>
-            <a:endParaRPr lang="en-US" dirty="0" smtClean="0"/>
-          </a:p>
-        </p:txBody>
-      </p:sp>
-      <p:sp>
-        <p:nvSpPr>
-          <p:cNvPr id="20" name="TextBox 19"/>
-          <p:cNvSpPr txBox="1"/>
-          <p:nvPr/>
-        </p:nvSpPr>
-        <p:spPr>
-          <a:xfrm>
-            <a:off x="6794938" y="1576552"/>
-            <a:ext cx="1355834" cy="369332"/>
-          </a:xfrm>
-          <a:prstGeom prst="rect">
-            <a:avLst/>
-          </a:prstGeom>
-          <a:noFill/>
-        </p:spPr>
-        <p:txBody>
-          <a:bodyPr wrap="square" rtlCol="0">
-            <a:spAutoFit/>
-          </a:bodyPr>
-          <a:lstStyle/>
-          <a:p>
-            <a:r>
-              <a:rPr lang="en-US" dirty="0" smtClean="0"/>
-              <a:t>Antenna</a:t>
-            </a:r>
-          </a:p>
-        </p:txBody>
-      </p:sp>
-      <p:pic>
-        <p:nvPicPr>
-          <p:cNvPr id="21" name="Picture 20"/>
-          <p:cNvPicPr>
-            <a:picLocks noChangeAspect="1"/>
-          </p:cNvPicPr>
-          <p:nvPr/>
-        </p:nvPicPr>
-        <p:blipFill>
-          <a:blip r:embed="rId4">
-            <a:extLst>
-              <a:ext uri="{28A0092B-C50C-407E-A947-70E740481C1C}">
-                <a14:useLocalDpi xmlns:a14="http://schemas.microsoft.com/office/drawing/2010/main" val="0"/>
-              </a:ext>
-            </a:extLst>
-          </a:blip>
-          <a:stretch>
-            <a:fillRect/>
-          </a:stretch>
-        </p:blipFill>
-        <p:spPr>
-          <a:xfrm rot="2032425">
-            <a:off x="6571690" y="1891017"/>
-            <a:ext cx="3314705" cy="2966852"/>
-          </a:xfrm>
-          <a:prstGeom prst="rect">
-            <a:avLst/>
-          </a:prstGeom>
-        </p:spPr>
-      </p:pic>
-      <p:pic>
-        <p:nvPicPr>
-          <p:cNvPr id="22" name="Picture 21"/>
-          <p:cNvPicPr>
-            <a:picLocks noChangeAspect="1"/>
-          </p:cNvPicPr>
-          <p:nvPr/>
-        </p:nvPicPr>
-        <p:blipFill>
-          <a:blip r:embed="rId5" cstate="print">
-            <a:extLst>
-              <a:ext uri="{28A0092B-C50C-407E-A947-70E740481C1C}">
-                <a14:useLocalDpi xmlns:a14="http://schemas.microsoft.com/office/drawing/2010/main" val="0"/>
-              </a:ext>
-            </a:extLst>
-          </a:blip>
-          <a:stretch>
-            <a:fillRect/>
-          </a:stretch>
-        </p:blipFill>
-        <p:spPr>
-          <a:xfrm rot="18290028">
-            <a:off x="9608668" y="4737886"/>
-            <a:ext cx="649117" cy="714029"/>
-          </a:xfrm>
-          <a:prstGeom prst="rect">
-            <a:avLst/>
-          </a:prstGeom>
-        </p:spPr>
-      </p:pic>
-      <p:sp>
-        <p:nvSpPr>
-          <p:cNvPr id="35" name="TextBox 34"/>
-          <p:cNvSpPr txBox="1"/>
-          <p:nvPr/>
-        </p:nvSpPr>
-        <p:spPr>
-          <a:xfrm>
-            <a:off x="789237" y="4557766"/>
-            <a:ext cx="2430482" cy="646331"/>
-          </a:xfrm>
-          <a:prstGeom prst="rect">
-            <a:avLst/>
-          </a:prstGeom>
-          <a:noFill/>
-          <a:ln>
-            <a:solidFill>
-              <a:schemeClr val="tx1"/>
-            </a:solidFill>
-          </a:ln>
-        </p:spPr>
-        <p:txBody>
-          <a:bodyPr wrap="square" rtlCol="0">
-            <a:spAutoFit/>
-          </a:bodyPr>
-          <a:lstStyle/>
-          <a:p>
-            <a:r>
-              <a:rPr lang="en-US" dirty="0" smtClean="0"/>
-              <a:t>Flight Computer</a:t>
-            </a:r>
-          </a:p>
-          <a:p>
-            <a:r>
-              <a:rPr lang="en-US" dirty="0"/>
-              <a:t> </a:t>
-            </a:r>
-            <a:r>
-              <a:rPr lang="en-US" dirty="0" smtClean="0"/>
-              <a:t> -Assemble packet</a:t>
-            </a:r>
-            <a:endParaRPr lang="en-US" dirty="0"/>
-          </a:p>
-        </p:txBody>
-      </p:sp>
-      <p:cxnSp>
-        <p:nvCxnSpPr>
-          <p:cNvPr id="37" name="Straight Arrow Connector 36"/>
-          <p:cNvCxnSpPr>
-            <a:stCxn id="35" idx="3"/>
-            <a:endCxn id="23" idx="1"/>
-          </p:cNvCxnSpPr>
-          <p:nvPr/>
-        </p:nvCxnSpPr>
-        <p:spPr>
-          <a:xfrm>
-            <a:off x="3219719" y="4880932"/>
-            <a:ext cx="958143" cy="136336"/>
-          </a:xfrm>
-          <a:prstGeom prst="straightConnector1">
-            <a:avLst/>
-          </a:prstGeom>
-          <a:ln>
-            <a:solidFill>
-              <a:schemeClr val="tx1"/>
-            </a:solidFill>
-            <a:tailEnd type="triangle"/>
-          </a:ln>
-        </p:spPr>
-        <p:style>
-          <a:lnRef idx="1">
-            <a:schemeClr val="accent1"/>
-          </a:lnRef>
-          <a:fillRef idx="0">
-            <a:schemeClr val="accent1"/>
-          </a:fillRef>
-          <a:effectRef idx="0">
-            <a:schemeClr val="accent1"/>
-          </a:effectRef>
-          <a:fontRef idx="minor">
-            <a:schemeClr val="tx1"/>
-          </a:fontRef>
-        </p:style>
-      </p:cxnSp>
-      <p:sp>
-        <p:nvSpPr>
-          <p:cNvPr id="44" name="TextBox 43"/>
-          <p:cNvSpPr txBox="1"/>
-          <p:nvPr/>
-        </p:nvSpPr>
-        <p:spPr>
-          <a:xfrm>
-            <a:off x="4451001" y="1646849"/>
-            <a:ext cx="1789386" cy="646331"/>
-          </a:xfrm>
-          <a:prstGeom prst="rect">
-            <a:avLst/>
-          </a:prstGeom>
-          <a:noFill/>
-          <a:ln>
-            <a:solidFill>
-              <a:schemeClr val="tx1"/>
-            </a:solidFill>
-          </a:ln>
-        </p:spPr>
-        <p:txBody>
-          <a:bodyPr wrap="square" rtlCol="0">
-            <a:spAutoFit/>
-          </a:bodyPr>
-          <a:lstStyle/>
-          <a:p>
-            <a:r>
-              <a:rPr lang="en-US" dirty="0" smtClean="0"/>
-              <a:t>Gamma Ray</a:t>
-            </a:r>
-            <a:r>
-              <a:rPr lang="en-US" dirty="0"/>
-              <a:t> </a:t>
-            </a:r>
-            <a:r>
-              <a:rPr lang="en-US" dirty="0" smtClean="0"/>
-              <a:t>Detector</a:t>
-            </a:r>
-          </a:p>
-        </p:txBody>
-      </p:sp>
-      <p:cxnSp>
-        <p:nvCxnSpPr>
-          <p:cNvPr id="46" name="Straight Arrow Connector 45"/>
-          <p:cNvCxnSpPr>
-            <a:stCxn id="44" idx="2"/>
-            <a:endCxn id="35" idx="0"/>
-          </p:cNvCxnSpPr>
-          <p:nvPr/>
-        </p:nvCxnSpPr>
-        <p:spPr>
-          <a:xfrm flipH="1">
-            <a:off x="2004478" y="2293180"/>
-            <a:ext cx="3341216" cy="2264586"/>
-          </a:xfrm>
-          <a:prstGeom prst="straightConnector1">
-            <a:avLst/>
-          </a:prstGeom>
-          <a:ln>
-            <a:solidFill>
-              <a:schemeClr val="tx1"/>
-            </a:solidFill>
-            <a:tailEnd type="none"/>
-          </a:ln>
-        </p:spPr>
-        <p:style>
-          <a:lnRef idx="1">
-            <a:schemeClr val="accent1"/>
-          </a:lnRef>
-          <a:fillRef idx="0">
-            <a:schemeClr val="accent1"/>
-          </a:fillRef>
-          <a:effectRef idx="0">
-            <a:schemeClr val="accent1"/>
-          </a:effectRef>
-          <a:fontRef idx="minor">
-            <a:schemeClr val="tx1"/>
-          </a:fontRef>
-        </p:style>
-      </p:cxnSp>
-      <p:pic>
-        <p:nvPicPr>
-          <p:cNvPr id="23" name="Picture 22"/>
-          <p:cNvPicPr>
-            <a:picLocks noChangeAspect="1"/>
-          </p:cNvPicPr>
-          <p:nvPr/>
-        </p:nvPicPr>
-        <p:blipFill>
-          <a:blip r:embed="rId6" cstate="print">
-            <a:extLst>
-              <a:ext uri="{28A0092B-C50C-407E-A947-70E740481C1C}">
-                <a14:useLocalDpi xmlns:a14="http://schemas.microsoft.com/office/drawing/2010/main" val="0"/>
-              </a:ext>
-            </a:extLst>
-          </a:blip>
-          <a:stretch>
-            <a:fillRect/>
-          </a:stretch>
-        </p:blipFill>
-        <p:spPr>
-          <a:xfrm>
-            <a:off x="4177862" y="4472243"/>
-            <a:ext cx="2196070" cy="1090049"/>
-          </a:xfrm>
-          <a:prstGeom prst="rect">
-            <a:avLst/>
-          </a:prstGeom>
-        </p:spPr>
-      </p:pic>
-      <p:sp>
-        <p:nvSpPr>
-          <p:cNvPr id="36" name="TextBox 35"/>
-          <p:cNvSpPr txBox="1"/>
-          <p:nvPr/>
-        </p:nvSpPr>
-        <p:spPr>
-          <a:xfrm>
-            <a:off x="540635" y="5735286"/>
-            <a:ext cx="3414425" cy="523220"/>
-          </a:xfrm>
-          <a:prstGeom prst="rect">
-            <a:avLst/>
-          </a:prstGeom>
-          <a:noFill/>
-        </p:spPr>
-        <p:txBody>
-          <a:bodyPr wrap="square" rtlCol="0">
-            <a:spAutoFit/>
-          </a:bodyPr>
-          <a:lstStyle/>
-          <a:p>
-            <a:r>
-              <a:rPr lang="en-US" sz="1400" dirty="0" smtClean="0"/>
-              <a:t>Cheaper approach if data packets are small enough</a:t>
-            </a:r>
-            <a:endParaRPr lang="en-US" sz="1400" dirty="0"/>
-          </a:p>
-        </p:txBody>
-      </p:sp>
-    </p:spTree>
-    <p:extLst>
-      <p:ext uri="{BB962C8B-B14F-4D97-AF65-F5344CB8AC3E}">
-        <p14:creationId xmlns:p14="http://schemas.microsoft.com/office/powerpoint/2010/main" val="2490308571"/>
-      </p:ext>
-    </p:extLst>
-  </p:cSld>
-  <p:clrMapOvr>
-    <a:masterClrMapping/>
-  </p:clrMapOvr>
-  <p:timing>
-    <p:tnLst>
-      <p:par>
-        <p:cTn id="1" dur="indefinite" restart="never" nodeType="tmRoot"/>
-      </p:par>
-    </p:tnLst>
-  </p:timing>
-</p:sld>
-</file>
-
-<file path=ppt/slides/slide24.xml><?xml version="1.0" encoding="utf-8"?>
 <p:sld xmlns:a="http://schemas.openxmlformats.org/drawingml/2006/main" xmlns:r="http://schemas.openxmlformats.org/officeDocument/2006/relationships" xmlns:p="http://schemas.openxmlformats.org/presentationml/2006/main">
   <p:cSld>
     <p:spTree>
@@ -12500,7 +11737,7 @@
 </p:sld>
 </file>
 
-<file path=ppt/slides/slide25.xml><?xml version="1.0" encoding="utf-8"?>
+<file path=ppt/slides/slide24.xml><?xml version="1.0" encoding="utf-8"?>
 <p:sld xmlns:a="http://schemas.openxmlformats.org/drawingml/2006/main" xmlns:r="http://schemas.openxmlformats.org/officeDocument/2006/relationships" xmlns:p="http://schemas.openxmlformats.org/presentationml/2006/main">
   <p:cSld>
     <p:spTree>
@@ -12685,7 +11922,7 @@
 </p:sld>
 </file>
 
-<file path=ppt/slides/slide26.xml><?xml version="1.0" encoding="utf-8"?>
+<file path=ppt/slides/slide25.xml><?xml version="1.0" encoding="utf-8"?>
 <p:sld xmlns:a="http://schemas.openxmlformats.org/drawingml/2006/main" xmlns:r="http://schemas.openxmlformats.org/officeDocument/2006/relationships" xmlns:p="http://schemas.openxmlformats.org/presentationml/2006/main">
   <p:cSld>
     <p:spTree>
@@ -13175,7 +12412,7 @@
 </p:sld>
 </file>
 
-<file path=ppt/slides/slide27.xml><?xml version="1.0" encoding="utf-8"?>
+<file path=ppt/slides/slide26.xml><?xml version="1.0" encoding="utf-8"?>
 <p:sld xmlns:a="http://schemas.openxmlformats.org/drawingml/2006/main" xmlns:r="http://schemas.openxmlformats.org/officeDocument/2006/relationships" xmlns:p="http://schemas.openxmlformats.org/presentationml/2006/main">
   <p:cSld>
     <p:spTree>
@@ -13649,7 +12886,7 @@
 </p:sld>
 </file>
 
-<file path=ppt/slides/slide28.xml><?xml version="1.0" encoding="utf-8"?>
+<file path=ppt/slides/slide27.xml><?xml version="1.0" encoding="utf-8"?>
 <p:sld xmlns:a="http://schemas.openxmlformats.org/drawingml/2006/main" xmlns:r="http://schemas.openxmlformats.org/officeDocument/2006/relationships" xmlns:p="http://schemas.openxmlformats.org/presentationml/2006/main">
   <p:cSld>
     <p:spTree>
@@ -14058,7 +13295,7 @@
 </p:sld>
 </file>
 
-<file path=ppt/slides/slide29.xml><?xml version="1.0" encoding="utf-8"?>
+<file path=ppt/slides/slide28.xml><?xml version="1.0" encoding="utf-8"?>
 <p:sld xmlns:a="http://schemas.openxmlformats.org/drawingml/2006/main" xmlns:r="http://schemas.openxmlformats.org/officeDocument/2006/relationships" xmlns:p="http://schemas.openxmlformats.org/presentationml/2006/main">
   <p:cSld>
     <p:spTree>

</xml_diff>

<commit_message>
Added more info to Communication slides
</commit_message>
<xml_diff>
--- a/Presentations/PDR_Presentation.pptx
+++ b/Presentations/PDR_Presentation.pptx
@@ -7802,27 +7802,11 @@
                     <a:p>
                       <a:r>
                         <a:rPr lang="en-US" dirty="0" smtClean="0"/>
-                        <a:t>71 </a:t>
-                      </a:r>
-                      <a:r>
-                        <a:rPr lang="en-US" dirty="0" smtClean="0"/>
-                        <a:t>x</a:t>
+                        <a:t>71 x</a:t>
                       </a:r>
                       <a:r>
                         <a:rPr lang="en-US" baseline="0" dirty="0" smtClean="0"/>
-                        <a:t> </a:t>
-                      </a:r>
-                      <a:r>
-                        <a:rPr lang="en-US" baseline="0" dirty="0" smtClean="0"/>
-                        <a:t>35 </a:t>
-                      </a:r>
-                      <a:r>
-                        <a:rPr lang="en-US" baseline="0" dirty="0" smtClean="0"/>
-                        <a:t>x </a:t>
-                      </a:r>
-                      <a:r>
-                        <a:rPr lang="en-US" baseline="0" dirty="0" smtClean="0"/>
-                        <a:t>12.5</a:t>
+                        <a:t> 35 x 12.5</a:t>
                       </a:r>
                       <a:endParaRPr lang="en-US" dirty="0"/>
                     </a:p>
@@ -7836,23 +7820,7 @@
                     <a:p>
                       <a:r>
                         <a:rPr lang="en-US" dirty="0" smtClean="0"/>
-                        <a:t>71 </a:t>
-                      </a:r>
-                      <a:r>
-                        <a:rPr lang="en-US" dirty="0" smtClean="0"/>
-                        <a:t>x </a:t>
-                      </a:r>
-                      <a:r>
-                        <a:rPr lang="en-US" dirty="0" smtClean="0"/>
-                        <a:t>46 </a:t>
-                      </a:r>
-                      <a:r>
-                        <a:rPr lang="en-US" dirty="0" smtClean="0"/>
-                        <a:t>x </a:t>
-                      </a:r>
-                      <a:r>
-                        <a:rPr lang="en-US" dirty="0" smtClean="0"/>
-                        <a:t>11</a:t>
+                        <a:t>71 x 46 x 11</a:t>
                       </a:r>
                       <a:endParaRPr lang="en-US" dirty="0"/>
                     </a:p>
@@ -7866,23 +7834,7 @@
                     <a:p>
                       <a:r>
                         <a:rPr lang="en-US" dirty="0" smtClean="0"/>
-                        <a:t>100 </a:t>
-                      </a:r>
-                      <a:r>
-                        <a:rPr lang="en-US" dirty="0" smtClean="0"/>
-                        <a:t>x </a:t>
-                      </a:r>
-                      <a:r>
-                        <a:rPr lang="en-US" dirty="0" smtClean="0"/>
-                        <a:t>70 </a:t>
-                      </a:r>
-                      <a:r>
-                        <a:rPr lang="en-US" dirty="0" smtClean="0"/>
-                        <a:t>x </a:t>
-                      </a:r>
-                      <a:r>
-                        <a:rPr lang="en-US" dirty="0" smtClean="0"/>
-                        <a:t>25</a:t>
+                        <a:t>100 x 70 x 25</a:t>
                       </a:r>
                       <a:endParaRPr lang="en-US" dirty="0"/>
                     </a:p>
@@ -11206,7 +11158,7 @@
             <p:ph idx="1"/>
             <p:extLst>
               <p:ext uri="{D42A27DB-BD31-4B8C-83A1-F6EECF244321}">
-                <p14:modId xmlns:p14="http://schemas.microsoft.com/office/powerpoint/2010/main" val="2066533038"/>
+                <p14:modId xmlns:p14="http://schemas.microsoft.com/office/powerpoint/2010/main" val="2171082082"/>
               </p:ext>
             </p:extLst>
           </p:nvPr>
@@ -11266,18 +11218,12 @@
                     <a:lstStyle/>
                     <a:p>
                       <a:r>
+                        <a:rPr lang="en-US" dirty="0" smtClean="0"/>
+                        <a:t> MM2-TTL, </a:t>
+                      </a:r>
+                      <a:r>
                         <a:rPr lang="en-US" dirty="0" err="1" smtClean="0"/>
                         <a:t>Freewave</a:t>
-                      </a:r>
-                      <a:r>
-                        <a:rPr lang="en-US" dirty="0" smtClean="0"/>
-                        <a:t> </a:t>
-                      </a:r>
-                    </a:p>
-                    <a:p>
-                      <a:r>
-                        <a:rPr lang="en-US" dirty="0" smtClean="0"/>
-                        <a:t>MM2-TTL</a:t>
                       </a:r>
                       <a:endParaRPr lang="en-US" dirty="0"/>
                     </a:p>
@@ -11289,6 +11235,14 @@
                     <a:bodyPr/>
                     <a:lstStyle/>
                     <a:p>
+                      <a:r>
+                        <a:rPr lang="en-US" dirty="0" smtClean="0"/>
+                        <a:t>CubeSat</a:t>
+                      </a:r>
+                      <a:r>
+                        <a:rPr lang="en-US" baseline="0" dirty="0" smtClean="0"/>
+                        <a:t> TX Patch Antenna</a:t>
+                      </a:r>
                       <a:endParaRPr lang="en-US" dirty="0"/>
                     </a:p>
                   </a:txBody>
@@ -11343,7 +11297,15 @@
                     <a:bodyPr/>
                     <a:lstStyle/>
                     <a:p>
-                      <a:endParaRPr lang="en-US"/>
+                      <a:r>
+                        <a:rPr lang="en-US" dirty="0" smtClean="0"/>
+                        <a:t>3 </a:t>
+                      </a:r>
+                      <a:r>
+                        <a:rPr lang="en-US" dirty="0" err="1" smtClean="0"/>
+                        <a:t>Dia</a:t>
+                      </a:r>
+                      <a:endParaRPr lang="en-US" dirty="0"/>
                     </a:p>
                   </a:txBody>
                   <a:tcPr/>
@@ -11397,7 +11359,11 @@
                     <a:bodyPr/>
                     <a:lstStyle/>
                     <a:p>
-                      <a:endParaRPr lang="en-US"/>
+                      <a:r>
+                        <a:rPr lang="en-US" dirty="0" smtClean="0"/>
+                        <a:t>&lt; 6</a:t>
+                      </a:r>
+                      <a:endParaRPr lang="en-US" dirty="0"/>
                     </a:p>
                   </a:txBody>
                   <a:tcPr/>
@@ -11447,6 +11413,10 @@
                     <a:bodyPr/>
                     <a:lstStyle/>
                     <a:p>
+                      <a:r>
+                        <a:rPr lang="en-US" dirty="0" smtClean="0"/>
+                        <a:t>50</a:t>
+                      </a:r>
                       <a:endParaRPr lang="en-US" dirty="0"/>
                     </a:p>
                   </a:txBody>
@@ -11505,6 +11475,10 @@
                     <a:bodyPr/>
                     <a:lstStyle/>
                     <a:p>
+                      <a:r>
+                        <a:rPr lang="en-US" dirty="0" smtClean="0"/>
+                        <a:t>N/A</a:t>
+                      </a:r>
                       <a:endParaRPr lang="en-US" dirty="0"/>
                     </a:p>
                   </a:txBody>
@@ -11559,6 +11533,18 @@
                     <a:bodyPr/>
                     <a:lstStyle/>
                     <a:p>
+                      <a:r>
+                        <a:rPr lang="en-US" dirty="0" smtClean="0"/>
+                        <a:t>Ukube-1 (Clyde </a:t>
+                      </a:r>
+                      <a:r>
+                        <a:rPr lang="en-US" dirty="0" err="1" smtClean="0"/>
+                        <a:t>Sapce</a:t>
+                      </a:r>
+                      <a:r>
+                        <a:rPr lang="en-US" dirty="0" smtClean="0"/>
+                        <a:t>)</a:t>
+                      </a:r>
                       <a:endParaRPr lang="en-US" dirty="0"/>
                     </a:p>
                   </a:txBody>
@@ -11613,6 +11599,10 @@
                     <a:bodyPr/>
                     <a:lstStyle/>
                     <a:p>
+                      <a:r>
+                        <a:rPr lang="en-US" dirty="0" smtClean="0"/>
+                        <a:t>4,750</a:t>
+                      </a:r>
                       <a:endParaRPr lang="en-US" dirty="0"/>
                     </a:p>
                   </a:txBody>

</xml_diff>

<commit_message>
Added Deliverables and GRB chart in background slide
</commit_message>
<xml_diff>
--- a/Presentations/PDR_Presentation.pptx
+++ b/Presentations/PDR_Presentation.pptx
@@ -5,7 +5,7 @@
     <p:sldMasterId id="2147483660" r:id="rId1"/>
   </p:sldMasterIdLst>
   <p:notesMasterIdLst>
-    <p:notesMasterId r:id="rId31"/>
+    <p:notesMasterId r:id="rId32"/>
   </p:notesMasterIdLst>
   <p:sldIdLst>
     <p:sldId id="256" r:id="rId2"/>
@@ -37,6 +37,7 @@
     <p:sldId id="282" r:id="rId28"/>
     <p:sldId id="283" r:id="rId29"/>
     <p:sldId id="304" r:id="rId30"/>
+    <p:sldId id="307" r:id="rId31"/>
   </p:sldIdLst>
   <p:sldSz cx="12192000" cy="6858000"/>
   <p:notesSz cx="6858000" cy="9144000"/>
@@ -137,7 +138,7 @@
   </p:defaultTextStyle>
   <p:extLst>
     <p:ext uri="{EFAFB233-063F-42B5-8137-9DF3F51BA10A}">
-      <p15:sldGuideLst xmlns="" xmlns:p15="http://schemas.microsoft.com/office/powerpoint/2012/main">
+      <p15:sldGuideLst xmlns:p15="http://schemas.microsoft.com/office/powerpoint/2012/main" xmlns="">
         <p15:guide id="1" orient="horz" pos="2160">
           <p15:clr>
             <a:srgbClr val="A4A3A4"/>
@@ -236,7 +237,7 @@
           <a:p>
             <a:fld id="{90D58D52-5CD9-4A4B-90F0-A7AB4F899008}" type="datetimeFigureOut">
               <a:rPr lang="en-US" smtClean="0"/>
-              <a:t>10/15/15</a:t>
+              <a:t>10/16/2015</a:t>
             </a:fld>
             <a:endParaRPr lang="en-US"/>
           </a:p>
@@ -1494,7 +1495,7 @@
           <a:p>
             <a:fld id="{E20D963B-2D4F-495B-A2B5-E46053ACE7DA}" type="datetimeFigureOut">
               <a:rPr lang="en-US" smtClean="0"/>
-              <a:t>10/15/15</a:t>
+              <a:t>10/16/2015</a:t>
             </a:fld>
             <a:endParaRPr lang="en-US"/>
           </a:p>
@@ -1769,7 +1770,7 @@
           <a:p>
             <a:fld id="{E20D963B-2D4F-495B-A2B5-E46053ACE7DA}" type="datetimeFigureOut">
               <a:rPr lang="en-US" smtClean="0"/>
-              <a:t>10/15/15</a:t>
+              <a:t>10/16/2015</a:t>
             </a:fld>
             <a:endParaRPr lang="en-US"/>
           </a:p>
@@ -1963,7 +1964,7 @@
           <a:p>
             <a:fld id="{E20D963B-2D4F-495B-A2B5-E46053ACE7DA}" type="datetimeFigureOut">
               <a:rPr lang="en-US" smtClean="0"/>
-              <a:t>10/15/15</a:t>
+              <a:t>10/16/2015</a:t>
             </a:fld>
             <a:endParaRPr lang="en-US"/>
           </a:p>
@@ -2236,7 +2237,7 @@
           <a:p>
             <a:fld id="{E20D963B-2D4F-495B-A2B5-E46053ACE7DA}" type="datetimeFigureOut">
               <a:rPr lang="en-US" smtClean="0"/>
-              <a:t>10/15/15</a:t>
+              <a:t>10/16/2015</a:t>
             </a:fld>
             <a:endParaRPr lang="en-US"/>
           </a:p>
@@ -2577,7 +2578,7 @@
           <a:p>
             <a:fld id="{E20D963B-2D4F-495B-A2B5-E46053ACE7DA}" type="datetimeFigureOut">
               <a:rPr lang="en-US" smtClean="0"/>
-              <a:t>10/15/15</a:t>
+              <a:t>10/16/2015</a:t>
             </a:fld>
             <a:endParaRPr lang="en-US"/>
           </a:p>
@@ -3200,7 +3201,7 @@
           <a:p>
             <a:fld id="{E20D963B-2D4F-495B-A2B5-E46053ACE7DA}" type="datetimeFigureOut">
               <a:rPr lang="en-US" smtClean="0"/>
-              <a:t>10/15/15</a:t>
+              <a:t>10/16/2015</a:t>
             </a:fld>
             <a:endParaRPr lang="en-US"/>
           </a:p>
@@ -4060,7 +4061,7 @@
           <a:p>
             <a:fld id="{E20D963B-2D4F-495B-A2B5-E46053ACE7DA}" type="datetimeFigureOut">
               <a:rPr lang="en-US" smtClean="0"/>
-              <a:t>10/15/15</a:t>
+              <a:t>10/16/2015</a:t>
             </a:fld>
             <a:endParaRPr lang="en-US"/>
           </a:p>
@@ -4230,7 +4231,7 @@
           <a:p>
             <a:fld id="{E20D963B-2D4F-495B-A2B5-E46053ACE7DA}" type="datetimeFigureOut">
               <a:rPr lang="en-US" smtClean="0"/>
-              <a:t>10/15/15</a:t>
+              <a:t>10/16/2015</a:t>
             </a:fld>
             <a:endParaRPr lang="en-US"/>
           </a:p>
@@ -4410,7 +4411,7 @@
           <a:p>
             <a:fld id="{E20D963B-2D4F-495B-A2B5-E46053ACE7DA}" type="datetimeFigureOut">
               <a:rPr lang="en-US" smtClean="0"/>
-              <a:t>10/15/15</a:t>
+              <a:t>10/16/2015</a:t>
             </a:fld>
             <a:endParaRPr lang="en-US"/>
           </a:p>
@@ -4790,7 +4791,7 @@
           <a:p>
             <a:fld id="{E20D963B-2D4F-495B-A2B5-E46053ACE7DA}" type="datetimeFigureOut">
               <a:rPr lang="en-US" smtClean="0"/>
-              <a:t>10/15/15</a:t>
+              <a:t>10/16/2015</a:t>
             </a:fld>
             <a:endParaRPr lang="en-US"/>
           </a:p>
@@ -5082,7 +5083,7 @@
           <a:p>
             <a:fld id="{E20D963B-2D4F-495B-A2B5-E46053ACE7DA}" type="datetimeFigureOut">
               <a:rPr lang="en-US" smtClean="0"/>
-              <a:t>10/15/15</a:t>
+              <a:t>10/16/2015</a:t>
             </a:fld>
             <a:endParaRPr lang="en-US"/>
           </a:p>
@@ -5526,7 +5527,7 @@
           <a:p>
             <a:fld id="{E20D963B-2D4F-495B-A2B5-E46053ACE7DA}" type="datetimeFigureOut">
               <a:rPr lang="en-US" smtClean="0"/>
-              <a:t>10/15/15</a:t>
+              <a:t>10/16/2015</a:t>
             </a:fld>
             <a:endParaRPr lang="en-US"/>
           </a:p>
@@ -5644,7 +5645,7 @@
           <a:p>
             <a:fld id="{E20D963B-2D4F-495B-A2B5-E46053ACE7DA}" type="datetimeFigureOut">
               <a:rPr lang="en-US" smtClean="0"/>
-              <a:t>10/15/15</a:t>
+              <a:t>10/16/2015</a:t>
             </a:fld>
             <a:endParaRPr lang="en-US"/>
           </a:p>
@@ -5739,7 +5740,7 @@
           <a:p>
             <a:fld id="{E20D963B-2D4F-495B-A2B5-E46053ACE7DA}" type="datetimeFigureOut">
               <a:rPr lang="en-US" smtClean="0"/>
-              <a:t>10/15/15</a:t>
+              <a:t>10/16/2015</a:t>
             </a:fld>
             <a:endParaRPr lang="en-US"/>
           </a:p>
@@ -6018,7 +6019,7 @@
           <a:p>
             <a:fld id="{E20D963B-2D4F-495B-A2B5-E46053ACE7DA}" type="datetimeFigureOut">
               <a:rPr lang="en-US" smtClean="0"/>
-              <a:t>10/15/15</a:t>
+              <a:t>10/16/2015</a:t>
             </a:fld>
             <a:endParaRPr lang="en-US"/>
           </a:p>
@@ -6293,7 +6294,7 @@
           <a:p>
             <a:fld id="{E20D963B-2D4F-495B-A2B5-E46053ACE7DA}" type="datetimeFigureOut">
               <a:rPr lang="en-US" smtClean="0"/>
-              <a:t>10/15/15</a:t>
+              <a:t>10/16/2015</a:t>
             </a:fld>
             <a:endParaRPr lang="en-US"/>
           </a:p>
@@ -6695,7 +6696,7 @@
           <a:p>
             <a:fld id="{E20D963B-2D4F-495B-A2B5-E46053ACE7DA}" type="datetimeFigureOut">
               <a:rPr lang="en-US" smtClean="0"/>
-              <a:t>10/15/15</a:t>
+              <a:t>10/16/2015</a:t>
             </a:fld>
             <a:endParaRPr lang="en-US"/>
           </a:p>
@@ -7656,7 +7657,7 @@
   <p:timing>
     <p:tnLst>
       <p:par>
-        <p:cTn xmlns:p14="http://schemas.microsoft.com/office/powerpoint/2010/main" id="1" dur="indefinite" restart="never" nodeType="tmRoot"/>
+        <p:cTn id="1" dur="indefinite" restart="never" nodeType="tmRoot"/>
       </p:par>
     </p:tnLst>
   </p:timing>
@@ -7797,7 +7798,7 @@
   <p:timing>
     <p:tnLst>
       <p:par>
-        <p:cTn xmlns:p14="http://schemas.microsoft.com/office/powerpoint/2010/main" id="1" dur="indefinite" restart="never" nodeType="tmRoot"/>
+        <p:cTn id="1" dur="indefinite" restart="never" nodeType="tmRoot"/>
       </p:par>
     </p:tnLst>
   </p:timing>
@@ -8306,7 +8307,7 @@
   <p:timing>
     <p:tnLst>
       <p:par>
-        <p:cTn xmlns:p14="http://schemas.microsoft.com/office/powerpoint/2010/main" id="1" dur="indefinite" restart="never" nodeType="tmRoot"/>
+        <p:cTn id="1" dur="indefinite" restart="never" nodeType="tmRoot"/>
       </p:par>
     </p:tnLst>
   </p:timing>
@@ -8941,7 +8942,7 @@
   <p:timing>
     <p:tnLst>
       <p:par>
-        <p:cTn xmlns:p14="http://schemas.microsoft.com/office/powerpoint/2010/main" id="1" dur="indefinite" restart="never" nodeType="tmRoot"/>
+        <p:cTn id="1" dur="indefinite" restart="never" nodeType="tmRoot"/>
       </p:par>
     </p:tnLst>
   </p:timing>
@@ -9035,7 +9036,7 @@
   <p:timing>
     <p:tnLst>
       <p:par>
-        <p:cTn xmlns:p14="http://schemas.microsoft.com/office/powerpoint/2010/main" id="1" dur="indefinite" restart="never" nodeType="tmRoot"/>
+        <p:cTn id="1" dur="indefinite" restart="never" nodeType="tmRoot"/>
       </p:par>
     </p:tnLst>
   </p:timing>
@@ -9220,7 +9221,7 @@
   <p:timing>
     <p:tnLst>
       <p:par>
-        <p:cTn xmlns:p14="http://schemas.microsoft.com/office/powerpoint/2010/main" id="1" dur="indefinite" restart="never" nodeType="tmRoot"/>
+        <p:cTn id="1" dur="indefinite" restart="never" nodeType="tmRoot"/>
       </p:par>
     </p:tnLst>
   </p:timing>
@@ -9289,7 +9290,7 @@
         </p:nvGraphicFramePr>
         <p:xfrm>
           <a:off x="515649" y="2885723"/>
-          <a:ext cx="11078817" cy="3985467"/>
+          <a:ext cx="11078817" cy="3761027"/>
         </p:xfrm>
         <a:graphic>
           <a:graphicData uri="http://schemas.openxmlformats.org/drawingml/2006/table">
@@ -10133,7 +10134,7 @@
   <p:timing>
     <p:tnLst>
       <p:par>
-        <p:cTn xmlns:p14="http://schemas.microsoft.com/office/powerpoint/2010/main" id="1" dur="indefinite" restart="never" nodeType="tmRoot"/>
+        <p:cTn id="1" dur="indefinite" restart="never" nodeType="tmRoot"/>
       </p:par>
     </p:tnLst>
   </p:timing>
@@ -10227,7 +10228,7 @@
   <p:timing>
     <p:tnLst>
       <p:par>
-        <p:cTn xmlns:p14="http://schemas.microsoft.com/office/powerpoint/2010/main" id="1" dur="indefinite" restart="never" nodeType="tmRoot"/>
+        <p:cTn id="1" dur="indefinite" restart="never" nodeType="tmRoot"/>
       </p:par>
     </p:tnLst>
   </p:timing>
@@ -10369,7 +10370,7 @@
           </a:prstGeom>
           <a:noFill/>
           <a:extLst>
-            <a:ext uri="{909E8E84-426E-40dd-AFC4-6F175D3DCCD1}">
+            <a:ext uri="{909E8E84-426E-40DD-AFC4-6F175D3DCCD1}">
               <a14:hiddenFill xmlns:a14="http://schemas.microsoft.com/office/drawing/2010/main">
                 <a:solidFill>
                   <a:srgbClr val="FFFFFF"/>
@@ -10410,7 +10411,7 @@
           </a:prstGeom>
           <a:noFill/>
           <a:extLst>
-            <a:ext uri="{909E8E84-426E-40dd-AFC4-6F175D3DCCD1}">
+            <a:ext uri="{909E8E84-426E-40DD-AFC4-6F175D3DCCD1}">
               <a14:hiddenFill xmlns:a14="http://schemas.microsoft.com/office/drawing/2010/main">
                 <a:solidFill>
                   <a:srgbClr val="FFFFFF"/>
@@ -10433,7 +10434,7 @@
   <p:timing>
     <p:tnLst>
       <p:par>
-        <p:cTn xmlns:p14="http://schemas.microsoft.com/office/powerpoint/2010/main" id="1" dur="indefinite" restart="never" nodeType="tmRoot"/>
+        <p:cTn id="1" dur="indefinite" restart="never" nodeType="tmRoot"/>
       </p:par>
     </p:tnLst>
   </p:timing>
@@ -10527,7 +10528,7 @@
   <p:timing>
     <p:tnLst>
       <p:par>
-        <p:cTn xmlns:p14="http://schemas.microsoft.com/office/powerpoint/2010/main" id="1" dur="indefinite" restart="never" nodeType="tmRoot"/>
+        <p:cTn id="1" dur="indefinite" restart="never" nodeType="tmRoot"/>
       </p:par>
     </p:tnLst>
   </p:timing>
@@ -10612,11 +10613,7 @@
             </a:pPr>
             <a:r>
               <a:rPr lang="en-US" dirty="0" smtClean="0"/>
-              <a:t>Anchorage, Boulder, Honolulu, </a:t>
-            </a:r>
-            <a:r>
-              <a:rPr lang="en-US" dirty="0" smtClean="0"/>
-              <a:t>Crookston</a:t>
+              <a:t>Anchorage, Boulder, Honolulu, Crookston</a:t>
             </a:r>
             <a:endParaRPr lang="en-US" dirty="0"/>
           </a:p>
@@ -10644,8 +10641,8 @@
         </p:blipFill>
         <p:spPr>
           <a:xfrm>
-            <a:off x="1993875" y="2491838"/>
-            <a:ext cx="7961844" cy="3996846"/>
+            <a:off x="1892276" y="2550883"/>
+            <a:ext cx="6535635" cy="3280889"/>
           </a:xfrm>
           <a:prstGeom prst="rect">
             <a:avLst/>
@@ -10665,7 +10662,7 @@
   <p:timing>
     <p:tnLst>
       <p:par>
-        <p:cTn xmlns:p14="http://schemas.microsoft.com/office/powerpoint/2010/main" id="1" dur="indefinite" restart="never" nodeType="tmRoot"/>
+        <p:cTn id="1" dur="indefinite" restart="never" nodeType="tmRoot"/>
       </p:par>
     </p:tnLst>
   </p:timing>
@@ -10967,7 +10964,7 @@
   <p:timing>
     <p:tnLst>
       <p:par>
-        <p:cTn xmlns:p14="http://schemas.microsoft.com/office/powerpoint/2010/main" id="1" dur="indefinite" restart="never" nodeType="tmRoot"/>
+        <p:cTn id="1" dur="indefinite" restart="never" nodeType="tmRoot"/>
       </p:par>
     </p:tnLst>
   </p:timing>
@@ -11046,11 +11043,7 @@
             </a:pPr>
             <a:r>
               <a:rPr lang="en-US" dirty="0" smtClean="0"/>
-              <a:t>Orbit </a:t>
-            </a:r>
-            <a:r>
-              <a:rPr lang="en-US" dirty="0" smtClean="0"/>
-              <a:t>shall coincide with as many ground stations as possible</a:t>
+              <a:t>Orbit shall coincide with as many ground stations as possible</a:t>
             </a:r>
           </a:p>
           <a:p>
@@ -11083,11 +11076,7 @@
             </a:pPr>
             <a:r>
               <a:rPr lang="en-US" dirty="0" smtClean="0"/>
-              <a:t>Orbital </a:t>
-            </a:r>
-            <a:r>
-              <a:rPr lang="en-US" dirty="0" smtClean="0"/>
-              <a:t>parameters shall not interfere with other spacecraft</a:t>
+              <a:t>Orbital parameters shall not interfere with other spacecraft</a:t>
             </a:r>
             <a:endParaRPr lang="en-US" dirty="0"/>
           </a:p>
@@ -11106,7 +11095,7 @@
   <p:timing>
     <p:tnLst>
       <p:par>
-        <p:cTn xmlns:p14="http://schemas.microsoft.com/office/powerpoint/2010/main" id="1" dur="indefinite" restart="never" nodeType="tmRoot"/>
+        <p:cTn id="1" dur="indefinite" restart="never" nodeType="tmRoot"/>
       </p:par>
     </p:tnLst>
   </p:timing>
@@ -11179,15 +11168,7 @@
             </a:r>
             <a:r>
               <a:rPr lang="en-US" dirty="0" smtClean="0"/>
-              <a:t>orbit assumed </a:t>
-            </a:r>
-            <a:r>
-              <a:rPr lang="en-US" dirty="0" smtClean="0"/>
-              <a:t>(1 </a:t>
-            </a:r>
-            <a:r>
-              <a:rPr lang="en-US" dirty="0" smtClean="0"/>
-              <a:t>MB </a:t>
+              <a:t>orbit assumed (1 MB </a:t>
             </a:r>
             <a:r>
               <a:rPr lang="en-US" dirty="0"/>
@@ -11276,7 +11257,7 @@
   <p:timing>
     <p:tnLst>
       <p:par>
-        <p:cTn xmlns:p14="http://schemas.microsoft.com/office/powerpoint/2010/main" id="1" dur="indefinite" restart="never" nodeType="tmRoot"/>
+        <p:cTn id="1" dur="indefinite" restart="never" nodeType="tmRoot"/>
       </p:par>
     </p:tnLst>
   </p:timing>
@@ -11408,7 +11389,7 @@
   <p:timing>
     <p:tnLst>
       <p:par>
-        <p:cTn xmlns:p14="http://schemas.microsoft.com/office/powerpoint/2010/main" id="1" dur="indefinite" restart="never" nodeType="tmRoot"/>
+        <p:cTn id="1" dur="indefinite" restart="never" nodeType="tmRoot"/>
       </p:par>
     </p:tnLst>
   </p:timing>
@@ -11930,7 +11911,7 @@
   <p:timing>
     <p:tnLst>
       <p:par>
-        <p:cTn xmlns:p14="http://schemas.microsoft.com/office/powerpoint/2010/main" id="1" dur="indefinite" restart="never" nodeType="tmRoot"/>
+        <p:cTn id="1" dur="indefinite" restart="never" nodeType="tmRoot"/>
       </p:par>
     </p:tnLst>
   </p:timing>
@@ -12024,7 +12005,7 @@
   <p:timing>
     <p:tnLst>
       <p:par>
-        <p:cTn xmlns:p14="http://schemas.microsoft.com/office/powerpoint/2010/main" id="1" dur="indefinite" restart="never" nodeType="tmRoot"/>
+        <p:cTn id="1" dur="indefinite" restart="never" nodeType="tmRoot"/>
       </p:par>
     </p:tnLst>
   </p:timing>
@@ -12209,7 +12190,7 @@
   <p:timing>
     <p:tnLst>
       <p:par>
-        <p:cTn xmlns:p14="http://schemas.microsoft.com/office/powerpoint/2010/main" id="1" dur="indefinite" restart="never" nodeType="tmRoot"/>
+        <p:cTn id="1" dur="indefinite" restart="never" nodeType="tmRoot"/>
       </p:par>
     </p:tnLst>
   </p:timing>
@@ -12249,7 +12230,7 @@
         </p:nvGraphicFramePr>
         <p:xfrm>
           <a:off x="825741" y="1566916"/>
-          <a:ext cx="10362958" cy="4129651"/>
+          <a:ext cx="10362958" cy="4129652"/>
         </p:xfrm>
         <a:graphic>
           <a:graphicData uri="http://schemas.openxmlformats.org/drawingml/2006/table">
@@ -12699,7 +12680,7 @@
   <p:timing>
     <p:tnLst>
       <p:par>
-        <p:cTn xmlns:p14="http://schemas.microsoft.com/office/powerpoint/2010/main" id="1" dur="indefinite" restart="never" nodeType="tmRoot"/>
+        <p:cTn id="1" dur="indefinite" restart="never" nodeType="tmRoot"/>
       </p:par>
     </p:tnLst>
   </p:timing>
@@ -13173,7 +13154,7 @@
   <p:timing>
     <p:tnLst>
       <p:par>
-        <p:cTn xmlns:p14="http://schemas.microsoft.com/office/powerpoint/2010/main" id="1" dur="indefinite" restart="never" nodeType="tmRoot"/>
+        <p:cTn id="1" dur="indefinite" restart="never" nodeType="tmRoot"/>
       </p:par>
     </p:tnLst>
   </p:timing>
@@ -13582,7 +13563,7 @@
   <p:timing>
     <p:tnLst>
       <p:par>
-        <p:cTn xmlns:p14="http://schemas.microsoft.com/office/powerpoint/2010/main" id="1" dur="indefinite" restart="never" nodeType="tmRoot"/>
+        <p:cTn id="1" dur="indefinite" restart="never" nodeType="tmRoot"/>
       </p:par>
     </p:tnLst>
   </p:timing>
@@ -13649,7 +13630,56 @@
           <a:bodyPr/>
           <a:lstStyle/>
           <a:p>
-            <a:endParaRPr lang="en-US"/>
+            <a:r>
+              <a:rPr lang="en-US" dirty="0" smtClean="0"/>
+              <a:t>Thre</a:t>
+            </a:r>
+            <a:r>
+              <a:rPr lang="en-US" dirty="0" smtClean="0"/>
+              <a:t>e dimensional computer generated model. (</a:t>
+            </a:r>
+            <a:r>
+              <a:rPr lang="en-US" dirty="0" err="1" smtClean="0"/>
+              <a:t>Solidworks</a:t>
+            </a:r>
+            <a:r>
+              <a:rPr lang="en-US" dirty="0" smtClean="0"/>
+              <a:t>)</a:t>
+            </a:r>
+          </a:p>
+          <a:p>
+            <a:pPr lvl="1"/>
+            <a:r>
+              <a:rPr lang="en-US" dirty="0" smtClean="0"/>
+              <a:t>includes dimensional drawings  to manufacture external structure</a:t>
+            </a:r>
+          </a:p>
+          <a:p>
+            <a:r>
+              <a:rPr lang="en-US" dirty="0" smtClean="0"/>
+              <a:t>Detailed hardware wiring schematics</a:t>
+            </a:r>
+          </a:p>
+          <a:p>
+            <a:r>
+              <a:rPr lang="en-US" dirty="0" smtClean="0"/>
+              <a:t>Skeleton software, meeting ADNCS and Power requirements</a:t>
+            </a:r>
+          </a:p>
+          <a:p>
+            <a:r>
+              <a:rPr lang="en-US" dirty="0" smtClean="0"/>
+              <a:t>Custom PCB (printed circuit board) for microsecond timing</a:t>
+            </a:r>
+          </a:p>
+          <a:p>
+            <a:r>
+              <a:rPr lang="en-US" dirty="0" smtClean="0"/>
+              <a:t>Orbit requirements, Link Budget, and Data Scheduling algorithms</a:t>
+            </a:r>
+          </a:p>
+          <a:p>
+            <a:endParaRPr lang="en-US" dirty="0"/>
           </a:p>
         </p:txBody>
       </p:sp>
@@ -13666,7 +13696,7 @@
   <p:timing>
     <p:tnLst>
       <p:par>
-        <p:cTn xmlns:p14="http://schemas.microsoft.com/office/powerpoint/2010/main" id="1" dur="indefinite" restart="never" nodeType="tmRoot"/>
+        <p:cTn id="1" dur="indefinite" restart="never" nodeType="tmRoot"/>
       </p:par>
     </p:tnLst>
   </p:timing>
@@ -13784,6 +13814,91 @@
           </a:p>
         </p:txBody>
       </p:sp>
+      <p:pic>
+        <p:nvPicPr>
+          <p:cNvPr id="1026" name="Picture 2"/>
+          <p:cNvPicPr>
+            <a:picLocks noChangeAspect="1" noChangeArrowheads="1"/>
+          </p:cNvPicPr>
+          <p:nvPr/>
+        </p:nvPicPr>
+        <p:blipFill>
+          <a:blip r:embed="rId3">
+            <a:extLst>
+              <a:ext uri="{28A0092B-C50C-407E-A947-70E740481C1C}">
+                <a14:useLocalDpi xmlns:a14="http://schemas.microsoft.com/office/drawing/2010/main" val="0"/>
+              </a:ext>
+            </a:extLst>
+          </a:blip>
+          <a:srcRect/>
+          <a:stretch>
+            <a:fillRect/>
+          </a:stretch>
+        </p:blipFill>
+        <p:spPr bwMode="auto">
+          <a:xfrm>
+            <a:off x="3424205" y="3465887"/>
+            <a:ext cx="4880451" cy="2455611"/>
+          </a:xfrm>
+          <a:prstGeom prst="rect">
+            <a:avLst/>
+          </a:prstGeom>
+          <a:noFill/>
+          <a:ln>
+            <a:noFill/>
+          </a:ln>
+          <a:extLst>
+            <a:ext uri="{909E8E84-426E-40DD-AFC4-6F175D3DCCD1}">
+              <a14:hiddenFill xmlns:a14="http://schemas.microsoft.com/office/drawing/2010/main">
+                <a:solidFill>
+                  <a:schemeClr val="accent1"/>
+                </a:solidFill>
+              </a14:hiddenFill>
+            </a:ext>
+            <a:ext uri="{91240B29-F687-4F45-9708-019B960494DF}">
+              <a14:hiddenLine xmlns:a14="http://schemas.microsoft.com/office/drawing/2010/main" w="9525">
+                <a:solidFill>
+                  <a:schemeClr val="tx1"/>
+                </a:solidFill>
+                <a:miter lim="800000"/>
+                <a:headEnd/>
+                <a:tailEnd/>
+              </a14:hiddenLine>
+            </a:ext>
+          </a:extLst>
+        </p:spPr>
+      </p:pic>
+      <p:sp>
+        <p:nvSpPr>
+          <p:cNvPr id="2" name="TextBox 1"/>
+          <p:cNvSpPr txBox="1"/>
+          <p:nvPr/>
+        </p:nvSpPr>
+        <p:spPr>
+          <a:xfrm>
+            <a:off x="3424204" y="5948039"/>
+            <a:ext cx="5267214" cy="646331"/>
+          </a:xfrm>
+          <a:prstGeom prst="rect">
+            <a:avLst/>
+          </a:prstGeom>
+          <a:noFill/>
+        </p:spPr>
+        <p:txBody>
+          <a:bodyPr wrap="square" rtlCol="0">
+            <a:spAutoFit/>
+          </a:bodyPr>
+          <a:lstStyle/>
+          <a:p>
+            <a:pPr marL="628650" indent="-628650"/>
+            <a:r>
+              <a:rPr lang="en-US" sz="1200" dirty="0" smtClean="0"/>
+              <a:t>Figure 1. This figures shows six examples of known Gamma Ray bursts from our universe. The data in the plots represents the relation between Kilo-Electron Volts and Seconds in time.</a:t>
+            </a:r>
+            <a:endParaRPr lang="en-US" sz="1200" dirty="0"/>
+          </a:p>
+        </p:txBody>
+      </p:sp>
     </p:spTree>
     <p:extLst>
       <p:ext uri="{BB962C8B-B14F-4D97-AF65-F5344CB8AC3E}">
@@ -13797,10 +13912,112 @@
   <p:timing>
     <p:tnLst>
       <p:par>
-        <p:cTn xmlns:p14="http://schemas.microsoft.com/office/powerpoint/2010/main" id="1" dur="indefinite" restart="never" nodeType="tmRoot"/>
+        <p:cTn id="1" dur="indefinite" restart="never" nodeType="tmRoot"/>
       </p:par>
     </p:tnLst>
   </p:timing>
+</p:sld>
+</file>
+
+<file path=ppt/slides/slide30.xml><?xml version="1.0" encoding="utf-8"?>
+<p:sld xmlns:a="http://schemas.openxmlformats.org/drawingml/2006/main" xmlns:r="http://schemas.openxmlformats.org/officeDocument/2006/relationships" xmlns:p="http://schemas.openxmlformats.org/presentationml/2006/main">
+  <p:cSld>
+    <p:spTree>
+      <p:nvGrpSpPr>
+        <p:cNvPr id="1" name=""/>
+        <p:cNvGrpSpPr/>
+        <p:nvPr/>
+      </p:nvGrpSpPr>
+      <p:grpSpPr>
+        <a:xfrm>
+          <a:off x="0" y="0"/>
+          <a:ext cx="0" cy="0"/>
+          <a:chOff x="0" y="0"/>
+          <a:chExt cx="0" cy="0"/>
+        </a:xfrm>
+      </p:grpSpPr>
+      <p:sp>
+        <p:nvSpPr>
+          <p:cNvPr id="2" name="Title 1"/>
+          <p:cNvSpPr>
+            <a:spLocks noGrp="1"/>
+          </p:cNvSpPr>
+          <p:nvPr>
+            <p:ph type="title"/>
+          </p:nvPr>
+        </p:nvSpPr>
+        <p:spPr>
+          <a:xfrm>
+            <a:off x="4405311" y="3666973"/>
+            <a:ext cx="3805817" cy="1400530"/>
+          </a:xfrm>
+        </p:spPr>
+        <p:txBody>
+          <a:bodyPr/>
+          <a:lstStyle/>
+          <a:p>
+            <a:r>
+              <a:rPr lang="en-US" dirty="0" smtClean="0"/>
+              <a:t>Questions?</a:t>
+            </a:r>
+            <a:endParaRPr lang="en-US" dirty="0"/>
+          </a:p>
+        </p:txBody>
+      </p:sp>
+      <p:pic>
+        <p:nvPicPr>
+          <p:cNvPr id="4" name="Picture 3"/>
+          <p:cNvPicPr>
+            <a:picLocks noChangeAspect="1"/>
+          </p:cNvPicPr>
+          <p:nvPr/>
+        </p:nvPicPr>
+        <p:blipFill>
+          <a:blip r:embed="rId2">
+            <a:clrChange>
+              <a:clrFrom>
+                <a:srgbClr val="020202"/>
+              </a:clrFrom>
+              <a:clrTo>
+                <a:srgbClr val="020202">
+                  <a:alpha val="0"/>
+                </a:srgbClr>
+              </a:clrTo>
+            </a:clrChange>
+            <a:extLst>
+              <a:ext uri="{28A0092B-C50C-407E-A947-70E740481C1C}">
+                <a14:useLocalDpi xmlns:a14="http://schemas.microsoft.com/office/drawing/2010/main" val="0"/>
+              </a:ext>
+            </a:extLst>
+          </a:blip>
+          <a:stretch>
+            <a:fillRect/>
+          </a:stretch>
+        </p:blipFill>
+        <p:spPr>
+          <a:xfrm rot="20813254">
+            <a:off x="1740490" y="1475400"/>
+            <a:ext cx="694601" cy="1579389"/>
+          </a:xfrm>
+          <a:prstGeom prst="rect">
+            <a:avLst/>
+          </a:prstGeom>
+          <a:ln>
+            <a:noFill/>
+          </a:ln>
+          <a:effectLst/>
+        </p:spPr>
+      </p:pic>
+    </p:spTree>
+    <p:extLst>
+      <p:ext uri="{BB962C8B-B14F-4D97-AF65-F5344CB8AC3E}">
+        <p14:creationId xmlns:p14="http://schemas.microsoft.com/office/powerpoint/2010/main" val="3396376396"/>
+      </p:ext>
+    </p:extLst>
+  </p:cSld>
+  <p:clrMapOvr>
+    <a:masterClrMapping/>
+  </p:clrMapOvr>
 </p:sld>
 </file>
 
@@ -14026,7 +14243,7 @@
   <p:timing>
     <p:tnLst>
       <p:par>
-        <p:cTn xmlns:p14="http://schemas.microsoft.com/office/powerpoint/2010/main" id="1" dur="indefinite" restart="never" nodeType="tmRoot">
+        <p:cTn id="1" dur="indefinite" restart="never" nodeType="tmRoot">
           <p:childTnLst>
             <p:seq concurrent="1" nextAc="seek">
               <p:cTn id="2" dur="indefinite" nodeType="mainSeq">
@@ -14476,7 +14693,7 @@
   <p:timing>
     <p:tnLst>
       <p:par>
-        <p:cTn xmlns:p14="http://schemas.microsoft.com/office/powerpoint/2010/main" id="1" dur="indefinite" restart="never" nodeType="tmRoot"/>
+        <p:cTn id="1" dur="indefinite" restart="never" nodeType="tmRoot"/>
       </p:par>
     </p:tnLst>
   </p:timing>
@@ -14649,7 +14866,7 @@
   <p:timing>
     <p:tnLst>
       <p:par>
-        <p:cTn xmlns:p14="http://schemas.microsoft.com/office/powerpoint/2010/main" id="1" dur="indefinite" restart="never" nodeType="tmRoot"/>
+        <p:cTn id="1" dur="indefinite" restart="never" nodeType="tmRoot"/>
       </p:par>
     </p:tnLst>
   </p:timing>
@@ -14743,7 +14960,7 @@
   <p:timing>
     <p:tnLst>
       <p:par>
-        <p:cTn xmlns:p14="http://schemas.microsoft.com/office/powerpoint/2010/main" id="1" dur="indefinite" restart="never" nodeType="tmRoot"/>
+        <p:cTn id="1" dur="indefinite" restart="never" nodeType="tmRoot"/>
       </p:par>
     </p:tnLst>
   </p:timing>
@@ -14837,7 +15054,7 @@
   <p:timing>
     <p:tnLst>
       <p:par>
-        <p:cTn xmlns:p14="http://schemas.microsoft.com/office/powerpoint/2010/main" id="1" dur="indefinite" restart="never" nodeType="tmRoot"/>
+        <p:cTn id="1" dur="indefinite" restart="never" nodeType="tmRoot"/>
       </p:par>
     </p:tnLst>
   </p:timing>
@@ -14968,7 +15185,7 @@
   <p:timing>
     <p:tnLst>
       <p:par>
-        <p:cTn xmlns:p14="http://schemas.microsoft.com/office/powerpoint/2010/main" id="1" dur="indefinite" restart="never" nodeType="tmRoot"/>
+        <p:cTn id="1" dur="indefinite" restart="never" nodeType="tmRoot"/>
       </p:par>
     </p:tnLst>
   </p:timing>
@@ -15235,7 +15452,7 @@
   <a:extraClrSchemeLst/>
   <a:extLst>
     <a:ext uri="{05A4C25C-085E-4340-85A3-A5531E510DB2}">
-      <thm15:themeFamily xmlns="" xmlns:thm15="http://schemas.microsoft.com/office/thememl/2012/main" name="Ion" id="{B8441ADB-2E43-4AF7-B97A-BD870242C6A8}" vid="{292E63A9-BB86-4E3D-B92A-7223C6510D2E}"/>
+      <thm15:themeFamily xmlns:thm15="http://schemas.microsoft.com/office/thememl/2012/main" xmlns="" name="Ion" id="{B8441ADB-2E43-4AF7-B97A-BD870242C6A8}" vid="{292E63A9-BB86-4E3D-B92A-7223C6510D2E}"/>
     </a:ext>
   </a:extLst>
 </a:theme>
@@ -15496,7 +15713,7 @@
   <a:extraClrSchemeLst/>
   <a:extLst>
     <a:ext uri="{05A4C25C-085E-4340-85A3-A5531E510DB2}">
-      <thm15:themeFamily xmlns="" xmlns:thm15="http://schemas.microsoft.com/office/thememl/2012/main" name="Office Theme" id="{62F939B6-93AF-4DB8-9C6B-D6C7DFDC589F}" vid="{4A3C46E8-61CC-4603-A589-7422A47A8E4A}"/>
+      <thm15:themeFamily xmlns:thm15="http://schemas.microsoft.com/office/thememl/2012/main" xmlns="" name="Office Theme" id="{62F939B6-93AF-4DB8-9C6B-D6C7DFDC589F}" vid="{4A3C46E8-61CC-4603-A589-7422A47A8E4A}"/>
     </a:ext>
   </a:extLst>
 </a:theme>

</xml_diff>

<commit_message>
Added Hardware and cost to Power Management Slides
</commit_message>
<xml_diff>
--- a/Presentations/PDR_Presentation.pptx
+++ b/Presentations/PDR_Presentation.pptx
@@ -5,7 +5,7 @@
     <p:sldMasterId id="2147483660" r:id="rId1"/>
   </p:sldMasterIdLst>
   <p:notesMasterIdLst>
-    <p:notesMasterId r:id="rId32"/>
+    <p:notesMasterId r:id="rId33"/>
   </p:notesMasterIdLst>
   <p:sldIdLst>
     <p:sldId id="256" r:id="rId2"/>
@@ -34,10 +34,11 @@
     <p:sldId id="303" r:id="rId25"/>
     <p:sldId id="280" r:id="rId26"/>
     <p:sldId id="281" r:id="rId27"/>
-    <p:sldId id="282" r:id="rId28"/>
-    <p:sldId id="283" r:id="rId29"/>
-    <p:sldId id="304" r:id="rId30"/>
-    <p:sldId id="307" r:id="rId31"/>
+    <p:sldId id="308" r:id="rId28"/>
+    <p:sldId id="282" r:id="rId29"/>
+    <p:sldId id="283" r:id="rId30"/>
+    <p:sldId id="304" r:id="rId31"/>
+    <p:sldId id="307" r:id="rId32"/>
   </p:sldIdLst>
   <p:sldSz cx="12192000" cy="6858000"/>
   <p:notesSz cx="6858000" cy="9144000"/>
@@ -138,7 +139,7 @@
   </p:defaultTextStyle>
   <p:extLst>
     <p:ext uri="{EFAFB233-063F-42B5-8137-9DF3F51BA10A}">
-      <p15:sldGuideLst xmlns:p15="http://schemas.microsoft.com/office/powerpoint/2012/main" xmlns="">
+      <p15:sldGuideLst xmlns:p15="http://schemas.microsoft.com/office/powerpoint/2012/main">
         <p15:guide id="1" orient="horz" pos="2160">
           <p15:clr>
             <a:srgbClr val="A4A3A4"/>
@@ -12714,6 +12715,453 @@
             <p:ph type="title"/>
           </p:nvPr>
         </p:nvSpPr>
+        <p:spPr/>
+        <p:txBody>
+          <a:bodyPr/>
+          <a:lstStyle/>
+          <a:p>
+            <a:r>
+              <a:rPr lang="en-US" dirty="0" smtClean="0"/>
+              <a:t>Power Management - Hardware</a:t>
+            </a:r>
+            <a:endParaRPr lang="en-US" dirty="0"/>
+          </a:p>
+        </p:txBody>
+      </p:sp>
+      <p:graphicFrame>
+        <p:nvGraphicFramePr>
+          <p:cNvPr id="5" name="Table 4"/>
+          <p:cNvGraphicFramePr>
+            <a:graphicFrameLocks noGrp="1"/>
+          </p:cNvGraphicFramePr>
+          <p:nvPr>
+            <p:extLst>
+              <p:ext uri="{D42A27DB-BD31-4B8C-83A1-F6EECF244321}">
+                <p14:modId xmlns:p14="http://schemas.microsoft.com/office/powerpoint/2010/main" val="492223669"/>
+              </p:ext>
+            </p:extLst>
+          </p:nvPr>
+        </p:nvGraphicFramePr>
+        <p:xfrm>
+          <a:off x="646111" y="1853248"/>
+          <a:ext cx="10482137" cy="3779456"/>
+        </p:xfrm>
+        <a:graphic>
+          <a:graphicData uri="http://schemas.openxmlformats.org/drawingml/2006/table">
+            <a:tbl>
+              <a:tblPr firstRow="1" bandRow="1">
+                <a:tableStyleId>{5C22544A-7EE6-4342-B048-85BDC9FD1C3A}</a:tableStyleId>
+              </a:tblPr>
+              <a:tblGrid>
+                <a:gridCol w="2494205"/>
+                <a:gridCol w="2205006"/>
+                <a:gridCol w="2083348"/>
+                <a:gridCol w="1702595"/>
+                <a:gridCol w="1996983"/>
+              </a:tblGrid>
+              <a:tr h="894213">
+                <a:tc>
+                  <a:txBody>
+                    <a:bodyPr/>
+                    <a:lstStyle/>
+                    <a:p>
+                      <a:r>
+                        <a:rPr lang="en-US" dirty="0" smtClean="0"/>
+                        <a:t>Components</a:t>
+                      </a:r>
+                      <a:endParaRPr lang="en-US" dirty="0"/>
+                    </a:p>
+                  </a:txBody>
+                  <a:tcPr/>
+                </a:tc>
+                <a:tc>
+                  <a:txBody>
+                    <a:bodyPr/>
+                    <a:lstStyle/>
+                    <a:p>
+                      <a:r>
+                        <a:rPr lang="en-US" dirty="0" smtClean="0"/>
+                        <a:t>Model</a:t>
+                      </a:r>
+                      <a:endParaRPr lang="en-US" dirty="0"/>
+                    </a:p>
+                  </a:txBody>
+                  <a:tcPr/>
+                </a:tc>
+                <a:tc>
+                  <a:txBody>
+                    <a:bodyPr/>
+                    <a:lstStyle/>
+                    <a:p>
+                      <a:r>
+                        <a:rPr lang="en-US" dirty="0" smtClean="0"/>
+                        <a:t>Source</a:t>
+                      </a:r>
+                      <a:endParaRPr lang="en-US" dirty="0"/>
+                    </a:p>
+                  </a:txBody>
+                  <a:tcPr/>
+                </a:tc>
+                <a:tc>
+                  <a:txBody>
+                    <a:bodyPr/>
+                    <a:lstStyle/>
+                    <a:p>
+                      <a:r>
+                        <a:rPr lang="en-US" dirty="0" smtClean="0"/>
+                        <a:t>Quantity</a:t>
+                      </a:r>
+                      <a:endParaRPr lang="en-US" dirty="0"/>
+                    </a:p>
+                  </a:txBody>
+                  <a:tcPr/>
+                </a:tc>
+                <a:tc>
+                  <a:txBody>
+                    <a:bodyPr/>
+                    <a:lstStyle/>
+                    <a:p>
+                      <a:r>
+                        <a:rPr lang="en-US" dirty="0" smtClean="0"/>
+                        <a:t>Cost</a:t>
+                      </a:r>
+                      <a:endParaRPr lang="en-US" dirty="0"/>
+                    </a:p>
+                  </a:txBody>
+                  <a:tcPr/>
+                </a:tc>
+              </a:tr>
+              <a:tr h="894213">
+                <a:tc>
+                  <a:txBody>
+                    <a:bodyPr/>
+                    <a:lstStyle/>
+                    <a:p>
+                      <a:r>
+                        <a:rPr lang="en-US" dirty="0" smtClean="0"/>
+                        <a:t>Battery</a:t>
+                      </a:r>
+                    </a:p>
+                    <a:p>
+                      <a:endParaRPr lang="en-US" dirty="0" smtClean="0"/>
+                    </a:p>
+                  </a:txBody>
+                  <a:tcPr/>
+                </a:tc>
+                <a:tc>
+                  <a:txBody>
+                    <a:bodyPr/>
+                    <a:lstStyle/>
+                    <a:p>
+                      <a:pPr algn="ctr"/>
+                      <a:r>
+                        <a:rPr lang="en-US" dirty="0" err="1" smtClean="0"/>
+                        <a:t>NanoPower</a:t>
+                      </a:r>
+                      <a:r>
+                        <a:rPr lang="en-US" dirty="0" smtClean="0"/>
+                        <a:t> BPX</a:t>
+                      </a:r>
+                      <a:endParaRPr lang="en-US" dirty="0"/>
+                    </a:p>
+                  </a:txBody>
+                  <a:tcPr/>
+                </a:tc>
+                <a:tc>
+                  <a:txBody>
+                    <a:bodyPr/>
+                    <a:lstStyle/>
+                    <a:p>
+                      <a:pPr algn="ctr"/>
+                      <a:r>
+                        <a:rPr lang="en-US" dirty="0" err="1" smtClean="0"/>
+                        <a:t>GOMSpace</a:t>
+                      </a:r>
+                      <a:endParaRPr lang="en-US" dirty="0"/>
+                    </a:p>
+                  </a:txBody>
+                  <a:tcPr/>
+                </a:tc>
+                <a:tc>
+                  <a:txBody>
+                    <a:bodyPr/>
+                    <a:lstStyle/>
+                    <a:p>
+                      <a:pPr algn="ctr"/>
+                      <a:r>
+                        <a:rPr lang="en-US" dirty="0" smtClean="0"/>
+                        <a:t>N/A</a:t>
+                      </a:r>
+                      <a:endParaRPr lang="en-US" dirty="0"/>
+                    </a:p>
+                  </a:txBody>
+                  <a:tcPr/>
+                </a:tc>
+                <a:tc>
+                  <a:txBody>
+                    <a:bodyPr/>
+                    <a:lstStyle/>
+                    <a:p>
+                      <a:pPr algn="ctr"/>
+                      <a:r>
+                        <a:rPr lang="en-US" dirty="0" smtClean="0"/>
+                        <a:t>$6,200</a:t>
+                      </a:r>
+                      <a:endParaRPr lang="en-US" dirty="0"/>
+                    </a:p>
+                  </a:txBody>
+                  <a:tcPr/>
+                </a:tc>
+              </a:tr>
+              <a:tr h="995515">
+                <a:tc>
+                  <a:txBody>
+                    <a:bodyPr/>
+                    <a:lstStyle/>
+                    <a:p>
+                      <a:r>
+                        <a:rPr lang="en-US" dirty="0" smtClean="0"/>
+                        <a:t>Power Management</a:t>
+                      </a:r>
+                      <a:r>
+                        <a:rPr lang="en-US" baseline="0" dirty="0" smtClean="0"/>
+                        <a:t> Board</a:t>
+                      </a:r>
+                      <a:endParaRPr lang="en-US" dirty="0"/>
+                    </a:p>
+                  </a:txBody>
+                  <a:tcPr/>
+                </a:tc>
+                <a:tc>
+                  <a:txBody>
+                    <a:bodyPr/>
+                    <a:lstStyle/>
+                    <a:p>
+                      <a:pPr algn="ctr"/>
+                      <a:r>
+                        <a:rPr lang="en-US" dirty="0" smtClean="0"/>
+                        <a:t>P31us</a:t>
+                      </a:r>
+                      <a:endParaRPr lang="en-US" dirty="0"/>
+                    </a:p>
+                  </a:txBody>
+                  <a:tcPr/>
+                </a:tc>
+                <a:tc>
+                  <a:txBody>
+                    <a:bodyPr/>
+                    <a:lstStyle/>
+                    <a:p>
+                      <a:pPr algn="ctr"/>
+                      <a:r>
+                        <a:rPr lang="en-US" dirty="0" err="1" smtClean="0"/>
+                        <a:t>GOMSpace</a:t>
+                      </a:r>
+                      <a:endParaRPr lang="en-US" dirty="0"/>
+                    </a:p>
+                  </a:txBody>
+                  <a:tcPr/>
+                </a:tc>
+                <a:tc>
+                  <a:txBody>
+                    <a:bodyPr/>
+                    <a:lstStyle/>
+                    <a:p>
+                      <a:pPr algn="ctr"/>
+                      <a:r>
+                        <a:rPr lang="en-US" dirty="0" smtClean="0"/>
+                        <a:t>1</a:t>
+                      </a:r>
+                      <a:endParaRPr lang="en-US" dirty="0"/>
+                    </a:p>
+                  </a:txBody>
+                  <a:tcPr/>
+                </a:tc>
+                <a:tc>
+                  <a:txBody>
+                    <a:bodyPr/>
+                    <a:lstStyle/>
+                    <a:p>
+                      <a:pPr algn="ctr"/>
+                      <a:r>
+                        <a:rPr lang="en-US" dirty="0" smtClean="0"/>
+                        <a:t>$6,200</a:t>
+                      </a:r>
+                      <a:endParaRPr lang="en-US" dirty="0"/>
+                    </a:p>
+                  </a:txBody>
+                  <a:tcPr/>
+                </a:tc>
+              </a:tr>
+              <a:tr h="995515">
+                <a:tc>
+                  <a:txBody>
+                    <a:bodyPr/>
+                    <a:lstStyle/>
+                    <a:p>
+                      <a:r>
+                        <a:rPr lang="en-US" dirty="0" smtClean="0"/>
+                        <a:t>Solar Panels</a:t>
+                      </a:r>
+                      <a:endParaRPr lang="en-US" dirty="0"/>
+                    </a:p>
+                  </a:txBody>
+                  <a:tcPr/>
+                </a:tc>
+                <a:tc>
+                  <a:txBody>
+                    <a:bodyPr/>
+                    <a:lstStyle/>
+                    <a:p>
+                      <a:pPr algn="ctr"/>
+                      <a:r>
+                        <a:rPr lang="en-US" dirty="0" err="1" smtClean="0"/>
+                        <a:t>NanoPower</a:t>
+                      </a:r>
+                      <a:r>
+                        <a:rPr lang="en-US" dirty="0" smtClean="0"/>
+                        <a:t> P110</a:t>
+                      </a:r>
+                    </a:p>
+                    <a:p>
+                      <a:pPr algn="ctr"/>
+                      <a:endParaRPr lang="en-US" dirty="0" smtClean="0"/>
+                    </a:p>
+                    <a:p>
+                      <a:pPr algn="ctr"/>
+                      <a:r>
+                        <a:rPr lang="en-US" dirty="0" smtClean="0"/>
+                        <a:t>SP-L-S3U</a:t>
+                      </a:r>
+                      <a:endParaRPr lang="en-US" dirty="0"/>
+                    </a:p>
+                  </a:txBody>
+                  <a:tcPr/>
+                </a:tc>
+                <a:tc>
+                  <a:txBody>
+                    <a:bodyPr/>
+                    <a:lstStyle/>
+                    <a:p>
+                      <a:pPr algn="ctr"/>
+                      <a:r>
+                        <a:rPr lang="en-US" dirty="0" err="1" smtClean="0"/>
+                        <a:t>GOMSpace</a:t>
+                      </a:r>
+                      <a:endParaRPr lang="en-US" dirty="0" smtClean="0"/>
+                    </a:p>
+                    <a:p>
+                      <a:pPr algn="ctr"/>
+                      <a:endParaRPr lang="en-US" dirty="0" smtClean="0"/>
+                    </a:p>
+                    <a:p>
+                      <a:pPr algn="ctr"/>
+                      <a:r>
+                        <a:rPr lang="en-US" dirty="0" err="1" smtClean="0"/>
+                        <a:t>ClydeSpace</a:t>
+                      </a:r>
+                      <a:endParaRPr lang="en-US" dirty="0"/>
+                    </a:p>
+                  </a:txBody>
+                  <a:tcPr/>
+                </a:tc>
+                <a:tc>
+                  <a:txBody>
+                    <a:bodyPr/>
+                    <a:lstStyle/>
+                    <a:p>
+                      <a:pPr algn="ctr"/>
+                      <a:r>
+                        <a:rPr lang="en-US" dirty="0" smtClean="0"/>
+                        <a:t>8</a:t>
+                      </a:r>
+                    </a:p>
+                    <a:p>
+                      <a:pPr algn="ctr"/>
+                      <a:endParaRPr lang="en-US" dirty="0" smtClean="0"/>
+                    </a:p>
+                    <a:p>
+                      <a:pPr algn="ctr"/>
+                      <a:r>
+                        <a:rPr lang="en-US" dirty="0" smtClean="0"/>
+                        <a:t>4</a:t>
+                      </a:r>
+                      <a:endParaRPr lang="en-US" dirty="0"/>
+                    </a:p>
+                  </a:txBody>
+                  <a:tcPr/>
+                </a:tc>
+                <a:tc>
+                  <a:txBody>
+                    <a:bodyPr/>
+                    <a:lstStyle/>
+                    <a:p>
+                      <a:pPr algn="ctr"/>
+                      <a:r>
+                        <a:rPr lang="en-US" dirty="0" smtClean="0"/>
+                        <a:t>$27,000</a:t>
+                      </a:r>
+                    </a:p>
+                    <a:p>
+                      <a:pPr algn="ctr"/>
+                      <a:endParaRPr lang="en-US" dirty="0" smtClean="0"/>
+                    </a:p>
+                    <a:p>
+                      <a:pPr algn="ctr"/>
+                      <a:r>
+                        <a:rPr lang="en-US" dirty="0" smtClean="0"/>
+                        <a:t>$25,000</a:t>
+                      </a:r>
+                      <a:endParaRPr lang="en-US" dirty="0"/>
+                    </a:p>
+                  </a:txBody>
+                  <a:tcPr/>
+                </a:tc>
+              </a:tr>
+            </a:tbl>
+          </a:graphicData>
+        </a:graphic>
+      </p:graphicFrame>
+    </p:spTree>
+    <p:extLst>
+      <p:ext uri="{BB962C8B-B14F-4D97-AF65-F5344CB8AC3E}">
+        <p14:creationId xmlns:p14="http://schemas.microsoft.com/office/powerpoint/2010/main" val="908898650"/>
+      </p:ext>
+    </p:extLst>
+  </p:cSld>
+  <p:clrMapOvr>
+    <a:masterClrMapping/>
+  </p:clrMapOvr>
+</p:sld>
+</file>
+
+<file path=ppt/slides/slide28.xml><?xml version="1.0" encoding="utf-8"?>
+<p:sld xmlns:a="http://schemas.openxmlformats.org/drawingml/2006/main" xmlns:r="http://schemas.openxmlformats.org/officeDocument/2006/relationships" xmlns:p="http://schemas.openxmlformats.org/presentationml/2006/main">
+  <p:cSld>
+    <p:spTree>
+      <p:nvGrpSpPr>
+        <p:cNvPr id="1" name=""/>
+        <p:cNvGrpSpPr/>
+        <p:nvPr/>
+      </p:nvGrpSpPr>
+      <p:grpSpPr>
+        <a:xfrm>
+          <a:off x="0" y="0"/>
+          <a:ext cx="0" cy="0"/>
+          <a:chOff x="0" y="0"/>
+          <a:chExt cx="0" cy="0"/>
+        </a:xfrm>
+      </p:grpSpPr>
+      <p:sp>
+        <p:nvSpPr>
+          <p:cNvPr id="2" name="Title 1"/>
+          <p:cNvSpPr>
+            <a:spLocks noGrp="1"/>
+          </p:cNvSpPr>
+          <p:nvPr>
+            <p:ph type="title"/>
+          </p:nvPr>
+        </p:nvSpPr>
         <p:spPr>
           <a:xfrm>
             <a:off x="646111" y="452718"/>
@@ -12834,7 +13282,7 @@
         </p:blipFill>
         <p:spPr>
           <a:xfrm>
-            <a:off x="3746326" y="4517490"/>
+            <a:off x="3516536" y="4517490"/>
             <a:ext cx="2215465" cy="1881755"/>
           </a:xfrm>
         </p:spPr>
@@ -12877,7 +13325,7 @@
         </p:nvSpPr>
         <p:spPr>
           <a:xfrm>
-            <a:off x="816810" y="4810400"/>
+            <a:off x="454011" y="4766500"/>
             <a:ext cx="1786537" cy="1711170"/>
           </a:xfrm>
           <a:prstGeom prst="sun">
@@ -12931,7 +13379,7 @@
         </p:nvCxnSpPr>
         <p:spPr>
           <a:xfrm>
-            <a:off x="2709010" y="5624985"/>
+            <a:off x="2434690" y="5622085"/>
             <a:ext cx="931653" cy="0"/>
           </a:xfrm>
           <a:prstGeom prst="straightConnector1">
@@ -12970,7 +13418,7 @@
         </p:nvCxnSpPr>
         <p:spPr>
           <a:xfrm>
-            <a:off x="5500678" y="5622085"/>
+            <a:off x="5571556" y="5622085"/>
             <a:ext cx="2217711" cy="0"/>
           </a:xfrm>
           <a:prstGeom prst="straightConnector1">
@@ -13161,7 +13609,7 @@
 </p:sld>
 </file>
 
-<file path=ppt/slides/slide28.xml><?xml version="1.0" encoding="utf-8"?>
+<file path=ppt/slides/slide29.xml><?xml version="1.0" encoding="utf-8"?>
 <p:sld xmlns:a="http://schemas.openxmlformats.org/drawingml/2006/main" xmlns:r="http://schemas.openxmlformats.org/officeDocument/2006/relationships" xmlns:p="http://schemas.openxmlformats.org/presentationml/2006/main">
   <p:cSld>
     <p:spTree>
@@ -13570,139 +14018,6 @@
 </p:sld>
 </file>
 
-<file path=ppt/slides/slide29.xml><?xml version="1.0" encoding="utf-8"?>
-<p:sld xmlns:a="http://schemas.openxmlformats.org/drawingml/2006/main" xmlns:r="http://schemas.openxmlformats.org/officeDocument/2006/relationships" xmlns:p="http://schemas.openxmlformats.org/presentationml/2006/main">
-  <p:cSld>
-    <p:spTree>
-      <p:nvGrpSpPr>
-        <p:cNvPr id="1" name=""/>
-        <p:cNvGrpSpPr/>
-        <p:nvPr/>
-      </p:nvGrpSpPr>
-      <p:grpSpPr>
-        <a:xfrm>
-          <a:off x="0" y="0"/>
-          <a:ext cx="0" cy="0"/>
-          <a:chOff x="0" y="0"/>
-          <a:chExt cx="0" cy="0"/>
-        </a:xfrm>
-      </p:grpSpPr>
-      <p:sp>
-        <p:nvSpPr>
-          <p:cNvPr id="2" name="Title 1"/>
-          <p:cNvSpPr>
-            <a:spLocks noGrp="1"/>
-          </p:cNvSpPr>
-          <p:nvPr>
-            <p:ph type="title"/>
-          </p:nvPr>
-        </p:nvSpPr>
-        <p:spPr>
-          <a:xfrm>
-            <a:off x="646111" y="452718"/>
-            <a:ext cx="9404723" cy="672697"/>
-          </a:xfrm>
-        </p:spPr>
-        <p:txBody>
-          <a:bodyPr/>
-          <a:lstStyle/>
-          <a:p>
-            <a:r>
-              <a:rPr lang="en-US" smtClean="0"/>
-              <a:t>Deliverables at CDR</a:t>
-            </a:r>
-            <a:endParaRPr lang="en-US" dirty="0"/>
-          </a:p>
-        </p:txBody>
-      </p:sp>
-      <p:sp>
-        <p:nvSpPr>
-          <p:cNvPr id="3" name="Content Placeholder 2"/>
-          <p:cNvSpPr>
-            <a:spLocks noGrp="1"/>
-          </p:cNvSpPr>
-          <p:nvPr>
-            <p:ph idx="1"/>
-          </p:nvPr>
-        </p:nvSpPr>
-        <p:spPr/>
-        <p:txBody>
-          <a:bodyPr/>
-          <a:lstStyle/>
-          <a:p>
-            <a:r>
-              <a:rPr lang="en-US" dirty="0" smtClean="0"/>
-              <a:t>Thre</a:t>
-            </a:r>
-            <a:r>
-              <a:rPr lang="en-US" dirty="0" smtClean="0"/>
-              <a:t>e dimensional computer generated model. (</a:t>
-            </a:r>
-            <a:r>
-              <a:rPr lang="en-US" dirty="0" err="1" smtClean="0"/>
-              <a:t>Solidworks</a:t>
-            </a:r>
-            <a:r>
-              <a:rPr lang="en-US" dirty="0" smtClean="0"/>
-              <a:t>)</a:t>
-            </a:r>
-          </a:p>
-          <a:p>
-            <a:pPr lvl="1"/>
-            <a:r>
-              <a:rPr lang="en-US" dirty="0" smtClean="0"/>
-              <a:t>includes dimensional drawings  to manufacture external structure</a:t>
-            </a:r>
-          </a:p>
-          <a:p>
-            <a:r>
-              <a:rPr lang="en-US" dirty="0" smtClean="0"/>
-              <a:t>Detailed hardware wiring schematics</a:t>
-            </a:r>
-          </a:p>
-          <a:p>
-            <a:r>
-              <a:rPr lang="en-US" dirty="0" smtClean="0"/>
-              <a:t>Skeleton software, meeting ADNCS and Power requirements</a:t>
-            </a:r>
-          </a:p>
-          <a:p>
-            <a:r>
-              <a:rPr lang="en-US" dirty="0" smtClean="0"/>
-              <a:t>Custom PCB (printed circuit board) for microsecond timing</a:t>
-            </a:r>
-          </a:p>
-          <a:p>
-            <a:r>
-              <a:rPr lang="en-US" dirty="0" smtClean="0"/>
-              <a:t>Orbit requirements, Link Budget, and Data Scheduling algorithms</a:t>
-            </a:r>
-          </a:p>
-          <a:p>
-            <a:endParaRPr lang="en-US" dirty="0"/>
-          </a:p>
-        </p:txBody>
-      </p:sp>
-    </p:spTree>
-    <p:extLst>
-      <p:ext uri="{BB962C8B-B14F-4D97-AF65-F5344CB8AC3E}">
-        <p14:creationId xmlns:p14="http://schemas.microsoft.com/office/powerpoint/2010/main" val="2395279142"/>
-      </p:ext>
-    </p:extLst>
-  </p:cSld>
-  <p:clrMapOvr>
-    <a:masterClrMapping/>
-  </p:clrMapOvr>
-  <p:timing>
-    <p:tnLst>
-      <p:par>
-        <p:cTn id="1" dur="indefinite" restart="never" nodeType="tmRoot"/>
-      </p:par>
-    </p:tnLst>
-  </p:timing>
-</p:sld>
-</file>
-
 <file path=ppt/slides/slide3.xml><?xml version="1.0" encoding="utf-8"?>
 <p:sld xmlns:a="http://schemas.openxmlformats.org/drawingml/2006/main" xmlns:r="http://schemas.openxmlformats.org/officeDocument/2006/relationships" xmlns:p="http://schemas.openxmlformats.org/presentationml/2006/main">
   <p:cSld>
@@ -13920,6 +14235,135 @@
 </file>
 
 <file path=ppt/slides/slide30.xml><?xml version="1.0" encoding="utf-8"?>
+<p:sld xmlns:a="http://schemas.openxmlformats.org/drawingml/2006/main" xmlns:r="http://schemas.openxmlformats.org/officeDocument/2006/relationships" xmlns:p="http://schemas.openxmlformats.org/presentationml/2006/main">
+  <p:cSld>
+    <p:spTree>
+      <p:nvGrpSpPr>
+        <p:cNvPr id="1" name=""/>
+        <p:cNvGrpSpPr/>
+        <p:nvPr/>
+      </p:nvGrpSpPr>
+      <p:grpSpPr>
+        <a:xfrm>
+          <a:off x="0" y="0"/>
+          <a:ext cx="0" cy="0"/>
+          <a:chOff x="0" y="0"/>
+          <a:chExt cx="0" cy="0"/>
+        </a:xfrm>
+      </p:grpSpPr>
+      <p:sp>
+        <p:nvSpPr>
+          <p:cNvPr id="2" name="Title 1"/>
+          <p:cNvSpPr>
+            <a:spLocks noGrp="1"/>
+          </p:cNvSpPr>
+          <p:nvPr>
+            <p:ph type="title"/>
+          </p:nvPr>
+        </p:nvSpPr>
+        <p:spPr>
+          <a:xfrm>
+            <a:off x="646111" y="452718"/>
+            <a:ext cx="9404723" cy="672697"/>
+          </a:xfrm>
+        </p:spPr>
+        <p:txBody>
+          <a:bodyPr/>
+          <a:lstStyle/>
+          <a:p>
+            <a:r>
+              <a:rPr lang="en-US" smtClean="0"/>
+              <a:t>Deliverables at CDR</a:t>
+            </a:r>
+            <a:endParaRPr lang="en-US" dirty="0"/>
+          </a:p>
+        </p:txBody>
+      </p:sp>
+      <p:sp>
+        <p:nvSpPr>
+          <p:cNvPr id="3" name="Content Placeholder 2"/>
+          <p:cNvSpPr>
+            <a:spLocks noGrp="1"/>
+          </p:cNvSpPr>
+          <p:nvPr>
+            <p:ph idx="1"/>
+          </p:nvPr>
+        </p:nvSpPr>
+        <p:spPr/>
+        <p:txBody>
+          <a:bodyPr/>
+          <a:lstStyle/>
+          <a:p>
+            <a:r>
+              <a:rPr lang="en-US" dirty="0" smtClean="0"/>
+              <a:t>Three dimensional computer generated model. (</a:t>
+            </a:r>
+            <a:r>
+              <a:rPr lang="en-US" dirty="0" err="1" smtClean="0"/>
+              <a:t>Solidworks</a:t>
+            </a:r>
+            <a:r>
+              <a:rPr lang="en-US" dirty="0" smtClean="0"/>
+              <a:t>)</a:t>
+            </a:r>
+          </a:p>
+          <a:p>
+            <a:pPr lvl="1"/>
+            <a:r>
+              <a:rPr lang="en-US" dirty="0" smtClean="0"/>
+              <a:t>includes dimensional drawings  to manufacture external structure</a:t>
+            </a:r>
+          </a:p>
+          <a:p>
+            <a:r>
+              <a:rPr lang="en-US" dirty="0" smtClean="0"/>
+              <a:t>Detailed hardware wiring schematics</a:t>
+            </a:r>
+          </a:p>
+          <a:p>
+            <a:r>
+              <a:rPr lang="en-US" dirty="0" smtClean="0"/>
+              <a:t>Skeleton software, meeting ADNCS and Power requirements</a:t>
+            </a:r>
+          </a:p>
+          <a:p>
+            <a:r>
+              <a:rPr lang="en-US" dirty="0" smtClean="0"/>
+              <a:t>Custom PCB (printed circuit board) for microsecond timing</a:t>
+            </a:r>
+          </a:p>
+          <a:p>
+            <a:r>
+              <a:rPr lang="en-US" dirty="0" smtClean="0"/>
+              <a:t>Orbit requirements, Link Budget, and Data Scheduling algorithms</a:t>
+            </a:r>
+          </a:p>
+          <a:p>
+            <a:endParaRPr lang="en-US" dirty="0"/>
+          </a:p>
+        </p:txBody>
+      </p:sp>
+    </p:spTree>
+    <p:extLst>
+      <p:ext uri="{BB962C8B-B14F-4D97-AF65-F5344CB8AC3E}">
+        <p14:creationId xmlns:p14="http://schemas.microsoft.com/office/powerpoint/2010/main" val="2395279142"/>
+      </p:ext>
+    </p:extLst>
+  </p:cSld>
+  <p:clrMapOvr>
+    <a:masterClrMapping/>
+  </p:clrMapOvr>
+  <p:timing>
+    <p:tnLst>
+      <p:par>
+        <p:cTn id="1" dur="indefinite" restart="never" nodeType="tmRoot"/>
+      </p:par>
+    </p:tnLst>
+  </p:timing>
+</p:sld>
+</file>
+
+<file path=ppt/slides/slide31.xml><?xml version="1.0" encoding="utf-8"?>
 <p:sld xmlns:a="http://schemas.openxmlformats.org/drawingml/2006/main" xmlns:r="http://schemas.openxmlformats.org/officeDocument/2006/relationships" xmlns:p="http://schemas.openxmlformats.org/presentationml/2006/main">
   <p:cSld>
     <p:spTree>
@@ -15452,7 +15896,7 @@
   <a:extraClrSchemeLst/>
   <a:extLst>
     <a:ext uri="{05A4C25C-085E-4340-85A3-A5531E510DB2}">
-      <thm15:themeFamily xmlns:thm15="http://schemas.microsoft.com/office/thememl/2012/main" xmlns="" name="Ion" id="{B8441ADB-2E43-4AF7-B97A-BD870242C6A8}" vid="{292E63A9-BB86-4E3D-B92A-7223C6510D2E}"/>
+      <thm15:themeFamily xmlns:thm15="http://schemas.microsoft.com/office/thememl/2012/main" name="Ion" id="{B8441ADB-2E43-4AF7-B97A-BD870242C6A8}" vid="{292E63A9-BB86-4E3D-B92A-7223C6510D2E}"/>
     </a:ext>
   </a:extLst>
 </a:theme>
@@ -15713,7 +16157,7 @@
   <a:extraClrSchemeLst/>
   <a:extLst>
     <a:ext uri="{05A4C25C-085E-4340-85A3-A5531E510DB2}">
-      <thm15:themeFamily xmlns:thm15="http://schemas.microsoft.com/office/thememl/2012/main" xmlns="" name="Office Theme" id="{62F939B6-93AF-4DB8-9C6B-D6C7DFDC589F}" vid="{4A3C46E8-61CC-4603-A589-7422A47A8E4A}"/>
+      <thm15:themeFamily xmlns:thm15="http://schemas.microsoft.com/office/thememl/2012/main" name="Office Theme" id="{62F939B6-93AF-4DB8-9C6B-D6C7DFDC589F}" vid="{4A3C46E8-61CC-4603-A589-7422A47A8E4A}"/>
     </a:ext>
   </a:extLst>
 </a:theme>

</xml_diff>

<commit_message>
Added more comm stuff
</commit_message>
<xml_diff>
--- a/Presentations/PDR_Presentation.pptx
+++ b/Presentations/PDR_Presentation.pptx
@@ -11452,7 +11452,7 @@
             <p:ph idx="1"/>
             <p:extLst>
               <p:ext uri="{D42A27DB-BD31-4B8C-83A1-F6EECF244321}">
-                <p14:modId xmlns:p14="http://schemas.microsoft.com/office/powerpoint/2010/main" val="2829187582"/>
+                <p14:modId xmlns:p14="http://schemas.microsoft.com/office/powerpoint/2010/main" val="2652738268"/>
               </p:ext>
             </p:extLst>
           </p:nvPr>
@@ -11817,6 +11817,14 @@
                     <a:bodyPr/>
                     <a:lstStyle/>
                     <a:p>
+                      <a:r>
+                        <a:rPr lang="en-US" dirty="0" smtClean="0"/>
+                        <a:t>Military,</a:t>
+                      </a:r>
+                      <a:r>
+                        <a:rPr lang="en-US" baseline="0" dirty="0" smtClean="0"/>
+                        <a:t> SCADA</a:t>
+                      </a:r>
                       <a:endParaRPr lang="en-US" dirty="0"/>
                     </a:p>
                   </a:txBody>
@@ -15641,7 +15649,7 @@
   <a:themeElements>
     <a:clrScheme name="Ion">
       <a:dk1>
-        <a:sysClr val="windowText" lastClr="000000"/>
+        <a:sysClr val="windowText" lastClr="1E1E1E"/>
       </a:dk1>
       <a:lt1>
         <a:sysClr val="window" lastClr="FFFFFF"/>
@@ -15907,7 +15915,7 @@
   <a:themeElements>
     <a:clrScheme name="Office">
       <a:dk1>
-        <a:sysClr val="windowText" lastClr="000000"/>
+        <a:sysClr val="windowText" lastClr="1E1E1E"/>
       </a:dk1>
       <a:lt1>
         <a:sysClr val="window" lastClr="FFFFFF"/>

</xml_diff>

<commit_message>
updated Gantt chart slide
</commit_message>
<xml_diff>
--- a/Presentations/PDR_Presentation.pptx
+++ b/Presentations/PDR_Presentation.pptx
@@ -5,7 +5,7 @@
     <p:sldMasterId id="2147483660" r:id="rId1"/>
   </p:sldMasterIdLst>
   <p:notesMasterIdLst>
-    <p:notesMasterId r:id="rId33"/>
+    <p:notesMasterId r:id="rId34"/>
   </p:notesMasterIdLst>
   <p:sldIdLst>
     <p:sldId id="256" r:id="rId2"/>
@@ -37,8 +37,9 @@
     <p:sldId id="308" r:id="rId28"/>
     <p:sldId id="282" r:id="rId29"/>
     <p:sldId id="283" r:id="rId30"/>
-    <p:sldId id="304" r:id="rId31"/>
-    <p:sldId id="307" r:id="rId32"/>
+    <p:sldId id="309" r:id="rId31"/>
+    <p:sldId id="304" r:id="rId32"/>
+    <p:sldId id="307" r:id="rId33"/>
   </p:sldIdLst>
   <p:sldSz cx="12192000" cy="6858000"/>
   <p:notesSz cx="6858000" cy="9144000"/>
@@ -14269,6 +14270,157 @@
             <p:ph type="title"/>
           </p:nvPr>
         </p:nvSpPr>
+        <p:spPr/>
+        <p:txBody>
+          <a:bodyPr/>
+          <a:lstStyle/>
+          <a:p>
+            <a:r>
+              <a:rPr lang="en-US" dirty="0" smtClean="0"/>
+              <a:t>Book-keeping</a:t>
+            </a:r>
+            <a:endParaRPr lang="en-US" dirty="0"/>
+          </a:p>
+        </p:txBody>
+      </p:sp>
+      <p:sp>
+        <p:nvSpPr>
+          <p:cNvPr id="3" name="Content Placeholder 2"/>
+          <p:cNvSpPr>
+            <a:spLocks noGrp="1"/>
+          </p:cNvSpPr>
+          <p:nvPr>
+            <p:ph sz="half" idx="1"/>
+          </p:nvPr>
+        </p:nvSpPr>
+        <p:spPr/>
+        <p:txBody>
+          <a:bodyPr/>
+          <a:lstStyle/>
+          <a:p>
+            <a:r>
+              <a:rPr lang="en-US" dirty="0" smtClean="0"/>
+              <a:t>Communication</a:t>
+            </a:r>
+          </a:p>
+          <a:p>
+            <a:pPr lvl="1"/>
+            <a:r>
+              <a:rPr lang="en-US" dirty="0" smtClean="0"/>
+              <a:t>Google Groups</a:t>
+            </a:r>
+          </a:p>
+          <a:p>
+            <a:pPr lvl="1"/>
+            <a:r>
+              <a:rPr lang="en-US" dirty="0" smtClean="0"/>
+              <a:t>Email </a:t>
+            </a:r>
+          </a:p>
+          <a:p>
+            <a:r>
+              <a:rPr lang="en-US" dirty="0" smtClean="0"/>
+              <a:t>Data and Group sharing</a:t>
+            </a:r>
+          </a:p>
+          <a:p>
+            <a:pPr lvl="1"/>
+            <a:r>
+              <a:rPr lang="en-US" dirty="0" err="1" smtClean="0"/>
+              <a:t>Github</a:t>
+            </a:r>
+            <a:r>
+              <a:rPr lang="en-US" dirty="0" smtClean="0"/>
+              <a:t> </a:t>
+            </a:r>
+          </a:p>
+          <a:p>
+            <a:r>
+              <a:rPr lang="en-US" dirty="0" smtClean="0"/>
+              <a:t>Scheduling </a:t>
+            </a:r>
+          </a:p>
+          <a:p>
+            <a:pPr lvl="1"/>
+            <a:r>
+              <a:rPr lang="en-US" dirty="0" smtClean="0"/>
+              <a:t>Excel based Gantt on </a:t>
+            </a:r>
+            <a:r>
+              <a:rPr lang="en-US" dirty="0" err="1" smtClean="0"/>
+              <a:t>Github</a:t>
+            </a:r>
+            <a:endParaRPr lang="en-US" dirty="0" smtClean="0"/>
+          </a:p>
+          <a:p>
+            <a:endParaRPr lang="en-US" dirty="0" smtClean="0"/>
+          </a:p>
+        </p:txBody>
+      </p:sp>
+      <p:pic>
+        <p:nvPicPr>
+          <p:cNvPr id="6" name="Picture 5"/>
+          <p:cNvPicPr>
+            <a:picLocks noChangeAspect="1"/>
+          </p:cNvPicPr>
+          <p:nvPr/>
+        </p:nvPicPr>
+        <p:blipFill>
+          <a:blip r:embed="rId2"/>
+          <a:stretch>
+            <a:fillRect/>
+          </a:stretch>
+        </p:blipFill>
+        <p:spPr>
+          <a:xfrm>
+            <a:off x="6056244" y="1424815"/>
+            <a:ext cx="4895738" cy="4962525"/>
+          </a:xfrm>
+          <a:prstGeom prst="rect">
+            <a:avLst/>
+          </a:prstGeom>
+        </p:spPr>
+      </p:pic>
+    </p:spTree>
+    <p:extLst>
+      <p:ext uri="{BB962C8B-B14F-4D97-AF65-F5344CB8AC3E}">
+        <p14:creationId xmlns:p14="http://schemas.microsoft.com/office/powerpoint/2010/main" val="626953493"/>
+      </p:ext>
+    </p:extLst>
+  </p:cSld>
+  <p:clrMapOvr>
+    <a:masterClrMapping/>
+  </p:clrMapOvr>
+</p:sld>
+</file>
+
+<file path=ppt/slides/slide31.xml><?xml version="1.0" encoding="utf-8"?>
+<p:sld xmlns:a="http://schemas.openxmlformats.org/drawingml/2006/main" xmlns:r="http://schemas.openxmlformats.org/officeDocument/2006/relationships" xmlns:p="http://schemas.openxmlformats.org/presentationml/2006/main">
+  <p:cSld>
+    <p:spTree>
+      <p:nvGrpSpPr>
+        <p:cNvPr id="1" name=""/>
+        <p:cNvGrpSpPr/>
+        <p:nvPr/>
+      </p:nvGrpSpPr>
+      <p:grpSpPr>
+        <a:xfrm>
+          <a:off x="0" y="0"/>
+          <a:ext cx="0" cy="0"/>
+          <a:chOff x="0" y="0"/>
+          <a:chExt cx="0" cy="0"/>
+        </a:xfrm>
+      </p:grpSpPr>
+      <p:sp>
+        <p:nvSpPr>
+          <p:cNvPr id="2" name="Title 1"/>
+          <p:cNvSpPr>
+            <a:spLocks noGrp="1"/>
+          </p:cNvSpPr>
+          <p:nvPr>
+            <p:ph type="title"/>
+          </p:nvPr>
+        </p:nvSpPr>
         <p:spPr>
           <a:xfrm>
             <a:off x="646111" y="452718"/>
@@ -14371,7 +14523,7 @@
 </p:sld>
 </file>
 
-<file path=ppt/slides/slide31.xml><?xml version="1.0" encoding="utf-8"?>
+<file path=ppt/slides/slide32.xml><?xml version="1.0" encoding="utf-8"?>
 <p:sld xmlns:a="http://schemas.openxmlformats.org/drawingml/2006/main" xmlns:r="http://schemas.openxmlformats.org/officeDocument/2006/relationships" xmlns:p="http://schemas.openxmlformats.org/presentationml/2006/main">
   <p:cSld>
     <p:spTree>
@@ -15649,7 +15801,7 @@
   <a:themeElements>
     <a:clrScheme name="Ion">
       <a:dk1>
-        <a:sysClr val="windowText" lastClr="1E1E1E"/>
+        <a:sysClr val="windowText" lastClr="000000"/>
       </a:dk1>
       <a:lt1>
         <a:sysClr val="window" lastClr="FFFFFF"/>
@@ -15915,7 +16067,7 @@
   <a:themeElements>
     <a:clrScheme name="Office">
       <a:dk1>
-        <a:sysClr val="windowText" lastClr="1E1E1E"/>
+        <a:sysClr val="windowText" lastClr="000000"/>
       </a:dk1>
       <a:lt1>
         <a:sysClr val="window" lastClr="FFFFFF"/>

</xml_diff>

<commit_message>
Added The Millenium Falcon
</commit_message>
<xml_diff>
--- a/Presentations/PDR_Presentation.pptx
+++ b/Presentations/PDR_Presentation.pptx
@@ -5,7 +5,7 @@
     <p:sldMasterId id="2147483660" r:id="rId1"/>
   </p:sldMasterIdLst>
   <p:notesMasterIdLst>
-    <p:notesMasterId r:id="rId33"/>
+    <p:notesMasterId r:id="rId34"/>
   </p:notesMasterIdLst>
   <p:sldIdLst>
     <p:sldId id="256" r:id="rId2"/>
@@ -37,8 +37,9 @@
     <p:sldId id="308" r:id="rId28"/>
     <p:sldId id="282" r:id="rId29"/>
     <p:sldId id="283" r:id="rId30"/>
-    <p:sldId id="304" r:id="rId31"/>
-    <p:sldId id="307" r:id="rId32"/>
+    <p:sldId id="309" r:id="rId31"/>
+    <p:sldId id="304" r:id="rId32"/>
+    <p:sldId id="307" r:id="rId33"/>
   </p:sldIdLst>
   <p:sldSz cx="12192000" cy="6858000"/>
   <p:notesSz cx="6858000" cy="9144000"/>
@@ -8289,7 +8290,15 @@
           <a:p>
             <a:r>
               <a:rPr lang="en-US" dirty="0" smtClean="0"/>
-              <a:t>*Currently owned and wouldn’t contribute to total budget</a:t>
+              <a:t>*Currently owned and </a:t>
+            </a:r>
+            <a:r>
+              <a:rPr lang="en-US" dirty="0" smtClean="0"/>
+              <a:t>won’t </a:t>
+            </a:r>
+            <a:r>
+              <a:rPr lang="en-US" dirty="0" smtClean="0"/>
+              <a:t>contribute to total budget</a:t>
             </a:r>
             <a:endParaRPr lang="en-US" dirty="0"/>
           </a:p>
@@ -8925,7 +8934,15 @@
           <a:p>
             <a:r>
               <a:rPr lang="en-US" dirty="0"/>
-              <a:t>*Currently owned and wouldn’t contribute to total budget</a:t>
+              <a:t>*Currently owned and </a:t>
+            </a:r>
+            <a:r>
+              <a:rPr lang="en-US" dirty="0" smtClean="0"/>
+              <a:t>won’t </a:t>
+            </a:r>
+            <a:r>
+              <a:rPr lang="en-US" dirty="0"/>
+              <a:t>contribute to total budget</a:t>
             </a:r>
           </a:p>
         </p:txBody>
@@ -11165,16 +11182,25 @@
           <a:p>
             <a:r>
               <a:rPr lang="en-US" dirty="0"/>
-              <a:t>One event per </a:t>
+              <a:t>One event </a:t>
             </a:r>
             <a:r>
               <a:rPr lang="en-US" dirty="0" smtClean="0"/>
-              <a:t>orbit assumed (1 MB </a:t>
+              <a:t>assumed ≤ 1 </a:t>
+            </a:r>
+            <a:r>
+              <a:rPr lang="en-US" dirty="0" smtClean="0"/>
+              <a:t>MB </a:t>
             </a:r>
             <a:r>
               <a:rPr lang="en-US" dirty="0"/>
-              <a:t>of data per event)</a:t>
-            </a:r>
+              <a:t>of </a:t>
+            </a:r>
+            <a:r>
+              <a:rPr lang="en-US" dirty="0" smtClean="0"/>
+              <a:t>data</a:t>
+            </a:r>
+            <a:endParaRPr lang="en-US" dirty="0"/>
           </a:p>
           <a:p>
             <a:endParaRPr lang="en-US" dirty="0" smtClean="0"/>
@@ -12856,7 +12882,7 @@
           <p:nvPr>
             <p:extLst>
               <p:ext uri="{D42A27DB-BD31-4B8C-83A1-F6EECF244321}">
-                <p14:modId xmlns:p14="http://schemas.microsoft.com/office/powerpoint/2010/main" val="492223669"/>
+                <p14:modId xmlns:p14="http://schemas.microsoft.com/office/powerpoint/2010/main" val="336748045"/>
               </p:ext>
             </p:extLst>
           </p:nvPr>
@@ -13192,8 +13218,9 @@
                       <a:pPr algn="ctr"/>
                       <a:r>
                         <a:rPr lang="en-US" dirty="0" smtClean="0"/>
-                        <a:t>8</a:t>
-                      </a:r>
+                        <a:t>4</a:t>
+                      </a:r>
+                      <a:endParaRPr lang="en-US" dirty="0" smtClean="0"/>
                     </a:p>
                     <a:p>
                       <a:pPr algn="ctr"/>
@@ -13251,6 +13278,13 @@
   <p:clrMapOvr>
     <a:masterClrMapping/>
   </p:clrMapOvr>
+  <p:timing>
+    <p:tnLst>
+      <p:par>
+        <p:cTn id="1" dur="indefinite" restart="never" nodeType="tmRoot"/>
+      </p:par>
+    </p:tnLst>
+  </p:timing>
 </p:sld>
 </file>
 
@@ -14178,7 +14212,7 @@
           <a:p>
             <a:r>
               <a:rPr lang="en-US" dirty="0" smtClean="0"/>
-              <a:t>Background</a:t>
+              <a:t>Motivation</a:t>
             </a:r>
             <a:endParaRPr lang="en-US" dirty="0"/>
           </a:p>
@@ -14380,6 +14414,169 @@
             <p:ph type="title"/>
           </p:nvPr>
         </p:nvSpPr>
+        <p:spPr/>
+        <p:txBody>
+          <a:bodyPr/>
+          <a:lstStyle/>
+          <a:p>
+            <a:r>
+              <a:rPr lang="en-US" dirty="0" smtClean="0"/>
+              <a:t>Book-keeping</a:t>
+            </a:r>
+            <a:endParaRPr lang="en-US" dirty="0"/>
+          </a:p>
+        </p:txBody>
+      </p:sp>
+      <p:sp>
+        <p:nvSpPr>
+          <p:cNvPr id="3" name="Content Placeholder 2"/>
+          <p:cNvSpPr>
+            <a:spLocks noGrp="1"/>
+          </p:cNvSpPr>
+          <p:nvPr>
+            <p:ph sz="half" idx="1"/>
+          </p:nvPr>
+        </p:nvSpPr>
+        <p:spPr/>
+        <p:txBody>
+          <a:bodyPr/>
+          <a:lstStyle/>
+          <a:p>
+            <a:r>
+              <a:rPr lang="en-US" dirty="0" smtClean="0"/>
+              <a:t>Communication</a:t>
+            </a:r>
+          </a:p>
+          <a:p>
+            <a:pPr lvl="1"/>
+            <a:r>
+              <a:rPr lang="en-US" dirty="0" smtClean="0"/>
+              <a:t>Google Groups</a:t>
+            </a:r>
+          </a:p>
+          <a:p>
+            <a:pPr lvl="1"/>
+            <a:r>
+              <a:rPr lang="en-US" dirty="0" smtClean="0"/>
+              <a:t>Email </a:t>
+            </a:r>
+          </a:p>
+          <a:p>
+            <a:r>
+              <a:rPr lang="en-US" dirty="0" smtClean="0"/>
+              <a:t>Data </a:t>
+            </a:r>
+            <a:r>
+              <a:rPr lang="en-US" dirty="0" smtClean="0"/>
+              <a:t>sharing</a:t>
+            </a:r>
+            <a:endParaRPr lang="en-US" dirty="0" smtClean="0"/>
+          </a:p>
+          <a:p>
+            <a:pPr lvl="1"/>
+            <a:r>
+              <a:rPr lang="en-US" dirty="0" err="1" smtClean="0"/>
+              <a:t>Github</a:t>
+            </a:r>
+            <a:r>
+              <a:rPr lang="en-US" dirty="0" smtClean="0"/>
+              <a:t> </a:t>
+            </a:r>
+          </a:p>
+          <a:p>
+            <a:r>
+              <a:rPr lang="en-US" dirty="0" smtClean="0"/>
+              <a:t>Scheduling </a:t>
+            </a:r>
+          </a:p>
+          <a:p>
+            <a:pPr lvl="1"/>
+            <a:r>
+              <a:rPr lang="en-US" dirty="0" smtClean="0"/>
+              <a:t>Excel based Gantt on </a:t>
+            </a:r>
+            <a:r>
+              <a:rPr lang="en-US" dirty="0" err="1" smtClean="0"/>
+              <a:t>Github</a:t>
+            </a:r>
+            <a:endParaRPr lang="en-US" dirty="0" smtClean="0"/>
+          </a:p>
+          <a:p>
+            <a:endParaRPr lang="en-US" dirty="0" smtClean="0"/>
+          </a:p>
+        </p:txBody>
+      </p:sp>
+      <p:pic>
+        <p:nvPicPr>
+          <p:cNvPr id="6" name="Picture 5"/>
+          <p:cNvPicPr>
+            <a:picLocks noChangeAspect="1"/>
+          </p:cNvPicPr>
+          <p:nvPr/>
+        </p:nvPicPr>
+        <p:blipFill>
+          <a:blip r:embed="rId2"/>
+          <a:stretch>
+            <a:fillRect/>
+          </a:stretch>
+        </p:blipFill>
+        <p:spPr>
+          <a:xfrm>
+            <a:off x="6066183" y="1424816"/>
+            <a:ext cx="3671804" cy="4962525"/>
+          </a:xfrm>
+          <a:prstGeom prst="rect">
+            <a:avLst/>
+          </a:prstGeom>
+        </p:spPr>
+      </p:pic>
+    </p:spTree>
+    <p:extLst>
+      <p:ext uri="{BB962C8B-B14F-4D97-AF65-F5344CB8AC3E}">
+        <p14:creationId xmlns:p14="http://schemas.microsoft.com/office/powerpoint/2010/main" val="3965587775"/>
+      </p:ext>
+    </p:extLst>
+  </p:cSld>
+  <p:clrMapOvr>
+    <a:masterClrMapping/>
+  </p:clrMapOvr>
+  <p:timing>
+    <p:tnLst>
+      <p:par>
+        <p:cTn id="1" dur="indefinite" restart="never" nodeType="tmRoot"/>
+      </p:par>
+    </p:tnLst>
+  </p:timing>
+</p:sld>
+</file>
+
+<file path=ppt/slides/slide31.xml><?xml version="1.0" encoding="utf-8"?>
+<p:sld xmlns:a="http://schemas.openxmlformats.org/drawingml/2006/main" xmlns:r="http://schemas.openxmlformats.org/officeDocument/2006/relationships" xmlns:p="http://schemas.openxmlformats.org/presentationml/2006/main">
+  <p:cSld>
+    <p:spTree>
+      <p:nvGrpSpPr>
+        <p:cNvPr id="1" name=""/>
+        <p:cNvGrpSpPr/>
+        <p:nvPr/>
+      </p:nvGrpSpPr>
+      <p:grpSpPr>
+        <a:xfrm>
+          <a:off x="0" y="0"/>
+          <a:ext cx="0" cy="0"/>
+          <a:chOff x="0" y="0"/>
+          <a:chExt cx="0" cy="0"/>
+        </a:xfrm>
+      </p:grpSpPr>
+      <p:sp>
+        <p:nvSpPr>
+          <p:cNvPr id="2" name="Title 1"/>
+          <p:cNvSpPr>
+            <a:spLocks noGrp="1"/>
+          </p:cNvSpPr>
+          <p:nvPr>
+            <p:ph type="title"/>
+          </p:nvPr>
+        </p:nvSpPr>
         <p:spPr>
           <a:xfrm>
             <a:off x="646111" y="452718"/>
@@ -14415,16 +14612,21 @@
           <a:p>
             <a:r>
               <a:rPr lang="en-US" dirty="0" smtClean="0"/>
-              <a:t>Three dimensional computer generated model. (</a:t>
-            </a:r>
-            <a:r>
-              <a:rPr lang="en-US" dirty="0" err="1" smtClean="0"/>
-              <a:t>Solidworks</a:t>
+              <a:t>Three dimensional computer generated </a:t>
             </a:r>
             <a:r>
               <a:rPr lang="en-US" dirty="0" smtClean="0"/>
-              <a:t>)</a:t>
-            </a:r>
+              <a:t>model </a:t>
+            </a:r>
+            <a:r>
+              <a:rPr lang="en-US" dirty="0" smtClean="0"/>
+              <a:t>(</a:t>
+            </a:r>
+            <a:r>
+              <a:rPr lang="en-US" dirty="0" smtClean="0"/>
+              <a:t>SolidWorks)</a:t>
+            </a:r>
+            <a:endParaRPr lang="en-US" dirty="0" smtClean="0"/>
           </a:p>
           <a:p>
             <a:pPr lvl="1"/>
@@ -14442,8 +14644,13 @@
           <a:p>
             <a:r>
               <a:rPr lang="en-US" dirty="0" smtClean="0"/>
-              <a:t>Skeleton software, meeting ADNCS and Power requirements</a:t>
-            </a:r>
+              <a:t>Skeleton software, meeting ADNCS and Power </a:t>
+            </a:r>
+            <a:r>
+              <a:rPr lang="en-US" dirty="0" smtClean="0"/>
+              <a:t>control</a:t>
+            </a:r>
+            <a:endParaRPr lang="en-US" dirty="0" smtClean="0"/>
           </a:p>
           <a:p>
             <a:r>
@@ -14454,7 +14661,11 @@
           <a:p>
             <a:r>
               <a:rPr lang="en-US" dirty="0" smtClean="0"/>
-              <a:t>Orbit requirements, Link Budget, and Data Scheduling algorithms</a:t>
+              <a:t>Orbit, </a:t>
+            </a:r>
+            <a:r>
+              <a:rPr lang="en-US" dirty="0" smtClean="0"/>
+              <a:t>Link Budget, and Data Scheduling algorithms</a:t>
             </a:r>
           </a:p>
           <a:p>
@@ -14482,7 +14693,7 @@
 </p:sld>
 </file>
 
-<file path=ppt/slides/slide31.xml><?xml version="1.0" encoding="utf-8"?>
+<file path=ppt/slides/slide32.xml><?xml version="1.0" encoding="utf-8"?>
 <p:sld xmlns:a="http://schemas.openxmlformats.org/drawingml/2006/main" xmlns:r="http://schemas.openxmlformats.org/officeDocument/2006/relationships" xmlns:p="http://schemas.openxmlformats.org/presentationml/2006/main">
   <p:cSld>
     <p:spTree>
@@ -14571,6 +14782,30 @@
           <a:effectLst/>
         </p:spPr>
       </p:pic>
+      <p:pic>
+        <p:nvPicPr>
+          <p:cNvPr id="6" name="Picture 5"/>
+          <p:cNvPicPr>
+            <a:picLocks noChangeAspect="1"/>
+          </p:cNvPicPr>
+          <p:nvPr/>
+        </p:nvPicPr>
+        <p:blipFill>
+          <a:blip r:embed="rId3"/>
+          <a:stretch>
+            <a:fillRect/>
+          </a:stretch>
+        </p:blipFill>
+        <p:spPr>
+          <a:xfrm rot="503569">
+            <a:off x="-2828538" y="3314130"/>
+            <a:ext cx="2865538" cy="2106215"/>
+          </a:xfrm>
+          <a:prstGeom prst="rect">
+            <a:avLst/>
+          </a:prstGeom>
+        </p:spPr>
+      </p:pic>
     </p:spTree>
     <p:extLst>
       <p:ext uri="{BB962C8B-B14F-4D97-AF65-F5344CB8AC3E}">
@@ -14581,6 +14816,79 @@
   <p:clrMapOvr>
     <a:masterClrMapping/>
   </p:clrMapOvr>
+  <p:timing>
+    <p:tnLst>
+      <p:par>
+        <p:cTn id="1" dur="indefinite" restart="never" nodeType="tmRoot">
+          <p:childTnLst>
+            <p:seq concurrent="1" nextAc="seek">
+              <p:cTn id="2" dur="indefinite" nodeType="mainSeq">
+                <p:childTnLst>
+                  <p:par>
+                    <p:cTn id="3" fill="hold">
+                      <p:stCondLst>
+                        <p:cond delay="indefinite"/>
+                        <p:cond evt="onBegin" delay="0">
+                          <p:tn val="2"/>
+                        </p:cond>
+                      </p:stCondLst>
+                      <p:childTnLst>
+                        <p:par>
+                          <p:cTn id="4" fill="hold">
+                            <p:stCondLst>
+                              <p:cond delay="0"/>
+                            </p:stCondLst>
+                            <p:childTnLst>
+                              <p:par>
+                                <p:cTn id="5" presetID="60" presetClass="path" presetSubtype="0" accel="50000" decel="50000" fill="hold" nodeType="withEffect">
+                                  <p:stCondLst>
+                                    <p:cond delay="1000"/>
+                                  </p:stCondLst>
+                                  <p:childTnLst>
+                                    <p:animMotion origin="layout" path="M 0.00521 0.07824 C 0.01523 0.11157 0.04114 0.15763 0.13177 0.1574 C 0.26367 0.1574 0.27369 0.00185 0.43021 0.00162 C 0.57278 0.00162 0.49622 0.13703 0.63268 0.13634 C 0.77474 0.13634 0.69883 0.03819 0.85169 0.03819 C 0.98802 0.03819 0.91211 0.10463 1.03398 0.10463 C 1.15039 0.10463 1.08971 0.05393 1.19596 0.05393 C 1.25677 0.05393 1.26198 0.06736 1.26679 0.07824 " pathEditMode="relative" rAng="0" ptsTypes="AAAAAAAA">
+                                      <p:cBhvr>
+                                        <p:cTn id="6" dur="5500" fill="hold"/>
+                                        <p:tgtEl>
+                                          <p:spTgt spid="6"/>
+                                        </p:tgtEl>
+                                        <p:attrNameLst>
+                                          <p:attrName>ppt_x</p:attrName>
+                                          <p:attrName>ppt_y</p:attrName>
+                                        </p:attrNameLst>
+                                      </p:cBhvr>
+                                      <p:rCtr x="63073" y="116"/>
+                                    </p:animMotion>
+                                  </p:childTnLst>
+                                </p:cTn>
+                              </p:par>
+                            </p:childTnLst>
+                          </p:cTn>
+                        </p:par>
+                      </p:childTnLst>
+                    </p:cTn>
+                  </p:par>
+                </p:childTnLst>
+              </p:cTn>
+              <p:prevCondLst>
+                <p:cond evt="onPrev" delay="0">
+                  <p:tgtEl>
+                    <p:sldTgt/>
+                  </p:tgtEl>
+                </p:cond>
+              </p:prevCondLst>
+              <p:nextCondLst>
+                <p:cond evt="onNext" delay="0">
+                  <p:tgtEl>
+                    <p:sldTgt/>
+                  </p:tgtEl>
+                </p:cond>
+              </p:nextCondLst>
+            </p:seq>
+          </p:childTnLst>
+        </p:cTn>
+      </p:par>
+    </p:tnLst>
+  </p:timing>
 </p:sld>
 </file>
 
@@ -15410,7 +15718,11 @@
             <a:pPr lvl="1"/>
             <a:r>
               <a:rPr lang="en-US" dirty="0" smtClean="0"/>
-              <a:t>Defined by ________________ as -40ºC to 85ºC</a:t>
+              <a:t>Defined as </a:t>
+            </a:r>
+            <a:r>
+              <a:rPr lang="en-US" dirty="0" smtClean="0"/>
+              <a:t>-40ºC to 85ºC</a:t>
             </a:r>
             <a:endParaRPr lang="en-US" dirty="0"/>
           </a:p>

</xml_diff>